<commit_message>
làm việc với form
</commit_message>
<xml_diff>
--- a/lesson7.pptx
+++ b/lesson7.pptx
@@ -5,7 +5,7 @@
     <p:sldMasterId id="2147483648" r:id="rId1"/>
   </p:sldMasterIdLst>
   <p:notesMasterIdLst>
-    <p:notesMasterId r:id="rId13"/>
+    <p:notesMasterId r:id="rId21"/>
   </p:notesMasterIdLst>
   <p:sldIdLst>
     <p:sldId id="256" r:id="rId2"/>
@@ -19,6 +19,14 @@
     <p:sldId id="264" r:id="rId10"/>
     <p:sldId id="265" r:id="rId11"/>
     <p:sldId id="266" r:id="rId12"/>
+    <p:sldId id="267" r:id="rId13"/>
+    <p:sldId id="268" r:id="rId14"/>
+    <p:sldId id="269" r:id="rId15"/>
+    <p:sldId id="270" r:id="rId16"/>
+    <p:sldId id="271" r:id="rId17"/>
+    <p:sldId id="272" r:id="rId18"/>
+    <p:sldId id="273" r:id="rId19"/>
+    <p:sldId id="274" r:id="rId20"/>
   </p:sldIdLst>
   <p:sldSz cx="12192000" cy="6858000"/>
   <p:notesSz cx="6858000" cy="9144000"/>
@@ -535,6 +543,797 @@
   <inkml:trace contextRef="#ctx0" brushRef="#br0" timeOffset="163180">27988 15274 24449,'46'-36'1485,"0"-7"-1561,-11 9 12,-2-6-287,-11 9 157,-2-2-329,-1-3 110,-2-3-295,1-21-381,-7 13 26,-2-16-215,-6 21 387,-3 0 114,0 0-192,0-14 21,0 15 149,-16-17-275,12 30 346,-11-3-211,15 41 745,0 34-75,0 10-384,7-2 0,1 1-907,-4 9 243,11-4 0,-1 1 726,-12-23 1,-1-2 622,6 13 1,0-1-1,-7 17 1,0 1-1</inkml:trace>
   <inkml:trace contextRef="#ctx0" brushRef="#br0" timeOffset="163313">28148 15474 24449,'-16'2'2004,"-4"0"-1335,19-1-805,13-1-2536,37 1 443,1-1 2211,-12 0 1,-1 0 0,13 0 0,3 0 0</inkml:trace>
   <inkml:trace contextRef="#ctx0" brushRef="#br0" timeOffset="163446">29573 15622 27777,'29'0'-4408,"4"0"4408,-10 0 0,2 0 0,-10 0 0</inkml:trace>
+</inkml:ink>
+</file>
+
+<file path=ppt/ink/ink11.xml><?xml version="1.0" encoding="utf-8"?>
+<inkml:ink xmlns:inkml="http://www.w3.org/2003/InkML">
+  <inkml:definitions>
+    <inkml:context xml:id="ctx0">
+      <inkml:inkSource xml:id="inkSrc0">
+        <inkml:traceFormat>
+          <inkml:channel name="X" type="integer" min="-2.14748E9" max="2.14748E9" units="cm"/>
+          <inkml:channel name="Y" type="integer" min="-2.14748E9" max="2.14748E9" units="cm"/>
+          <inkml:channel name="F" type="integer" max="32767" units="dev"/>
+        </inkml:traceFormat>
+        <inkml:channelProperties>
+          <inkml:channelProperty channel="X" name="resolution" value="1000" units="1/cm"/>
+          <inkml:channelProperty channel="Y" name="resolution" value="1000" units="1/cm"/>
+          <inkml:channelProperty channel="F" name="resolution" value="0" units="1/dev"/>
+        </inkml:channelProperties>
+      </inkml:inkSource>
+      <inkml:timestamp xml:id="ts0" timeString="2021-07-19T06:39:33.703"/>
+    </inkml:context>
+    <inkml:brush xml:id="br0">
+      <inkml:brushProperty name="width" value="0.12095" units="cm"/>
+      <inkml:brushProperty name="height" value="0.12095" units="cm"/>
+    </inkml:brush>
+  </inkml:definitions>
+  <inkml:trace contextRef="#ctx0" brushRef="#br0">1908 1101 23279,'0'-35'-4676,"0"1"3267,0 3 1064,0-1 246,0 2 213,0 2 122,0 0 615,0-14-2087,0 16 1506,0-15-180,0 25-1,0-3-89,-14 9 219,10 0-937,-25 5 1861,5 3 273,-25 22 707,5-1-1275,7 9 1,0 4 457,-7 10-620,14-11 1,1 0 273,-7 17 1011,8 0-2327,6-3-275,7 15-1262,8-17 234,26 20-678,-13-30 446,46 6 872,-28-16-134,27 0 868,-12-4 96,15 6 438,-15-7 118,7 7 824,-20-12-68,-13 1-1577,-3-2 418,-10-4-736,-20 10 1718,14-5-1037,-42 9 833,4 7 62,-15-6-410,27-8 1,1 0 661,-15 2-85,2-3 142,5-6-1079,-10-4 1,15-2 0,-5-2 0</inkml:trace>
+  <inkml:trace contextRef="#ctx0" brushRef="#br0" timeOffset="230">1435 670 23189,'11'-23'-2115,"5"0"2262,-14 10-352,6 2 718,-3 24-2754,4 12 609,4 12 427,4 12 89,-4-11 1,-1 2 431,-1-6 1,0 3 69,1 7 0,1 6 0,0-3 241,-3-2 0,1 3-39,0-2 1,2 7 0,-1 1 0,-1-6 61,1 5 1,-1-1-408,4 11 0,1 7 0,-1-10 179,-4-16 0,0-3 594,3 13 1,0-3 0,-4-17-1,-1-2 1,11 31 0</inkml:trace>
+  <inkml:trace contextRef="#ctx0" brushRef="#br0" timeOffset="1282">3163 1282 23999,'-23'-21'-5157,"-23"1"5226,22 3-1118,-25 2 1591,9 4-273,-2 4 267,-4 3 93,-3 4-629,1 18 2150,0-13-1170,3 40-391,18-25 1,1 2 184,-7 34-819,15-16 0,3 0-557,6 9-504,6 15-377,29-25-1119,-3-1 410,26-8 1654,-17-13 1,2-2-389,20 3 1044,-3-9 0,2-3 645,11-3-103,-22-13 0,-2-3 1490,11 8-883,-28-19 1,-1-2 493,15 2-1215,-17-8 1,-3-3-467,2-10 91,-9 5 1,-4-1-956,-3-7-55,-11 4 1,-2 2-1791,5 4-19,-13-15 735,4 40 442,11 25 1129,-10 5 1012,13 25-903,6-2 0,3 2-439,9 14-518,0 3 0,2 0-380,9-1 1608,-7-13 1,1-1 0,8 1-1,-10-17 1,0-1 0</inkml:trace>
+  <inkml:trace contextRef="#ctx0" brushRef="#br0" timeOffset="1580">3618 1377 23999,'0'-19'-5936,"0"3"3808,18 55-153,-13-18 1603,10 19 0,3 2-309,1-6 716,-3-6 1,0 0-102,2 2-1674,7 5 2875,-17-13-1422,5-8 985,-5-3-154,-7-28 512,1-3 107,-2-21-451,0 0 44,0-8-289,0-7-630,0 8 1,0 0 59,0 10 0,0 0-504,-2-24 1,4 0 962,8 27 0,1 2 0,-9-9 1,1 2-1,18-9 0</inkml:trace>
+  <inkml:trace contextRef="#ctx0" brushRef="#br0" timeOffset="1915">4395 1235 24269,'-29'0'-180,"12"23"-751,5-4 171,12 23-1456,0-7 739,18 22-277,-13-11 850,27 11-1157,-28-18 288,10-5-182,-1-2 498,-9 4 1723,16-12 440,-13 4-448,1-18-282,1-3 761,-6-31-352,2 0 714,-4-26-325,0 2-809,-1 6 0,0-2-306,1 9 1,0-2-340,2-24 0,1-1 331,0 27 0,1 1-279,1-8 1,1 2 765,8-3 1,3 8-1,2 6 1</inkml:trace>
+  <inkml:trace contextRef="#ctx0" brushRef="#br0" timeOffset="4898">5512 1433 24898,'0'-5'-5396,"0"1"3718,0 0 883,0 0 247,0 2 122,0-1 122,0 1 76,0 0-1369,0 0 1507,20 0 1877,3 1-382,14 0-912,-2 1-336,-4 0 90,3 16-652,3-12 533,0 30 1,1-16 0,0 18 0</inkml:trace>
+  <inkml:trace contextRef="#ctx0" brushRef="#br0" timeOffset="5063">5760 2012 24718,'-7'9'-868,"5"-2"-1629,-6-3 4270,4-3-1662,28 1-1828,12-19 1796,23 13 1,-24-4 0,1 0 0,27 8-1</inkml:trace>
+  <inkml:trace contextRef="#ctx0" brushRef="#br0" timeOffset="6014">8532 592 23369,'6'-9'-111,"-2"2"-870,-3 0-460,-1 1-157,0 1 653,0-1 411,-15-4 326,11 3-1723,-33-6 1515,11 5 624,-14-2 330,5 3 714,6 2-30,1 1 124,-15 2-415,10 1 1052,-23 1-1291,25 0-159,-9 0-12,8 14 425,9-10-636,-10 22-366,18-8-549,-2 9-455,6 15-320,5-9 32,0 33-68,5-19 287,1-2 0,0 1-661,0 12 920,0-5 0,0 0-570,0 12 875,0-23 1,0 0 79,0 16 145,0-1 251,0-1 29,0-18 0,0-1 48,0 17 102,0-12 0,0-2 180,0 2-180,0 6 0,0-22-90,0-5 0,0-6 90,0 0 0,0-7-90,14 1 483,14-7 1049,7-1-94,11-1-202,-2 0-1439,-4 1 0,2-2 462,-5-6 1,0-1 0,15 6-1,1 1 1,-11-7 0,-1 1 0</inkml:trace>
+  <inkml:trace contextRef="#ctx0" brushRef="#br0" timeOffset="6747">10398 585 23549,'-12'-9'-3379,"0"0"1670,-2 1 1569,4 0-675,3 2 272,5 2-890,-6-1 1442,8 3-1605,0-1 1294,17-1 2034,9 0-497,28-2 261,-10 3-716,-3 1 1,-1 1 1473,1 1-1609,-5 0 1,-2 0 948,-7 0 92,9 13-2833,-21-10 540,4 22-1527,-12-21 1264,0 23-1297,-5-15 282,-1 38 324,-1-19 764,0 4 1,0 1-116,1 8 264,3-2 0,0 1 696,2 14-570,4-7 1,1 1 613,6 12-260,-6-22 1,3 0-146,2 0 1,2-1-365,6 20 393,-1-13 0,1 0-257,1 4 401,-4-13 1,-1-1-155,0 2 456,7 21-190,-18-37 223,1 10 61,-10-26 409,-23-1 2145,-19-5-1175,-7-18-1321,11 16 1,1-2 650,-4-29-1009,-12 28 914,21-20-570,0 21 1,8-17 0,2 6 0</inkml:trace>
+  <inkml:trace contextRef="#ctx0" brushRef="#br0" timeOffset="6996">11840 1327 26158,'0'-17'-6206,"-19"2"4680,14-7-547,-28 5 2460,29-3-1757,-10 9-3524,6 3 5061,6 25 1,-6-12 0,8 15 0</inkml:trace>
+  <inkml:trace contextRef="#ctx0" brushRef="#br0" timeOffset="7150">11992 1815 23099,'14'33'-7562,"-1"-1"4929,-3-3 1474,-1-4 548,-2 3 563,-2-11-177,-2 4 243,-2-12-1808,0-1 2291,-1-1 229,0 0-664,-19 3 856,15 2-474,-27 1 1,-6-1-1,-2 10 1,-2-6-1,0-1 1</inkml:trace>
+  <inkml:trace contextRef="#ctx0" brushRef="#br0" timeOffset="8380">5795 3870 23189,'0'-10'-4946,"0"-1"2907,21 0 5253,-16-2-3395,36 1 1878,-35-1-2184,40 1 1536,-26 0-590,23 3 1122,-12 2-2996,13 4 1141,-9 2 0,8 22 0,-13 6 0</inkml:trace>
+  <inkml:trace contextRef="#ctx0" brushRef="#br0" timeOffset="8548">5898 4543 22740,'16'-16'-369,"12"-2"23,19-1 605,8-12 1,0 27 0,4-13 0</inkml:trace>
+  <inkml:trace contextRef="#ctx0" brushRef="#br0" timeOffset="8998">7730 3659 23909,'-16'15'52,"4"10"-1868,12 12-913,17 7-71,-12-6 1598,13 5-198,2 1 876,-12-11 0,1 0-1547,14 18-161,-12 10 1084,1-22 568,-9-7 1218,9 3-1052,-12-13 1116,0-1-2,0-14-226,-17-5 1956,13-20-2624,-25-10 743,26-13-601,-9-6 204,12 6-152,0-2 0,25-3 898,-19 2-1454,15 15 0,4 2 2341,3-12-1202,-5 14 1,2 3 1234,13 7 998,6 3-599,-21 12-710,7 22-2080,-8 12-438,-7 11-17,-3-9 1,0 0-1818,1 10 2453,0-4 1,1-1-1,5 8 1,-5-18 0,-1-1-1</inkml:trace>
+  <inkml:trace contextRef="#ctx0" brushRef="#br0" timeOffset="9331">8602 4116 23099,'0'-13'-6295,"0"4"4166,17 1 5596,-13 1-3281,36-1 1149,-20-3-344,23 0 158,10-9-165,-13 4 197,-4-1 1,-1-2 1003,-5-2-2263,9-23 441,-31 19-1658,-3-19-421,-33 18-58,-5-15-690,-17 22 1076,-9-5 122,23 16 575,-6 1 652,18 7 902,-2 22 711,14 10-968,-2 13-353,13-11 0,2 0-1200,-1 10 379,12-13 1,4 0-1894,5 11-649,29 0 529,-10-3 2241,5-1 1,6-4 0,1-2 0</inkml:trace>
+  <inkml:trace contextRef="#ctx0" brushRef="#br0" timeOffset="9563">9333 3909 23189,'0'-13'-6475,"-12"0"4828,10 4 4,-10 3 2366,12 16-1075,25 9 411,8 0-10,-2 8 0,3 2-1430,19-3 1531,-15 12 0,-2 5-310,8 1-732,-14-13 1,3 3-1,-3-2 784,-7-7 0,0-1 0,13 13 0,-1-2 0,1-3 0</inkml:trace>
+  <inkml:trace contextRef="#ctx0" brushRef="#br0" timeOffset="9932">10170 3790 22920,'-17'-9'-3826,"0"3"3327,-3 23 1819,-5-12-2,23 40-2978,-21-23 2075,21 23-1522,-18-5 429,13-1 400,-7 1-38,6-1-900,0 9-449,3-14 1368,-3 11-1417,5-27 1670,-3-2-220,1-12 1469,-1-4-246,-1 0 139,-5-23-1954,2-9 110,-5-31 208,8 9 421,2 16 1,2 0-722,0-7-991,3-10 297,0 13 295,0 17 1769,17 2 1322,0 17 878,4 29-2521,7 1 1,-1 4 10,-4 27-401,12-9 0,2 0-639,-4 4 784,-3-8 0,1-1 0,7 6 0,-14-18 0,1 0 0</inkml:trace>
+  <inkml:trace contextRef="#ctx0" brushRef="#br0" timeOffset="10114">10797 3729 23099,'-44'22'2277,"8"-17"-2354,2 45-1378,6-23 1354,1 29-822,7-18 0,1 2-205,5-7 1,2 0 987,-4 13 0,1 1 1,8-12-1,2 0 0,0 1 1,0 1-1</inkml:trace>
+  <inkml:trace contextRef="#ctx0" brushRef="#br0" timeOffset="10714">12272 3248 24359,'-36'-22'-4519,"-6"-1"3386,13 8 637,0 5 593,17 23 615,5 7-938,6 21-605,-1 5-703,1 9 1303,0-7 0,0 2-19,0-12 0,0 1 5,1 6 1,-1 4 0,1-5-165,0-4 0,0-1-290,0 10 1,0-1 113,0 13 414,0-7 139,0-19 1,0-1-18,0 13 99,0 6 19,0-18 18,0-16-176,0-1-91,0-30-90,0-17-90,0-14 90,0 1 0,0-2 270,0-22 48,5 23 0,2-5 0,-2 2 26,-3 0 1,1-1 31,6-6 0,5-6 0,-2 5 92,-2 3 0,-2 2-40,2-14 0,2 1 145,7 8 0,0 4 109,-13 15 0,1 0 94,14-10 1,2 4 524,-2 9 324,9 6 99,-8 20 236,1 6-409,1 27-1771,2-3 89,0 29-852,0-6 472,-8-6 1,-1 2-157,-4-9 0,0 1-175,6 27 1,0 0-257,-8-25 1,-1 0 368,5 23 0,-1 0 396,-6-26 1,0-1-951,5 28 0,-1-2 687,-3-3 934,-2-16 1,-2-3-1,-4-7 1,-1-5-1</inkml:trace>
+  <inkml:trace contextRef="#ctx0" brushRef="#br0" timeOffset="10834">12305 3834 22830,'0'-21'-6836,"0"4"3988,20 3 3668,13 2 1,11 1 0,6 3 0</inkml:trace>
+  <inkml:trace contextRef="#ctx0" brushRef="#br0" timeOffset="11132">13113 3679 22200,'0'29'-5396,"0"7"3357,0-7 975,0 8 425,0-8 304,20 19-768,-2-10 756,-1-6 0,0-1-1758,-1 5 1774,-2-4 1,-2-2-43,-8-4 1254,17 14-1051,-20-30-169,4-22 1247,-5-19-1345,0-2 1,0-4 45,0-27 501,0 14 0,0 1 0,0-15 1,0 23-1,0 0 0</inkml:trace>
+  <inkml:trace contextRef="#ctx0" brushRef="#br0" timeOffset="11464">13590 3774 22830,'0'3'-6476,"0"1"4258,0-2 1153,0 2 517,0-1 122,0 5 122,0 21 76,0-6-1368,0 30 1596,0-24 0,0 19 0,0-23 989,10 8-724,-8-19-238,8 1-353,-10-32 56,6-27 23,-4-6 62,4 17 0,0 0-253,0-11-86,6 0 589,1 0 198,1 3 1,3 2-1,1 3 1</inkml:trace>
+  <inkml:trace contextRef="#ctx0" brushRef="#br0" timeOffset="12330">14263 3735 23279,'-17'-34'-7623,"13"1"5476,-35 15 3093,33-9-2301,-34 25 3084,17-10-1455,-15 12 861,7 0-1225,12 22 2079,1 10-703,11 12-1804,-5 19 1281,8-22-1759,15-8 1,2 0-672,-6 4 346,21-11 1,4-2-22,-9-2 880,15-10 1,3-4 578,-4-3 967,25-26 823,-38 15-883,-9-22 0,-3-5 701,-3 8-988,-5-11 0,-2-1-517,-2 0-370,0-9-1091,-17 8-859,12 13-593,-13-3 796,6 19 1497,10 22 406,-10 13 791,12 12-887,22 18-1002,2-20 992,-1-5 1,2 0-133,10 2 271,3 6-609,-13-17 185,5-7 211,-3-6 892,0 0 908,-2-8 86,-4 2-241,5-20 337,-11 13 579,3-32-1354,-12 10-1189,-2-9-526,-4 1-258,0 12-675,0 0 360,0 4-654,0 23-233,20 10 1586,7 26-161,14-21 952,-11-1 0,0 0 140,13 0 71,-6-4 1,1 0 415,8 2 66,12-9 377,-22-8 33,-3 0 573,-6 0-640,2-16 433,-12 11-69,-3-27-1437,-11 8-256,-3-18-1247,-25 8-540,19 5-331,-33 18 1670,35-5-1861,-23 13 1703,25 18 257,-10 6 1166,12 26-759,0-4 339,0 8-30,0 9-963,10-28 0,3 3 624,0 18 0,3 1-1068,4-13 0,1 2 764,-4 5 0,-1 5 1,-1-5-471,0-4 0,-1-1 596,1 2 0,1 4 0,-2-5-105,-1-8 1,-2-1 83,0 8 1,0-2 43,3 5 144,-12-9 725,6-8-642,-8-3-154,-26-11 646,-18-3-123,-13-10 0,22-8 1,0-3-1,-22-9 1</inkml:trace>
+  <inkml:trace contextRef="#ctx0" brushRef="#br0" timeOffset="12663">16633 2854 24089,'-21'-8'-2674,"15"1"-1033,-34 4 5065,13 18 826,-9-11-1138,0 45-1013,12-18-143,7 14 0,4 5-488,5-15 0,1 0 486,-2 8 1,-1 4 0,4-3 292,4-3 1,2 0-845,-6 13 0,4 0-462,15-17 1,2-2-57,-13-1 0,3 0 264,21-2 1,6 0 28,-7 9 1,1-1 256,5-10 1,4-2-431,17 15 1,0-3 671,-18-19 1,1-3 514,12 4 1,1-3-1,-10-10 1,-1-2-1,1-2 1,0 1-1</inkml:trace>
+  <inkml:trace contextRef="#ctx0" brushRef="#br0" timeOffset="12918">17580 2820 23189,'0'-11'-5396,"24"4"9290,3 4-2402,16 20-2075,-4-13 519,-14 23 0,-2 5-1466,14-2 1100,-12 3 0,-1 3-1512,6 15 1603,-2 4-2370,-4 5 1461,-10-15 1,-2 1 639,-5-11 1,-2 1 74,2 24 1,-1 0 615,-4-25 0,-4 0-23,-8 24 0,-7-2-114,-1-23 0,-4-1-654,-12 20 0,-3-2 1033,7-22 1,0-1-1,1 6 1,2 0-1,-11 9 1</inkml:trace>
+  <inkml:trace contextRef="#ctx0" brushRef="#br0" timeOffset="13147">19063 3365 26517,'0'-4'-7285,"-17"-1"7807,12 3-2091,-13-2-509,4 2 2271,-1 0 1,-3 2-1,7 0 1</inkml:trace>
+  <inkml:trace contextRef="#ctx0" brushRef="#br0" timeOffset="13304">19085 3778 23369,'11'39'-6930,"5"0"4185,-14-1 2680,12 11-906,-8-11 715,7 7-227,-4-2 140,-4-12-1490,-1 23 1610,-4-20-2311,-19 26 2782,-19-20 1,14-13-1,-1-1 1,-6-5 0,0-1-1</inkml:trace>
+  <inkml:trace contextRef="#ctx0" brushRef="#br0" timeOffset="17298">21512 456 21570,'11'-16'-1078,"-1"2"672,-3 3 78,0 2 723,-2 3 57,-2 22-2306,-1 14 1065,-2 16-717,0 9 337,0 0 62,0 9 618,0-27 1,0 1-45,0 3 0,0 4 116,0 0 1,1 3 0,-2-1 703,-7 9 0,0 2-240,6-11 0,2 6 1,0 0-1,-2-5 82,-5 12 1,-1-1-78,3 5 0,2 6 0,1-6-29,1-8 1,0-3 38,-5-6 1,-1 1 0,2-3 3,4 1 1,0-3 35,-6 0 1,0-1-92,6-2 0,0 2 38,-3 10 0,-1 0-79,5-14 0,0 1-6,-4 18 1,5-3-51,25 3-361,-13-18 1,5-4-265,28-4 981,-1-4 46,-10-20 812,4-5 266,0-23 641,15-14-63,-16-11-956,-10 10 1,-3-1 757,-3-8-1671,-10 7 1,-3 1-254,-5-3-558,-16 6 0,-1 2-1572,7 5 1183,-27 9 0,-6 6 332,9 7 897,-15 13 0,-1 6 935,-4 9-423,17-2 1,0 5-96,0 13 1,3 3 134,7-8 1,1 5-107,0 9 0,-1 6 0,4-2-262,2 1 0,3 2-440,4-9 0,0 6 1,1 0-1,1-4-569,-1 14 1,2 0 220,2-12 0,0 5 0,0-1 0,1-4-545,-3 11 1,1-2 625,2-8 0,-2 1 1,1-3-70,-3 2 0,-1-2 244,0-1 0,0 0 55,-2-2 1,-1 2-122,-1-6 0,0 2 0,-1-3-227,-2 6 1,-1 1 579,-1 1 1,-3 4-1,2-6 1,2-6-1,-1-3 1,-4 12-1,-1-1 1</inkml:trace>
+  <inkml:trace contextRef="#ctx0" brushRef="#br0" timeOffset="17680">23215 2124 23549,'-54'-21'-1484,"19"8"0,0-1 644,-12-3 810,11 6 1,2 3 93,0 1 135,-9 4 284,15 23 207,0-15-349,3 43-264,-7-1 182,15 15-503,7-12 0,3 0-506,4 15 3,10-8 0,9-1-599,2-23 0,3-3-68,4 11 1,3-4 102,3-13 1,2-4 333,21 16 357,-24-22 0,1-1 732,1-4 1,1-1 0,1-2-1,2-3 1,-1-1 0,1-1 0</inkml:trace>
+  <inkml:trace contextRef="#ctx0" brushRef="#br0" timeOffset="18014">23678 2334 22920,'0'-37'-5127,"0"3"2999,-21-3 129,-2 14 1514,-2-2 293,-6 15 1106,14 5-84,-10 2-1049,12 24 1465,-3 8-271,16 14-1592,-5 19 453,31-20-640,4-3 1,6-1 239,-6-19 0,4-4 301,20 10 1,1-4-334,0-12 713,-9-3 1,-1-7 797,1-22 1761,16-4-211,-36-14-262,0-15-1022,-18 26-1594,-2-13-379,-21 23-546,-1 9 395,-13 22 1102,15 19-1782,6 11-763,10 21 694,0-23 1497,28 15 1,-5-21 0,25-2 0</inkml:trace>
+  <inkml:trace contextRef="#ctx0" brushRef="#br0" timeOffset="18197">24483 2316 23189,'0'-15'-6565,"-20"7"6747,15-2-2929,-31 9 4551,20 14-343,-3 13-1045,7 11-730,12 24-1552,0-20 909,8-5 0,6-2 817,23 5 0,-13-15 0,2-2 0,30 4 0</inkml:trace>
+  <inkml:trace contextRef="#ctx0" brushRef="#br0" timeOffset="18597">24993 1493 23639,'-21'-31'-7767,"4"5"5960,4 5 571,10 37 1794,-9 3-294,10 17 0,4 7-635,-2 17 322,0-16 0,0 3-749,0 7 0,0-1 965,-1-11 1,2 1-102,3 2 1,1 4-1,0-4 63,-4-5 0,1-3-360,4 12 0,2-3-608,6 11 482,-11-5 231,21-8-208,-22 4 215,18-19-113,-13 1-63,11-22 1242,-6-18 911,3 6 778,8-49-1792,-2 27-16,1-14 0,1-1 248,-1 6 554,14-18-88,-25 42-740,1 2-650,-7 29-2719,-2 14 1566,-1 12-213,-2 7 218,0-9-167,0 4-664,0 0-1178,-14 15 698,10-19 2489,-11 6 1,15-26-1,0-5 1</inkml:trace>
+  <inkml:trace contextRef="#ctx0" brushRef="#br0" timeOffset="18797">24077 1368 23189,'-15'15'-366,"3"-12"1921,3 54-4362,4-25 1551,3 15 0,1 6-1580,1 10 2615,-2-17 1,4 0-1,10-10 1,3-2-1,2 2 1,-1 0 0</inkml:trace>
+  <inkml:trace contextRef="#ctx0" brushRef="#br0" timeOffset="19197">26605 1766 25078,'2'-14'-5422,"-1"3"3782,-1 4 235,0 24 562,-16 41 991,0-1-156,7 0 0,-1 0 21,-2-25 0,2-1-655,8 12 1,2 0 395,-10 16 316,10-3-339,0-2-136,0-20 0,0-1-397,0 15-1063,0 17 682,0-38 779,0-2 657,-16-40-174,-7-17-46,3 2 1,0-3-254,-3-20-13,5 16 1,3 2-423,3-6 103,-4-20 50,8 31-744,25-10 1352,17 27 603,-1 4 1,3 3-301,30 6 1,-27 0-1,-1 0 1,20 0 0</inkml:trace>
+  <inkml:trace contextRef="#ctx0" brushRef="#br0" timeOffset="19547">27245 2234 23819,'-21'-18'-5997,"16"-8"2627,-34 23 5366,22-8-2288,-16 25 2434,17 10-1933,-2 22-418,16-4-1301,-5 18 1587,26-24-579,5 22-2107,0-28 1452,19 6-1415,-10-19 1933,11-7 872,14-4 1088,-26-21 657,8 11 324,-16-37-499,-4 20-732,-7-18 0,-1-3-352,1-1-710,-5 2 0,-2 2-949,-3 8-404,-3-3-744,0 15 42,0 33 585,0 8-713,19 36 313,-15-12 1637,34 1 0,-21-17 0,17 0 0</inkml:trace>
+  <inkml:trace contextRef="#ctx0" brushRef="#br0" timeOffset="19830">28147 2267 23009,'0'-26'-5306,"0"-5"3268,-17 9 569,12-4 492,-32 17 2228,16 2-546,-19 25 1189,9 5-1568,6 22 653,12-9-397,7 2 48,26-4-568,7-5-1202,26-6 1041,-10-11-1180,15-30 1616,-26 14 290,-7-21 1,-4-5-173,-5 7-166,-3-11 0,-3-2 573,-8 0-963,4-10-2572,-32 9-38,20 14 2389,-46 2 1,28 15 0,-24 6-1</inkml:trace>
+  <inkml:trace contextRef="#ctx0" brushRef="#br0" timeOffset="19970">27368 3259 23729,'0'12'-8184,"0"-3"9023,23-6 1,7-19-1,24-6 1</inkml:trace>
+  <inkml:trace contextRef="#ctx0" brushRef="#br0" timeOffset="22256">18 6218 21121,'33'0'449,"-1"0"-449,-8 0 0,1 0 0,-6 0 0,1 0 0,-3 0 90,4 5-699,11-3 614,-3 8-597,11-9 441,14 9-93,-8-8 146,14 1 1,3 0 100,-27-1 1,2-2-14,12 1 1,6 0 0,-5-1 263,-8 0 1,0 0-227,5 0 1,6 0 0,-5 0 311,-1 0 1,-2 0-311,14 0 1,1 0 130,1 1 0,-2-2-54,-14-4-1,2-1-50,4 5 0,5 1 0,-4-1 66,-4-4 1,3-1-131,3 5 0,10 1 0,1 1 0,-8-1 2,-9 1 1,-6-1-1,7-1 26,5-1 0,7-2 0,3 0 1,-2 0-1,-7 1 30,-1 2 0,-4 0 0,4-1-12,-2-3 1,6-1-1,3-1 1,-3 0-1,-5 1-30,6-1 0,-5 1 0,4-1 37,-3 1 1,5-1-1,2 0 1,-2 0-1,-5-1 44,7-1 0,-6-2 0,3 2-13,-5 1 1,3 1 0,1 0-1,1 0 9,1-1 0,2 1 0,-1-1 1,-3 1-42,4-1 1,-2 1-1,5-1 6,-5 1 1,8-1 0,1 0 0,-2 1 0,-6 0-40,5-1 0,-6 2 1,6-1-16,-5 0 0,6 0 1,3 0-1,-3 0 0,-7 0-7,5 1 1,-6 0 0,3 0 5,-3 0 1,4 0 0,-2-1 0,-3 2-28,-2 0 1,-2 0 0,-1 1 38,2-1 1,-1 0 0,1 1-39,-1 0 1,1 0 0,4 0 4,0 0 0,5 0 1,1 0-1,-4 1-11,4-1 0,-3 1 1,6 0 15,-16 1 1,5-1-1,3 1 1,-1-1 0,-2 1-1,-4 0-13,-1 1 0,-4 0 0,0 0 0,4 0 6,0 0 0,5 0 0,2 0 0,0 0 0,-2 1 1,-6-1-27,18 1 1,-7 0 0,4 0 33,-6-1 1,3 1 0,2 0 0,-2 1 30,2-2 1,1 0-1,-1 1 1,-3 2-47,-11 0 0,-3 2 1,1 0-1,5-1 14,1-2 0,5-1 0,3 0 1,0 0-1,-2 0 0,-5 3-51,1 2 1,-6 3 0,1-1 0,6-1 62,0-2 1,6-2 0,3 0-1,1-1 1,-4 1 0,-5 1-7,1 0 1,-6 1 0,0 0 0,6 0 10,-9-1 1,5 0-1,3 0 1,1 0-1,-1 0 1,-3 0 0,-4 0-26,11 0 1,-5 1 0,-1-1-1,4 1 3,-1 0 0,2 0 0,2 0 1,0 0-1,1 0 18,-10 1 0,2-1 1,-1 1-1,1 0 1,-2-1-1,-2 1-15,1-2 0,-4 1 0,0-1 0,2 1 0,4 0 44,4 0 1,5 1 0,3 0 0,2 0 0,-1 0-1,-3 0 1,-6 0-34,-1-1 0,-5 0 1,-1 0-1,1 0 1,6 1 17,-5-1 0,4 1 0,4 0 1,2 1-1,-1-1 0,0 0 0,-4 0 1,-4 0-17,6 0 1,-5-1 0,-2 1 0,3-1-1,5 1-7,-6 0 0,6 0 0,3 0 0,2 1 0,0-1 1,-2 1-1,-3-1 0,-4 0 45,6 0 1,-5 0 0,-2 0 0,1 0 0,4 0-30,-9-1 0,1 1 1,2 0-1,1-1 0,0 1 1,0 0-1,0 0-4,0 0 1,1 0 0,1 0 0,-1 0 0,-1 1 0,-1-1 0,-2 0-3,10 0 0,-4 1 0,0-1 0,0 1 1,3 0 0,-8-1 1,3 1 0,1 0 0,0-1 0,0 1 0,-2-1 0,-4 1-19,6-1 0,-4 1 0,-1-1 1,0 1-1,0-1 51,1 1 1,-1-1-1,0 1 1,2 0 0,3 0-45,-4-1 1,2 1-1,3-1 1,1 1 0,-1 0-1,-2-1 1,-1 1 11,8 0 0,-3 0 1,0 0-1,0 0 0,3 0 14,-8 0 0,2-1 0,2 1 0,0 0 1,0 0-1,-3 0 0,-2-1-28,4 1 0,-2-1 1,-2 0-1,0 0 1,0 0 17,2 0 0,0 1 0,-1-1 1,1 1-1,-1-1 20,1 1 1,0-1 0,-1 0 0,1 0 0,0 0-17,0 1 0,0-1 0,1 0 0,-1 1 0,0-1-1,1 1 1,0-1 0,-1 1 0,1-1 0,0 1-20,-1-1 1,-1 1 0,1-1-1,1 0 1,4 1 15,-6 0 1,3-1 0,2 1 0,1 1 0,0-1 0,-2 0 0,-3-1 0,-3 1 1,-2-1-1,-2-1 1,1 1-1,2 1 1,5-1 7,-4 1 0,5 0 0,3 0 0,1 0 0,2 1 0,-2-1 1,-1 1-1,-3-1 0,-5-1-25,4 1 0,-5-1 0,-2 1 1,-1-1-1,2 0 0,2 1 14,3-1 1,3 1 0,2 1 0,-1-1 0,0 0-1,-2 0 1,-3 0-21,5 0 0,-3 0 1,-1 0-1,-2 0 1,2 0 38,0 0 1,0-1-1,0 1 1,0 0-1,0-1-38,-2 1 1,0 0 0,-1 0 0,3-1 0,3 2 33,-6-2 0,3 1 1,3 0-1,0 0 0,0 0 1,-2-1-1,-2 1-13,9 0 1,-5 0-1,0 0 1,3 0-1,5 1-8,-14-2 0,4 1 0,4 0 1,1 0-1,1 0 0,0 0 1,-3-1-1,-2 1 0,-5-1 27,3 0 0,-4 0 0,-4 0 0,1-1 0,2 1 0,6 0-16,-3 0 1,4 0 0,3 1 0,3-1 0,0 1 0,-1-1 0,-1 1 0,-4-1 0,-4-1 19,3 1 0,-4 0 0,-3-1 0,0 0 1,1 0-1,3 1-30,4-1 1,2 1-1,1 0 1,2 0-1,-2 0 1,-2 0-1,-3-1 36,5 1 1,-2-1 0,-3 1-1,0-1 1,1 0-20,1 0 1,0 1 0,0-1 0,0 0 0,-1 1-18,-1-1 1,-1-1 0,0 1 0,2 0 0,3 0 40,-6 0 0,3 0 1,2 0-1,1 0 1,-1 0-1,-1 0 1,-3-1-23,9 1 0,-4 0 0,-1 0 0,2 0 0,6 0-5,-15-1 0,5 0 0,3 0 0,1 1 0,1 0 0,0-1 1,-3 0-1,-2 0 0,-5 0 4,13 1 1,-6-1 0,-2 0 0,2 0 0,6 1-14,-13-2 0,3 1 0,3-1 0,2 1 0,1 0 0,-1 0 0,-2-1 0,-3 1 0,-4-1 16,13 0 0,-5 1 0,-2-1 1,0 0-1,3 0 22,-7 0 0,2 1 0,2-1 1,0 0-1,-1 0 0,-1 0 1,-4 0-41,6 0 1,-3 0 0,-2-1 0,-1 1 0,2-1 35,0 1 0,0 0 0,1 0 0,-1-1 0,0 1-19,0-1 1,-2 1 0,1-1 0,2 1-1,2-1-4,-5 1 1,3-1-1,2 1 1,0-1 0,1 0-1,-3 1 1,-2-1 2,8 0 0,-4 1 0,-1-1 0,4 0 0,5 1 3,-10-1 1,5 1 0,4-1 0,2 0 0,1 1-1,0-1 1,-2 1 0,-3-1 0,-4 0-9,7 1 0,-4-1 0,-2 0 0,-1 0 0,2 0 0,4 1 7,-10-1 1,2 0 0,3 0 0,0 0 0,1 0 0,-1 0 0,-1 0 0,-2 0 0,-4 0-9,8 0 1,-3 0 0,-2-1 0,-1 1 0,-2 0 0,-1-1-1,2 1 1,-3 0 0,0 0 0,0 0-1,4-1-13,1 1 0,3-1 1,2 0-1,0 0 0,-3 1 1,-5-1 36,3 0 1,-7 1 0,2-1 0,8 1-26,-11-1 0,7 0 1,4 0-1,4 0 1,0 0-1,0 0 1,-3 0-1,-4 1 1,-5-1-2,17 0 0,-8 0 0,-2 0 1,3 0-1,-1 0 0,4 0 1,-1 0-1,-6 0 0,-11 0 0,-10 0 1,1 0-1</inkml:trace>
+  <inkml:trace contextRef="#ctx0" brushRef="#br0" timeOffset="27448">2807 7548 23819,'1'-7'-3838,"-1"-1"1906,0 2 946,0-2 359,0 1 89,-23-5 982,18 2-1366,-52-5 401,35 6 930,-13 1 0,-3 2 697,-7 1-430,-18 2 0,-4 0 853,4 3-742,7 5 0,2 2 436,-2 8 1312,26 0-1561,-5 16-277,30-17-1244,3 34-805,2-16-177,21 16-788,-1 15-49,5-11 917,-9-3 0,-4 2-1143,-9 13 1710,5-20 1,-2 0-167,-6 18 958,0 2 180,-16-2 500,4-20 0,-4 0 63,-1-11 0,-2 1 322,-8 15 1,-1-2 366,-6 2-605,12-20 1,0-1 1013,-4 9-602,-2-14 761,16 1-1489,0-15 856,12-1-2325,0-4 69,0 2-299,23 3 701,14 1-17,15 6-1221,12-1 828,-4 2 864,-4-3 0,4 1 0,-11-4 1,2 1-1,-4 0 0,0-1 1,0 0-1</inkml:trace>
+  <inkml:trace contextRef="#ctx0" brushRef="#br0" timeOffset="30814">4543 8309 26697,'0'-32'-6385,"17"0"6818,1-8-435,2 6 53,-5 3 0,-2-1-196,0-9-35,-5 6 1,0 0-162,9-9-234,-15 7 1,-2 1 671,8-6-712,-5-8-76,-3 18-315,3 11 433,-3 4 40,0 58 163,0-13 146,0 5 0,0 5 175,0-3 1,0 0-568,0 26-648,-1-7 1,2 2 493,5-20 1,0-1 684,-5 24 0,1 0 1,10-24-1,1-1 1,-4 9-1,-1 0 1</inkml:trace>
+  <inkml:trace contextRef="#ctx0" brushRef="#br0" timeOffset="30997">4902 8633 20851,'-13'-1'-467,"2"0"1</inkml:trace>
+  <inkml:trace contextRef="#ctx0" brushRef="#br0" timeOffset="31334">5255 8442 21930,'4'-1'1714,"2"0"-1475,-3 1-525,1 0 151,1 15-2809,4 6 683,-2 7 754,7 18-760,-7-15 1223,-2 7 0,-1 1-1507,-2 4 2308,1 1 1,-4-1-1,-22 1 1,-4 13-1</inkml:trace>
+  <inkml:trace contextRef="#ctx0" brushRef="#br0" timeOffset="31852">6465 7818 24808,'-18'-29'-8046,"4"3"5090,14-3 2514,23-6 1865,-18 11-1316,40-10 1470,-15 22 74,17 0-1174,-6 27 884,-13 11-719,-13 12-1253,-9 27-791,-6-20 1266,-7-1 0,-5 0-1181,-12 10 576,4-11 0,0 1-565,-4 3 1340,8 8 404,16-12 263,0-14-500,24 12-889,-18-21 496,24-4 0,4-1 183,-10 2-138,10 0 0,2-1 15,-1 0 429,1 12-5,-19-16 123,-10 4-636,-7-5 185,-17 9 74,-17-4 206,-8 4 1,-4 1 0,13-9 0,0 0 0,-12 7 0,0 0 0</inkml:trace>
+  <inkml:trace contextRef="#ctx0" brushRef="#br0" timeOffset="32250">7920 8161 23639,'-3'47'-5834,"1"-6"3743,2 5 879,0-6 575,0 4-207,0 1 786,0-11 0,0 0 1,0 17-1,0-17 1,0 0-1</inkml:trace>
+  <inkml:trace contextRef="#ctx0" brushRef="#br0" timeOffset="32730">8408 8502 23189,'11'-21'-2714,"1"-3"2094,11-20 348,-3 4 173,8-16 177,-3 8-192,1-3 227,-8 12 1,0-2-713,7-20 817,-11 19 1,1-6 0,-3 6-316,-4 9 0,-1 0 1,6-26 0,-4 3-480,-6 14-378,0-13 40,-3 35 120,0 2 66,0 38-36,0 1 248,0 27 360,0-12 1,0 3-185,0 26 317,0 1 0,0 1-30,0-25 0,0-1 8,0 16 0,0-1 45,0-19 0,0-1 45,0-1 0,0 0-45,0 28-331,7-23 1,0-1-640,-4 17 190,4-15 1,-1-3 283,-6 0-134,0 4 180,-18-15 1551,13-10-489,-51 1 1976,33-13-26,-43-1-466,34-4-273,-16-36-1377,31 6-920,-3-22-1518,39 15 1205,23-6-1058,11 7 1845,-17 12 0,1 1 0,-4 5 0,-1 1 1,3 0-1,0 0 0</inkml:trace>
+  <inkml:trace contextRef="#ctx0" brushRef="#br0" timeOffset="33322">9658 7884 23009,'0'-10'-6115,"-26"2"6793,-6 5 421,-17 2-330,3 1-39,12 20 219,-2-15-388,3 39-900,4-25 2300,2 21-1857,13-9-675,-7 16-74,19-11-810,-9 23-231,31-27-893,-16 7 92,39-9 489,-9-12 825,24 0 1122,-6-13 546,7-22 1504,-24 13-747,-10-27 1,-2-5 638,-3 11-1109,-7-12 1,-3-1-819,-6 9-375,-2-5-406,-2 14-580,0 25-742,15 7 472,6 27 65,24 1 819,-6-15 782,7 6 152,-11-27 1044,5 9-120,0-13 522,4 0 79,17-19 1109,-14 0-1729,-9-8 1,-2-4 498,1-13-1048,-8 2 0,-3-4-898,-2-13 436,-10 20 0,-2-2-893,-2-18-68,-6 0-866,-2-3 369,-2 2 201,0 1 653,-16 3 138,15 20 1,-2 0-473,-31-13-171,30-16 616,-13 40 93,6 1-436,8 45 1226,-8-2 575,11 32-864,-1-15 1,2 1-132,6-6 1,2 3-170,-1 15 0,-1 9 1,1-6-181,1-7 0,3 0-343,3 9 0,3 6 0,-2-7 150,-7-15 0,2-1-1103,19 19 1,3-2 1395,4 0 1,-12-22 0,2-3 0,12 4 0</inkml:trace>
+  <inkml:trace contextRef="#ctx0" brushRef="#br0" timeOffset="33830">11035 7771 24359,'-19'-23'-6871,"14"4"3526,-14 5 3398,-2 4 584,0 6 471,-3 19 511,8 13-1460,16 27-1666,0-6 1420,8-10 0,5-1 33,12 10-493,-13-15 0,2-1-783,24 9 40,-33-2-826,29-4 1144,-30-5 633,20-4 597,-22-5-208,13 0-386,-13-8-384,4-1 23,-28-8 2865,3-2-349,-5-18-1226,-2 11 786,24-27-1441,9 17 1207,22-15 676,11 16-414,-10-1 1,-1 0-1161,10 4 68,-5-5 1,0-2 1397,5 0-1122,-8 2 0,-1-1 1653,3-5-1563,-8-4 1,-1-3-492,-5-4-744,-5-1 1,-2-1-756,-8-2-582,-1-10-134,-3 16 19,0 5-58,-21 1 255,16 8-265,-16 3 1697,1 5 546,4 4 607,-7 20 1049,1-12 96,19 41-1708,-8 2 254,11 16-399,-1-27 1,2 0-1408,21 23-1295,-17-1 2381,17-28 0,2-1 1,-1 26-1,0-27 1,0-1-1</inkml:trace>
+  <inkml:trace contextRef="#ctx0" brushRef="#br0" timeOffset="34168">12743 8154 24449,'17'-9'1928,"0"17"-4958,3 23-594,1 9 1207,-19 11 1479,6-6-378,-8 5-287,-20 4 1459,8-14 1,0 1 0,-1-9 0,1 0 0,3 9 0,-1 1 0</inkml:trace>
+  <inkml:trace contextRef="#ctx0" brushRef="#br0" timeOffset="34750">13560 7476 24089,'-20'-14'-4631,"3"2"2716,1 2 1207,12 2-1363,-12 2 2637,5 2-90,8 16-438,-8 29-1123,34 2 534,-7 0 1,3 2 131,4-18 1,1-1 129,3 11 0,-2 0 495,14 16-1337,1-2-30,-4-2 817,-13-18 0,-2-1-333,8 10 1313,5 16-141,-23-33-982,-1 2 77,-10-16-438,0-2-844,-22-4 2027,-24-23 1,-2 15-1,-13-17 1</inkml:trace>
+  <inkml:trace contextRef="#ctx0" brushRef="#br0" timeOffset="34880">13613 7446 23819,'35'-24'1188,"1"1"-539,3 3-1,19-4-5,-12 9-1377,-6 5 1,0 1-594,8 4 1248,15 0 0,-19 5 0,1 0 0</inkml:trace>
+  <inkml:trace contextRef="#ctx0" brushRef="#br0" timeOffset="35330">14798 7789 23099,'23'15'-4277,"-2"12"1059,-8 12 645,-4 9 1540,-1-3 819,-7-7 1,-1 2 87,4 25-1089,-3-7 1,-2 1 990,-7-23 0,0-1 0,6 11 0,0-1 1,-13 16-1</inkml:trace>
+  <inkml:trace contextRef="#ctx0" brushRef="#br0" timeOffset="36747">16388 7444 24539,'0'-12'-6386,"0"2"4168,-15 4 2694,11-1-2178,-12 4 2502,7 0-1555,6 18-789,-12 4 361,13 19 1248,-7-9 1,8 0 0,-3-8-1</inkml:trace>
+  <inkml:trace contextRef="#ctx0" brushRef="#br0" timeOffset="36914">16587 7438 23459,'0'6'-6475,"-12"-9"6303,9 38-2449,-9-15 2406,12 20 0,0-3 0,0 1 1</inkml:trace>
+  <inkml:trace contextRef="#ctx0" brushRef="#br0" timeOffset="37331">17260 7789 23819,'-19'-12'-4576,"15"2"511,-29-4 4603,15 8 116,-21-3-65,10 8 357,-15 19 540,19-14-1064,-13 44 396,22-27-35,5 15 1,8 4-1426,23-2-208,-5 0 1,3-2-776,27-2 986,-12-6 0,-1 0-1469,7 0 441,12 6 1030,-19-15 369,-7-4 940,-2-1 1083,-6-2-647,-7-4-1262,-4 1-617,-6-5 599,-17 3 1751,-10-4-1052,5 2-1174,-43 1 680,40-2 304,-31 0 0,29-4 0,4 0 1</inkml:trace>
+  <inkml:trace contextRef="#ctx0" brushRef="#br0" timeOffset="37647">17853 7856 23819,'10'-4'3213,"-2"0"-2587,-28 18-820,-2 8-215,0 7 1,1 3-572,0 12 492,11-8 1,5 0-529,5-1-490,0 9-736,19-19 58,-14-3 82,42-5 1814,-25-6 46,24-5 1059,-12-3 666,13-3 113,-12-18 730,14-10-40,-31-9-993,10-4-1061,-26 8-780,8-2-379,-10-1-1031,0-16-628,-26 15-2025,0-19 574,-4 31 3902,-9-1 1,35 16 0,-15 2 0</inkml:trace>
+  <inkml:trace contextRef="#ctx0" brushRef="#br0" timeOffset="38230">18270 7864 22830,'9'0'899,"-1"0"-809,-4 0 90,1 0-90,0 0 90,5 17-2454,-1-13 1817,10 49-1787,-8-29 1168,-1 16 0,0 3-960,0-4 1007,-2-5 1,-1-1-1073,-2-7 232,2 6 1906,-5-20-965,2 1 864,-3-10-33,2-14 1103,2-8-71,1 2 76,8-35-37,-3 31 335,5-30-442,-3 25 761,-1 5 56,-1 1-1130,3 8 653,-2 4 95,5 4 186,-6 25-2854,9 7 349,-8 13-473,3-2-170,-6-7 76,-1-3-554,2 0-292,2 4-166,-4-10 2610,3 2-193,-6-17 83,2-2 1021,-3-6 1224,2 0-6,6-19-520,-2-8-140,19-26 234,-9 9-716,0 13 0,2 1 995,4-5-966,9-8-1018,-6 13-17,-7 10 550,9 4 870,-15 11-199,9 19-1514,-12-10-602,15 55-1583,-14-34 522,-2 13 1,0 0-1114,1-4-1055,9 19 3505,-4-27 1,4 4 0,-4-14-1</inkml:trace>
+  <inkml:trace contextRef="#ctx0" brushRef="#br0" timeOffset="38531">19298 8222 24359,'8'-8'-503,"5"5"1694,-2-5-872,15 2 149,-7 0 221,19-6-222,-14 5-130,7-2 274,-10 4 55,-2-2-310,-2-1 99,4-7-618,-8 1-566,2-17-592,-12 8-712,0-11 176,-20-7-915,13 10 331,-28-24-247,13 28 487,-13-11 611,14 23 983,-5-1 896,10 12 580,-4 41 591,6-8-1179,8 14 0,2 3-710,1 10 24,0-19 1,0 1-710,0 17-504,24-2 1443,-17-2 0,16-27 1,5-1-1,7 22 1</inkml:trace>
+  <inkml:trace contextRef="#ctx0" brushRef="#br0" timeOffset="38916">20267 7604 25888,'0'-13'-6476,"0"1"4348,0 6 1064,-14 18 3186,-2 38-2224,-1 0 10,5 1 1,2 3-281,7 8-581,-2-19 1,0 2 508,1 0 1,2-1-169,1 22-25,-3-14 1,2-1-1555,2 0 2123,-3-14 1,-1-2 0,-1-4-1,-7 4 1</inkml:trace>
+  <inkml:trace contextRef="#ctx0" brushRef="#br0" timeOffset="39048">19947 8298 23189,'-12'-27'-9027,"3"0"6203,5-1 2062,4-11 671,26 10 1986,15-15-853,16 23-551,-14 4 1,1 1-362,13 1 925,-18 6 1,-1 0-411,14-1 0,-2 0 1,-1 0-1</inkml:trace>
+  <inkml:trace contextRef="#ctx0" brushRef="#br0" timeOffset="39581">20677 7588 24269,'-22'-17'-5200,"5"1"3160,17 6 680,0 2 813,-11 3 1125,8 17-610,-8 17 188,11 36-1663,0 1 1370,0-27 0,0 1-33,0 26 180,-1-32 0,2 0-99,8-1 1,-1 2-462,-7 11 1,3 0 136,12-13 1,2 1-298,-9 16 0,1-2 241,18 1 163,-12-15 1,-1-3-396,2-3 34,5 2 512,-4-20 1061,-5-5 286,8-24 1046,-10 13 320,14-54-1184,-11 35-434,1-16 1,-1-1 78,0 8-31,7-16-788,-15 30-174,3 10-319,-6 1-1243,3 9 2458,-1 21-2287,1-15 1100,2 38-814,7-9-295,-2 12 699,-1-15 0,2-1-1498,4 6 872,15 18-734,-14-30 2321,11 5-615,-16-18 779,4-5 1203,-4-3 47,-4-22 124,2-6-38,-5-12 18,-1-8-1197,-2 17-411,-3-11-688,-1 19-1827,0 25 327,19 13 31,-15 19-303,15-3 2053,0-9 0,-14-2 0,14 1 0</inkml:trace>
+  <inkml:trace contextRef="#ctx0" brushRef="#br0" timeOffset="39742">21343 7941 24718,'-14'-24'-8534,"-6"3"6284,18 7 1735,-5 5 1,7 6 0,0 2 0</inkml:trace>
+  <inkml:trace contextRef="#ctx0" brushRef="#br0" timeOffset="40115">21672 8134 22290,'0'49'-6026,"0"-8"3988,0-1 883,14-10-446,-10 2 1035,11-1-160,-15-1 610,10 6-1893,-8-10 1826,8 6 249,-10-18 114,0-1 421,0-53-375,0 17 450,0-38-676,0 31 592,17-2 513,-12 5-42,13-5-83,-4 17 520,-11-6-1187,22 19 1392,-11 14-1539,6-8-210,-2 26 1,-1 4-1907,6-8 1078,0 12 0,0 1-1060,4-6 1694,0-8 0,1-2 0,10 1 0,15 4 0</inkml:trace>
+  <inkml:trace contextRef="#ctx0" brushRef="#br0" timeOffset="40497">22468 8302 23189,'-30'-19'-4163,"-12"2"3500,22 1-587,-1 5 1014,-7 4 756,25 23-1083,-8 8 645,11 22-1678,22 0 454,-17-9 452,21-14 1,3-3 803,-9-1-478,25 1 390,-31-33 1675,-6-11-1366,-8-10 384,0-10-88,0 16-270,-13-10-1235,10 18 450,-10 25 1919,13 25-2340,8 19 0,2 6 291,-2-16 1,0 2 414,2 5 0,2 5 0,-2-6-67,-3-9 1,0 0-248,4 21 0,-3 0 247,-6 3-546,6-15 0,0-3-3395,-6-1 4158,4 4 0,-6-26 1,0-5-1</inkml:trace>
+  <inkml:trace contextRef="#ctx0" brushRef="#br0" timeOffset="40730">22735 7467 23819,'8'-1'1532,"1"0"-1303,0 1-737,0 19-3190,1-14 2931,-1 33-1090,0-34 1635,1 52-1718,-3-35-1296,0 42 547,-5-33-146,-1 16 2969,-1-23-1109,0 1 1085,0-13 1,0-6-1,0-2 1</inkml:trace>
+  <inkml:trace contextRef="#ctx0" brushRef="#br0" timeOffset="40863">22948 7638 23909,'23'-14'2960,"17"4"-2095,-25-6-1621,15 10 1094,-14 22-2733,0 17-121,-7 13-708,-3 12 1,-1 4 2987,-4-24 1,0 1 0,0 24 0,0 0 0,-1-25-1,0-1 1</inkml:trace>
+  <inkml:trace contextRef="#ctx0" brushRef="#br0" timeOffset="41630">24053 7460 22290,'-5'-2'-2293,"1"1"1445,19 0 2047,9 18-2549,13-3 1068,1 5-146,10 3 186,-11-8-272,24 9 493,-30-5-183,8-2-649,-18-5 1194,-3 1-862,-3 0 206,-4 0-539,-3 2-562,-2 2-67,-4 9 688,0-3-164,-2 26 288,0-17 309,0 36-9,0-25 550,0 18 245,0-16 282,0 3-508,23 0-417,-10-12 0,2 0-61,5-8 1,2 1 143,3 17 0,-1 1-505,7 6 466,-12-18 0,-1-2-123,7 8-7,-5-2 341,-1-6 1464,-1 3-1150,-9-13-605,0 5 178,-9-19 428,-45-1 2035,16-6-2002,-16-1 1,-4 0 809,-6 0-1696,8-7 1,-1-2 975,-7 6 1,-8-13 0,27 16 0</inkml:trace>
+  <inkml:trace contextRef="#ctx0" brushRef="#br0" timeOffset="41846">25347 8245 25528,'0'-13'-6296,"-20"-1"5262,16 0-1600,-16 1 2816,20 0-755,-14 3 674,10-1-1584,-11 5-2964,15 0 4537,0 20 0,16-12 0,5 15 0</inkml:trace>
+  <inkml:trace contextRef="#ctx0" brushRef="#br0" timeOffset="41997">25585 8664 23279,'19'55'-6781,"-4"-1"4541,1-2 2084,-7-12 1,1-1-412,1 8 480,-3-10 1,-1-4-172,-5-12 162,1 3-2374,-3-15-579,-44 3 3545,9-4 0,-3-3 0,-3 0 0,-19 2 0</inkml:trace>
+  <inkml:trace contextRef="#ctx0" brushRef="#br0" timeOffset="45347">570 11288 25078,'50'12'-2996,"-10"-9"2418,5 9-1122,-9-12 974,4 9 648,2-6 1,0 14 0,0-7 0</inkml:trace>
+  <inkml:trace contextRef="#ctx0" brushRef="#br0" timeOffset="45551">552 11765 23009,'-13'2'1338,"4"1"581,3-1-1445,24 0-1524,11-1 636,12-1-103,4 0-1557,18-16 2165,-9 12 1,-17-9 0,0 0-1,18 0 1</inkml:trace>
+  <inkml:trace contextRef="#ctx0" brushRef="#br0" timeOffset="45854">1147 11274 23549,'-25'-7'-2255,"-6"-1"3650,18 2-2177,14 2 88,27 3 1562,26 1-350,-5 12-620,4-9 77,-16 22-509,-1-23 941,9 41-951,-12-22 316,3 27-1745,-10 2-172,-15-10 1360,-3-2 1,-3 0-961,-5 8 908,0 16-2037,-23-3 2487,-6-15-628,4-12 1,-2-1 1508,-15-1 0,2 2 0,9-16 0</inkml:trace>
+  <inkml:trace contextRef="#ctx0" brushRef="#br0" timeOffset="46165">755 11116 23639,'-10'-12'-6840,"0"1"4773,-1 2 1941,-4-1 246,2 6 649,-4-3-269,-9 6 404,4-1-1013,-24 2 1729,15 18 566,-14-14-1230,19 19 0,1 3 380,-17-4-879,9 11 1,0 4 156,-6 8-641,17-14 0,2 3-259,3 4 1,5 0-622,1 23-57,13-8 1,7 0-1595,16 8 1430,8-22 0,11 2 0,-2-5-100,-4-8 0,3-2 1166,0-2 1,6 1-1,2-1 1,-6-4-1,7-1 1,-1-2-1,-5-3 1,0 0-1,-1 1 1</inkml:trace>
+  <inkml:trace contextRef="#ctx0" brushRef="#br0" timeOffset="47564">3822 10542 23999,'0'-11'-6116,"-22"2"6110,17-1-2203,-41 3 3567,26-1-1051,-25 4 462,10 0-176,-3 3-665,-2 0 1638,-18 1-855,14 0 427,10 6 1,0 1-571,0-4 339,-6 9-144,15 0-11,9 0-463,1 2-160,11 8-1447,2-12-10,2 24-644,0-12 290,0 25-506,0-15-27,0 13 401,0 10 209,0-10 1539,-7-3 0,-4 0 158,-17 12 419,4-6 1,-3-1 5,5-18 1,-1-1 33,-7 19 1,3-1 581,-5 7-554,12-22 1,2 0 440,-2 19-298,9-16-621,3 10-680,26-22-649,-13 0-276,47-9 1513,-21-4-350,14-3 1,5 0-19,-17-3 1,1 1 20,13 2 1,1 1 438,-11-3 0,0 1 0,2 1 0,-1 0 0,3 0 0,-1 0 0</inkml:trace>
+  <inkml:trace contextRef="#ctx0" brushRef="#br0" timeOffset="48496">5140 11789 23369,'-14'-10'-3586,"10"3"-649,-10 2 4944,14 3-1841,-12-1 2087,-2 2 61,-10 16 249,8-11-718,3 26-297,7-26 2414,1 29-3184,3-9 667,1 8-1250,20 5-917,8-24 786,12 10-267,18-21 2236,-19 6-1468,26-23 2498,-29 11-109,8-31-5,-20 18 689,-3-20-2198,-6-11-126,-6 10-1326,-3-13-250,-5 3-1029,-21 14-1605,-4-12 3837,0 26 0,-14 4 0,15 11 1</inkml:trace>
+  <inkml:trace contextRef="#ctx0" brushRef="#br0" timeOffset="48880">5952 11873 24089,'-5'0'719,"1"0"-449,2 0-270,17 0-989,9 0-180,26 0-91,-8 0 1260,7 0 0,-12 0 0,0 0 0</inkml:trace>
+  <inkml:trace contextRef="#ctx0" brushRef="#br0" timeOffset="49047">6133 12101 24089,'49'-14'1593,"-7"10"-3052,9-9 236,-6 1 1285,5 9 0,4-19 0,2 10 0</inkml:trace>
+  <inkml:trace contextRef="#ctx0" brushRef="#br0" timeOffset="49463">6938 11761 23459,'12'-14'-850,"13"-1"2274,23-2-206,4-9-571,-13 22-363,-11-15 1,1-3-281,11 5 297,-8-7 1,-2-1-30,1-1 996,6-18-1753,-25 18-106,-2-26-914,-10 27-643,0-16 364,0 28-287,-16-2 561,12 11-111,-12 22 1607,16 11-762,0 34 394,17-8 130,-8-11 0,-1 0-40,13 14-55,-6-21 0,-4 1-509,-7 14 645,22-2-1960,-23-1 1423,11-17 0,1 0-751,-5 13 357,3-11 1,0-1-350,-2-3 1482,1 6 1,-4-21 0,-2-1-1</inkml:trace>
+  <inkml:trace contextRef="#ctx0" brushRef="#br0" timeOffset="50051">6095 11757 24269,'16'-3'2463,"5"0"-2343,12 3-429,-5 0-20,7 13-680,-9-10 758,29 21-500,-19-5 303,-2-4 0,-1 3-867,7 14 617,-8-10 0,-1 0-494,3 7-215,5 8 707,-15 4-983,-9-10 293,-3 23 163,-9-20 446,-21 23 673,-12-23-1171,-2 0 0,-3-1 1624,-13-1 0,3 16 0,33-26 0</inkml:trace>
+  <inkml:trace contextRef="#ctx0" brushRef="#br0" timeOffset="50546">7152 12159 24539,'0'9'-4947,"20"-1"5499,-14-3-1903,37-1 2573,-24 1-761,22-2-138,13 0-869,-10-1-1184,-2-2 0,1 0 2049,12 0 0,-17 0 0,0 0 0,19 0 0</inkml:trace>
+  <inkml:trace contextRef="#ctx0" brushRef="#br0" timeOffset="51514">4920 13432 25348,'0'-23'-6385,"0"-2"4256,0 6 1065,0-3 425,18 2 2136,-14-1-1609,14-2 882,-5-1-1377,-9-3 847,19-1 1104,-21 0-1174,15 0 886,-15 1-2272,11 3 1887,-11 2-1533,7-3 681,-8 10-25,3-1-865,-4 12 811,0 18-706,0 9 830,0 11-853,-12 24 1253,9-16-1324,-3-2 0,0 2-149,6 10 187,-1-18 1,2-1 911,16 14 1,-13-4 0,12 1 0</inkml:trace>
+  <inkml:trace contextRef="#ctx0" brushRef="#br0" timeOffset="51913">5843 13373 24718,'-1'-9'-6405,"1"3"4024,24-2 5984,-18 3-2698,28-3 1,6 0-684,-7-2-328,5 2 1,3 0-567,14-5-395,4 2 1589,4 1 1,-1 2-1,1 1 1</inkml:trace>
+  <inkml:trace contextRef="#ctx0" brushRef="#br0" timeOffset="52080">6097 13408 24269,'-25'3'1184,"7"1"-2041,26-3-1112,22 1 1915,17-2 0,9 0 1,-9 0-1</inkml:trace>
+  <inkml:trace contextRef="#ctx0" brushRef="#br0" timeOffset="52329">6413 13043 23279,'0'-7'-5306,"22"3"8530,8 15-3904,11-7 1293,1 23-1563,-10-23 1309,11 41-1554,-12-25 148,6 29 767,-17-19-1947,-8 3 316,4 2-2117,-14 18 2309,7-12 1348,-9 14 1,0-19 0,0-1 0</inkml:trace>
+  <inkml:trace contextRef="#ctx0" brushRef="#br0" timeOffset="52696">7310 12987 24179,'2'-4'-2342,"0"14"-1667,15 4 2953,-14 18-376,13-6 240,-3 3-160,-3 7 596,5-8-1383,10 29 482,-16-28 1279,20 21-239,-17-30 692,8 11 351,-11-15-58,2 3-76,-9-8 57,0 1 161,-2 4 80,0-4-147,-18 6 1519,-5 3-163,1-3-1963,-7 0 0,0 0 515,7 5 238,-34 6 1,26-7 0,0-1 0</inkml:trace>
+  <inkml:trace contextRef="#ctx0" brushRef="#br0" timeOffset="55547">5033 14500 22830,'9'0'539,"-2"0"1170,-3-10-3020,-2 2-208,0-5 198,-2 6 128,0 3 299,0 2-703,0 0 1,0-1 0,-13 0 1936,10-1-852,-10 1 1371,13 1-859,0-1 0,0 2-89,0-1 89,0 0 89,0 0-1325,0 0 1389,0 1-1411,0-1 1168,-6 1 1235,17-1 569,-2 2-118,18 0 1,-3 0-1,-2 17-1244,-6-13 769,-3 27-1834,-7-18-1253,-2 15-66,-3-4 314,-1 14 122,0-6-1,-18 21 1878,14-21-1131,-28 16 2714,11-22 65,3 3-604,-16-9 835,30-4-1642,-28-1 1772,15-1-1183,-8-4 838,0 0-855,11-6-422,-5-1 151,10-3-1262,-2 0 1521,7-18-3674,1-1 641,23-18 886,3 6 132,25 12 1220,-13-3-174,5 21 162,-10-7 216,15 8 1416,-8 14-618,23 2-1173,-24 1-1670,24 11-1453,-25-8 2683,-4-1 0,-1 2 0,4 11 0,12 1 1</inkml:trace>
+  <inkml:trace contextRef="#ctx0" brushRef="#br0" timeOffset="55997">5897 14708 23819,'39'12'-1319,"-2"-9"1590,4 10-1350,-9-4-391,5-7 462,-6 6 1006,1-1 1,3-6 0,-1 5 0</inkml:trace>
+  <inkml:trace contextRef="#ctx0" brushRef="#br0" timeOffset="56164">6158 14976 22650,'11'1'-817,"13"0"-488,21-16 1514,6 11 1,-10-11-1,4 15 1</inkml:trace>
+  <inkml:trace contextRef="#ctx0" brushRef="#br0" timeOffset="56446">6233 14567 23099,'-6'-4'-2177,"1"1"1372,32 1 2513,7 1-1271,0 1 1,2 0 114,17 0-392,-15 8 1,-2 1-344,5-5-16,13 26 136,-10-7 143,-12 7-1786,7 19-281,-22-16-1043,-4 16-427,-10-12 599,-3 3 2508,0 2 1,0 1-1,0 0 1</inkml:trace>
+  <inkml:trace contextRef="#ctx0" brushRef="#br0" timeOffset="56913">7108 15017 24089,'3'-10'-4036,"3"-10"3092,2 4 973,13-22 78,-6 10 132,10-13-85,1-7-122,-6 11-327,-5 5 1,-1 0 860,1-5 192,2-22-830,-10 26-461,-2-6-152,-3 17-327,-2 3-139,0 5 144,0-1 191,-15 9 847,11 18-21,-20 16 985,21 13-960,-6-9 1,0 2 359,7 15-325,-3-2 0,1 1 101,4 14-171,0-7 0,0 0-785,0 10 420,-1-24 1,2 1-664,6-4 1,0-2 61,-4 15 447,5-12 1,-2-3-151,-6-1 227,0 11 172,-17-26 1697,12-1-1001,-27-12 1747,15-4 169,-15-18-1367,3-8-537,12-9-969,6-5-1306,11-9-579,0 7 2422,19-14 1,-15 15 0,15-1 0</inkml:trace>
+  <inkml:trace contextRef="#ctx0" brushRef="#br0" timeOffset="57547">7970 14637 23729,'-25'-8'-1890,"4"1"1126,-21 3 1181,10 1-99,1 2 55,-1 1-63,1 0-76,4 13 377,-4 6 495,11 15-1027,3-3-391,11 1-766,6-7-839,39 18 89,-16-18 988,4-6 0,4-2-253,3-10 0,-1-4 281,11 3 1048,-3-12 1,-1-1 732,-7 3 509,13-42 244,-28 26 46,2-26-785,-15 18-1149,-2-1-757,-3 3-488,0-7-551,0 11-54,-17-2 228,13 12-252,-12 25 3041,16 5-1308,21 25-540,6-21 1058,26 16 87,-11-22 153,19 4 654,-23-8 435,12-12-2113,0-18 2846,-13 13-875,-8-20 0,-1-5-150,0 4-799,-7-11 0,-5-4-578,-1-4 100,-7-7 0,-3-3-460,-2-3 136,-12 0 0,-1 2-1725,5 4 1026,-3 19 0,-4 1-987,-6-6 170,13 7 902,-13 5 176,4 8 442,10 6 107,-10 5 1352,14 22-797,0 16 356,0 14-85,0 9-299,0-5 63,0 4-276,0 4 449,17 0-1856,-13 0 379,13-2-342,-9-19 0,-2-1-380,-2 16 1511,22 10 1,-15-27 0,11-3 0</inkml:trace>
+  <inkml:trace contextRef="#ctx0" brushRef="#br0" timeOffset="58082">8852 14412 23999,'0'-10'-6296,"-17"2"6078,12 19 175,-12 19 421,17 5-1461,16 12-407,-12-15 763,27 1-864,-13 28 1030,15-24 94,-19-5 1,-2-1-918,4-9 31,-2 5 470,-13-17 946,-18-3 2468,-6-6-927,-23-17-18,9 1-456,15-16-755,8 6-577,14 3 815,17 10 1520,17-3-2183,10 7 177,-6 1 1,1-1 904,15-2-474,-18 4 0,-1 1 1563,18-2 223,-2-2-407,0-2-1695,-1-1-430,-3-3 534,-3-1 220,9-12-210,-17 6-150,9-19-359,-28 16-615,-1-18-457,-14 20-734,-2-8-252,-21 8-160,-6 7 767,-22 0 816,3 12 541,5 25 1198,18 25-728,10 5-753,21-9 1,3-1-871,-7 6 1333,23-5 1,5-1-1,-8 8 1,6-16-1,-1-1 1</inkml:trace>
+  <inkml:trace contextRef="#ctx0" brushRef="#br0" timeOffset="58815">5477 16432 26248,'0'-14'-6746,"0"2"570,9 7 6868,3 1 0,6 4 0,1 0 1</inkml:trace>
+  <inkml:trace contextRef="#ctx0" brushRef="#br0" timeOffset="58967">6282 16451 23819,'28'0'810,"0"0"-810,-3 0 0,1 0 0,-1 0 0,1 0-90,1 0-900,2 0 990,21 0 0,-10 0 0,16 0 0</inkml:trace>
+  <inkml:trace contextRef="#ctx0" brushRef="#br0" timeOffset="59130">8440 16320 24179,'44'0'360,"-7"0"-360,-4 0-90,-14 0-990,-4 0-1258,-9 0 2338,-1 0 0,-1 0 0,-2 0 0</inkml:trace>
+  <inkml:trace contextRef="#ctx0" brushRef="#br0" timeOffset="59264">9157 16292 25258,'13'0'-3417,"-1"0"3817,-25 10 1,-19 2 0,-25 9-1</inkml:trace>
+  <inkml:trace contextRef="#ctx0" brushRef="#br0" timeOffset="60217">3612 17061 24808,'0'-11'-5306,"0"1"3538,0 2 703,0 1 427,0 0 212,0 3 32,17 1 1973,5 19-2816,23 2 2121,-8 12-619,0-5 72,-1 10-172,-13-6-420,4 11-56,-9 6-2297,-11-8 2301,-2-5 0,-1 0-794,-4 9 944,2-6 0,-4 0-164,-22 8 1133,18 12-533,-34-16 1394,36-1-1028,-28-1 807,28-1-1470,-27-2 1012,28 0-1532,-24 13 466,24-12 36,-10 24-1098,13-25 929,0 7-1172,0-12 1252,0-1-1359,22-1 1066,-1 12-1091,4-12 1390,5 16-607,-16-23 374,2 5 353,2-12 1023,-16-3-459,5 1-521,-7-4 652,0-1-746,-24-5 2126,-9-1-91,-16-1-1188,14 0 1,0 0-405,-16 0-168,18-6 0,-1 0-154,-17 3 291,1-9 1,0 12 0,2 0 0</inkml:trace>
+  <inkml:trace contextRef="#ctx0" brushRef="#br0" timeOffset="64566">5360 16737 22290,'-29'0'809,"12"11"250,-2-8-715,8 16-1438,-4-17 1511,-1 6 155,5 0-470,-1-6 234,0 13-634,0-8 478,-1 6-603,-5 4 1018,4-4-902,-10 10-265,9-7 245,-3 4-191,0 2 547,7-6-951,-4 12 430,7-13-154,2 12-484,4-15 183,1 5-285,1-3-93,0-4-2,21 5 450,5-9 959,26 0 33,-9-5 553,2-1-66,-9 0 277,-1-16 661,1 12-972,-3-11 1,0-2 0,-3-4 0</inkml:trace>
+  <inkml:trace contextRef="#ctx0" brushRef="#br0" timeOffset="64751">5488 16914 22920,'-19'-5'-996,"-9"-1"1239,18 5-126,-4 14 404,7 11-1553,7 7-294,0 7 263,0-6-623,0 4 698,16 3-2008,-13 0 61,13 1 2398,-3-1 1,-9-1 0,9-1 0</inkml:trace>
+  <inkml:trace contextRef="#ctx0" brushRef="#br0" timeOffset="65130">6085 17061 26607,'43'0'-179,"-7"0"-361,4 0-630,-5 0-1348,22 0 1079,-9 0 1439,12 0 0,-18 0 0,-3 0 0</inkml:trace>
+  <inkml:trace contextRef="#ctx0" brushRef="#br0" timeOffset="65284">6292 17287 23729,'7'-15'-4677,"13"11"5086,22-26-10,6 26 1,-8-23-1,3 12 1</inkml:trace>
+  <inkml:trace contextRef="#ctx0" brushRef="#br0" timeOffset="65547">6477 16714 23999,'44'-2'948,"5"19"-2827,-9-13 1795,1 32-1864,-15-21 1234,0 18-709,-5-5 311,-1 5-901,-3 4-317,-8 0 927,2 5-1292,-10 21 1307,4-15 1333,-15-6 0,-1-1 0,6 4 0,-16 14 0</inkml:trace>
+  <inkml:trace contextRef="#ctx0" brushRef="#br0" timeOffset="65949">7375 16682 24359,'-20'-7'-2425,"3"1"1205,17 3-1242,-12-1 2657,3 3-211,-5 13-950,8 7-602,6 19 1168,0-7 1,0 1 0,0-10 0</inkml:trace>
+  <inkml:trace contextRef="#ctx0" brushRef="#br0" timeOffset="66098">7543 16721 23729,'0'46'-2878,"0"-8"0,0 1 0</inkml:trace>
+  <inkml:trace contextRef="#ctx0" brushRef="#br0" timeOffset="66507">8710 16594 24629,'2'12'-2678,"-1"1"1,-1 16-1</inkml:trace>
+  <inkml:trace contextRef="#ctx0" brushRef="#br0" timeOffset="66646">8922 16608 23009,'6'0'179,"0"0"-179,-3 0 1,1 0-1,-1 15-2609,3-11 1571,-1 28-1678,0-15 2230,1 19 1,-1-3 0,1 3 0</inkml:trace>
+  <inkml:trace contextRef="#ctx0" brushRef="#br0" timeOffset="75683">2083 13278 23009,'0'-11'-6475,"-15"0"5637,11 0-1704,-12 2 2922,4 2-86,9 0-1387,-18 1 2008,10 2-1558,-7 2 1861,3 1-118,3 1 1186,4 0-1201,1 0-76,-4 13 909,5 7-2433,-1 13-37,7-2-618,21 19-941,5-22 1239,-2 1 1,3-1-703,12-3 439,11 16-3,-23-21 1044,5 5 168,-13-9 471,-9-5 422,-2 3-1373,-8-9 384,0 6-530,-17-4 2609,-7 17-800,-21-9 65,-3 16-236,19-16-130,-9 3-268,24-12 0,-5 0 0,10-6 0</inkml:trace>
+  <inkml:trace contextRef="#ctx0" brushRef="#br0" timeOffset="76014">2350 13413 23009,'10'-8'1017,"-2"0"-1418,-2 5 1131,-3 0-1035,-1 16-2413,-1 2 1167,-1 17 415,0-9-371,0 8-253,24-13 680,14 8-482,7-15 1232,18-1 2169,-31-7 202,20-23 691,-24 16-712,10-30-378,-22 14-557,-1-25-922,-12 12-1156,-21-15-1032,13 24 204,-33-15-1062,10 19 1047,-1 1 0,-1 2-90,-15 3 1853,-5-5 1,25 14 0,2 1-1</inkml:trace>
+  <inkml:trace contextRef="#ctx0" brushRef="#br0" timeOffset="76219">2235 13137 22110,'23'-17'1806,"12"4"-109,-31-15-4689,33 6 4121,-7-8-1211,9 7 591,2-4-187,-13 11 164,-1 1-352,1 2-199,-3 3 2027,-2 3-1840,1 4 204,6 1-694,-5 2-2000,12 18 1951,-13-14 1,5 30 0,-10-14 0</inkml:trace>
+  <inkml:trace contextRef="#ctx0" brushRef="#br0" timeOffset="76430">3275 12554 23189,'0'33'-7554,"0"-3"3722,0 6 3565,0-2 1,0 7 0,0 4 0</inkml:trace>
+  <inkml:trace contextRef="#ctx0" brushRef="#br0" timeOffset="76569">3655 13609 24629,'0'4'-2189,"0"-2"1,0-1-1</inkml:trace>
+  <inkml:trace contextRef="#ctx0" brushRef="#br0" timeOffset="84121">12067 10311 20941,'0'6'-6026,"0"0"3897,0 3 1065,0 3 695,0 2-56,-13 35 682,10-12-271,-4-4 0,1 1-1239,6 14 1253,0 7 76,-3-10 0,0 1-25,2-8 1,0 1-26,-1 7 1,-1 4 0,1-3-4,2-2 0,0 2-158,0 7 0,0 6 0,0-5 45,0-1 0,0-1-25,0-7 1,0 3-1,0 0 265,0 2 0,0 1 0,0-2-183,1 10 0,-2 1 15,1-11 0,-2 4 0,1 1 0,0-5 46,-1 11 0,1 1-19,-2-12 1,1 4 0,-1 1 0,0-6 42,0 10 1,0 1-21,-1-3 0,0 7 0,-1 0 0,1-7 47,-1 5 1,-1 0-38,1-7 1,0 8 0,-1-1 0,1-8 51,0 1 1,-1 0-16,1 6 1,-1 6 0,1-6-23,1-7 0,-1 1-40,1 6 1,0 6-1,0-6-6,0-7 1,2-1 5,0-7 0,0 3 0,0-4-50,-1 2 0,1-2-19,1-1 1,0 0-5,-1-2 0,0 2 14,-1 13 0,1 1 9,-1-16 1,0 1 38,-1 3 1,0 3 0,0-4 28,0-6 1,-1-1 51,-4 27 1,-2 0 67,5-26 0,-1-1-24,-1 10 0,-1 3-1,0 2 1,0 0 172,2-13 1,-1 1-164,0 6 1,0 4 0,-1-4-34,0-4 0,0 0-35,-1 4 1,-1 5 0,0-5 9,2-4 1,-1 0-4,-1 2 1,-1 3-1,2-4-23,1-5 1,1 1-50,-1 9 0,0 6 0,1-6-39,3-9 0,1 0-19,-1 8 0,0 6 0,2-6-79,1-12 0,2-1-11,-2 27 0,1 0-59,1-26 1,0-1-28,0 26 0,0 0 11,-1-25 1,2-1-49,6 25 0,2 0 19,-7-24 0,0-2 38,5 12 0,2 0-194,5 17-72,-10 1 244,10-3 79,-7-18 1,-1 1-126,3 22 201,2-11 0,-1 0 24,-2 7-6,-3-21 0,-1-1 305,0 13-48,4-1-281,-1-1 79,-1-16 0,0 0 6,6 19-237,-2-9 0,1-1 121,3 7-123,-2-8 0,0-2-182,3 6-48,0-2 0,0-1-75,1 0 62,0-4 1,-1-1-178,0-5-670,11 23 1292,-10-25 1,4 9-1,-6-15 1</inkml:trace>
+  <inkml:trace contextRef="#ctx0" brushRef="#br0" timeOffset="86999">13688 9922 22290,'-23'-18'-5392,"4"1"3519,-25 7 2775,7 4-157,-5 4 62,-3 2-133,-4 21 512,0-15-974,0 37 1156,5-25 729,6 18-1659,6-10-3,11 0-586,9-1-609,8 0-1173,4 0 126,0 0 168,24 1-688,-17 0 286,41 0 964,-42-2-757,42-1 2082,-23 6-394,4-9 1094,3 9-618,-29-14-662,10 0 680,-13-6-983,0-2 1200,0 0-1290,-24 7 2980,17-3-1519,-24 1 0,-6 0 1298,8 4-681,-11-3 1,-2 0 997,2 0-478,-9 2-1304,23-8-318,3-3 0,12-17 0,2-7 1</inkml:trace>
+  <inkml:trace contextRef="#ctx0" brushRef="#br0" timeOffset="87233">13278 9802 22290,'17'-43'-2694,"-2"1"1697,-2 7 668,1-4 2,-5 15 317,2-3 388,-8 20-205,0 22-2095,-3 17 1156,0 14 469,0-7 1,0 2-495,0 19 504,0-3 0,0 2-79,0-22 1,0-1-34,0 12 0,0 3-24,2 12 1,-4-2 263,-5-22 1,0 0-219,5 19 1,0 2 394,-6-10 0,1-4 0,7 11 0,0-15 1,0 0-1</inkml:trace>
+  <inkml:trace contextRef="#ctx0" brushRef="#br0" timeOffset="87696">14285 10100 23189,'9'-11'-503,"-2"1"-246,-4 0-932,-2 6 386,-20-2 1275,-7 6 612,-12-1-122,-24 20 106,20 8-282,2-1 1,0 3 416,-5 18-284,9-14 1,2-1 828,2 7-1091,13-8 1,2-1-706,3 1-133,7 19-1207,24-29-194,10 9 276,14-24 1475,15 0 211,-17-6 384,-7-7 1,0-4 1087,4-13-249,5 0 843,-12-28-770,-12 32 712,2-37-2218,-13 29-546,-2-3-605,-4 11-885,0 5 355,0 1-63,0 21 1099,0 10-442,0 15 777,0 5 117,0-7 14,0 3-398,0 0-990,18 15 285,-14-14 1430,27 8 0,-27-17 0,9-3 1</inkml:trace>
+  <inkml:trace contextRef="#ctx0" brushRef="#br0" timeOffset="87997">14500 10322 23009,'0'-22'-6205,"0"6"4166,0 0 1065,14 62-678,-10-23 1277,9 19 0,0 3-552,-10-7 842,7-6 0,0 0-2119,-4 3 1890,2 5 274,0-14-42,-7-10 993,3 0-868,-4-28 556,1-24-294,-1-5-136,0 1 0,0-1-305,0-7-531,7 4 1,5 0 513,8-6 384,-11 16 0,4 3 0,27-9 0,-9 2 0</inkml:trace>
+  <inkml:trace contextRef="#ctx0" brushRef="#br0" timeOffset="88345">15207 10231 23009,'-33'0'270,"13"18"-21,9 4-1764,11 11-786,0 2 767,0-5 439,0 3 273,0 15-775,0-11 799,0-3 0,0-1-532,0-3 1629,0 14-209,0-32 0,0 0-90,-11-9 2104,8-16-2624,-8-10-70,4-26 206,5 3-12,-3 7 1,3-1-340,19-14 530,-16 17 0,3 2-683,34-16 640,-33 3 0,40 3 1,-14 2-1</inkml:trace>
+  <inkml:trace contextRef="#ctx0" brushRef="#br0" timeOffset="88913">16127 10143 23549,'-39'-9'-1866,"16"-5"-288,-5 12 2855,24-11-3457,-40 6 3353,25-4-987,-35-2 861,26 5-1045,-7-3 266,5-2 558,11 2-1152,-4-13 1499,16 7-2609,1-20 1136,6 10-278,22-10 1063,3-4 277,2 13 413,13-14 520,-15 26 819,17 1 1242,-6 31-2117,-9 20-1174,-11 11-534,-11-7 1,-3 0-657,-2 17 599,2-7 0,-4 0-743,-19 11 769,10-11 0,-1-2-1104,-14 4 1982,-9-5 0,-1-3 1236,9-3-342,-15-9 1,-1-3 872,9-11-20,-19-1 84,27-12-650,-4-4-108,14-1-839,6-16-2139,3 12 733,5-30-1116,1 10 21,19-18 651,10 17 1111,22-8 561,-4 29-120,-1-9 2380,-9 13-1428,-1 0 646,1 0-80,16 18-1856,-12 7-1254,-5-4 0,-1 3-1226,7 12 2337,13 0 1,-15-10 0,-1 1-1</inkml:trace>
+  <inkml:trace contextRef="#ctx0" brushRef="#br0" timeOffset="89147">17023 10226 24359,'-21'-4'-1245,"4"1"-134,38 1 869,8 1-887,11 17 1130,1-13 1,-10 28 0,0-13 0</inkml:trace>
+  <inkml:trace contextRef="#ctx0" brushRef="#br0" timeOffset="89319">16858 10737 24089,'-5'5'2057,"28"-2"-3105,23-2 533,16-1-1029,-10-7 0,0-1 1576,-16 6 1,0 0-1,14-6 1,1 1-1,-14 7 1,0 0-1</inkml:trace>
+  <inkml:trace contextRef="#ctx0" brushRef="#br0" timeOffset="90197">19028 9514 23459,'6'-14'-2257,"-2"0"857,-4 0-388,0-1 611,0-2 302,0 1 314,-21-2 316,15 2-1979,-48-3 2428,31 6 23,-19 5 0,-3 2 1122,-2 2-673,2 1 1,0 4 873,2 18-364,9-10 1,2 2 680,-1 11 665,-4 14-1878,18-21 135,5 18-1370,4-6-244,4 2-427,3 4-935,2 3-85,1 25 367,0-11 1031,9-3 1,3 0-1393,8 12 1572,-8-20 1,1 2 2,3-1 1,-1-1-420,4 21 738,-9-22 1,1-1-231,14 10 87,-22 0 578,7 13 92,-10-16 456,0 23 62,0-33 50,-17 5 672,12-19-412,-13-4 1171,18-5-1955,0-2 137,0-3-336,0-2 90,0 0-1169,0 1-1020,25-2 1168,-19 3 831,49 0 0,-31 0 0,26 1 1</inkml:trace>
+  <inkml:trace contextRef="#ctx0" brushRef="#br0" timeOffset="92580">19913 11025 22650,'0'-12'-5936,"0"1"3897,0 4 975,0 1 875,0 2-236,-15 17 2045,11 8-1732,-23 11-36,24 5 296,-17-5 968,17 4-1075,-15 2 941,10 0-610,-2 2-1559,1 12 1188,7-15-1840,-2 12 1506,4-28-1053,0-2 1075,19-14 472,-1-4 844,4-18 386,9 13 27,-27-34-1267,28 21 1801,-16-28-1289,12 7 594,-14 3-1561,1 6-383,-10 8-641,2 12 800,-1-6 1016,-4 14-418,1-4 461,-1 5-911,1 19 128,1 6 1,0 13-1,1-1 1</inkml:trace>
+  <inkml:trace contextRef="#ctx0" brushRef="#br0" timeOffset="93214">20600 11403 22920,'3'-7'-3807,"-2"1"2279,0 21-611,-1 7 1151,0 13 180,-16 3 1302,12 11-831,-25-11 14,17 25 26,-3-31 707,1 11 295,13-24-568,-9-1 802,9-27-1963,-4-10 404,28-13 538,-18-5-89,36 4 1168,-24-4-754,17 1 1004,7-12-814,-9 14 1175,17-8 543,-21 28-1185,12 2 928,-19 12-2049,2 19-489,-12-14-69,-2 43-1023,-4-24 850,-2 9 1,0 3-867,0 11 198,0-6 1,1-1-1343,1 6 2482,1-9 1,2-2 0,4 1-1,6 9 1</inkml:trace>
+  <inkml:trace contextRef="#ctx0" brushRef="#br0" timeOffset="93614">21312 11442 21840,'0'-12'-6205,"0"3"4166,-20 4 3513,1 29-440,-23 9 217,13 16-1218,9-15 0,2 0-5,-4 9-632,2 13 1264,6-5-192,12-16-1411,-6 18-111,8-28-696,18 6 269,1-22 1205,21 0 513,-2-28 1294,3-9-212,-10-11-754,-13 10 1,-3-1 146,-4-7-234,0 5 0,-1 0 492,-2-2-1244,4-12-84,-3 25-1082,-6 1-122,0 14 1260,-2 3 77,1 24-593,0-16-385,1 53 643,0-34 184,2 18 0,1 2-1187,2-4 569,1-3 1,1-2-1304,3-5 2026,4 4 0,-3-17 0,0-3 0</inkml:trace>
+  <inkml:trace contextRef="#ctx0" brushRef="#br0" timeOffset="94014">21725 11520 21480,'2'-4'-3339,"1"0"4153,-1 4 132,3 15-3942,-2-11 1564,3 40 282,-2-23 221,0 42-795,-2-27 962,-1 11-640,-1-2-195,0-14 2363,0 15-545,1-26 321,0 4-277,1-17-794,0-2 236,0-5 1830,0-17-1344,5-7 391,-1-11-215,15-21 308,-7 17-267,4-4 0,1 0 1064,0 1-849,0 5 0,-1 3-1286,-6 11 1543,8-1-35,-14 18 512,5 18-2066,-7-9 64,1 34-431,-3-18-45,-1 20 137,0-7-48,-1 17-311,0-12-266,0 21 1369,0-27-314,0 3-272,0-10 796,15-10 0,-11-2 1,10-9-1</inkml:trace>
+  <inkml:trace contextRef="#ctx0" brushRef="#br0" timeOffset="94396">22120 11571 21390,'7'0'450,"1"0"-360,0 19-4637,2-14 4029,0 31-1473,3-31 2245,0 31-1333,8-15-452,-3 9-318,15 2 352,-10-15 2554,10-2-996,6-4 1486,-7-9-991,23 5 1580,-23-7-606,19-17 1139,-22-8-1964,-5-4 1,-3-4 63,0-12-762,-7 7 1,-2 1-83,-6-2-931,-2-26 35,-4 29-626,-17-14-1360,12 28 1154,-12 0 574,-2 18 1836,-4 19 832,-19 15 108,9 11-999,18-6 0,0 0 107,-7 13 15,15-5 0,2 0-78,-5 7-19,10 14-1600,19-23-1704,-14-2 9,41-1-467,1 9 3159,-17-30 0,1-1 0,6 3 0,-1-1 0,21 3 0</inkml:trace>
+  <inkml:trace contextRef="#ctx0" brushRef="#br0" timeOffset="94797">23057 10887 22380,'0'-15'-5846,"0"1"3807,0 3 1425,12 2 3296,-10 3-2466,10 15-735,8 8 53,-11 20-3225,16 7 2262,-17-6 161,-1-1 1198,-3-13 1,-2-2 0,0-2 0</inkml:trace>
+  <inkml:trace contextRef="#ctx0" brushRef="#br0" timeOffset="94963">23208 10922 21480,'34'-9'3092,"0"3"-2684,-15 20-3398,9-11 2645,-20 31-2251,12-15 1522,-14 18-270,8 15-1557,-9-8 2516,2-3 0,-1 2 0,0 13 1,-2-19-1,-1 1 0</inkml:trace>
+  <inkml:trace contextRef="#ctx0" brushRef="#br0" timeOffset="95180">23630 11680 22830,'0'-12'-6026,"18"6"9948,-14-5-4851,48 7 1797,0-8-458,-19 8 0,3 1-791,14-1 1,-1 1-517,11 0 900,-20 3 1,-1 0 0,15 0 0,-1 0 0</inkml:trace>
+  <inkml:trace contextRef="#ctx0" brushRef="#br0" timeOffset="95363">23947 11354 21660,'-6'-9'-7930,"3"3"4836,2 2 2844,1 1 1,0 2-1,0-1 1</inkml:trace>
+  <inkml:trace contextRef="#ctx0" brushRef="#br0" timeOffset="96029">23570 11952 22830,'53'0'1619,"-9"0"-1529,7 0-90,-10 0 171,-9-8 0,1 0 543,17 3-689,-5-2 0,0-2 47,7-4-878,-7 12 1,1-1-297,6-10 1173,13 4 1,-24 6-1,-1-5 1</inkml:trace>
+  <inkml:trace contextRef="#ctx0" brushRef="#br0" timeOffset="96346">24207 11333 22740,'-7'-3'-2552,"0"1"4286,4 1-1313,20 1 450,23 13-1189,3 7 120,-6-5 1,-1 2-221,2 13-139,-5-10 1,-2-1 266,3 8-340,4 11-550,-14 5-1015,-11-7 545,-2 29 443,-8-23 676,-11-3 1,-6-1 19,-21 12-740,7-15 0,-6 5 0,0-4 1415,-1-6 0,-1 0 0,4 1 1,-2 2-1,3-2 0,4-6 1,-1 0-1</inkml:trace>
+  <inkml:trace contextRef="#ctx0" brushRef="#br0" timeOffset="96847">25695 10820 22650,'-22'-11'-3512,"16"0"-925,-31 3 5667,33 0-3394,-30 4 3434,9 1-388,-11 2 16,-12 14-1338,19 13-3,-7 8 842,16 7 0,3-5 1,3 3-1</inkml:trace>
+  <inkml:trace contextRef="#ctx0" brushRef="#br0" timeOffset="97283">26538 11325 22200,'-17'-24'-6155,"13"2"3448,-34 4 3510,16 2-921,-21 8 1203,10 2-299,2 5 172,8 1-1048,0 14 2346,-5 7-41,8-2-1268,-4 41-477,15-39-866,3 45-647,31-43-237,6 6-280,15-13 549,-3-7 383,-8-2 339,0-7 1148,0-16 640,12-9 413,-15-7-1177,-8 7 0,-1 0 864,0-6-1111,3-17-627,-15 31 9,-2-15-942,-6 29 428,-2-14-1362,0 36 401,-1 7-300,0 38-43,0-8-30,0 5 1566,16 2 0,1-19 1,16 13-1</inkml:trace>
+  <inkml:trace contextRef="#ctx0" brushRef="#br0" timeOffset="97730">27098 10919 23099,'5'-13'-3213,"-1"3"2860,-1 5 671,0 27-2228,0-1 478,-1 45 801,0-18 351,-1 0 0,-1 2-1232,0 16 1211,0-23 1,1 2-196,-1 1 0,0-1 15,0-11 1,0 0 617,0 20 0,0-2 165,0 2-283,0-16 1,0-3 127,0-4-51,0-2-536,0-17 359,10-8 630,-7-22-450,7-15 405,-1-13-132,-7-8-215,10 19 0,2-1 561,-2-20-471,0 18 0,2 1 443,3-10-729,2 4 493,0 7 65,10 3 591,-7 15 440,14 4 59,-14 14-327,9 37-2167,-14-13-140,-1 35-324,-9-1 167,-3-10 437,-3-7 1,-1-1-1230,0 8 136,0-11 0,0-1-748,0 2 2732,-16 14 1,13-29 0,-13 4-1</inkml:trace>
+  <inkml:trace contextRef="#ctx0" brushRef="#br0" timeOffset="97963">28082 11344 23639,'0'-22'-4407,"0"-3"2549,0 6 883,-23-3 406,3 12 1050,-21 2 676,7 7-99,3 16-588,12 13 725,-1 27-520,17-2-859,-3-12 0,4-1-628,25 11-1108,-8-10 0,4-1-1295,29 2 2996,-22-16 0,1-3 1,18 1-1,2-3 0</inkml:trace>
+  <inkml:trace contextRef="#ctx0" brushRef="#br0" timeOffset="98234">28750 10642 21750,'35'-2'1237,"-1"14"-3184,-16 4-503,1 16-7,-18-7 1230,5 3-438,-6-8 716,0 2 728,-14 4 0,10-8 0,-11 3 1</inkml:trace>
+  <inkml:trace contextRef="#ctx0" brushRef="#br0" timeOffset="98801">29180 11649 24629,'5'-11'-1447,"-2"23"-3364,-3-2 3520,0 20-59,0 4-750,-14-5 2270,-7 22 1,-14-8 0,16-13-1,0-1 1</inkml:trace>
+  <inkml:trace contextRef="#ctx0" brushRef="#br0" timeOffset="99663">19840 13096 22830,'0'-9'-6386,"0"0"4347,0 5 975,-12 1 2204,-1 21-82,-18 6 184,8 11-916,-6 2-539,8-7 1403,-7 21-939,10-11-361,6-8 1,3 0-955,2 2 794,2 12 1,5-27 0,0 2 0</inkml:trace>
+  <inkml:trace contextRef="#ctx0" brushRef="#br0" timeOffset="99814">19897 13194 21840,'5'4'-4917,"0"16"3733,-11 16 0,-3 5-524,5 21 1559,-4-19 0,1-1 1,7 11-1,0 1 0</inkml:trace>
+  <inkml:trace contextRef="#ctx0" brushRef="#br0" timeOffset="100213">20498 13652 23009,'-45'0'0,"10"0"0,3 0 0,12 0 0,2 15 369,0 0-292,7 18-1050,2 1-211,6-3-134,25 9-847,-17-17 994,22-4 1,3-3-244,-7 0-276,31 0 860,-21-11 1277,1-3 378,-1-1 508,11-21 1573,-15 15-58,15-34-1837,-26 15 464,3-19-1455,-14 19-793,-3-13-431,-2 52-508,-2-10-894,0 32-397,0-2 2592,0-6 0,0 1 1,0 0-1</inkml:trace>
+  <inkml:trace contextRef="#ctx0" brushRef="#br0" timeOffset="100946">21493 13573 22560,'-23'-8'-2400,"-12"3"2536,17 2 15,-11 23 819,5 3-740,13 20-1335,3-10 271,8 7-673,20-16 442,4 10-519,21-17 1152,0-3-478,-3-9 685,-17-27 1388,6 16 313,-20-50-1084,5 34 190,-10-14 1,-4-2-124,-2 5-1529,0-19 75,0 33-372,-13 3-431,10 30 270,-10 18 1965,4 33-863,7-6 435,-2-13 1,-1-1 173,5 13-173,-1-20 1,2 0-173,7-2 0,1-1-149,-5 17-266,12 10-572,0-25 277,-13-5-125,13 0-230,-16-13 846,0-1 525,-16-31 496,13-11-710,-13-27-5,16 5 402,-2 12 1,4 0 11,19-8 360,-8 7 0,0 1 55,14-4-11,13 6 0,2 1 854,-8 4-411,17 6 1,4 5 1564,-7 5-1718,-5 6 1,-1 0 665,8 1-1179,-11 1 1,-1 0 567,4-2-769,-5-4 1,-2-2 271,-2-3-191,15-21-728,-35 14-385,-2-18-364,-8 14-452,-3-8-313,0 11-13,-22 1-123,17 2-860,-35 3 1746,35 4-646,-35 5 2455,12 4 425,-11 17 1143,-3 16-333,26 9-1327,-11 12 908,24-9-2268,-6 4 1743,9 3-2716,0-1-829,28 0 2040,-21-2 1,20-24 0,6-2 0,7 20 0</inkml:trace>
+  <inkml:trace contextRef="#ctx0" brushRef="#br0" timeOffset="101330">23370 13687 25798,'47'0'-26,"-13"-5"1,0 0-102,11 2-840,21-7 258,-18 10-421,1 0-204,-4 0 1199,-3 15 1,-6-12 0,-2 12 0</inkml:trace>
+  <inkml:trace contextRef="#ctx0" brushRef="#br0" timeOffset="101515">23438 13966 23549,'-24'3'1659,"5"-1"-1240,29-1-1062,21 0 258,19-1-330,8-12-18,-19 10 1,0 1-88,21-11 838,-19 11 1,-1 2 0,13-1 0,-1 0 0</inkml:trace>
+  <inkml:trace contextRef="#ctx0" brushRef="#br0" timeOffset="101833">23807 13451 23189,'-22'-6'-1922,"3"0"1394,7 3 902,3 0-695,31 2 1112,27 14-842,6 4-19,-9-1 0,-2 2-604,4 11 495,-8-7 1,-2 1-143,3 6-313,6 12 3,-22-11-1065,-5 0 249,-10 3-106,0 15 308,-9-9 1083,-10-5 0,-2 1 201,4 7-397,-36 3 0,-8 0 720,12 5-133,3-20 0,-9 2 0,6-3 1,11-7-1,2-1 0,-10 6 1,0 0-1</inkml:trace>
+  <inkml:trace contextRef="#ctx0" brushRef="#br0" timeOffset="103113">25668 13128 21930,'0'-8'-5846,"21"-1"10028,-16 3-3948,49 0 667,-26 2-319,31 1-272,-14 3-115,1 0-195,-5 0 1597,-4 14-3060,-7-10 1490,-14 30-2473,2-16 680,-16 20-23,6-5-300,-37 22 1446,22-12 290,-21-14 1,-4-1 1145,7 8-978,-26-1 2725,14-6-881,4-3 231,15-4 14,-10-5-875,24 6-1595,-10-8 403,14 10-1017,0-9-737,18 5 110,2 5-144,3-7 908,6 14-891,-15-15 1483,3 11-1600,-7-12 1684,-10 8 457,0-12-30,0 4 106,-21 1 811,15-5-1806,-28 9 1365,30-11 1,-22 2 0,9-5 0</inkml:trace>
+  <inkml:trace contextRef="#ctx0" brushRef="#br0" timeOffset="103430">26777 13255 24089,'13'-22'-1641,"-3"2"545,-4 7 468,-4 4-455,-2 5 181,-20 2 1629,-2 19 85,-3 6-714,-7 24 230,17-11-209,-4 4-101,9-12 299,10 0-658,18 0-1234,15 5-103,11-11 1234,-6-9 1,0-3 418,16-3 396,-8-3 1,1-4 262,9-16 37,-20 16 0,-2-3 1129,7-34 33,-4 17 307,-7-20-1874,-3-15-724,-14 13-702,-4 2 0,-7 0-1304,-20-5 2033,4 8 1,-4 2 0,-25 2 0,-5-6 0</inkml:trace>
+  <inkml:trace contextRef="#ctx0" brushRef="#br0" timeOffset="104613">20252 15351 22020,'0'-8'-5259,"1"-1"3022,-1 2 1444,0 1-14,0 0 180,0 1 243,0 1 96,-17 1-40,-2 2 1714,-19 18 835,5 5-485,1 19-444,14-9-317,7 1-339,11-10-636,0-1-1268,0-1-197,18 4-1073,5-6 896,24-3 1302,5-10 728,-10-22 1287,0 12 108,-16-32-541,-1 32 727,3-47-546,-11 33-113,2-26-1309,-13 15-833,-2 9-1331,-3-6 489,-1 15 432,-16 20 1304,13 20-775,-24 14 333,25-5 0,1 0-359,-18 14 728,17-6 1,2 0-316,-8 7 406,7-11 1,2-1-114,-1 5-1252,0-11 0,0-1 668,0 2-415,0 7-81,0-15 1007,0-9 1,0-2 0,0-10 0</inkml:trace>
+  <inkml:trace contextRef="#ctx0" brushRef="#br0" timeOffset="104915">20417 15671 21210,'34'-20'1762,"3"1"-830,4 1-247,4 2-264,1-1-134,2 2-241,-12 4 1,0 1-2,21-6 220,-11 3 1,-2 0-45,6-1-103,-15 1 0,-1-1 213,-1-1-215,1-6-187,-19-1-854,-8 7-491,-4-12-355,-24 14 394,-5-7-503,-25 14 921,-3-1 100,11 23 1110,-7 6 925,25 11-745,-7 15 462,22-15-740,1 26-167,9-23-1352,20 9-976,11-5-672,11-13 2706,-11-7 1,1-2 0,11-1-1,16 1 1</inkml:trace>
+  <inkml:trace contextRef="#ctx0" brushRef="#br0" timeOffset="105296">21390 15450 22380,'-16'-10'-4538,"13"2"542,-13 3 5189,16 19-2171,0 6 326,14 21-555,-10-9 739,10 1-1817,0 7 1225,0-17 1460,2 14-2039,1-25 1938,-16-16 232,9-15 1090,-7-13-1250,5-6 714,1-12-51,1 10-578,0 5 0,2 1 818,1-4-897,14-13 30,-12 28-325,14 5 1739,-14 13 42,13 24-1793,-18 10-1257,10 27-184,-9-6 221,-2-16 1,0-1-1051,4 7 1761,6 8 0,-2-19 0,2-2 0</inkml:trace>
+  <inkml:trace contextRef="#ctx0" brushRef="#br0" timeOffset="105683">22112 15404 22830,'0'-18'-6206,"-23"7"5930,18-3-2634,-37 12 4697,23-5-1386,-15 28 1214,10 3-931,11 23-1788,6-11 1507,7-1-1132,19-10 1226,-15-2-2498,35 4 1472,-10-14-591,25 7 472,-11-19 1682,10 6-68,-26-27 756,11-9 331,-26-11-999,8-5-716,-18-14-1081,5 8 366,-7 4 0,0-2-1176,0-14 889,-9 7 0,0-1-1109,4-8 737,-4 23 1,1 0 66,8-6 147,-11 7 259,8 9 425,-8 7-399,11 31 676,0 5 91,0 50 18,0-12-152,9-14 1,0 2-962,-4 24 507,13 3-276,-9-32 1,-1 2 674,-1 11 1,0 0 0,3-11-1,-1-1 1,-4 9 0,0-1-1</inkml:trace>
+  <inkml:trace contextRef="#ctx0" brushRef="#br0" timeOffset="106019">22372 15571 22830,'0'-18'-6296,"0"2"4167,23 5 5433,-18 3-2838,41 1 716,-28 1 81,20-1-716,-10 0-65,1 0 1579,-4-1 149,-1-1-2246,-3-2 982,1-10-1262,-11 3-847,5-22 39,-15 13-875,3-12 340,-4 9-192,0 1-72,-20 2-539,15-5 493,-29 12 1413,31-4-464,-20 17 2061,21 23-984,-7 15 486,9 11-543,0 8 55,17 10-915,-13-11-465,11-7 1,3-1 1304,9 5-1,6 10 1,3-20 0</inkml:trace>
+  <inkml:trace contextRef="#ctx0" brushRef="#br0" timeOffset="106362">22975 15315 22380,'-18'-21'-6650,"4"4"4588,14 2 1160,0 29 360,17-15 2360,-13 44-2599,12-24 318,-1 19-1849,-11-7 2162,21-1 190,-13 11-605,1-11 65,4 11-1672,-9-21 2442,2-1-833,-3-10 1168,-4-5-617,6-45 526,0 14 40,2-16 1,1-3 629,6-4-426,-5 17 0,2-3-11,4 0 0,1 0 695,12-16-954,-3 11 1,2 2 632,4 3-1267,-5 13 0,1 5 528,1 6-27,8 4 1,-16 8 0,-1 0-1</inkml:trace>
+  <inkml:trace contextRef="#ctx0" brushRef="#br0" timeOffset="106815">19777 14296 22200,'-18'32'-2451,"13"5"-365,-28-7 4209,29 5-2823,-21-7 1910,23 13-2052,-15-9 1437,16 17 0,-6-24 1,7 7-1</inkml:trace>
+  <inkml:trace contextRef="#ctx0" brushRef="#br0" timeOffset="106979">19932 14393 21840,'1'53'-7783,"-1"-8"7257,0 8 1,0-5 0,0 5-1</inkml:trace>
+  <inkml:trace contextRef="#ctx0" brushRef="#br0" timeOffset="107547">23677 14604 23549,'0'-14'-5396,"0"1"3627,0 3 975,0 1 335,0 2 213,0 4-58,0 16-823,0 6-1189,0 21 1506,0-9-629,14 15 221,-11-21 1141,11 17 1,-14-22 0,0 5 0</inkml:trace>
+  <inkml:trace contextRef="#ctx0" brushRef="#br0" timeOffset="107685">23708 14760 21840,'38'-39'1063,"-3"6"-630,-8 8-318,-2 12 790,-8 7-113,-3 6-1007,-2 16-1968,0-11 488,3 36-2127,-2-18 3241,6 26 1,-5-3-1,4 3 1</inkml:trace>
+  <inkml:trace contextRef="#ctx0" brushRef="#br0" timeOffset="107947">24557 15401 25258,'-27'-19'-3218,"-12"-1"2678,35 2-2112,-24-4 2229,25 7-632,-8-2 194,11 9-204,21 0 971,16 4-1013,8 1 1,3 2 1013,-14-1 0,0 4 406,12 9 1,-2 0-1,-1-5 1,-2 16 0</inkml:trace>
+  <inkml:trace contextRef="#ctx0" brushRef="#br0" timeOffset="108112">24630 15682 23999,'-22'0'270,"10"-14"-4892,23 11 6905,11-12-1555,23 0-1299,-11 8 0,2-1-88,23-9 711,-16 6 0,1 2 1,21 7-1,-32-3 1,1 1-1</inkml:trace>
+  <inkml:trace contextRef="#ctx0" brushRef="#br0" timeOffset="108381">25382 14872 23999,'-38'-15'-3031,"3"1"2220,9 3 50,4 5 944,34 1 1424,-13 28-2418,29-8 1,7 2 514,-4 28-467,11-11 0,4-1 485,-21-11 0,-1 2-156,15 18 0,-2 2 17,-16-17 0,-3 0-282,6 7 1,-5 2-785,-10 1 0,-5-1 1387,5 18-749,-5-7 0,-8-1 195,-25 9 775,11-11 1,-3-1 0,-5-18 0,-2-2-1,3 7 1,-1 1 0</inkml:trace>
+  <inkml:trace contextRef="#ctx0" brushRef="#br0" timeOffset="109180">26422 14946 23819,'0'-11'-5126,"0"3"3177,0 21 975,0 7 335,18 13-328,-13 14 534,30-14 419,-31 28-1712,22-24 1365,-24-3 0,-1 0 415,15-3-614,-15 10 499,4-28-198,-5-5 271,0-3-401,3-3 945,0-17 280,2 11 980,0-31-1042,1 18-48,10-37 562,-3 19-918,1 3 1,1 0 506,2-2-319,12-10 374,-14 30-983,5 1 1598,-7 13-524,-1 15-1712,2 12-569,-4 8-54,6 24-111,-9-20 698,-2-5 0,-1 1-1157,-1 3-199,0 9 442,0-20 1600,-1-5 389,0-6-13,1-4-498,-1-6-372,1-3 850,0-3 1419,2-20-1243,-1 15 1206,6-37-1096,-2 22 494,5-19 6,0 5 303,9-14-750,-5 12-1384,9-16 1206,-10 30-794,8 2 1654,-9 16-21,4 4-404,5 16-1309,-4 14-644,-3-3 1,0 3-824,5 24 519,-4-15 1,1-2-1140,4 8 2092,-2-9 0,2-2 1,7 2-1,11 7 1</inkml:trace>
+  <inkml:trace contextRef="#ctx0" brushRef="#br0" timeOffset="109746">27643 15299 22920,'4'-37'-4272,"-1"1"2858,-3 0 474,0 3 431,0 2-11,-19 2-258,15 5 87,-15 7-793,2 4 1798,12 6-844,-25 4 1892,28 24-1090,-19 11 857,19 15-770,-7 1-170,9 10-752,0-14-211,23 10 86,3-8-1292,2-16 1927,1-9 1,-1-3-798,-7-2 1077,30-3 536,-28-10 576,0-3 258,-4 0 695,-1-19-375,1-7-593,-7-26-765,1 10 417,-8-14-1921,-2 25-242,-3-6-460,0 17 140,0 4 120,0 51 75,20-1 456,-16 31 272,13-32 1,2-4 88,5 5 357,-2-7 1,2-2 17,14 0 645,13 7-18,-21-21 443,8 1 496,-3-11 518,-11 2-297,11-19 988,-18-8-942,6-25-1021,-13 6-123,1-21-914,-7 24-451,-1-8-818,-3 10 268,0 14-916,0-1 989,0 41-123,0 12 410,0 19-69,18 2-1642,-1 7 921,5-12 1598,5 10 1,-23-19 0,11-4-1</inkml:trace>
+  <inkml:trace contextRef="#ctx0" brushRef="#br0" timeOffset="109929">28485 14632 24539,'0'-29'-7016,"0"12"2369,19 0 4969,2 32 0,2-13 0,-8 15 1</inkml:trace>
+  <inkml:trace contextRef="#ctx0" brushRef="#br0" timeOffset="110130">28852 15424 23729,'7'0'90,"2"0"-90,5-23-1043,-3 0 94,10-25 233,-10 13-677,4-9 156,-9 19 889,-2-14 1,-2 19 0,-2-6-1</inkml:trace>
+  <inkml:trace contextRef="#ctx0" brushRef="#br0" timeOffset="110685">28288 15496 22470,'34'-18'3082,"-1"3"-1220,6-35-2819,-7 15 630,7-17 158,-20 21 0,-1-1-483,8-19 353,-6 3 0,0 0-469,1-11 38,-6 5 1,-1 1-1012,1-11 1289,-5 7 0,-2 0-178,-4 24 1,-1-1 265,0-15 0,-1-7 0,0 6-106,-1 10 0,-1-1 247,0-11 0,1-6 0,-1 7-145,0 14 1,0 2 59,0-21 0,0 2-361,0 3 174,0-10 325,-12 42-347,9 25 981,-12 21 0,-2 8 298,8 28-482,-7 0 1,0 0-114,10-26 0,1 0 27,-4 13 0,2 1-55,2-13 1,0-1-31,1-1 1,1 1 183,-1 2 0,1-1-665,1 1 0,-1 0-2,1 1 1,0 0 222,1-1 0,-1 2-82,1 17 1,0 1 3,1-16 1,0 2-373,0 1 1,0 3 0,-1-4 146,0-6 1,2-2-249,8 8 0,3-1 535,-1-7 1,1-5 0,13 14 0,-7 8 0</inkml:trace>
+  <inkml:trace contextRef="#ctx0" brushRef="#br0" timeOffset="111065">28900 15372 24179,'0'-10'-6386,"0"-1"4258,0 5 1064,0-4 425,0 4 303,19-6 2274,7 5-352,10-2-1171,3 2 1592,-10 1-52,2-1 76,15-6 97,-13 1 143,22-15-2047,-27 7-470,13-23-361,-22 12-224,2-13-358,-13-6-529,-5 11 746,1 5 1,-5 1-1280,-22-3-138,-2-17-63,-2 29 1909,-7 10 1,0 2 580,12 4 70,-41 28 1860,49 0-943,-7 42-223,18-20-746,9-1 0,2 1 27,-3 10-828,21-16 1,13 2 0,-5-4 23,-12-6 0,2-1 674,18 4 1,11 2-1,-5-6 1,-11-8 0,-1-4-1,13 5 1,1-1 0</inkml:trace>
+  <inkml:trace contextRef="#ctx0" brushRef="#br0" timeOffset="112365">25683 14287 22560,'16'-2'1358,"-3"18"-6380,-13-1 2745,0 20 425,0-11 168,-12 4 1667,9 1 0,-9-8 0,12 6 0</inkml:trace>
+  <inkml:trace contextRef="#ctx0" brushRef="#br0" timeOffset="112533">25942 14266 22380,'-20'21'-1195,"-8"6"557,25 15 0,-10 0 0,13-6 0</inkml:trace>
+  <inkml:trace contextRef="#ctx0" brushRef="#br0" timeOffset="113147">30578 13852 26517,'0'-22'-5486,"0"1"3538,0 4 884,0 3 335,-13 3 720,10 5-814,-11 20 1973,14 12-3555,0 33 2045,0-7-450,0-12 1,0 0-181,0 10 91,0 12-696,-14-10 1825,10-18-525,-11 5 1,15-23 0,0-2 0</inkml:trace>
+  <inkml:trace contextRef="#ctx0" brushRef="#br0" timeOffset="113281">30532 14132 22740,'19'-37'-997,"-14"0"811,20 10 0,4-1 1160,-9-14-1024,3 17 0,2 1 435,0-6-221,-1 7-33,7 6 359,-9 9 675,4 4-1817,-10 45-2911,-5-8 3382,-6 14 1,-2 6-1,-1-20 1,-2 1-1,0 13 1,0-1-1</inkml:trace>
+  <inkml:trace contextRef="#ctx0" brushRef="#br0" timeOffset="114346">19532 16640 25168,'34'-20'2204,"1"-1"-1677,-17 8-644,10 4 594,-25 2-1687,10 6 1162,-13 14-1721,0 9 172,0 11-438,0 8 22,0-3 190,0 7-398,0 5 1258,0 4-770,0 4 1823,0 2-90,0-17 0,0 0 0,0-10 0,0 1-45,0 22 0,0 1 45,0 8-104,7-12 1,1-1-275,-4 7 212,10-12 0,3-1-513,-2 5 395,-1-4 1,2-2-354,5-2 272,-11-6 1,-1-3-103,0-8-29,1 6 310,-9-18 385,3-2-79,-4-7 537,0-2 70,-17-2 1800,-2 0-335,-24-1 107,-5 0-139,2 0-431,0 0 157,11-11-1422,-2 8-276,1-8-4317,-16 11 4048,14-8 1,-10 7-1,18-7 1</inkml:trace>
+  <inkml:trace contextRef="#ctx0" brushRef="#br0" timeOffset="114941">21270 17374 25888,'0'-15'-3193,"0"3"0</inkml:trace>
+  <inkml:trace contextRef="#ctx0" brushRef="#br0" timeOffset="115199">21297 18048 25618,'0'4'-6116,"0"0"3988,0 16 1064,0 6 425,0 10 213,0 17 122,0-17-233,-6 6 1,-6 1-1782,-23 1 2556,3 0 1,-4-2-1,3-23 1,-1-2-1,-3 6 1,0 1-1</inkml:trace>
+</inkml:ink>
+</file>
+
+<file path=ppt/ink/ink12.xml><?xml version="1.0" encoding="utf-8"?>
+<inkml:ink xmlns:inkml="http://www.w3.org/2003/InkML">
+  <inkml:definitions>
+    <inkml:context xml:id="ctx0">
+      <inkml:inkSource xml:id="inkSrc0">
+        <inkml:traceFormat>
+          <inkml:channel name="X" type="integer" min="-2.14748E9" max="2.14748E9" units="cm"/>
+          <inkml:channel name="Y" type="integer" min="-2.14748E9" max="2.14748E9" units="cm"/>
+          <inkml:channel name="F" type="integer" max="32767" units="dev"/>
+        </inkml:traceFormat>
+        <inkml:channelProperties>
+          <inkml:channelProperty channel="X" name="resolution" value="1000" units="1/cm"/>
+          <inkml:channelProperty channel="Y" name="resolution" value="1000" units="1/cm"/>
+          <inkml:channelProperty channel="F" name="resolution" value="0" units="1/dev"/>
+        </inkml:channelProperties>
+      </inkml:inkSource>
+      <inkml:timestamp xml:id="ts0" timeString="2021-07-19T06:41:51.582"/>
+    </inkml:context>
+    <inkml:brush xml:id="br0">
+      <inkml:brushProperty name="width" value="0.12095" units="cm"/>
+      <inkml:brushProperty name="height" value="0.12095" units="cm"/>
+    </inkml:brush>
+  </inkml:definitions>
+  <inkml:trace contextRef="#ctx0" brushRef="#br0">2305 1623 22740,'-18'-13'-3397,"-1"0"2143,0 0 698,4 2-51,2 1 289,5 3-97,2 2 37,2 3-401,2 1 1227,0 16-696,1 9-149,1 9 79,0 8-66,0-6 243,15 25-475,-11-13 167,4-8 1,-1 0-625,-7 4 856,0 18 157,0-33 150,0 8-90,0-23-270,0 0 745,0-30-216,20 13 413,-10-33 1,2-6-135,37 7 91,-23-18 1,-1-3-145,-3 28 0,0 1 120,9-19 1,-1 0 406,8-6-375,-7 14 0,2 3 796,5 3-1041,7-1 806,-6 24-465,-13 6 217,10 38-2062,-19-8 222,-7 11 0,-3 4-827,0 7 956,-5 4 0,0 1-952,-2 0 800,0-6 0,0-3-1080,0-9 164,0 7 1730,-13-25 1731,9-1-1050,-9-28-262,32-24 683,-14-4-745,12 1 1,3-1 586,5-6-362,-3 6 0,1 0 551,14-4-970,-3-7 663,-2 17 519,-8 15-432,14 2 935,-15 14-825,12 20-1082,-15 10-1110,4 9-437,-1 24-47,-6-22 611,-4-2 1,1 0-1241,3 5 689,-1-7 1,1-1-1437,7 2 1859,-1-8 1,2-3 823,11-2 785,16-1 0,-11-15 1,3-4-1</inkml:trace>
+  <inkml:trace contextRef="#ctx0" brushRef="#br0" timeOffset="370">3892 1640 23099,'0'-26'-6385,"-18"1"3470,13 6 1311,-30 4 2705,7 4-420,-16 6 403,-5 17 435,12 13-1219,-4 23 1172,21-7-241,-3 18-44,16-24-1538,13-2 1,3 1-992,-4-3 450,22-4 1,5-4-801,-7-9 1170,14-6 0,2-3 410,4-2 810,15-21 624,-19 14 561,-2-38-33,-4 22-715,-14-9 1,-2-3-416,5-6-742,-9 3 1,-2 1-583,-5-5-466,-1-16-932,-6 28 256,-1 0 300,-12 19 194,9 20 628,-9 14 563,12 10-605,0 5 338,0-8 89,0 2 94,0 1-1025,17 13-815,2-14 1871,0-7 1,3-3 0,8 0-1,3 4 1</inkml:trace>
+  <inkml:trace contextRef="#ctx0" brushRef="#br0" timeOffset="750">4415 1545 21300,'0'38'-6295,"14"-18"3459,-10 19 1615,10-22 568,1 18-495,-11-9 751,21-3 528,-22 0-1933,16-3 1929,-17-3 535,17-2 77,-12-3-1123,5-5 1723,-5-2-629,-1-21-154,2-10 238,1-10-330,9-26 348,-4 20-574,4-17 872,2 5-1090,-4 16 330,10-11-94,-10 33 719,14-4 422,-14 19-235,8 14-1168,-11-9 416,3 36-1926,-2-20 585,9 37-660,-6-19 499,-1-5 0,0 0-1400,4 4 8,8 11 719,-6-19-228,3-5 2304,2-3 0,5-7 0,0-2 0</inkml:trace>
+  <inkml:trace contextRef="#ctx0" brushRef="#br0" timeOffset="1136">5407 1411 22740,'0'-15'-6476,"-16"6"5790,-1 4 1355,-2 19 945,-5-11-426,22 44-2374,-9-25 1149,11 41-1560,0-29 1597,0 11-541,21-7-932,5-9-451,24 8 375,-13-25 2498,11 5-868,-18-17 1466,-6-21 275,-2 14 398,-19-44-1087,5 13-424,-8-13-1050,0-14-716,0 30 105,-16-11-1228,12 56 1346,-11 22-403,34 28 979,-7-8 1,0 1-200,-1-17 0,2-1 90,8 14 0,-2 0 18,-11-14 0,0-1 52,8-1 0,1-1 324,5 31-721,-8-24 0,0-2-795,4 17 1222,-6-15 0,-2-3-1017,-3-2 1646,-2 8 1,-28-28 0,-6 0 0</inkml:trace>
+  <inkml:trace contextRef="#ctx0" brushRef="#br0" timeOffset="1350">4430 649 22200,'0'-4'-6476,"15"1"9578,-11 20-6294,10 2 1519,-14 21 63,-17 1 1651,12 12 0,-13-22 0,-2 1 0,7 3 0,0-1 0</inkml:trace>
+  <inkml:trace contextRef="#ctx0" brushRef="#br0" timeOffset="2050">6625 1418 22740,'-43'-3'-570,"2"0"449,-15 3 294,18 21 671,-10-16-473,31 24 0,4 4-1518,-3-6 756,7 10 0,3 4-937,6 0 287,21-8 0,6-2-694,6 3 1106,4-15 0,9-1 1,-5-4-716,21 2 852,-1-4 0,-1-3 1084,-8-9-45,-11-6 0,-3-5 1332,-3-17-590,-10 4 0,-3-3 192,-5-19-770,0-1-418,-13-1-1297,-1 14-237,-3-18-477,0 29-430,0-2 469,0 15 363,0 27 624,0 9-12,22 14 148,10 15-130,11-20 796,-11-7 1,-2-1 72,10 3 13,-5-12 0,1-2 398,7 4-19,12-11 600,-4-1 609,-13-8 241,16-20 55,-26-10-1456,-9 3 1,-2-3 57,-2-19-582,0-3-120,-10 17-793,-2 0-338,-3 4-400,0 3-839,0 4 958,0 6 537,0 5 292,0 22 138,0 25 103,22 4-69,-10-3 1,0-1-949,15 2 323,16 11 132,-23-18 1011,22-3 1,-10-6 0,0-2-1</inkml:trace>
+  <inkml:trace contextRef="#ctx0" brushRef="#br0" timeOffset="2400">8245 1301 23189,'0'-24'-6475,"0"5"4436,0 5 975,-19 4 1479,15 4-1215,-27 3 1973,29 26-1420,-23-17 812,22 42-437,-10-12 535,13 10-663,0 19-569,0-28 719,25 11-2077,2-10 1493,2-12-1549,26 6 2528,-36-22-584,39-1 1255,-34-9 471,8-23 203,-16 18 930,0-43-1903,-9 26 191,5-40-1052,-11 22-517,5-24-665,-6 32-470,0-6-295,0 20-380,0 29 1628,0 15-1183,19 35-22,-15-8 1698,11-17 1,3-2 0,2 5-1,14 9 1</inkml:trace>
+  <inkml:trace contextRef="#ctx0" brushRef="#br0" timeOffset="2634">7585 519 22380,'24'-21'270,"-3"1"-489,21 6 1529,-11 5-756,-1 4-342,20 19-1173,-17 17-1347,2 13-689,-23 13 2704,-12 0 1,0-22 0,0 0 0,0 3 0,0 0 0</inkml:trace>
+  <inkml:trace contextRef="#ctx0" brushRef="#br0" timeOffset="3243">9385 1176 22920,'19'24'-4069,"-8"7"0,1 2 878,11-2 2694,-2 14 1,-1 3-490,7 6 691,-4-7 1,-1 0-152,3 8 269,-8-20 1,-3 1-2147,-2 28 2474,4-18 266,-8-12 1,-3-2-25,-4-1 300,5 6-292,-6-24 118,-23-3 2235,2-28-1780,-29-17-225,28-12-756,-6 3 1,2-3-186,21 14 1,2-3 21,-10-9 1,-5-5-1,4 2 142,7 0 0,3-1-76,-2 6 0,0-4 1,1 3-1109,1-4 1,0 1 1048,4 0 0,0 0-43,-1 3 0,2 0 585,11-7 0,1 0 186,-11 16 0,2 1-6,16-8 0,6 6 1065,3 10 244,9 7 485,0 17-581,-13 22-1501,-1 0-291,-1 21-775,-5-5-374,-1 5-762,-3 21-146,-8-14 932,-2-10 1,-2-1-854,-2 0 1115,0 7-533,0-23 1874,-19-4 1,14-8-1,-14-5 1</inkml:trace>
+  <inkml:trace contextRef="#ctx0" brushRef="#br0" timeOffset="3636">10182 425 22020,'11'20'-7066,"-1"14"4538,-1-18 1798,5 36 116,-3-13 427,0 0 1,0 2-231,2 13 364,-4-4 0,0 2-1883,1 11 2006,-5-21 1,1-1 192,2 17-29,0-3 13,-1-2-107,-2-19 1,0 0 104,1 14-180,-1-13 1,1-3-29,-1-2 55,1 4-64,-3-22-246,-1-2 30,1-6 266,3-1 881,0-20 110,8-12 23,-1-9-2,5-10-146,-3 8 330,0-4-178,-1-1-299,4-10-954,-6 19 175,4-1-93,-8 26 776,8 4 852,-6 27-2716,7-15 757,-6 26 1,-1 5-795,9-3-358,-1 13 1,0 3-1035,7 4 2386,0-8 0,1 0 1,6 6-1,-9-18 1,0-1-1</inkml:trace>
+  <inkml:trace contextRef="#ctx0" brushRef="#br0" timeOffset="4040">11197 1138 23099,'0'47'-2968,"0"-14"1,0 1 838,0 12 1438,7-1 0,4 1-536,10 12 639,-10-20 0,1 1 196,5-1 1,0-3-150,6 19-593,-8-21 0,1-1 586,13 8 304,-11-6 45,2 2 797,-11-13-1065,6 1 517,-14-37-462,-29-37 526,20-6-199,-17-3 1,-1-1-138,16 21 0,2-1 334,1-11 0,0-6 1,0 4 53,0-2 0,1 0 70,4 8 0,1-4 0,4 1 294,6 0 0,3 0 1,-3 3-369,-7-6 1,4 1 314,15 2 0,9-2 0,-5 7 309,-12 11 0,1 3 313,22-8 1,4 8 1121,-8 12 226,12 4-218,-30 37-2887,1 0 291,-12 13 0,-6 5-249,-18 21-291,7-19 1,-3 5-1,-2-3 895,-11 3 1,-2-2 0,4-3 0,-2 3-1,1-3 1,-7 5 0,0 0 0</inkml:trace>
+  <inkml:trace contextRef="#ctx0" brushRef="#br0" timeOffset="6436">2828 3275 23909,'-25'-19'-4503,"0"3"3416,2 5 857,1 3 294,2 3 344,6 2 11,1 2 78,4 1-407,1 18 422,1-13 811,0 55-1793,4-29 37,2 13 0,0 5-563,1 8 95,7-7 0,5 0-478,3-20 0,2-1-61,2 8 0,5-1 392,12-5 0,1-4-956,15 12 2115,-4-14 1,2-4-1,13-7 1,-21-9-1,-1 1 1</inkml:trace>
+  <inkml:trace contextRef="#ctx0" brushRef="#br0" timeOffset="6783">3400 3715 22470,'19'-34'-1451,"-5"2"523,-3-12-411,-7 13 410,-2-5-99,-2 18 310,-17 4 333,-8 7-137,-15 18 1637,15 12-331,-19 23 255,38-6-994,-31 2 1216,35-12-1094,-9 1 251,11-4-1673,0 6-936,25-13 679,7-2 489,14-13 2091,14-22-300,-25 13 903,11-38-659,-10 7 522,-11-14-1071,-9 17 0,-3 0 54,-3-7-623,-2-20-1008,-8 31-1124,0-8 400,0 46 186,0 10 118,0 22 609,0 5 237,0-11-132,18 3-902,-14-1 479,24-14 1,5-1 1349,-4 8 0,4-13 1,3-2-1,10 2 1</inkml:trace>
+  <inkml:trace contextRef="#ctx0" brushRef="#br0" timeOffset="6970">4288 3354 22920,'-26'-19'-5059,"6"2"3169,-1 6 1737,16 3-1466,-33 5 2974,20 16 27,-13 14-552,14 9-1560,-2 7 1184,17-6-602,-7 2-28,9 1 176,19 16-2907,-14-17 2553,22-9 1,4-3 0,-4-4 0,34 3 0</inkml:trace>
+  <inkml:trace contextRef="#ctx0" brushRef="#br0" timeOffset="7151">4300 2659 22200,'-34'0'0,"-16"17"1624,13 15-1764,5-1 0,3 5-356,12-5 0,2 4 273,-5 18 0,2 0 0,11-18 0,2 0 0,0 10 1,1 1-1</inkml:trace>
+  <inkml:trace contextRef="#ctx0" brushRef="#br0" timeOffset="7666">5113 3458 22290,'0'45'-6206,"0"-7"4168,16 5-284,-12-5 1813,27 6 114,-20-10 1,-3 2-268,12 22 376,-5-9 1,-1 1-1777,3 11 1816,-8-23 1,0 0-25,3-1 1,-1-1 335,-2 17-116,-3-12 0,0-1 464,0 0 125,-6 8 248,0-24-231,0-5 24,0-4-131,-17-7 2334,12-18-3346,-29 6 1597,30-52-1344,-23 26-212,24-3 0,3-3 276,-10-16-415,10-6 600,-2 10 0,4-1-877,10 10 1,0 0 1392,-10-13 0,2-2-844,16 1 1,3 2 974,-9 12 1,0-1 100,9-21 1,3 3-225,-5 27 0,0 2 297,0-6 1,-2 2 511,9 1-121,-2 7 330,0 9 139,-2 6 44,-3 7-363,-1 2-533,4 17-1477,-7 9-654,4 24-573,-11-7-135,-1 4-253,-6-14-61,-3 1 259,0-3-1211,-16 9 3386,12-12 1,-12 3-1,16-13 1</inkml:trace>
+  <inkml:trace contextRef="#ctx0" brushRef="#br0" timeOffset="7902">6100 2788 22470,'0'43'-5486,"0"-1"3357,0-8 1155,0 3 335,0 25 304,0-15 197,-1 4 1,2 1-143,12-1-833,-12 0 1,1-1-31,10-3 1082,-6-8 1,-2-1-1,-2 5 1,8 10-1</inkml:trace>
+  <inkml:trace contextRef="#ctx0" brushRef="#br0" timeOffset="8350">5970 3289 21840,'21'-17'786,"9"6"871,13-1-1300,1 7-492,-6 2-113,19 2-50,-12 1 107,-6 5 0,-1 3-217,4 8-130,-8 0 1,-2 0-1103,2 2 206,5 16-209,-11-8 69,-11 7-624,4 11 100,-15-20 416,-1 16 646,-5-19 383,0 10-129,0-15 699,0 0-87,0-4 730,0-6 59,20 2 605,6-6 381,24 0-14,-10-2 5,16-17 572,-26-4-362,11 0 602,-11-28-975,-11 29 192,2-42-2085,-13 31-457,-3-7-543,-2 16-539,-3 4 193,0 5-422,0 29 1245,0 24-473,17 8-313,-13 10 208,31-25 276,-31-2 1208,35-3 1,-23-4 0,19-3 0</inkml:trace>
+  <inkml:trace contextRef="#ctx0" brushRef="#br0" timeOffset="8602">6865 2968 21570,'58'-1'928,"-11"0"-858,-4 1-49,-12 0-63,-1 16-1184,-2-12 975,-3 25-1183,1-9 154,-7 15-753,-4-5-309,-9 4-348,-6-16 2610,0 4 1,-20-11 0,-6-1 0</inkml:trace>
+  <inkml:trace contextRef="#ctx0" brushRef="#br0" timeOffset="8766">7333 2489 21660,'17'41'-9278,"4"3"6625,-18 2 2295,2-6 1,1 4 337,-6-8 0,0 2 1,2 14-1,-1 1 1,-1-12-1,0 1 1</inkml:trace>
+  <inkml:trace contextRef="#ctx0" brushRef="#br0" timeOffset="9956">8448 3768 22290,'12'-38'-1214,"0"0"1,0-10 0,5 2 1050,4 20 0,3 0 345,7-24 0,-3-2-231,-11 20 0,-1-1-43,7-11 0,-2 0-63,-7 12 1,-3 0-88,-5-1 0,1 0-247,5 0 1,-1-2 414,-5-13 1,-2-1-131,4 13 0,-1-1-236,-2-21 0,-3 2-540,-2-2 412,-10 23 0,-1 3-1012,5 1 723,-35 10 881,14 10 529,-9 26 1476,1 8-1468,21 13 1,3 6-232,-3-11 1,2 3-139,5 8 1,3 7-1,0-4 306,-4 1 1,3-1-388,11 16 0,7 1-634,5-2 0,5-3-224,1-14 0,4 0-118,1 0 1,4 2 0,-1-6 139,0-4 0,2-4 586,3 0 0,4 1 0,-3-4 133,-2-6 0,0-2 27,21 8 1,-2-3 510,7-5 41,-25-10 0,0-1 581,19-5 412,-18-3-41,10-23 571,-28-7-1264,-1-12-283,-14 0-904,-2 10-113,-3-2-419,0 1-569,0 5-257,-18 2-779,13 3 913,-26 11 1674,27 17 852,-10 21-275,14 7-582,0 8-90,0-8 0,0 4 261,16-1-552,10 13-1198,-5-14 917,9-9 1,2-2-176,-6-1 875,11-10 0,2-3 862,0-4 68,12-3 308,-4-20 1547,-13 13-1530,-9-21 1,-2-4 169,-2 3-470,1-32-700,-12 20-635,-6-2-230,-2-26-998,-2 24-742,-15-20-464,11 42 1070,-10 20 2043,14 21-1156,20 28-471,3-6 894,0-13 1,2-1-149,12 7-208,4 6 248,-9-17 681,6-5 0,2-5 1,2-3-1</inkml:trace>
+  <inkml:trace contextRef="#ctx0" brushRef="#br0" timeOffset="10284">10547 3343 22740,'-23'-9'-3107,"-7"1"2862,13 5 553,-8 39-302,2-13-110,14 19 0,4 4-949,-3-5 683,6-7 0,0-1-1067,2 0 707,23 0-529,2 8-230,2-11 1013,1-9 1,-1-3 110,-6-2 535,42-1 704,-33-11 516,17-3 39,-21-23 581,2 17 452,-10-55-2034,-8 36-455,-5-13 1,-2-2-131,-2-2-748,-11 4 1,-2-1-1605,6-4 1150,-13 15 0,-3 0-1987,-2-16 2854,0 15 1,-13 0-1,14 15 1</inkml:trace>
+  <inkml:trace contextRef="#ctx0" brushRef="#br0" timeOffset="10667">11097 3479 21660,'0'13'-6295,"0"2"4166,0 4 1065,0 3 425,0 2 214,0 3 121,0 15 76,0-11-1369,0 10 1687,14-15-678,-11-3 474,11 0-371,0 2-88,3-8 126,13 1 829,-7-13 611,10-17 1201,-13 9 341,9-35-518,-1-1-26,-7-11-740,-5 12 1,-1-1 2,-1-8-1081,-4 8 1,-1 2-880,1-2-917,0-10 85,-4 34 921,0 1 192,-2 14 1261,5 20-2243,-2 11-236,8 27-309,-5-8 116,3 2 1617,-5-16 1,0-1-1,1-3 1</inkml:trace>
+  <inkml:trace contextRef="#ctx0" brushRef="#br0" timeOffset="10889">10365 2880 22920,'32'-35'-622,"-6"2"913,11 15 0,4 2 1056,11-5-1003,-7 11 0,0 3-382,9 3-1485,-12 23 0,-3 7 1148,3 6 1,-16 5-1,-3 2 1,6 14-1</inkml:trace>
+  <inkml:trace contextRef="#ctx0" brushRef="#br0" timeOffset="11417">12710 3406 23279,'-44'0'0,"-2"0"-90,-15 20 1314,14 8-1008,19-9 0,3 3-345,-5 22-652,7-8 265,11 1-458,5 13-245,7-13-557,20 15-974,15-27 1995,-5-11 0,3-3 28,26-3 873,-1-4 241,-2-25 1380,-14 15-832,-13-24 0,-3-6 214,3 4-281,-13-14 1,-5-4-976,-1-8-86,-6 15 1,-1-7-1,-4 4-428,-7 6 0,-2 0 408,2-13 0,0-5 0,-1 5-776,-2 11 0,-1 1 257,-2-4 1,-1-4 0,1 4-151,1 7 0,0 1 43,-6-17 0,-1 2-316,-3 6 364,11-1 587,12 33 540,0 34-26,0 3 357,21 31-702,-8-15 1,1 1 32,-2-6 0,2-1 31,8 15 0,-1 0-63,-13-12 0,0-2-249,10 1 0,0 0-264,-5-2 0,-2 1-737,6 10 0,-1-2-329,6 20 806,-6-18 0,0-2 834,-3 0 1,0 3 0,-10-21 0</inkml:trace>
+  <inkml:trace contextRef="#ctx0" brushRef="#br0" timeOffset="11567">12352 3163 23819,'0'-31'-6386,"29"-9"7559,-2 12-336,13 7 0,6 3 1025,15 2-1576,-15 8 0,0 2-440,-10 4 1,0 1-245,2 0 0,-1 2-243,1 9 1,0 1 777,0-10 1,0 3 0,-1 16 0,0 3 0,1-8 0,-1-1 0</inkml:trace>
+  <inkml:trace contextRef="#ctx0" brushRef="#br0" timeOffset="11758">13647 3277 23459,'-36'-17'-3250,"16"-6"19,-9 20 4640,17-5-2191,-2 28 1246,5 12-1129,27 12-2028,-13 6-523,36-8 2983,-22 3 1,22 1 0,-10 0 0</inkml:trace>
+  <inkml:trace contextRef="#ctx0" brushRef="#br0" timeOffset="11918">13410 4319 24539,'-5'-19'-3277,"2"15"0,3-15 0</inkml:trace>
+  <inkml:trace contextRef="#ctx0" brushRef="#br0" timeOffset="13578">15258 2808 23459,'0'-22'-6295,"0"4"4256,0 6 1155,-14 5 1340,10 28-605,-11-1 1064,15 27-1191,0-14 0,0 2-1320,0 25 1641,0-3 0,0 0-45,0-20 0,0-1-450,0 10 0,0 1-522,0-3 0,0-1 268,0 18-365,0-14 1,0-2 1068,0-3 0,0 7 0,0-23 0</inkml:trace>
+  <inkml:trace contextRef="#ctx0" brushRef="#br0" timeOffset="13710">14993 3589 21930,'-28'-21'-1496,"0"1"1,-4-8 0,5-1-877,2-10 1285,12 6 1,3-2-324,5-5 855,33-12 1557,-2 19 2,31 3-394,-3 3 130,-6 12 0,3 3 1,-12 3 1,4 2-374,5 1 0,6 2 1,-4 1-60,-3 1 1,-1 1 0,16 1-1,-1 0 1,-18 0 0,0 0-1</inkml:trace>
+  <inkml:trace contextRef="#ctx0" brushRef="#br0" timeOffset="14069">16182 3223 22560,'-46'0'270,"-1"0"-270,22 19 369,-19-14 170,39 34-2418,-33-23 2870,34 19-2243,-12 5 414,16-8-669,0 23 1,25-23-428,11 18-129,13-24 2245,-3-7 0,0-2-1580,6-5 1847,-3-4 0,0-2 166,-4-6 296,-12-9 1,-2-6 1304,1-16-1463,-13 0 0,-3-2 354,-3-20-983,-8 4 0,-2 1-553,-2-2-275,-12 4 0,-1 3-1276,7 10-172,-34-6 19,25 28 1101,-6 20 2375,11 22-1099,9 12-996,19 7-546,-6-19 0,4-1 1385,26 17 1,-19-17 0,2 0-1,17 9 1</inkml:trace>
+  <inkml:trace contextRef="#ctx0" brushRef="#br0" timeOffset="14337">17407 3212 23639,'-23'-19'-5305,"18"4"1077,-37 4 5730,10 6-321,-8 3-66,-20 18 256,26 11-926,6-3 1,3 3-510,7 20 339,6-15 0,4 0 1021,8 7-2052,24-2 0,8-3-574,1-1 802,17-8 1,2-6-581,-3-10 899,-9-5 0,0-2 176,1-2 922,14-20 603,-36-5-76,7-12-1889,-24-8-1307,5 16 1415,-7-6 0,-27 15 0,-6 2 0</inkml:trace>
+  <inkml:trace contextRef="#ctx0" brushRef="#br0" timeOffset="14504">16492 4200 22920,'0'11'-7915,"0"-4"8859,26-3 1,-20-17 0,20-4 0</inkml:trace>
+  <inkml:trace contextRef="#ctx0" brushRef="#br0" timeOffset="15023">19455 2306 25078,'-36'-1'-78,"-9"21"1815,17 1-2079,9 13 1,4 6-1303,5 20 784,6-15 1,1 2 166,3-8 1,0 0 175,0 1 0,0 0-326,0 0 0,0 1 110,0-2 1,0 0-366,-1-1 1,2-1 251,8-2 0,1 0 376,-9 10 1,3-2 15,14-12 1,0 0 241,-15 13 0,-2-3 258,15-2-843,-7 2 197,-7-24-409,7-6 890,-31-25 728,2-11-595,-6-15-154,10 8 0,4-1-579,9-16 944,-5 15 1,2 1-193,6-20 225,23 3 719,-18 3-860,24 18 1,5 3 1913,-8-8-946,10 17 1,4 4 1805,-1 5-642,13 31-1001,-19 0-830,1 25-1458,-6-5 408,-10-9 1,-2 2-1686,5 18 1132,-8-9 0,-3-1-1377,-3 4 1456,-4-13 0,-2-2 349,-1 0-1010,-46 10 2485,12-29-105,-28 2 0,37-16 0,14 0 0</inkml:trace>
+  <inkml:trace contextRef="#ctx0" brushRef="#br0" timeOffset="15379">20322 3037 22650,'-20'28'-1018,"-5"0"1172,0-7 411,-21 0 624,27-2-1257,-22-2 803,15 4-657,11-3-295,-8 23 77,19-16-1056,-9 15 227,41-19-1001,-21-2 1403,29-7 1,5-2-537,-9 3 734,12-5-1,3-2 425,-1-2 185,-11-1 0,-2-3 1132,3-15 298,4 11-232,-20-41-951,-6 25-508,-7-43-883,-3 28-235,-29-26-1274,-2 17 781,1 19 1,0 2-1301,0-7 2645,-15 15 1,36 12-1,-14 3 1</inkml:trace>
+  <inkml:trace contextRef="#ctx0" brushRef="#br0" timeOffset="15604">20958 3038 22920,'6'24'-8068,"1"12"5640,5-10 586,0 12 914,6 2 198,-5-7 111,-1-1 65,-1 1-2650,6 12 1960,-6-10 1175,5 7 0,-7-15 1,-1-1-1</inkml:trace>
+  <inkml:trace contextRef="#ctx0" brushRef="#br0" timeOffset="15749">21267 3056 23099,'0'-24'-6475,"0"1"4256,0 9 1065,0 2 994,0 6 1,0 16-1,0 6 1</inkml:trace>
+  <inkml:trace contextRef="#ctx0" brushRef="#br0" timeOffset="16008">20237 2430 22650,'20'-20'182,"17"3"1629,-32 6-3601,37 4 2415,-26 4-125,19 2-560,-12 1-19,-2 0 169,-1 22-1735,-3-17 422,-4 40-650,2-10-1627,-7 12 2948,1 16 1,-7-24 0,0 9 0</inkml:trace>
+  <inkml:trace contextRef="#ctx0" brushRef="#br0" timeOffset="16210">21175 1891 23459,'26'-21'1115,"6"4"-21,-10 8-177,14 4-869,-19 26-2876,3 15 187,-14 12-77,-3 14-659,-25-8 3226,17 11 1,-21-29 0,-6 0 0,9 2 0,1 1 0</inkml:trace>
+  <inkml:trace contextRef="#ctx0" brushRef="#br0" timeOffset="17138">10797 5737 24269,'0'-24'-5127,"0"3"3089,0 3 1064,0 4 335,0 4 483,-17 4 934,13 23-750,-12 0-63,16 24-55,0 1 90,0 11 90,0 12-145,1-8 1,-2 2-39,-7-12 0,-1 3-1054,7 6 1,2 6 0,-2-5 286,-7-2 0,1-2 681,6-8 1,3 2 0,0-4-1,-1 2 1,0-3 0,0 0-1,0-1 1</inkml:trace>
+  <inkml:trace contextRef="#ctx0" brushRef="#br0" timeOffset="17388">11218 6187 23459,'-22'-13'-4161,"-2"4"3800,-27 4 1000,12 27 969,-6-3-324,10 24-1320,6-13 1,0 0 76,-13 21-150,8-4 1,2 2 660,2 10-657,13-10 1,4 0-1317,5 5-749,13-13 1,8-2 1840,29 0 1,-15-17-1,2-2 1,6-9-1,-1-1 1</inkml:trace>
+  <inkml:trace contextRef="#ctx0" brushRef="#br0" timeOffset="17739">11560 6640 22830,'-22'30'-767,"20"-6"-2708,27-12 2916,9-6 1171,6-6 116,-8 0-144,17-18 555,-12 13-891,18-30 476,-29 11 869,2-7-893,-15-5-1261,-7 10-627,-2-4-29,-4-12-990,0 10 272,-19-16-761,-2 26 1030,-19-4 739,4 18 1434,1 26 1259,7 15-683,12 14-350,8 3-416,8 9 408,0-14-1229,6-6 0,6-2-1570,19 5-317,10 8 1947,9-21 1,-9-6-1,4-1 1</inkml:trace>
+  <inkml:trace contextRef="#ctx0" brushRef="#br0" timeOffset="18195">12272 6483 23369,'0'14'-6385,"0"1"4256,17 8 688,-12 11 556,51-20 2072,-30 20-1189,12-22 1,2-5 850,3 8-1496,16-8 2109,-20-7 134,0 0 99,-5 0 249,-4-22-1039,-5 17 824,-5-38-2002,-6 15 674,-6-13-962,-5-14-544,-3 20-312,-21-8-651,15 18-269,-15 2 350,2 6 1171,15 4-744,-15 4 2013,6 5 390,10 21-446,-11 15 1117,14 13-1112,0 10-520,19-4-701,-15 7 940,15-28 0,2 1-830,-12 1 0,0 0-121,10 0 0,0 0 344,-3-1 1,-1 2-129,9 10 1,0-1 330,-7-10 1,1-1 64,10 17 0,0-3 588,2 1-323,2 7 248,-15-27 131,-5-4-520,-5-7 66,-4-2-38,-3-5-667,-24-3 2029,-14-3-1544,3-2 0,-2 0 636,-24 0 0,-1-21 0,21-4 0</inkml:trace>
+  <inkml:trace contextRef="#ctx0" brushRef="#br0" timeOffset="18523">14117 6531 24539,'47'0'-1,"1"0"2,-3 0-1,7 0-180,3 0-180,5 0-180,0 19-785,4-14 615,-33 11 1,2 3 633,12-8 0,0-2 0,-12 1 0,-1 0 0,10-2 0,-1 1 0</inkml:trace>
+  <inkml:trace contextRef="#ctx0" brushRef="#br0" timeOffset="18739">14182 6816 23009,'52'0'0,"-6"-12"347,-4 10 0,2 1-608,18-11-178,-5 11 0,0 2-192,-21-1 0,-2 0 610,12 0 0,-1 0 1,18 0-1,-1 0 1</inkml:trace>
+  <inkml:trace contextRef="#ctx0" brushRef="#br0" timeOffset="19039">14817 6258 23369,'-5'-11'-8943,"4"3"7160,16 4 5723,11 21-4142,26 7 368,-9 13-703,4-2 446,-23-11 1,-1 1-1347,12 14 1757,-13-13 1,-1 1-147,5 13-2652,-3-2 1587,-5 0-382,-8 0 505,-4-1 312,-6 0 296,-20 17 174,16-14-858,-27-3 1,-4-2 1232,4 6 1,-4-12 0,-1-3 0,-7 11-1</inkml:trace>
+  <inkml:trace contextRef="#ctx0" brushRef="#br0" timeOffset="19590">15750 6353 24718,'-14'-15'-6685,"-2"-1"4951,8 8 889,0 26 1495,27 19-1957,9 15 877,-9-25 1,2 0 420,10 6 1,0-2-1354,12 16 1631,-5-8 0,2-3-201,10 2 274,-8-11 1,0-3-492,8-1 1568,14-5 62,-22-13 16,-3-5 45,0 0-49,12-18 546,-13-16-1903,-9 3 1,-3-4-148,-11 5 1,-3-2-353,4-4 0,-1 0-758,0-23-806,-5 0-694,-5-2 2243,-1 3 0,-4 3 0,0 2 0</inkml:trace>
+  <inkml:trace contextRef="#ctx0" brushRef="#br0" timeOffset="20024">17375 6451 23819,'-20'-24'-6325,"15"-14"3852,-37 33 4512,7-34-3059,-11 17 1140,12 5 0,1 0 60,-8-2-28,6 13 1,0 3-302,-4 3 1369,8 24 1,3 6 591,4 1-2100,9 17 0,4 2 826,8-5-1019,14-7 0,1-1-845,-6 3 587,24-12 0,5-3-420,-9-1 348,18-10 0,4-3 529,-8-4 616,-5-13 1,-1-3 1352,-9 4 650,4-53-438,-15 33-945,-9-11 0,-2-2-1007,2 0-200,-5-11-930,0 11-472,0 13-795,-15-2-1481,11 39 2853,-10 13 645,31 18-667,-6-10 0,1 0-271,10 9 1334,-1-14 1,0 0 0,1 7 0,22-1 0</inkml:trace>
+  <inkml:trace contextRef="#ctx0" brushRef="#br0" timeOffset="21011">17762 6803 24179,'13'0'809,"0"0"-719,10-19 158,-6-9-683,0-1 0,1-1-298,4-23 483,-1 11 0,-1 0-209,5-16 166,-10 17 1,2-7 0,-3 5-205,-3 6 1,-1 0 114,1-9 1,0-5 0,-2 6-245,-4 10 0,-2 1 204,0-22 0,-1 0-451,-1-7 779,-12 11 0,-1 1-1260,6-4 855,-5 22 1,-2 0-1023,-6-13 340,15 19 609,-27 0 632,28 36 525,-10 6 881,13 22-904,0 3-195,0 10 461,0 9-189,0 7-548,9-13 1,1 2-265,-9-14 1,2 1-149,5 4 1,4 4 0,-1-5-719,0-6 0,1-1 468,8 23 1,2-3 130,-2-26 0,1-2 37,1 6 0,-1-2-328,14 4 845,-1-6 253,1-8-112,11-3 931,-14-11 521,15-3 218,-27-25 96,3 13 415,-13-36-1315,-3 20-88,-4-21-99,-1-5-1462,-2 11-579,0-17-207,0 27-350,0-3-221,0 37 1244,0 6 107,22 28-137,-17-9 434,26-6 1,4-2 632,-12 0-275,11-4 1,0-3 559,-8-9 206,10 4 31,-20-12 544,1 4 172,-9-5 374,-1-19-1393,-2-23-173,-2-1-558,-3 9 0,1 1-740,-1 0-243,0-5-902,0 13 164,0 33-299,19 9 1102,-15 23-240,35 0 760,-33-9-381,37 1 824,-25-2-659,21-3 1058,-11 0-410,0-7 383,11 4 552,-12-14 198,16 4 543,-23-14 192,4 3 610,-13-18-1086,-1 11 1438,-4-24-2356,-1 10-331,-1-9-616,0 10-68,3-2-206,1 11 1169,6-2 237,16-7-861,-4 9 2057,31-15-49,-19 10-736,-5 2 0,1 0 665,5-2-910,-5-1 1,-1-1-176,-4-2-478,12-21-579,-33 15-1004,-1-18-516,-25 13-671,-11-17 40,-13 20 884,-6-4 95,-10 14 741,12 8 876,9 12 0,2 2 1429,-2-3-437,14 23 1,5 7 393,5-3-925,6 15 1,6 4-930,20 7-217,-10-18 1,4 0-1000,20 2 1,5-4 440,-12-8 1,4-2 1097,6 3 0,5 1 0,-2-4 0,-2-5 0,0-1 0,14 5 0,0 0 1</inkml:trace>
+  <inkml:trace contextRef="#ctx0" brushRef="#br0" timeOffset="21137">20478 6760 26967,'6'-9'-775,"-1"6"0,-4-6 1</inkml:trace>
+  <inkml:trace contextRef="#ctx0" brushRef="#br0" timeOffset="23731">7532 6205 23729,'0'-10'-4766,"0"1"3087,0 2 794,0 1 337,0 0 212,0 2 1291,0 1-1183,22 2 310,13-1 686,3 9 0,4 1-38,-6-7 1,2 2-392,5 9 0,3 6 1,-2-3 237,2-5 1,0 0-281,12 10 1,6 4 0,-5-2 169,-1-2 0,-1-2-153,-5 1 1,2 0-1,-2 0-648,4 1 0,-1 0-32,0 1 1,0 1-111,-3-2 0,2 1-31,-7-2 0,1 1 0,-3-1-156,5 2 1,0 1-427,-3-1 1,3 2 0,-5-3 1044,-8-2 0,-4-2 0,7 5 0,-3-1 0,8 6 1</inkml:trace>
+  <inkml:trace contextRef="#ctx0" brushRef="#br0" timeOffset="24416">2502 5855 23189,'0'46'-6385,"0"-6"4256,0 3 1065,17-3-686,-13 6 367,13 4-830,-17 5 2141,14-1 1,-10 4-1,10 0 1</inkml:trace>
+  <inkml:trace contextRef="#ctx0" brushRef="#br0" timeOffset="24608">2632 5470 23549,'0'-13'-8094,"0"3"4616,15 4 3593,-11 26 1,36-15-1,-9 17 1</inkml:trace>
+  <inkml:trace contextRef="#ctx0" brushRef="#br0" timeOffset="25026">3343 5882 23189,'0'10'-6385,"-18"1"9615,13 2-4239,-25 3 2703,27 4-3013,-22 17 1444,10-4-361,-1 12-707,-4 6 1680,18-13-2562,-5 24 1405,7-29-1704,22 6 1468,-17-18-993,35-6 1719,-36-4-1529,31-7 2049,-12-17 1377,13-18-526,-14-12-1040,-8 4 0,-3-3 553,-4-19-525,0 19 0,-2 0-852,0-23 1476,-5-1-1931,0 1 297,0 23 0,0 1-1092,0-17 1333,2 18 0,-4 4-239,-12 5-53,11 1 240,-11 37 2337,14 19-1945,17 33-659,-12-2 389,10-11 0,2 0-1366,2 13 260,-6-18 0,2 5 0,1-4 1368,0-8 0,-1-1 0,5 18 0,0-2 0,3 0 0</inkml:trace>
+  <inkml:trace contextRef="#ctx0" brushRef="#br0" timeOffset="25378">3998 5928 23369,'0'-10'-5936,"-17"2"5679,13 3-1545,-13 0 2754,4 4 85,-1-1-417,-11 23 145,4 4-941,7 14 893,2 12-997,8-18 625,2 11-1247,2-15-626,0-3 106,22-3-162,1-5 501,3-3 976,11-7 886,-13-3 105,0-23 855,11 14 114,-32-35-1659,26 20 1785,-18-32-1818,4 18 67,-3-18-978,-11 23-402,4-9-539,-5 19 1227,0-1 1,0 13 0,0 1-1</inkml:trace>
+  <inkml:trace contextRef="#ctx0" brushRef="#br0" timeOffset="26046">2890 6013 23369,'-16'12'1109,"4"4"-2301,12 12-1957,0 1 1259,-6-3 1126,4 15-51,-4-8 424,6 19-1205,0-25-165,0 10 484,0-21 1277,0-1 0,12-42 361,3-2 492,0-23-666,8 10 790,-14 11-389,14-7 574,-9 14-155,5-3 180,-10 19-336,5 2 649,-6 6-538,2 17-2363,-4-12 930,1 38-1737,-1-22 1862,5 45 0,-2-22 0,3 17 1</inkml:trace>
+  <inkml:trace contextRef="#ctx0" brushRef="#br0" timeOffset="26876">3867 6125 22110,'37'0'270,"1"0"0,4-17 1201,-8 13-1377,1-25-194,-12 26 376,-1-23-567,-2 23 706,-2-23-823,-3 15 850,-4-11-1783,-2 5 456,-3 0-119,-4 1-440,1-2 365,-3-4-842,-19 5 880,15-3-1275,-15 10 2047,-2 2-6,16 3-247,-30 2 1632,18 2 196,-15 19 754,8-13-252,0 46-493,15-29-1227,1 31-555,8-5 276,0-9-1159,21 24-737,5-28 942,-2-8 0,4-2-853,14 0 897,-3-6 0,2-4 1204,6-4 1,-10-4-1,0-3 1,4-4 0</inkml:trace>
+  <inkml:trace contextRef="#ctx0" brushRef="#br0" timeOffset="27109">4610 5819 24269,'19'29'-7220,"0"-3"4852,21 1 2566,-12-8-153,2 2-64,-8-6-142,0 1-1008,2 1-1018,-3 0 1539,4 1 789,-5-2 0,2 1 0,-1 0 0</inkml:trace>
+  <inkml:trace contextRef="#ctx0" brushRef="#br0" timeOffset="27295">4895 5774 23099,'-16'-1'-580,"0"16"707,2-10 1150,1 35-3014,1-19 1209,0 26-1500,-2-6-386,-1 7 2138,0 3 1,2 4 0,1 1 0</inkml:trace>
+  <inkml:trace contextRef="#ctx0" brushRef="#br0" timeOffset="27609">5552 5358 23459,'-23'-9'-2775,"-17"4"3039,8 19 1679,-12-10-1453,8 37 1,3 9-1143,-3-5 478,15-4 0,0 10 0,4-5-187,6-12 0,3 0-426,-2 26 0,2 1 43,5-26 1,2-1-1113,9 24 1,5-2 1397,1-24 0,2-3 0,5 11 0,1-3 1,23 11-1</inkml:trace>
+  <inkml:trace contextRef="#ctx0" brushRef="#br0" timeOffset="27926">5772 5848 23729,'-26'-14'-3635,"5"3"2238,2 3 1227,14 3-1356,-25 2 2425,16 1-298,0 16-92,3 5-971,11 11-249,20 12-430,-15-12-134,29 11 1202,-16 2-2033,1-12 372,7 17-173,-15-25 324,3 7 998,-6-19 892,-8-1-791,-17-7 626,-4-2 282,-19-16 0,18 12 0,3-12 0</inkml:trace>
+  <inkml:trace contextRef="#ctx0" brushRef="#br0" timeOffset="28233">5952 5872 24539,'0'-4'-6026,"-16"2"7277,12 15-2166,-11 7 1601,35-2-1788,-14 11-230,39-26 2215,-23 22-2586,39-18 3145,-20 5-1431,-8-8 0,0-3 868,6-1-529,16-15 1571,-27-4 423,1 1-1824,-16-14 312,-5 17-1259,-4-15-1100,-3-3-796,-1 8-1612,-24-15 3435,-3 20 0,-3-4 1,9 11-1</inkml:trace>
+  <inkml:trace contextRef="#ctx0" brushRef="#br0" timeOffset="28461">6017 5488 23009,'15'-17'553,"14"1"1129,-15 3-1986,14 0 1321,-4 2-529,17 0-100,-15 6-332,20 0-25,-27 19-3207,15 5 703,-18 16 1940,4-16 0,-10 14 0,-2-13 0</inkml:trace>
+  <inkml:trace contextRef="#ctx0" brushRef="#br0" timeOffset="28629">6610 5169 23549,'0'-12'-6385,"0"3"3357,0 23 794,0 11 2074,0 13 0,0 5 1,0-8-1</inkml:trace>
+  <inkml:trace contextRef="#ctx0" brushRef="#br0" timeOffset="28897">6817 5162 23009,'0'-18'-5935,"14"2"7971,-10 4-2719,31 3 2803,-17 2-624,32 4-956,-16 1-234,12 16-806,3 10 1291,-13 8-1452,-8-5 0,-1 2 252,0 9-898,-8-1 1,-2 3-1574,-4 10 1782,-6-16 0,-1 0-1190,-5 20 328,-1 0-1,-23 6 2086,4-14 0,-4 1 1,-4-9-1,-2-1 1,-5 14-1,1 0 1</inkml:trace>
+  <inkml:trace contextRef="#ctx0" brushRef="#br0" timeOffset="29611">9498 7293 25168,'0'-5'-5576,"-17"0"6497,12 0-3175,-34 1 3526,20-2-905,-20 5 418,-20-1-174,7 2-637,15 6 1,-3 2 1016,-11 2 1,-1 2-481,12 3 1,-3 3 342,-8-1 1,-7 2 0,5-1-526,2 1 0,0 1-888,-6 5 1,-7 3-1,6-2 293,4-2 0,3 1 330,6-2 1,-1 2 0,3-2 0,-2 4 0,3 0 0,-1 1 0,0 0 0</inkml:trace>
+  <inkml:trace contextRef="#ctx0" brushRef="#br0" timeOffset="30760">1982 9016 23909,'-50'30'1716,"10"-15"-240,4 20-2245,8-18 969,1 19-1132,4-8 436,3 2 13,10-2-470,-2 0-273,11-1-1191,-4-3 873,5 0-1189,22-4-561,13 2 3241,14-11 1,10 0 0,-9-11 0</inkml:trace>
+  <inkml:trace contextRef="#ctx0" brushRef="#br0" timeOffset="31198">2405 8538 23099,'-13'-22'-7780,"10"4"5552,-9 8 2517,12 4-521,0 22-133,0 15 258,0 13 78,0-5 1,0 2-1479,0 17 1783,0-4 0,0 2-147,-1-21 1,2-1-285,5 10 1,0 0 65,-4-2 1,-1-1 0,12 18-78,-8-14 1,0-2 20,6 0-238,8 16-226,-5-33 38,1 2 7,-5-20 778,7-3 766,-4-29 346,14-5 258,-7-15-153,15-8 247,-13 21 58,4-8-46,-9 14-900,-5 11-365,7 2 641,-10 12-818,12 15-764,-9-11 463,6 34-1756,-3-16 423,1 22-491,4-7-44,10 17-729,-4-12 1282,-2-9 0,0-1 393,9 1 2,-5-11 1,1-4 1644,8-4 212,9-2 824,-14-12-1004,-2 0 1,-3-21-1,-1-6 1</inkml:trace>
+  <inkml:trace contextRef="#ctx0" brushRef="#br0" timeOffset="31527">3278 9219 23099,'0'-27'-6025,"0"3"3896,0 2 1065,0 7 425,0 4 394,-14 6 984,11 16-531,-11 10-628,31 20-163,-12-7 239,13 2-155,1-10 205,2 5-126,12-9-12,5 5 252,-14-19-44,8 0 2010,-2-8 64,-8-19 446,8-4-311,-17 0-32,1-31-1487,-10 32-165,-1-29-509,-3 25-635,0 1-664,0 3-200,0-3-163,-13 13 1056,9-6-234,-9 37 1395,13 1-1361,0 17 294,19 0-2238,1 6 2900,13-10 1,-4 8 0,-5-15 0</inkml:trace>
+  <inkml:trace contextRef="#ctx0" brushRef="#br0" timeOffset="31832">3980 9029 23729,'-24'-11'-3443,"-15"2"3484,22 4-290,-21 2 792,13 24 137,2 6-472,12 26-1102,5-11-260,18-8 1,3-2-395,-8-1 711,25-3 0,5-4 297,-11-12 240,16-1 0,3-4-136,-9-5 581,16 3 953,-39-23 342,5 13 1256,-15-30-2025,7 11-388,-10-20-1241,-21 7-868,-2-4-557,-2 18 313,-8-2 149,29 11 1488,-24 7 0,25-2 1,-10 3-1</inkml:trace>
+  <inkml:trace contextRef="#ctx0" brushRef="#br0" timeOffset="32048">4455 9032 25078,'-27'13'1139,"6"10"-3440,35 7-3707,-10 5 5261,26-6 0,-26 1 0,10 1 1</inkml:trace>
+  <inkml:trace contextRef="#ctx0" brushRef="#br0" timeOffset="32234">4738 8903 25348,'0'-22'-5936,"-16"3"3573,12 6 22,-12 2-124,16 4 2370,0 20 0,0 7 0,0 19 1</inkml:trace>
+  <inkml:trace contextRef="#ctx0" brushRef="#br0" timeOffset="32478">3713 8580 24629,'20'-21'864,"-16"2"-3192,33-5 3761,-11 8-450,18-7-58,-5 12-786,7-1-704,-18 9-359,7 1-178,-11 2 776,1 0 54,-1 17 0,0-13 0,-3 13 0</inkml:trace>
+  <inkml:trace contextRef="#ctx0" brushRef="#br0" timeOffset="32712">4487 8322 23549,'0'-12'-3057,"18"6"6873,2 19-5242,22 3 1086,-8 4-339,2 6 30,-6-23 876,15 23-1674,-9-17 1526,12 5-2686,-15-7 1943,1-7-51,-1 0 1136,-1-19 0,-1 14 0,0-13 0</inkml:trace>
+  <inkml:trace contextRef="#ctx0" brushRef="#br0" timeOffset="32932">5507 9183 27057,'0'12'-6835,"0"-2"6302,0-3 1,0-3 0,0-2 0</inkml:trace>
+  <inkml:trace contextRef="#ctx0" brushRef="#br0" timeOffset="49147">2705 11803 23459,'-3'-48'-6296,"1"7"4125,2-9 1522,20 7 1729,-15-6-755,16 23 1,3 1 963,-3-30-1127,7 16 1,3 0-358,-12 9 1,-1-1 774,11-19 1,0 2 579,4-7-599,-14 21 1,-1 0-382,10-23 42,-17 17-1299,11-14 697,-20 33-656,5 0 656,-7 38-674,-14 41 486,-1 4 281,6 0 1,1 1 68,2-24 1,1 0-302,4 8 0,2 4 0,-1-4-221,0-2 1,0-1 338,0 14 1,0 1-699,0-2 1,0-2 1098,0-13 0,0-1 0,0 12 0,0-1 0,0-18 0,0 0 0</inkml:trace>
+  <inkml:trace contextRef="#ctx0" brushRef="#br0" timeOffset="49279">2558 12099 22290,'-2'-27'-7272,"-1"0"4896,23-4 3001,22-19-212,-16 28 0,3 0-200,8-7 0,1-1 0,-4 7 0,0 1 0,3-1 0,0 1 1</inkml:trace>
+  <inkml:trace contextRef="#ctx0" brushRef="#br0" timeOffset="49600">3758 11039 22560,'-27'-6'-1625,"-16"2"1629,14 2 165,-22 17 1019,9-12-688,16 19 0,3 4-758,-3-4 382,3 30-913,7-17 507,14 3-225,-4-1 0,4 1-857,26 10 28,-9-3 0,1-2-1668,14-6 2379,3-14 0,-1-2-377,-6-4 1145,9-9 1,1-4 344,-4-1 746,6-22 1027,-11-9 20,-14-11-851,6-21-867,-18 19-1008,3-16-224,-4 16-773,0 1-95,-19 2-1652,14 3 716,-14 3 717,3 6 1536,12-2 0,-24 11 1,14-1-1</inkml:trace>
+  <inkml:trace contextRef="#ctx0" brushRef="#br0" timeOffset="49964">4015 11034 22290,'0'7'-6476,"15"-10"9631,-11 41-5915,24-1 1125,-24 12 969,8-12 1,0 1-583,-9 10 1000,2-7 1,0 0-1494,-5 6 2235,0-11 1,0-1-1756,0-1 2528,0 9-913,-14-30 1611,11-43-1670,-11 2-469,12-15 0,4-3 577,-2-7-463,9-10 1,6-1 86,0 30 1,4 0-159,2-7 0,4-5 0,0 8 268,4 10 0,3 5-68,14-14 0,1 5 0,11 2 0,-19 14 0,-1 0 0</inkml:trace>
+  <inkml:trace contextRef="#ctx0" brushRef="#br0" timeOffset="51113">2332 13218 22290,'45'-2'1345,"-8"1"-1079,-2 1-264,-10 0 35,0 22-1939,1-17 1682,2 40-1437,-1-23 346,3 22-674,-4-4-6,1 3 950,-10-7 0,-1 1-1217,7 21 1799,-3-7 1,-2 1-1409,1 9 1316,-7-22 0,2 1-962,-1-5 1,1-3 1485,8 15 0,11 6 1,-7-25-1</inkml:trace>
+  <inkml:trace contextRef="#ctx0" brushRef="#br0" timeOffset="51335">3422 13178 23819,'0'-20'-6475,"0"5"4346,-26 7 3199,-4 48-71,-15-11-450,12 15 0,2 5-409,10-21 0,-1 0 69,-16 22 0,-1 1-378,16-20 1,2-1 783,-7 7 0,1 1 7,2-5 0,3-3-398,-9 13-692,7-12 1,2-2-809,2-4 588,-5 2 239,14-19 701,-1-2 0,2-5 0,1-1 0</inkml:trace>
+  <inkml:trace contextRef="#ctx0" brushRef="#br0" timeOffset="51513">2835 13461 22380,'0'-33'-5936,"16"4"6576,-12 4-1649,13 8 2495,-2 5-233,2 6 129,20 3-855,-9 24-1777,3-16 1556,-12 21 1,-1 3-1702,12-5 1268,-2 10 0,0 2-1732,8 4-104,-4-7 1,1 0 1564,9 5 0,-14-15 0,0-1 0,15 6 1</inkml:trace>
+  <inkml:trace contextRef="#ctx0" brushRef="#br0" timeOffset="51700">3962 13274 24539,'0'-12'-6656,"-20"5"6995,0 22 1691,-25 16-718,13 11-1365,6-6 1,1 1-29,-7 15 41,10-15 1,0 0-804,-5 18 870,0 2-1189,4-1 967,10-18 1,0 0-1,-4 15 1,7-20-1,0 0 1</inkml:trace>
+  <inkml:trace contextRef="#ctx0" brushRef="#br0" timeOffset="52463">4215 12672 23729,'-18'40'-3139,"4"2"1701,14-1-588,0 7 810,0 8 865,-4 3 0,-3 2 172,3-22 1,0 1 109,-1 9 1,1 4-1,0-6-642,0-12 0,2-2 339,2 19 1,0-2-279,0 5 650,0-17 0,0-2 0,0 1-171,0-1-217,16-17-642,-13-10-15,25-2 2073,-25-22-625,29-12 1293,-19-8-992,18-6 578,-10 8-206,-1 0 139,0 1 592,3 6-1516,-4-1 520,8 14-311,-11 1 653,13 12-839,-12 24-1612,7-18 1326,-7 44-1706,2-28 229,-1 24-465,11 3-701,-8-12 276,17 16 487,-15-27 1633,19 2-511,-16-18 2183,10-4-221,0-26 1575,-10 15-1602,-4-23 1,-2-5 426,0 7-656,-5-13 0,-2-2 142,-1 0-851,-5 2 0,-1 1-949,-2 3-374,-1-11-817,-3 32-29,0 26 843,0 13-8,0 13 571,0 24-690,16-23-437,-15-4 0,1 0 1430,26 5 0,-25 8 1,9-19-1</inkml:trace>
+  <inkml:trace contextRef="#ctx0" brushRef="#br0" timeOffset="52617">4832 12835 21570,'-3'13'-1910,"24"-11"1,7 13 0</inkml:trace>
+  <inkml:trace contextRef="#ctx0" brushRef="#br0" timeOffset="52967">5222 13655 22920,'8'0'358,"1"-23"-2611,3 17 2050,-2-27 0,0-6-901,8 6 1055,0-16 0,-1-4 12,4-7 0,-4 4 0,0 0-435,-7 22 0,-1 0 202,3-26 1,-1 0 172,-5 25 0,-2 0 85,0-11 1,-1-5 0,-1 6 38,0 9 0,-1 2-414,-1-27 1,0 3-219,0 13-205,-16-9-324,12 34 312,-24 4 1260,15 69-238,-11-17 133,11 19 0,4 5-170,1-26 0,1-2 11,0 14 1,1 0-90,4-11 1,2 0 230,-2 0 0,1 0-328,1 0 0,0 0-679,-1 0 0,2-1-273,9 0 0,0-1-1796,-6 29 2577,13-20 1,3-1 0,4 15 0,-3-21 0,0-1 0</inkml:trace>
+  <inkml:trace contextRef="#ctx0" brushRef="#br0" timeOffset="53313">5695 13513 23099,'18'13'-4637,"4"-3"3899,24-10 2239,-9 0-744,4 0-282,-10-16 503,1 11-580,-2-29-579,-2 20 1902,-2-18-1134,1-9-1043,-11 5 130,-7 1 1,-2 0-457,-4-11 112,0 5 0,-4 0-1221,-17-4-252,14-11-352,-14 27 855,-3 6 369,16 7-41,-28 8 2062,16 4 283,0 27 199,3-3 716,6 43-1454,6-17 10,-6 19-763,8-10-94,19 1-2486,-14 3 2547,15-29 1,2-1 0,0 27 0,0-28 0,0-1 0</inkml:trace>
+  <inkml:trace contextRef="#ctx0" brushRef="#br0" timeOffset="54581">2565 15649 23279,'0'-23'-5935,"0"0"3896,-21 2 1143,15 1-680,-38 3 2510,26 2-1148,-22 5 1012,8 4-1220,-7 4 1981,0 2 37,-4 17 643,1-12-843,14 20 0,1 4-803,-14-3 109,14 10 1,3 3-656,2 1-340,3 15-259,15-5-803,3-12-749,27 17-824,9-28 1904,16 4-80,2-19 1184,-10-5 143,3-4 594,1-3 718,1-16 575,-2 12-590,-16-24 1,0-5-422,14 2-607,-12-15 0,-4-4-641,1-8 21,-13 19 1,-2-1-594,-2-19-220,-3-3-753,-7 1-255,1-3 842,-3 1-230,0 3 778,-10 21 1,-1 1-834,6-12 810,-4 16 0,-3 3-418,-3 7 245,1 20 1787,-12 65-305,13 1-598,6-11 1,1 1 83,5-12 1,1-2 87,-2 2 1,-1 4-144,1 17 0,4 1-405,8-16 0,0 0-193,-10 12 1,5-1-1827,25-8 0,4-4 2113,-19-13 0,2 0 1,16 6-1,4-4 0,11 6 1</inkml:trace>
+  <inkml:trace contextRef="#ctx0" brushRef="#br0" timeOffset="54865">3272 15754 24089,'0'-33'-4947,"0"2"2999,-22 3 675,17 4-73,-17 5 1289,3 3 73,3 6 235,-19 4-468,20 25 1507,-5 8-44,19 12-879,-6 0 308,7-8-736,0 2-218,0 0-262,24-3-836,-18-1-306,41-5 1115,-14 4 811,11-15 561,9 4 82,-26-16 643,8 3-233,-24-24-124,-1-7-350,-10-13-1949,0-4-1268,-23-12-540,17 9 1369,-16 16 1,-2 1 1141,4-12 0,-21 4 0,10 2 0</inkml:trace>
+  <inkml:trace contextRef="#ctx0" brushRef="#br0" timeOffset="55413">3877 15130 22560,'0'44'-6386,"23"-8"3406,-17 13 1677,39-7 1125,-26 6-1094,20 2 1063,-8 3-259,1-1-1522,2 1 1643,0-3 465,2-1-108,-2-2-647,-10-15 1,1-1 297,10 14 357,-12-17 0,-1-1 0,6 3 0,-2-2 0</inkml:trace>
+  <inkml:trace contextRef="#ctx0" brushRef="#br0" timeOffset="55649">4980 15441 23729,'6'-4'1853,"-2"21"-8008,-20-13 8165,-6 47-2840,0-32 1061,-4 10 0,0 2-9,6-1-126,-11-6 1,-1 0 143,4 1-1339,0-4 1,-1-2 2681,1-4-1557,-23 3 0,29-16 0,-5-2 1</inkml:trace>
+  <inkml:trace contextRef="#ctx0" brushRef="#br0" timeOffset="55837">4588 15250 23369,'19'-29'-1425,"11"4"2719,-10 5-963,10 10 960,8 2-669,-12 28-2111,9-15 1312,-9 38-1807,3-22 1244,0 23-1382,0-8 487,-2 5-912,-1 1 1045,-7-11 1,-1 2-161,12 15-240,-7-9 1,0-2 1950,6 2 0,5 6 0,-7-19 0</inkml:trace>
+  <inkml:trace contextRef="#ctx0" brushRef="#br0" timeOffset="56014">5517 15379 24808,'4'-16'-4585,"0"5"3616,-2 1-246,-22 34 2102,14-9-1203,-34 30 1054,36-9-1531,-34 5 117,33 5-392,-12-11 0,-1-1 1039,4 17 0,4-18 0,1-1 0,0 7 0</inkml:trace>
+  <inkml:trace contextRef="#ctx0" brushRef="#br0" timeOffset="56467">5890 14589 23549,'4'-4'-326,"0"1"1247,2 3-1070,1 44-2989,-3-11 2194,0 3 0,-1 4-393,2 18 416,-1 8 67,-3-31 0,1 2 62,-2 16 1,1 2-199,-1-15 0,0 2 488,0 2 0,0 3 0,0-3 612,0-7 0,0-1 47,0 19 0,0-3-1,0 1-73,0-17 1,0-3 117,0-2-156,0 1-123,0-19-643,0-5 721,0-21 90,11-8 863,2-20-357,8 0 433,-2 6-71,-3 15 344,-4 9 452,0 11-158,-1 0 90,1 17-2945,3-13 1726,2 33-1957,13-9 621,-6 11 96,-2-14 0,2 0-1056,4 4 646,-2-7 0,1-3-488,5-5 1849,12 7-124,3-19 1,-9 4 0,11-6 0</inkml:trace>
+  <inkml:trace contextRef="#ctx0" brushRef="#br0" timeOffset="56615">6613 15421 24449,'0'-20'-6656,"0"5"4528,0 2 1153,-14 8 1798,11 19-953,-11 12 780,14 9-1307,0 4-1838,20 11 623,-1-12 1762,0-6 0,1 0 0,-3 0 0,-2 8 0</inkml:trace>
+  <inkml:trace contextRef="#ctx0" brushRef="#br0" timeOffset="56812">6547 14886 23189,'0'-13'-6475,"0"4"4436,20 5 4807,-14 24-5421,30-15 3062,-32 43-2045,31-24 644,-31 27 437,35-7 1,-25 3-1,18 2 1</inkml:trace>
+  <inkml:trace contextRef="#ctx0" brushRef="#br0" timeOffset="56997">6902 15596 22470,'5'12'-7825,"0"0"6385,-1-4 21,0-4 1661,-1-1-90,-1-3 1819,1 0-560,0-14-2796,2 11 4098,1-11-1430,0 1 249,1 10-515,2-21-1224,-3 15-2195,3-4 2214,-6 1 0,0 11 1,-3-5-1</inkml:trace>
+  <inkml:trace contextRef="#ctx0" brushRef="#br0" timeOffset="58031">7088 15536 23459,'16'-36'-2664,"-1"0"1803,1-3 568,-4-3 160,-5 8 1,-1-1-528,1-21 589,-3 2 1,-1-1-192,-2 21 1,0-1-432,0-27 1,-1-1 383,1 25 0,-2 1-137,-7-11 0,-1-1 72,9 3 1,-4 2-58,-11 13 0,-1-1-20,8-15 0,1 2-35,-10 3-390,6-4 290,0 28 74,8 6 253,-14 7 1487,15 22-488,-4 23 213,6 13-807,0 1 0,0 3 201,0-16 0,0 1-150,-1 19 0,2 1-62,6-13 0,0-2 53,-6 3 0,1-1-833,4-2 1,1 3 482,0 15 0,-2 0-33,-4-18 0,1 1 91,4-2 0,2 3 1,0-6-121,-1-6 0,1-3-331,5 16 0,1-2-526,9 1-96,2 6 60,-6-24 255,3-7 278,1-3 258,13-4 1340,-9-8 778,20-3 577,-24-6 1115,13-17-209,-20-1-921,1-12-1281,-11 14-332,-2-4-1120,16 17 1261,3-8 23,28 11-905,-12 0-672,5 0 830,-11-12 1143,-1 9-247,0-9 982,10-4-1691,-11-4-649,3-9 505,-15-1-779,-5 6 101,-4-5-1121,-4-19 424,-4 8 137,-12 6 0,-1 0-1683,5-6 1339,-12 11 0,-4 2-460,0 1 645,-1 2 252,-8 17 1484,18 26 455,-3 1 526,7 23-572,9-3-214,21 6-1227,-15 7 20,17-26 0,5 2-574,-3 12 1,0 0-293,8-9 1,2-2 1207,3 10 1,1-2 0,-7-12 0,1-4 0,1 1 0,0-1 0</inkml:trace>
+  <inkml:trace contextRef="#ctx0" brushRef="#br0" timeOffset="64367">9313 10614 21390,'0'49'-6295,"0"3"4166,-17 6 2439,13 6-392,-11-30 1,-1 1 342,6 19 1,2 2-333,0-13 0,-1 3 67,-1 0 1,0 8-1,-1 1 1,4-7-699,4 9 1,0-1 821,-6 2 0,-4 5 0,5-6-27,6-6 0,2-4-334,-3 1 0,-1 2 101,4-6 1,0 3 0,0-3-89,-1 6 0,2 1 51,6 0 0,3 5 0,-2-6-117,-6-8 1,2 0 93,8 0 1,5 4-1,0-6-326,-2-6 0,0-1 125,4 7 0,3 0 205,5-7 0,0-3 187,4 13-97,-6-13 0,0-2 259,0-3 486,10 5 177,-20-21 282,2 1 130,-12-27-100,-1-3-460,-24-22-1111,2 19 399,-5-15-551,-6 33 1568,25-24-1720,-24 27 1458,11-9-628,0 27 1184,-16 19 839,23 11-1755,-4 2 1,0 2 62,9-12 0,2 1-987,-1 17 0,1 2 776,3-9 0,0-1-914,0 5 0,0 1 453,-1 3 1,2 3-329,4-3 1,2 6 0,-1-4 89,-4-12 1,-1-3-1,0 5 336,3 7 0,2 6 1,-1 0-1,-2-6-71,-2 11 0,-2-1 195,1-14 1,0 4 0,0 0 0,0-6 48,0 10 0,0-3-11,0-9 1,0 2 0,0-3-10,0 0 0,0-2 77,0-1 0,0 0-24,1-3 1,-2 1 94,-5 12 0,-1-1-22,6-16 1,-2 1 29,-9 17 1,0-3 387,9-5-963,-15 13 113,16-39 412,-6-2 0,8-15 0,0-2 0</inkml:trace>
+  <inkml:trace contextRef="#ctx0" brushRef="#br0" timeOffset="65180">10467 12074 22920,'7'-4'3567,"-2"2"-3144,0-2-720,-4 1-1133,-1-1-866,0-1 566,-21 2 1749,16-3-1573,-39 4 688,25-2 104,-23 3 662,-3 0 499,11 1 1198,-8 22 530,19 5-1988,3 14 799,9 17-2068,4-16 561,16-3 1,7 0-1778,21 11 1436,-2-7 1,3-1 195,-8-17 1,1-1-248,1 6 0,0 0-328,10 9 528,-5-3 519,-4-2 415,-7 5 281,-4-12-429,-11 10-749,-24-19 976,-39 8 1111,-1-15-1639,6-5 0,-1-2 523,-3-2 0,17-7 1,2-4-1,-9-9 1</inkml:trace>
+  <inkml:trace contextRef="#ctx0" brushRef="#br0" timeOffset="65401">10400 11880 22560,'10'23'-7984,"-1"-18"8041,-5 46-1322,-1-24 986,-2 10 1,0 3-127,-1 16 344,0-4 1,0 1-11,0-19 1,0 0-729,0 24 1,0 0 1076,0-24 1,0 0-477,0 10 1,0-2 471,0 15-609,17-3-1404,-12-2 1636,9-18 1,4-2 0,7 15-1,-4-18 1,-1 0 0</inkml:trace>
+  <inkml:trace contextRef="#ctx0" brushRef="#br0" timeOffset="65615">10977 12607 24629,'0'31'-6296,"0"-4"4167,0 5 166,14 11-810,3-10 2497,13 24 1,-14-24 0,-3 8-1</inkml:trace>
+  <inkml:trace contextRef="#ctx0" brushRef="#br0" timeOffset="65785">11038 12098 24269,'-13'-21'-8084,"3"2"5174,3 7 2872,6 3 1,13 28 0,12 9 0</inkml:trace>
+  <inkml:trace contextRef="#ctx0" brushRef="#br0" timeOffset="66181">11605 12549 24179,'16'0'90,"-14"-13"-3666,41 9 4763,-10-21-2100,28 22 31,-10-9 961,0 12 0,-18 0 1,0 0-1</inkml:trace>
+  <inkml:trace contextRef="#ctx0" brushRef="#br0" timeOffset="66337">11690 12869 22920,'19'4'-994,"12"-2"-257,24-2 1478,4-15 1,-9 11 0,4-10 0</inkml:trace>
+  <inkml:trace contextRef="#ctx0" brushRef="#br0" timeOffset="66798">13038 12278 24449,'0'-14'-6476,"0"1"4258,-19 3 2318,14-2-2289,-30 7 3519,16-1-735,-9 6 456,-2 14-455,-2 9 1260,6 9-490,-9 19-906,22-17 1023,0 29-2397,13-26-78,20 11-1222,-15-16-377,43-3 1257,-26-1 720,6-10 1,3-2 175,3 8 215,7 8 503,-13-17 460,-15 2-302,-1-11 611,-12 0-1480,-25-3 2003,-10-2-663,-17 0-636,0-1-1053,-9 0 1016,17 0 1,-10 0 0,22 0 0</inkml:trace>
+  <inkml:trace contextRef="#ctx0" brushRef="#br0" timeOffset="67114">13355 12446 22200,'10'0'450,"-1"0"-270,-5 14-4459,-1-10 2390,-2 22 755,0-6 187,-1 6 381,0 15-940,0-14 269,0 19-269,0-19 2229,0 4-481,21-12 78,-16-2-651,37-2 1540,-11 0-297,9-8 763,13 0 316,-24-7-167,6 0-47,-15-16-138,-4 11 1027,-2-26-2826,-4 7 211,-5-6-939,-2-18-443,-20 19-1750,-8-25 45,2 23-7,-25-8-681,10 8 3712,-13 10 0,-3-1 0,15 9 0</inkml:trace>
+  <inkml:trace contextRef="#ctx0" brushRef="#br0" timeOffset="67298">13275 12183 22740,'19'-12'2135,"9"2"-645,-18 1-2021,11 1 1149,-8 1-425,0 2 125,-3 1-73,1 3-166,-2 0-891,7 1-880,-4 13 1309,6-9 0,-3 21 0,0-10 0</inkml:trace>
+  <inkml:trace contextRef="#ctx0" brushRef="#br0" timeOffset="67497">14113 11484 25708,'0'-13'-6566,"0"2"4258,-14 24 4464,11 3-2678,-11 24-1089,7-5 0,0 2 1557,-1-5 0,0 2 0,-1 15 0,1 1 0,1-9 0,1 0 0</inkml:trace>
+  <inkml:trace contextRef="#ctx0" brushRef="#br0" timeOffset="69069">14977 12172 24359,'-24'-4'-761,"4"0"764,1 0 44,11-3-1762,2 4 1130,57-5 1576,-13 6-714,19-1 0,6 0-287,-25 3 0,-1-1 197,16-1 0,1 1-304,-13 1 1,-2 0-255,1 0 0,0 0 415,-1-1 0,0 2-329,-2 8 0,-1 0 89,29-5 1,-35 14 0,-1 3 0,23 5 0</inkml:trace>
+  <inkml:trace contextRef="#ctx0" brushRef="#br0" timeOffset="69248">15135 12727 23639,'-26'4'1409,"3"-2"-1201,8 0 53,25-2-565,24-12 943,15 9-1374,-6-5 1,7-2-1,-4 1 125,-3 2 0,0 0 649,5 2 1,5 0 0,-5-2 0,-3-4 0,-4 0 0,4 3 0,-1 1 0</inkml:trace>
+  <inkml:trace contextRef="#ctx0" brushRef="#br0" timeOffset="69515">15658 11877 22560,'-43'-24'-4086,"5"2"3219,4 1 284,17 7 61,29 4 1837,29 29-1479,14-13 327,-25 16 0,0 5-795,4-6 1,-2 1 413,-9 6 1,0 1-126,7 4 1,-2 0-290,0 20-147,-11 2-1512,1 3 1766,-14-14 1,-6 0 79,-1-10 0,-3 1 509,-11 26 0,-6-2-114,1-23 1,-5-1 233,-1 5 0,-4 3 0,2-4 0,-1-4 0,1-2 0,-12 12 0,1-1 0</inkml:trace>
+  <inkml:trace contextRef="#ctx0" brushRef="#br0" timeOffset="73346">17492 11857 23099,'-28'-23'-4868,"4"1"3030,-28 0 2363,9 4-139,-4 3 224,-2 5 134,-4 4 88,-3 3-749,15 14 1,-1 4 920,10-6 0,0 3 22,-19 19 1,3 4-24,1 10-615,17-3 0,6 2-216,8 10-459,7-18 1,8 0-1010,32 12-731,0-3 866,-1-24 0,5-1 429,16 4 1,3-2 292,-12-6 1,3-3 356,9-2 1,5-1-1,-3-2 237,-4-3 0,-1-3 331,16 2 0,-2-5 339,-21-6 1,-3-2 259,-3 9 1,-2-4-31,-2-14 0,-2-2 158,20 2 178,-8-22-1500,-13 8-1347,-10-18-706,-10 11 1595,-7-11 0,-29 18 0,-6 2 0</inkml:trace>
+  <inkml:trace contextRef="#ctx0" brushRef="#br0" timeOffset="73535">17243 12657 22740,'20'4'-1438,"-3"0"981,42-4 1048,-13-18-39,-12 16 1,2-1-100,-6-15 1,1-2-235,3 12 0,1 0-458,3-9 1,0-2-157,3 5 1,1 0 552,1-2 1,0 1 0,2-1 0,0 0 0,0 0 0,0 0 0</inkml:trace>
+  <inkml:trace contextRef="#ctx0" brushRef="#br0" timeOffset="73997">19233 11992 23009,'-30'-10'-2280,"-21"1"2432,25 4 74,-9 3 0,-3 2 264,-15-1-280,18 8 1,1 1 482,-18-4-463,4 31 105,1-17 252,21 5 0,1 4-510,-7 6 317,5 26-1110,20-25-515,7 10-797,19-19 63,-14-3-300,45-4 1125,-1-9 938,16-3 269,-18-14 1,0-2 1079,12 6-270,-11-24 0,-1-6 969,4 3-1274,-22-5 1,-1-11 0,-3 4 140,-7 10 0,-2-2-796,1-12 0,0-7 1,-5 4-384,-6 9 0,-2 0-7,-1-8 0,0-5 0,-2 5-360,0 3 0,-2 0 413,-3-5 1,-3-4 0,1 6-300,5 6 0,-2 2-84,-16-10 0,0 1 69,17 13 0,-2 4-340,-34-9 804,34-4-30,-22 34 898,17 29 535,-7 10 144,1 32-319,2 3-528,6-26 1,0 2-151,0 5 0,0 3-181,1 0 0,1 3 0,0-2 30,0 9 0,2 2-731,0 2 0,0 5 0,1-7-403,1-7 1,2-2-120,-2-1 0,0 3 0,3-6 221,6-9 1,0-3 761,-6 7 0,0-3 1,14 1-1,-16-6 0</inkml:trace>
+  <inkml:trace contextRef="#ctx0" brushRef="#br0" timeOffset="74448">18823 11926 22650,'-8'-42'-8005,"1"0"5652,39-13 3808,-6 14-792,1 15 0,6 3 245,6 3 1,1 4-126,-7 3 1,1 2-643,29-3 0,2 3-223,-26 7 0,0 1 737,27-2 1,0 5 182,-29 8 0,0 1-730,27 0 1,-3 5-287,-33 7 0,-2 2-305,15 0 0,-5 1-1116,-18 16-865,0 7-28,-15-20 661,-2 16 487,-1-19 98,-17 5 1768,13-6-493,-13-4 1076,17 6-366,0-10-40,20 7-536,-14-10-771,37 3 1563,-24-7-1110,22-3 1125,-7 0-1090,19-3 1732,-15-2-47,26-14 483,-33-5 651,7 1-820,-18-34-1676,-7 28 162,-4-31-1142,-7 22-160,-2 2-538,0-7-643,-19 11-149,14 0-279,-14 14 2273,19 28-789,0 12 847,0 15-2079,17 22 437,10-23 1809,7 15 0,4-22 1,-11-1-1</inkml:trace>
+  <inkml:trace contextRef="#ctx0" brushRef="#br0" timeOffset="74698">20258 10862 23279,'0'-19'-6295,"23"3"9176,-18 6-3100,52 5 1173,-48 17-2890,43 14 1597,-37 8-1240,5 11-682,-9-5 1636,-11 8-1484,0-7 0,0 2 2020,1-8 1,-2 0 0,-8 14-1,-4 0 1,-1-12 0,0 0-1</inkml:trace>
+  <inkml:trace contextRef="#ctx0" brushRef="#br0" timeOffset="75199">21492 11645 23459,'-59'-4'-425,"-2"1"331,-3 3 278,32 7 0,-1 1 694,-28-4-556,22 22 1,1 4-329,-12-2 59,20 1 0,4 4-342,3 8-77,11 0-578,6 1-621,34 14-1100,-1-16 1581,11-10 1,6-4-133,18-2 800,-4-12 0,3-3 391,-23-5 0,-1-2 270,13 0 1,-2-4 439,-15-9 1,-3-1 1359,27 6-666,-31-17 0,-2-5-551,4 5 1,-2-1-455,-8-4 0,-3-5-453,4-15 0,-4-1-775,-5-16 216,-5 4 0,-5-1-373,-10 22 0,-1 0-182,10-15 1,-3 1 164,-18 14 1,1 2 133,19-1 0,-1 0 302,-19 2 1,-2 0 385,16-11 1,-2 2-491,-13 13 1,-1 1 319,8-11 1,3 2-176,-11 8 802,5 0-182,17 47 773,-6 1 679,8 31-1302,8-11 1,0 1 156,-4 27-304,11-1 1,-1 2 97,-12-24 0,0 1-649,9 13 1,4 6-1,-3-6 18,-9-13 1,0-1-316,7 8 0,3 3 1,-2-8-1419,-1 9 2162,-3-16 0,-1-3 0,2-6 0,-8 4 0</inkml:trace>
+  <inkml:trace contextRef="#ctx0" brushRef="#br0" timeOffset="75364">21208 11455 23009,'-9'-50'-7821,"2"2"5465,7 5 1640,0 3 340,25 8 1865,22 0 254,13 15-991,-23 9 0,1 2-453,25 3 1103,3 3-832,-31 12 1,0-1-182,1-9 0,-1 2-180,0 20 0,0 1-812,-1-14 0,0 0 411,0 12 1,-2 1 0,-1-6-1,-1-1 1,0 1 0,-1 1 0</inkml:trace>
+  <inkml:trace contextRef="#ctx0" brushRef="#br0" timeOffset="75714">22242 11592 23549,'-47'2'752,"-2"0"-774,5-2-93,1 17 1206,6 7-818,18 11-1196,8 1-275,11-6-308,21 26-992,-15-20 1365,21-4 1,6-2-326,-9-5-813,34 2 1117,-24-15 1060,0-4 677,-2-4 765,-2-3 791,-3-1 141,-4-15-495,-4 11 244,-3-33-1995,-4 17 1096,-1-37-1277,-5 16-185,-3 7 1,0 0-1033,-2-5-177,0-6-408,-1 21-130,0 6 1286,0 5-245,1 6 877,0 4 403,3 18-892,0 13-1064,9 27 316,-3-2 120,7 6-171,-3-15-298,1-2 1533,2-2 0,1-3 0,2-3 1</inkml:trace>
+  <inkml:trace contextRef="#ctx0" brushRef="#br0" timeOffset="76103">22787 11815 24089,'2'-26'-4976,"1"3"3304,-2 3 575,0 4 777,0 3-139,-1 28 97,0 16-68,14 19-462,-13 5 1,2 1 613,10-24 1,1 0 11,-11 33 0,-3 0 93,14-4-87,-10-14 0,-2 0 142,0 1-40,5 7-528,-7-27 513,0-6 83,0-8 241,0-4-409,-18-7 2363,1-17-1865,-19-16-276,19 1 0,4-5-540,-6-27 335,8 23 1,2-1-212,7-26 403,-1 29 0,-1-2 181,4 0 1,0-1-858,-1 0 0,2-1 840,9 2 1,1 0 208,-9 2 0,1 1 444,16-7 1,2 3 1048,2-12-1085,-4 20 1,3 6 783,18 10 892,-10 5-131,-11 30-2570,2-15 1088,-13 57-1514,6-37-39,-10 14 0,-3 2-834,-1 0-280,-7-7 1,-2 0 1392,6 1 0,-13 6 0,16-17 0</inkml:trace>
+  <inkml:trace contextRef="#ctx0" brushRef="#br0" timeOffset="76299">23033 10275 26158,'-52'27'2062,"10"-3"-2169,19 2 0,2 4-1151,-10 22 305,15-20 0,1 1-434,-1 3 1,1 4 1224,-4 21 1,2 2 0,7-14 0,2 1-1,-2 15 1,0 1 0</inkml:trace>
+  <inkml:trace contextRef="#ctx0" brushRef="#br0" timeOffset="76899">24157 11848 23459,'0'-33'-5036,"0"3"3087,0 4 975,0 3 425,0 1 304,0 8-59,0 20 165,0 21-1457,0 11 1596,0 9 0,0-7 90,17 3-897,6 20 137,-1-18 465,3-12 1,1-1 65,-7-3-198,29 2 805,-11-21 639,-9-5 103,8-5 1103,-15-25-199,1 4-1401,-10-11 1,-2-3-37,6-12-159,-7 3 1,-2-3-418,-2-11-187,-3 9 1,-1 1-798,-1-7-714,0-12 154,0 22 424,0 16 482,0 3 16,0 43 222,0 0 173,0 27-291,17 17-811,4-10-289,-1-4 1,1 1-493,12 9 1939,-9-13 1,-1 0 0,6 1 0,-10-17 0,1 0 0</inkml:trace>
+  <inkml:trace contextRef="#ctx0" brushRef="#br0" timeOffset="77231">25027 11692 23819,'0'-12'-6475,"0"1"4616,-17 7 2932,13 14-986,-12 12 669,32 21-2421,-13 8 952,25-9-1240,-25-3 1805,9-15-438,-3-4-872,-6-3 376,12-3 13,-11-7 1141,5-21 1170,-3-13-736,2-12-82,2-4 604,1 7 65,3-3-243,13-13-10,-9 16 498,17-11-1278,-17 31 1227,9 1 434,-11 15-566,1 26-3053,2 11-176,-7 15 1693,8 2 0,-7-12 0,2 0 0</inkml:trace>
+  <inkml:trace contextRef="#ctx0" brushRef="#br0" timeOffset="77633">25772 11676 23729,'-22'-13'-4017,"3"6"3415,-16 3 1276,11 25 312,12 7-1597,4 12-258,8-1-173,0-8-464,0-1 824,17 0-530,-12-2-542,33-3 668,-11 2 303,-1-10 889,16-3 829,-23-10 297,15-19 1108,-17-10-565,-7-8-548,-10-6-1354,0 8 715,0-13-994,-19 12-1162,15-14 227,-15 25-962,4 4 1036,11 31 1114,-10 6 1467,14 24-1314,0-10 0,0 2-90,0 23 362,0-3 0,0 0-174,0-22 1,0-1-522,0 10 0,0 1-514,0-6 0,0-2-818,0 15 1565,0 9 1,-19-28 0,-4-4 0</inkml:trace>
+  <inkml:trace contextRef="#ctx0" brushRef="#br0" timeOffset="77868">24612 10791 23099,'22'-21'14,"17"5"1898,-11 8-1340,17 21-1905,-8-10 862,-9 37-1738,-16-18 175,3 21-140,-13 15 325,6-13-1623,-8 17 3030,0 0 1,-18-17-1,-5 12 1</inkml:trace>
+  <inkml:trace contextRef="#ctx0" brushRef="#br0" timeOffset="78066">25787 9887 24449,'-14'31'-773,"1"0"0,-12 0 1,0 1 773,1 27-358,-1-24 1,-2 1-339,6 3 0,0 3 640,0 1 0,-2 5 0,2-2 1,-2 7-1,-1 2 0,4-7 1,0 1-1,0-1 0</inkml:trace>
+</inkml:ink>
+</file>
+
+<file path=ppt/ink/ink13.xml><?xml version="1.0" encoding="utf-8"?>
+<inkml:ink xmlns:inkml="http://www.w3.org/2003/InkML">
+  <inkml:definitions>
+    <inkml:context xml:id="ctx0">
+      <inkml:inkSource xml:id="inkSrc0">
+        <inkml:traceFormat>
+          <inkml:channel name="X" type="integer" min="-2.14748E9" max="2.14748E9" units="cm"/>
+          <inkml:channel name="Y" type="integer" min="-2.14748E9" max="2.14748E9" units="cm"/>
+          <inkml:channel name="F" type="integer" max="32767" units="dev"/>
+        </inkml:traceFormat>
+        <inkml:channelProperties>
+          <inkml:channelProperty channel="X" name="resolution" value="1000" units="1/cm"/>
+          <inkml:channelProperty channel="Y" name="resolution" value="1000" units="1/cm"/>
+          <inkml:channelProperty channel="F" name="resolution" value="0" units="1/dev"/>
+        </inkml:channelProperties>
+      </inkml:inkSource>
+      <inkml:timestamp xml:id="ts0" timeString="2021-07-19T06:43:19.845"/>
+    </inkml:context>
+    <inkml:brush xml:id="br0">
+      <inkml:brushProperty name="width" value="0.12095" units="cm"/>
+      <inkml:brushProperty name="height" value="0.12095" units="cm"/>
+    </inkml:brush>
+  </inkml:definitions>
+  <inkml:trace contextRef="#ctx0" brushRef="#br0">1845 794 24179,'-50'-10'-1304,"0"1"1198,9 4 146,-2 1 125,-2 4 96,3-1-69,-15 16 480,4 7 37,4 19-186,15-5-620,26-2 1,5 1-997,-2 5 279,21 1 0,8 0-1294,6 2 1309,13-5 1,5-2-98,-20-13 0,1-2-83,9 7 0,2 0 328,-1 0 0,-1-2 380,-10-7 1,-1 0 396,12 11 1,-3 0 373,-6 0 40,-4 8-723,-20-16-728,-6 0 563,-18-2 1352,-19 9-102,-9-8 277,-14 5-143,12-10-91,-2-5 131,0-3-516,1-5 0,3-2 0,2-1 0</inkml:trace>
+  <inkml:trace contextRef="#ctx0" brushRef="#br0" timeOffset="234">1530 572 23549,'7'-21'-3495,"-5"3"1491,11 5 3727,-12 5-2648,7 4 2801,-5 2-528,9 22-2916,-3 8 406,1 2 1,2 3-45,3 25 886,-5-23 0,1 2-656,0 12 1,1 0 583,-3-10 0,-1 2-423,2 6 1,0 5 0,-1-3-675,0-2 0,-1-2 870,3 15 1,-1 0 91,-2-18 0,-1-2-102,1 0 1,0-2 638,0 0 0,0-1 0,0-2 0,1-1 0,0 0 0,0-1 0</inkml:trace>
+  <inkml:trace contextRef="#ctx0" brushRef="#br0" timeOffset="667">2912 1141 24089,'-54'-16'-1775,"4"1"1440,11 5 0,-3 3 486,-5 5 211,-2 0 63,-2 2-214,2 23 104,17-8 0,0 2 760,-12 28-805,14-12 1,3 0-47,9 9-515,6-4 1,8 1-981,33 5-705,-2 10 731,13-31 1,5-5-473,16 6 1007,-18-12 1,1-3 305,19-4 526,1-5 423,-22-10 1,0-2 1377,17 6-636,-18-22 0,-4-4 537,-6 7-292,-5-33-841,-20 8-1194,-6 14-491,-21-23-1369,16 30-209,-35-12 287,35 25 76,-25 1 1248,27 35 326,7 28-136,17 2-1093,-1-8 1,1-3 235,14 4 1679,2 10 0,-8-20 1,-1-2-1</inkml:trace>
+  <inkml:trace contextRef="#ctx0" brushRef="#br0" timeOffset="972">3357 1161 23279,'0'15'-4586,"17"-15"6713,-12 47-4240,30-24 1632,-31 26-429,24-10 1,2 1 186,-9 10 272,10-2 0,0-1-1464,-9-7 2066,10 17-1750,-18-32 1754,5 5-987,-12-21 1326,-1-22 593,-3-24-430,-3-13-339,0-14-194,-8 20 0,-1 0-147,7 8 1,0-2-780,-3-12 1,-2-6 0,3 6 265,3 10 1,2 1 555,-1-29 0,0 4 0,0 16 0,0-7 1</inkml:trace>
+  <inkml:trace contextRef="#ctx0" brushRef="#br0" timeOffset="1318">4128 1143 24359,'0'35'-5936,"0"-5"3807,0 2 1065,0-4 426,0 3 212,17 1-503,-13 0 623,12 0-1845,-3-3 1517,-9-1 675,9-4 490,-5 1-784,-6-10 86,14 0 746,-11-11-138,5-2 1362,-5-25-739,1 4-218,2-24-47,5-22 296,1 9-754,-4 2 1,2-1-230,-4 21 0,2 1-219,4-21 0,2 1-1308,6 1 1089,-9 19 1,2 2-1904,21-4 2688,-6 17 1,11 3 0,-10 15-1</inkml:trace>
+  <inkml:trace contextRef="#ctx0" brushRef="#br0" timeOffset="1584">5192 1308 26428,'-19'0'0,"1"-4"-1343,10 2-2602,25-1 2610,18 2 1232,13 17 1,2-12 0,-10 12-1</inkml:trace>
+  <inkml:trace contextRef="#ctx0" brushRef="#br0" timeOffset="1750">5235 2026 25798,'47'-17'-2671,"1"-14"2830,-4 27 1,6-34-1,6 13 1</inkml:trace>
+  <inkml:trace contextRef="#ctx0" brushRef="#br0" timeOffset="2638">7922 715 24718,'0'-18'-6025,"-22"1"4965,17 2-1608,-38 0 3661,24 1-1040,-20 1 687,6 2-258,-2 4-774,-4 1 1718,-21 4-210,12 0 1081,-15 2-1551,22 0 620,2 20-117,-9 4 52,15 13-971,-5-1 4,18 15-891,9-7 19,6 0 0,1 0-800,4 14 615,8-4 0,2 1-1650,-5 11 1271,3-22 1,2 2 337,-1 0 1,-3 0-20,-4-12 0,0 2 453,6 25 1,-1 0 162,-6-27 1,-2 1 328,-11 25 1,-3 0 260,6-26 0,-5 0 102,-12 10 1,-7 4 0,2-5 361,5-9 0,-1-2-189,-6 5 0,-4 4 0,4-7 1020,-14 9-615,14-14 1,4-1 754,8-2-685,2 2-384,19-14-1621,18-4 187,7-3 5,13-4 0,5-1 76,-8-1 0,2 0 658,11 0 1,7-1-1,-4 0 1,2 0 0,0 0-1,-4 0 1,-1 0 0,0 0-1</inkml:trace>
+  <inkml:trace contextRef="#ctx0" brushRef="#br0" timeOffset="15968">9193 2918 23729,'0'-10'-4946,"0"1"3087,0 2 975,0-2 155,-15 2 1353,1 1-89,-5 26 388,0 12-1374,11 13 458,0-9 1,0 0-752,-2 13-8,7-7 0,0 0 140,0 5-773,3 11 1168,0-25 1,0-5 0,0-2 0</inkml:trace>
+  <inkml:trace contextRef="#ctx0" brushRef="#br0" timeOffset="16094">9157 3311 22290,'5'-26'-4554,"-4"-12"1993,7 20 2717,-7-11-1142,2 14 728,-1 7-4,0 8 522,1 0-800,2 20 1,1-15 0,3 14-1</inkml:trace>
+  <inkml:trace contextRef="#ctx0" brushRef="#br0" timeOffset="16519">9970 3354 22380,'-48'0'360,"-4"0"-360,13 0 0,0 0 0,13 20 261,1-15 153,4 35-1119,9-23 264,-6 19-137,15-8-839,-7 1 501,10 0-680,0-2-196,0 0-200,26 4 1013,5-11 288,31 2 619,-15-16 1226,1-3-365,-14-3 897,-2-17 408,-2 12-216,6-46-675,-12 28-721,-8-8 0,-3-3-332,-2-1-622,-1-18-739,-8 25-310,-1-1-433,-1 13 166,0 29 499,0 8 41,0 35 511,14-10-257,-10 6-1555,24 2 2325,-25-12 0,24 11 0,-11-18 0</inkml:trace>
+  <inkml:trace contextRef="#ctx0" brushRef="#br0" timeOffset="16804">10540 3332 22200,'0'38'-4767,"0"5"2639,0-5 1064,0 1 425,14-12-514,-10 0 658,10 9-262,-14-11-929,0 6 1776,0-14-90,9-2-352,-7-3 333,10-2 1095,-11-5-1158,4-1 1155,-2-17-690,1 10 1182,0-25-1372,-1 24 727,0-28-1464,0 18 609,5-26 1,-1 17-1,4-7 1</inkml:trace>
+  <inkml:trace contextRef="#ctx0" brushRef="#br0" timeOffset="17484">9800 3319 22380,'0'-6'-6296,"0"2"4168,11 1 5259,-8 38-4746,8-9 827,-6 12 1,-3 5 85,0 7 438,2-2 0,0 0-1475,-4 13 1739,0-2 0,0 0 0,0-4-982,0-8 1,0-4 1314,0-15 779,0 6-1000,0-23 2,0-20 28,0-18-232,0-14 198,8 6 0,1-1 384,-4-16-311,11 15 1,0 0 718,-12-17-766,30-1 858,-18 3-410,19 4 647,-7 5-310,2 7-43,18-2 401,-11 17 73,25 1 721,-25 17-1385,8 20-303,-17-13-233,-2 39-1704,-4-22 370,-1 24-1142,-5-10-414,-1 0-136,-4 18 709,-5-14 886,-1 24-77,-4-29 1675,1 7-426,-1-17 616,4-3-272,-2-2-655,10-1-229,-4-5-964,17-1 1960,-8-8 1,9-2 0,-6-2 0</inkml:trace>
+  <inkml:trace contextRef="#ctx0" brushRef="#br0" timeOffset="17887">10875 3458 22290,'-42'0'270,"20"15"672,-16 2 108,15 1-1190,-15 25-374,9-26 806,6 37-1284,15-27-50,3 8-267,5-10-517,0-4-402,18-1 457,5 2 491,0-6-375,28 0 1864,-30-10 295,28-3 773,-22-3 320,1-17 400,-3 13-53,-2-32-883,-3 17 110,-2-16-1291,-1-13 14,-7 13-104,-1-28-1010,-7 29-681,-1-7-73,-1 18 850,0 6-669,0 3 997,-14 8 951,10 20-318,-10 12 859,14 11-703,16 3-759,-13 9 521,34-11-136,-26-5 1,1-1-1287,24 3 1529,-14-7 0,0-1 1,8 0-1,9 5 0</inkml:trace>
+  <inkml:trace contextRef="#ctx0" brushRef="#br0" timeOffset="18451">11458 3435 22830,'0'-9'-5486,"0"18"3447,0 8 1065,17 25-742,-13-6 1187,25 2 186,-25-9 56,23-1-1258,-23 0 1305,21-3 319,-22-1-302,17-2 995,-17-4-706,14-2 339,-12-1-811,5-7 641,-4-2-124,-3-20 365,1 10 1234,-1-30-1602,4 4 624,0-12-546,10-21 962,-6 23-1032,3 3 0,1 3 623,-1 4-129,16-9-1017,-16 32 2489,11 3-681,-11 26-1960,10 4 18,-11 14-679,6 11-236,-10-19 12,0 9-228,-2-7-787,-3-11 280,4 5 1974,-4-19-428,2-2 1112,-4-7 1785,1 0-210,0 0-44,0 0 82,4-22-1247,-2 17 1224,8-55-990,-4 34-724,1-11 0,0-1-1536,1-1 206,4-8-101,-5 21 176,-2 6 1062,0 4-764,-1 7 1627,1 4 426,0 5-449,4 15-1641,-1-12 997,9 43-1724,-5-26 105,3 29-1611,-2-17-571,-2 2 2833,4 0 1,1-1 0,2-2-1</inkml:trace>
+  <inkml:trace contextRef="#ctx0" brushRef="#br0" timeOffset="18774">12488 3644 22830,'60'-13'1602,"-9"10"-1727,6-9 620,-11-6 261,0 14-495,-15-10 1,-1-2-66,14-1 341,4-7 220,-24 0-1205,-11 5 46,-2 1-459,-10-3-1087,2 0 239,-20-1-544,-11-5-7,5 9 404,-40-2 1299,40 14 620,-30 3 242,26 17 1677,-3 12-536,16 9-628,-9 5 128,21-6-1079,-5 18-518,28-12-1319,-6-7 1,4-1 1726,28 3 1,-20-13 0,0-1-1,17 4 1</inkml:trace>
+  <inkml:trace contextRef="#ctx0" brushRef="#br0" timeOffset="19051">13100 2720 22290,'27'16'-3877,"8"-12"4789,-31 25-3720,26-26 3710,-27 25-2504,27-24 2311,-26 26-1758,22-12-260,-15 9-967,9 4-360,-9-13 2554,-5 2 1,-6-11-1,0 0 1</inkml:trace>
+  <inkml:trace contextRef="#ctx0" brushRef="#br0" timeOffset="19200">13270 2734 21750,'17'-14'1464,"3"4"-241,1 26-4264,3-12 2761,-13 48-2071,0-28 351,6 34 518,-15-17-1732,12 5 2689,-13 3 0,10 2 1,-5 2-1</inkml:trace>
+  <inkml:trace contextRef="#ctx0" brushRef="#br0" timeOffset="19454">13933 3600 22470,'21'15'-4838,"-16"6"992,40-19 5219,-25 12-3076,23-13 1858,-9 13 0,-1-8 0,1 7 0</inkml:trace>
+  <inkml:trace contextRef="#ctx0" brushRef="#br0" timeOffset="19634">14092 4060 22110,'46'0'90,"-8"0"-90,9 0 0,-7 0 90,8-16-592,-10 15 1,1-2 563,-7-12 0,0 0 0,11 12 0,0 2 0,19-13 0</inkml:trace>
+  <inkml:trace contextRef="#ctx0" brushRef="#br0" timeOffset="19890">14433 3354 22740,'54'-1'1306,"-9"-1"-1176,-4 9 0,0 0-565,15-4 299,3 19 1,0 5-845,0-5 656,-10 11 0,-6 4-698,-12 3-2,-16-1 0,-5 3-1361,-3 15 515,-24-4 1,-6 2 1836,9-18 0,-2-2 1,-18 13-1,-2 0 1,11-13-1,0 1 1</inkml:trace>
+  <inkml:trace contextRef="#ctx0" brushRef="#br0" timeOffset="20368">16087 2081 23459,'-35'19'1824,"4"-14"-1671,8 30-1598,1-31 2002,-6 42-1388,7-27-298,6 11 0,2 2 861,0 3 1,2 15-1,8-14 1</inkml:trace>
+  <inkml:trace contextRef="#ctx0" brushRef="#br0" timeOffset="20536">16147 2324 22290,'-13'40'-3914,"10"-4"1444,-10 11 1648,13-1 657,0-6 1,0 3 0,0-9 0,0 2 0,0 12 0,0 0 0</inkml:trace>
+  <inkml:trace contextRef="#ctx0" brushRef="#br0" timeOffset="21135">17075 3100 21840,'-33'38'-728,"5"2"-37,5 1-18,11 19-614,4-16 670,14-2 0,10-3-1074,22-2 1544,-2-8 1,4-5-166,-8-15 0,2-5 491,15 2 0,-1-2 249,8-3 284,-11-8 0,-2-5 1283,-1-14-704,-12-5 1,-5-4 1107,-8-13-1641,-7 8 1,-3 0-613,-7 0-588,-11 7 1,-1 1-1672,6 0-15,-17-6-294,5 22 877,13 4-198,-25 7 2541,27 23-707,-9 13-422,12 32-210,22-8-1174,-16 5 1810,37-15 1,-23-2-1,19-1 1</inkml:trace>
+  <inkml:trace contextRef="#ctx0" brushRef="#br0" timeOffset="21540">18502 3136 24539,'-24'-17'-4132,"-16"2"3948,34 3-3082,-52 3 4556,34 5-554,-33 1 88,25 3-210,1 22-257,2-16 383,10 21 0,2 5-664,-4-8 790,8 11 0,5 2-1722,3 2 182,13-6 1,2 0-1494,-5 3 151,38 7 21,-22-19-126,24-5 1876,-10-6 21,2-6 830,-1-4 919,-2-3 728,10-15 244,-14 11-697,10-45-332,-28 26-936,4-29-581,-15 19-494,2-1-314,-3 1-560,-16-9-1562,12 14 760,-12-7 273,2 24 1292,10 19 890,-10 18 241,32 27-2406,-14-8 217,10-12 0,4-1 1834,6 8 1,8 8-1,5-18 1</inkml:trace>
+  <inkml:trace contextRef="#ctx0" brushRef="#br0" timeOffset="21952">19283 3107 24718,'-56'-22'-2444,"12"8"1797,-11-4 362,25 12 449,-7 1 139,16 4 123,2 1-138,3 16-273,1 9 175,8 10-864,1 19 10,6-16-266,11-7 0,2 1-1274,-7 5 161,42 6 257,-13-11 303,12-13 1165,15-1 961,-25-13 602,21-5 676,-28-18 865,13-9-146,-25-9-1550,2-6 663,-14-7-1895,-2 11-430,-2-24-659,-2 30-545,0-9-194,-15 28 243,11-5 326,-11 37 1522,41 7-1668,-12 3 0,2 2 522,8-4 1,1-1 70,-2 3 1,-1-2 975,19 13 1,-1-2 0,3-2 0</inkml:trace>
+  <inkml:trace contextRef="#ctx0" brushRef="#br0" timeOffset="22237">19997 2030 24539,'0'-5'-5307,"22"17"4861,-1 8-726,21 23 220,-22-7-374,10 5 695,-17 5-170,3-10-3445,2 26 2797,-16-28 1259,5 18 0,-7-27 1,0 5-1</inkml:trace>
+  <inkml:trace contextRef="#ctx0" brushRef="#br0" timeOffset="22374">20283 2146 23909,'23'-23'246,"9"2"712,-20 11-847,9 20-1729,-10 8-3325,2 41 4622,-9-10 1,0-14-1,0 1 1,-1 24 0</inkml:trace>
+  <inkml:trace contextRef="#ctx0" brushRef="#br0" timeOffset="22634">20995 3437 25888,'2'-12'-4912,"1"3"3803,1 9 2524,-1 0-512,1 0-301,1 16-2759,0-12 1310,-1 47-1625,-2-26 1156,-15 12 1,-2 3 11,8 5 1252,-20-13 0,-5-1 1,3 13-1,1-21 0,-1-1 1</inkml:trace>
+  <inkml:trace contextRef="#ctx0" brushRef="#br0" timeOffset="23352">9107 5293 23909,'-12'0'-90,"3"0"90,-3 0 0,5 13-917,1-9 1705,3 9-2142,2 0 282,-2-10 808,1 22-1726,1-14-663,0 12-410,1-2 2821,0 2 0,0 1 1,0 1-1</inkml:trace>
+  <inkml:trace contextRef="#ctx0" brushRef="#br0" timeOffset="23535">9220 5239 22560,'-16'36'-3111,"4"-3"1842,4 5 118,5-3-348,-5 4-296,8 4 1602,0 5 1,0 0 0,0 2 0</inkml:trace>
+  <inkml:trace contextRef="#ctx0" brushRef="#br0" timeOffset="24017">10022 5576 24089,'-15'-7'-3356,"11"3"-99,-23 1 4647,14 3-184,-2 18-588,-2-14 731,15 34-2295,-13-20 927,10 18-291,-6 10 1138,7-9-1816,2 11-224,2-15 143,0-4-925,20-2 1895,5 4-1239,0-12 1650,29 2 219,-31-15 620,41-2 348,-32-24 785,8 15-249,-14-34-499,-3 21 614,-2-17-1215,1-8-587,-9 11-138,0-25-800,-11 27-864,0-17-212,-2 27 546,0-3-476,-17 14 1427,12 19 264,-12 12 646,17 10-967,0 24 169,0-18-887,0 17-2006,0 2 3035,20-13 0,-15 10 0,15-17 1</inkml:trace>
+  <inkml:trace contextRef="#ctx0" brushRef="#br0" timeOffset="24518">10978 5660 23999,'0'-11'-6566,"-17"2"6249,12 4-1297,-32 1 2950,18 3-301,-4 22-137,-5-16 187,16 49-2285,-12-33 2802,14 28-1905,2-21 813,8-1-2352,21-3 9,16 4 62,10-14 1247,-9-6 0,0-1 1404,10-7-842,-6-8 1,-1-1 1592,4 5-225,10-34 858,-26 21 115,-4-18-1131,-5 8-290,-3-13-1176,-8 9-402,-3-18-1211,-6 23-37,0-7-126,-17 22 486,13-3-199,-26 13 2011,27 14-629,-22 18 1077,22 9-669,-8-2 1,0 2 520,9 18-599,-1-11 1,0 6 0,0-4-193,2-7 1,2 1 328,4 10 0,2 7 1,-1-7-947,-4-14 1,1-2 198,13 24 0,1-1-1920,-13 0 1828,4-23 1,-1-3-1040,-7 3 640,0-7-238,0-6 1375,0-8 0,0-5 0,0-5 0</inkml:trace>
+  <inkml:trace contextRef="#ctx0" brushRef="#br0" timeOffset="24834">11480 5995 22200,'47'-14'2930,"-1"2"-1942,1 1-692,-3 3-54,3-1 18,-5 2 145,-1-2-123,-2 2 274,-3-2-473,12-6-10,-17 2 562,7-5-306,-19 2-451,-2 0-254,-5-2-18,-2-10-1068,-6 6-231,-2-17-480,-2 16-212,-43-18 195,32 22 1496,-24 4 1,-3 5 121,19 4 486,-24 4 966,15 22 609,9 12-466,3 12-353,10 7-604,6-7-1063,21 4-1813,-15 3 444,25-13 0,5 0 2069,-4 17 0,4-19 1,2-3-1,12 10 0</inkml:trace>
+  <inkml:trace contextRef="#ctx0" brushRef="#br0" timeOffset="25104">12342 5084 22830,'39'0'629,"-1"14"-2408,-6 6 67,-6-2 503,-1 19-528,-15-20 334,8 21 224,-11-9-1865,10 19-111,-11-13 2899,-1 26 1,-5-28 0,0 8 0</inkml:trace>
+  <inkml:trace contextRef="#ctx0" brushRef="#br0" timeOffset="25285">12677 5114 22560,'22'0'899,"-5"0"-809,-2 20-3843,-3-15 3367,-1 37-1733,3-22 154,4 39-1156,-5-16 2595,5 17 0,-8-14 0,1 2 0</inkml:trace>
+  <inkml:trace contextRef="#ctx0" brushRef="#br0" timeOffset="25590">14245 5793 24808,'21'-7'2401,"-16"0"-4124,56-8 1667,-34 5-816,15 0 0,2 0 904,5 1 0,-16 2 0,0 1 0,12-2 0</inkml:trace>
+  <inkml:trace contextRef="#ctx0" brushRef="#br0" timeOffset="25768">14237 5990 23369,'43'1'-419,"1"0"0,19 1-315,-20-2 0,0 0 863,15 0 1,3-12 0,4-3 0</inkml:trace>
+  <inkml:trace contextRef="#ctx0" brushRef="#br0" timeOffset="25970">15767 5031 22380,'-14'-7'-2017,"11"0"0,-10 1 0</inkml:trace>
+  <inkml:trace contextRef="#ctx0" brushRef="#br0" timeOffset="26524">14578 5356 24808,'51'15'-1051,"-6"-11"1537,-2 26-2373,-4-26 2345,4 31-1693,4-16 1046,4 18-366,4-4-503,0 0 734,-3 4-224,-18-9 0,0 2 322,13 16-499,-14-4 1,-4 2 141,-4 8-234,-13-16 0,-2 0 50,-5 15 39,-3 2 19,-2 0 461,-28-1 1023,21 0-351,-20-26 1,-5-1 162,7 10 1,1 0-177,-5-9 0,-2-1-951,-11 15 0,1-1 897,0 2 0,14-17 0,2-2 0,-3 4 0</inkml:trace>
+  <inkml:trace contextRef="#ctx0" brushRef="#br0" timeOffset="27001">15938 4970 26248,'0'-19'-6476,"0"1"4348,0-7 1063,26 7 3492,-19-3-2672,45 11 1816,-31 4-364,23 3-1083,-4 2 1533,-11 23-1401,9 12-125,-26 15-1311,-4-10 0,-3 0 430,-5 15-119,-11-16 1,-2-1-764,7 17 1083,-18-27 0,-3-1 285,5 25 475,-6-17 1,-1-1 970,8 15-522,-2-5 0,3-1 454,16-2-1178,4-5 0,2 0-651,2-2 101,23-6 0,5 0-714,-5 4 872,9-4 0,-1 0-609,-12 3 629,0-2 0,-3 2-862,-17 0 1020,13 22-195,-35-27 2242,-16 18-1572,-9-18-895,7-4 0,-1 0 1185,-9 0 0,-15 4 0,22-13 0</inkml:trace>
+  <inkml:trace contextRef="#ctx0" brushRef="#br0" timeOffset="27336">17242 5057 25078,'-22'-5'-502,"-10"25"2261,-11-15-1063,12 27 1,1 5-1353,-7-6 631,12 3 0,4 4-774,4 9 110,-6 2-144,21 2 278,5-16 1,5 0-1903,16 14 1176,11-12 0,6-3 284,17-3 613,-16-13 1,1-4 430,-9-8 0,0-3 344,1-1 0,0-1-96,-1 0 1,2-2 664,11-7 1,-1-5 449,-13-3 0,0-4-336,14-13 0,-5-4-426,-21 5 1,-6-2-682,4-18 1,-5 0-298,-8 17 1,-5 0-470,-8-11 0,-7-1-366,-4-1 0,-4 2-104,-1 12 1,-5 1-1091,-15-17 0,-2 5 887,17 23 1,-3 5 1425,-20-4 0,-2 6 0,-7 8 0,21 7 0,-1 0 0</inkml:trace>
+  <inkml:trace contextRef="#ctx0" brushRef="#br0" timeOffset="27534">18317 5651 26158,'-27'-29'-9831,"-15"10"9193,36 1 1,-31 16 0,17-7-1</inkml:trace>
+  <inkml:trace contextRef="#ctx0" brushRef="#br0" timeOffset="28602">6987 6554 25078,'-20'-12'-4527,"16"1"-44,-16 2 5202,20 2-1582,23 19 1226,18 6 105,13 1-261,-9 7 0,1 1-1145,14-4 1138,-7 10 1,-2 3 389,-22-18 0,-2 0-669,16 12 1,-4 2 450,0 6-854,2 11-240,-22 0-659,-10-11 440,-3 24 133,-23-24 1325,-7 20-179,1-25 741,-14 20 141,17-24 46,-1 9 559,-5-12 212,24 2-1573,-8 0-788,10 19-336,0-11 25,10-3 0,3 1-1287,12 8 1227,-1-5 0,0 1-603,0 7 417,-4-15 1,-1 2 494,1 26-821,2-15 1033,-8-9 0,-3-1 10,-9-1 1110,7 16-636,-9-27 415,0 3 80,-24-10 1806,-3-5 238,-31 0-222,15-6-1126,-23-1-1048,25-2-208,-17-17 65,14 13 0,-1-29 0,-1 15 1</inkml:trace>
+  <inkml:trace contextRef="#ctx0" brushRef="#br0" timeOffset="33350">1938 10264 25168,'-8'2'3035,"-1"0"-2346,5-2-945,0 0 246,2-16-2372,1-7 660,28-12 1950,-21-5-548,20 20 1,2 0 193,-2-27-325,8 10 0,3-1 421,-12 8 0,-1-1-110,16-18 0,-1 0 871,-17 21 1,-1 1-39,8-12 0,-3 2-785,-4 0-145,0-11-819,-35 54 1958,-4 39-1625,-6 17 256,14-17 1,2 3-249,1 5 1,2-2 54,2-11 0,1 2 104,-3 4 0,-2 5 0,6-5-303,9-6 0,1 0-201,-10 22 1,5-1-601,15-28 1,0-2 714,-17 8 0,-1-2-77,19 7-306,-21-6 938,0-5-302,0 4 790,0-13 106,-44 7 2273,15-21-974,-3-4 1,-2-2 755,-9-3 317,0-1-620,2 0-270,-11-19-787,17-4-448,-3-25-2481,21 12-710,7-7 523,29-6 1148,4 7 224,13 4 0,6 1 891,-11 13 0,0 2 1,16-8-1,1 0 1,-9 10-1,-1-1 1</inkml:trace>
+  <inkml:trace contextRef="#ctx0" brushRef="#br0" timeOffset="33668">3168 9606 23729,'-16'-8'-3240,"-4"3"3211,-17 3 785,0 26 523,3 6-1075,13 16-694,1 16-209,18-19-724,-6 13 985,8-17-540,28-3-703,-20-2 594,25-14 1,5-2 153,-11 8 799,10-10 1,2-4 623,-3-4 854,16-3 234,-24-28 148,0-9-145,-16-14-949,-8-20-1220,-4 21 78,-8 6 1,-4 1-2004,-7-6 98,0 7 1,-2 2 2011,-10 6 1,12-9 0,7 28 0</inkml:trace>
+  <inkml:trace contextRef="#ctx0" brushRef="#br0" timeOffset="34001">3610 9693 23639,'0'45'-6295,"0"-7"4166,0 6 1065,16 11-484,-12-12 1139,9-7 1,2 0-447,-2 4 236,1 7-1526,6-21 2044,-18-4 249,15-5 945,-11-4-1156,5-7 1242,-4-1-10,-2-26-44,-1 2-172,0-23-660,1 2 194,2-11-451,-1 7 0,1-3 376,-1 10 0,0-2-502,1-3 0,1-5 0,0 5-353,-1 3 1,2 2-753,9-20 1,1 3-124,7-1 1550,-7 24 1,1 4-1,13 1 1,2 5 0</inkml:trace>
+  <inkml:trace contextRef="#ctx0" brushRef="#br0" timeOffset="34468">5412 8962 24359,'0'-27'-5576,"-17"3"2497,12 3 1423,-30 5 2556,6 3-362,-9 7 673,-22 1-225,21 27-527,-16-16 1336,17 44-32,-1-26 611,3 28-2084,3-8 230,5 5-731,5 3-180,14-12 1,3 1-1365,-2 23 698,14-9 0,2 0-796,-4 10-123,25-11 0,5 0 674,-19-23 1,1-3 64,19 11 1,1-3 1016,10 11 1,0-7-1,0-1 1</inkml:trace>
+  <inkml:trace contextRef="#ctx0" brushRef="#br0" timeOffset="34974">6093 9212 24359,'-26'-8'-2187,"-12"1"2099,33 3-2418,-37 1 3285,24 3-184,-22 0-95,4 0-126,19 14-263,-18 3 1124,31 21-2297,-10-8 1827,14 7-2239,22-6-346,-17 4-80,42 2 590,-27-1 357,8-9 1,3-1-939,3 13 1815,-12-7 1,0-2-924,9 3 1259,-16 12-614,0-23 448,-15 2-380,0-12 484,0-1-390,-20-3 1994,-7 3-400,1-6-1113,-12-1 0,0-1 0,13-3 0,-10 1 1,1-1-1</inkml:trace>
+  <inkml:trace contextRef="#ctx0" brushRef="#br0" timeOffset="35218">6068 8921 23639,'4'-12'-2823,"-3"1"1043,3 5 2382,-4 19-1852,0 26 357,0 4 254,0 18 456,-1-26 0,2 0-1564,14 25 1321,-13-5 1,0 2 196,6-22 0,0 1-1195,-2 25 0,-2 1 698,-3-25 0,1-2-68,2 12 0,2-2 746,1 14 0,-6-5 0,6-3 1</inkml:trace>
+  <inkml:trace contextRef="#ctx0" brushRef="#br0" timeOffset="35401">6637 9507 23729,'0'11'-7195,"0"7"3447,0 22 3249,15-4 1,-11 3 0,12-9-1</inkml:trace>
+  <inkml:trace contextRef="#ctx0" brushRef="#br0" timeOffset="35576">6708 9046 24539,'-10'-16'-7899,"7"4"7736,-16 5 0,17 3 0,-7 4 0</inkml:trace>
+  <inkml:trace contextRef="#ctx0" brushRef="#br0" timeOffset="35820">7288 9427 26338,'-14'-8'-4121,"3"1"2092,31-3 4122,10 5-1856,11 5-1250,5 0-275,-9 14 1101,1-10 1,0 30 0,-1-9 0</inkml:trace>
+  <inkml:trace contextRef="#ctx0" brushRef="#br0" timeOffset="35972">7387 9995 24988,'8'0'-180,"-12"-18"-6136,54 14 6760,-21-27-162,12 19 0,5 4 0,18-8 0,-20 7 1,-1 1-1</inkml:trace>
+  <inkml:trace contextRef="#ctx0" brushRef="#br0" timeOffset="36301">8420 9214 24808,'-26'-15'-4083,"6"2"2494,-9 5 2005,1 3 370,14 4-249,-4 22-208,1-16 844,16 40-2606,-6-8 1200,24 12-346,5-8 0,5-3-646,23 0 676,-14-9 1,2-4-337,13-13 600,6 3-626,-1-14 2375,2 6-533,-6-7 462,-18-7 1,-2-5 1406,12-16-1993,-14 2 1,-5-4 17,-6-19-1148,-3-5-294,-13-11-943,-29 16 331,10 6 1,-4 2-300,-4 17 0,-3 3-468,-10-10 1,-1 2-858,-11 6 2810,17 11 1,-1 3-1,-14 6 1,1 3 0</inkml:trace>
+  <inkml:trace contextRef="#ctx0" brushRef="#br0" timeOffset="36646">9573 9292 26158,'0'-8'-7915,"0"2"4887,0 1 2762,0 2 0,0 2 0,0 0 0</inkml:trace>
+  <inkml:trace contextRef="#ctx0" brushRef="#br0" timeOffset="36884">9825 9848 23549,'0'14'-6116,"0"-1"4078,0-5 1244,0 2 245,0-5 213,0 8 32,0-2 166,0 11-1458,0-6 1596,0 6 0,0 3 0,0-3 0,-16 15 818,-8-13-1009,-27 13 691,6-17 63,-10 4 0,12-12 0,-1-3 1</inkml:trace>
+  <inkml:trace contextRef="#ctx0" brushRef="#br0" timeOffset="37406">11025 8968 26338,'-9'-21'-8408,"1"2"5186,0 2 1943,2 3 362,1 3 272,0 3 551,2 4-232,-1 1-639,3 19 1763,-2 9 104,20 27-895,4-5 45,1-9 1,1-1 279,14 13-290,-9-7 1,-1-1 223,8 8-761,-13-20 0,1 2 297,-1-3 0,-2-1-232,9 12 677,-9-10 1,-2 0 19,-3-2-310,0 7-375,-12-19 448,-21-4 2128,-13-7-1139,-1-3 0,-3-3 795,-28-12-1098,27 12 1,-1-1 320,-22-25-1376,0 23-891,14-14 0,0-3 1435,12 12 1,0 0 0,-10-10 0,2-2-1,-12-4 1</inkml:trace>
+  <inkml:trace contextRef="#ctx0" brushRef="#br0" timeOffset="37867">11135 8763 24718,'0'-5'-6205,"-13"0"6959,10 1-2811,-9 26 2865,12-4-1625,0 27 79,0 21 342,0-8-402,0-16 0,0 3 798,0 5 0,0 1-473,0-11 0,0 3 563,0 4 0,0 4 1,0-3-656,0-4 1,0 0-126,0 6 1,0 5-1,0-5-210,0-4 1,0-2 928,1 15 0,-2-1 1,-6-17-1,-1-3 1,-1 0-1,-1 0 1</inkml:trace>
+  <inkml:trace contextRef="#ctx0" brushRef="#br0" timeOffset="38288">11778 9029 24629,'17'-11'2060,"-4"4"-1263,-5 2-243,-6 19-4050,11 9 920,-9 11 1000,5 4 137,-3-3-1296,6 24-1046,-2-13 3362,0-4 1,0 0 0,3 7-1,-5-17 1,1 1 0</inkml:trace>
+  <inkml:trace contextRef="#ctx0" brushRef="#br0" timeOffset="38451">11958 8837 24449,'-10'-36'-9442,"7"2"6731,-7 6-514,10 4 3707,0 6 0,21 6 1,5 4-1</inkml:trace>
+  <inkml:trace contextRef="#ctx0" brushRef="#br0" timeOffset="38852">14053 8628 25078,'-41'-11'-1733,"2"1"1146,4 4 444,5 1 201,6 1 3,3 2 77,5 1 21,4 16-333,3 11-409,-1 28-95,1-4-220,-5 11 532,2-26 1,0 0-298,-8 21 340,0-9 0,-2-2-274,-5 7 464,4-12 1,0-1 489,-1 1 64,6-6 0,2-2 132,4-2-357,0 22-465,32-30-2114,13 16 192,12-14 2152,-7-4 0,1-1 0,14 4 1,-15-8-1,-1 1 0</inkml:trace>
+  <inkml:trace contextRef="#ctx0" brushRef="#br0" timeOffset="40468">15025 9005 24269,'-30'-12'-3342,"-8"0"2944,13 6 268,-14 2 535,2 19 993,3-10-851,9 34-864,0-19 450,-3 39-431,14-21-597,5-3 1,3 0-756,6 4-795,30 12 1953,-1-21 1,31-6-1,-9-1 1</inkml:trace>
+  <inkml:trace contextRef="#ctx0" brushRef="#br0" timeOffset="40750">15540 9204 23909,'5'-28'-4203,"-2"2"2742,-3 0-1,0 4 855,-24-7-94,-4 12 858,-24-3 369,3 15-641,4 18 1882,11 11-184,16 11-530,10 0-521,8-6-535,0 1-395,27 0-516,-20-1 222,28-10 1,4-2-667,-11 6 784,14-8 0,3-4 809,-5-4 559,24-2 652,-35-5 60,5-21 558,-24-3-1766,-3-26-1668,-7 13-1679,-23-12-306,-1 21 3083,-3-7 1,-10 15 0,14 2 0</inkml:trace>
+  <inkml:trace contextRef="#ctx0" brushRef="#br0" timeOffset="41168">15932 9100 23999,'-22'16'825,"5"7"-1837,40 19-3175,-18-7 2037,40 1 1571,-28-12-575,21-1 1127,-8-4-1082,1-2-163,1-8 1178,15 0 1835,-13-8 108,11 3-683,-8-22 1300,-11-5-1278,6-22-265,-22 9-747,1-2-303,-10 11-487,-1 1-570,0 3-70,0 1-877,0 3 506,-18 4 627,13-2 49,-12 25 2586,17 4-1692,0 31-395,0-6-1709,17 20 422,-1-21 1599,18 20 0,-19-27 1,-1 6-1</inkml:trace>
+  <inkml:trace contextRef="#ctx0" brushRef="#br0" timeOffset="41518">16592 9191 23639,'0'-16'-5576,"0"25"3628,0 6 793,0 26 517,17-9-368,-13 0 412,13-8 215,-6 4-1953,-8-9 1962,17 2 10,-18-11-250,12-4 1358,-6-3 623,3-19-34,2 12 1065,0-31-908,4 17 288,12-33-680,-5 18 558,15-20-1073,-18 27 141,9-6-370,-17 21-790,2 2 1793,-7 9-1266,-1 0 580,1 16-2558,-3-12 974,4 31-918,-2-17-828,10 33-779,-3-16 2980,2-5 0,2-1 1,8 4-1,11 7 1</inkml:trace>
+  <inkml:trace contextRef="#ctx0" brushRef="#br0" timeOffset="41788">17570 8674 24808,'0'-21'-5845,"-13"1"3247,10 8 713,-9 23 4298,12 19-3042,0 12 325,8-6 1,4 0-727,9 14-70,-1-5 0,-1 1 305,0 9 679,-6-9 0,0-2-243,1 7-1988,-3-6 0,0-1 955,5-2 1361,-8 23 0,-5-43 1,-3 3-1</inkml:trace>
+  <inkml:trace contextRef="#ctx0" brushRef="#br0" timeOffset="41920">17292 9060 23639,'-3'-26'-7130,"1"1"4719,25 3 4727,0 0-1228,25 4-180,1 0-777,-7 9 0,1 2 1,-8 3-1,0 0 0,13 0 1,-1 1-1</inkml:trace>
+  <inkml:trace contextRef="#ctx0" brushRef="#br0" timeOffset="42218">18373 8387 25888,'-11'-13'-6769,"3"0"4345,-9 7 3703,3 3-315,1 19 54,-3 3-819,4 10 1,0 5-420,-8 19-185,6-13 1,0 2 735,3-7 0,1-1 146,1 3 1,0 1-756,2-1 0,1 1-551,2 16 0,1 0-211,-1-14 0,5 0-421,11 1 0,7 3 1,0-5 10,-4-4 0,4-3 1370,19 8 0,2-3 0,-12-14 0,-1-2 0,1-1 0,0 0 0</inkml:trace>
+  <inkml:trace contextRef="#ctx0" brushRef="#br0" timeOffset="42736">19588 8749 24718,'20'-21'-116,"4"1"549,-22-8-3396,7 7 2272,-31-10-1305,17 14 219,-56 0 2233,36 11-1010,-32 2 660,24 4-232,2 21 1809,3-16-435,4 55-214,12-34-345,3 12 1,8 2-1715,34 3 316,-11-6 0,5-1 7,6-13 1,2-3 141,1 6 1,1 0-171,2-3 1,0-1-633,16 7 1492,-14-8 0,-5-1 20,-12-3 336,13 3 438,-34-14-1626,-13-2 2406,-30-3-2040,4-9 1,-3 0 116,5 6 1,-2 0 267,-16-12 1,1-3-1,-11-7 1,22 4 0,0 0-1</inkml:trace>
+  <inkml:trace contextRef="#ctx0" brushRef="#br0" timeOffset="42954">19533 8260 23189,'0'16'-4766,"0"12"2637,0 18 1065,0 6 426,-15-1 996,11 3-374,-9-9 1,-1 0 19,12-9 1,1-1-729,-4 13 1,-1-1 1032,6 20-1118,0-1-451,0-3 1202,-1-20 0,2-1 0,22 20 0,-8-24 0,-1 1 0</inkml:trace>
+  <inkml:trace contextRef="#ctx0" brushRef="#br0" timeOffset="43333">19992 8810 24808,'0'-13'-6025,"0"2"3896,0 22 1065,15-10 2851,2 54-3398,2-28 826,7 33-208,-23-19-755,21 1 1279,-21 1 254,18 15-385,-10-13-1322,7 17 1955,-8-32 89,0 6 104,-8-23-329,3-1-94,-5-27 346,1-13 503,-1-29-280,0 4-225,0 11 0,0 0 458,0-13-483,-2 18 1,4 0-118,8-1 1,3 2 742,13-19-1194,-1 12 1,3 2 118,9-3 717,5-3 0,-12 21 0,2 5 1</inkml:trace>
+  <inkml:trace contextRef="#ctx0" brushRef="#br0" timeOffset="43956">20455 8784 23549,'-20'-13'-4229,"0"10"5110,-3-22-3035,0 21 3251,-1-18-2150,-12 20 1821,7-8-710,-20 10-58,22 0 1147,-7 16-157,13-11 963,4 36-2446,-1-1 1183,10 11-1265,1-4 0,5-2-225,25 4-358,-10-5 1,5-2-1140,27-8 1323,-13-9 0,1-2-517,10-3 1494,-5-8 1,0-2 375,5-4 610,13-2 422,-13-19 1547,-13 12-416,8-45-1550,-24 26-254,0-29-1001,-11 16-582,-2-3-149,-1 0 159,-20-19-2070,15 16 1807,-15 8 0,0 1-708,16 1 359,-29-10 706,30 25 347,-11 2 316,14 31 78,17 25-57,-13 6-352,12-10 0,0 0-1046,-12 5 134,26 10 1230,-13-4 0,8-16 1,-2 9-1</inkml:trace>
+  <inkml:trace contextRef="#ctx0" brushRef="#br0" timeOffset="44274">20793 8829 24898,'0'-14'-5845,"0"0"4256,0 5 524,0 37 427,17 19-668,-2 11 877,-1-22 1,1-3-293,-2-2-1286,6 16 2086,-11-26-61,6 4-496,-4-17 765,-5-2 168,-2-21 530,-2-11-383,3-28-319,0 5-117,4-8-1262,5-6 974,0 14-846,-2 8 0,1 1 1184,4-3 0,6-9 1,-5 21-1</inkml:trace>
+  <inkml:trace contextRef="#ctx0" brushRef="#br0" timeOffset="44604">21335 8604 25528,'-19'14'1198,"5"13"-3290,14 8-742,0 10 1079,0-8 586,0 3 243,0 0 389,0 0-1149,0-2-52,12 11 404,-10-16 1162,21 13-58,-21-27-31,16 2 160,-11-15 384,5-1 526,1-26 319,-4 16-398,3-26 1,-2-7-27,6 2-101,1-15 1,1-5-160,-7 23 1,2 1-483,9-26 1,2 0-184,-10 23 1,0 1-469,4-9 0,2 0 678,0 5 0,0 4 0,12-15 0,-11 20 0,0-1 0</inkml:trace>
+  <inkml:trace contextRef="#ctx0" brushRef="#br0" timeOffset="45037">22148 7743 23009,'0'-17'-6025,"14"3"8346,-10 4-2694,10 2 2888,2 4-1088,6 2-909,9 1-149,1 18-1157,-8-12 2127,2 40-3281,1-19 1572,-7 13 1,0 4-919,-6-13 1,-1 1-84,9 29 1,-3 2 209,-9-22 0,-3 2 507,0 4 0,-1 6 0,-1-5 260,-2-1 0,-2-2-235,3 14 0,-5 1 965,-12 0 1,-2-2-97,13-13 0,-3 0-166,-16 3 1,-10 3 0,5-5 111,9-5 1,-1-2 54,-12 2 0,-8 2 1,4-5-1,5-6 0,1-1 1,-10 7-1,0 1 0</inkml:trace>
+  <inkml:trace contextRef="#ctx0" brushRef="#br0" timeOffset="45656">23473 8382 24988,'0'-10'-6385,"-17"-2"5304,12 5 1776,-25-1 0,28 27 1,-10 4-1</inkml:trace>
+  <inkml:trace contextRef="#ctx0" brushRef="#br0" timeOffset="45884">23598 8815 23639,'0'19'-5036,"0"-2"3357,0-1 705,0-3 425,0 0 213,0 6-58,18-4 478,-13 18-1943,29-11 2242,-19 25-983,5-18 277,-10 12-162,-2-12-47,-6-1 389,6 0-546,-8 7 501,-29-9-1157,-12 12 1950,-15-20-29,-5-1 0,15-11 1,-4-5-1</inkml:trace>
+  <inkml:trace contextRef="#ctx0" brushRef="#br0" timeOffset="46268">24602 8168 25888,'2'-19'-4879,"-1"0"2889,-1 2 694,-22-10 329,16 7-220,-37-6 1556,11 7-127,-8 6-931,-16 2 1713,28 8 290,-8 26 654,17-17 260,8 46-1221,4-26-989,7 28-523,22-8-305,-6-10 0,3 1 17,4-9 1,3 2 78,11 19 0,1-1-385,-13-19 0,1-1-59,15 17 1,1 0 997,-19-20 1,-1 0-144,5 5 1,-2-1 300,2 5 633,-7-5-535,-9-6-586,-4 0 83,-7-9 432,-27-1 2083,-14-10-689,-15-2-227,-8-1-594,14 0-1104,14-8 1,0-3 782,-17-13-67,20 8 1,2-2-1,-8-17 1,5 8 0</inkml:trace>
+  <inkml:trace contextRef="#ctx0" brushRef="#br0" timeOffset="46540">24517 7769 24898,'0'-13'-5935,"0"2"3986,0 24 1065,0 15 425,0 37 123,0-3 113,7-9 1,3 1-21,-3-18 0,1 2-432,2 5 0,1 6 0,-2-5 537,-2-1 1,0-1-84,4 14 1,-1 0 110,-9-17 1,0-2 13,9 0 0,-1 0-92,-8-2 0,0 2 206,6 11 1,1 0-16,-5-13 1,1 0-508,1 19 0,0-1-493,2 3-416,-4-16 0,-1-2 1423,1 0 1,2 4 0,-2-19 0</inkml:trace>
+  <inkml:trace contextRef="#ctx0" brushRef="#br0" timeOffset="46758">25090 8558 25618,'1'-20'-5481,"0"1"3347,-1 7 958,0 3 560,0 3 145,0 21 225,0 11-96,0 12-2694,17 24 1342,-13-20 137,13-5 1,0-1 1410,-13 4 1,30 8-1,-14-20 1</inkml:trace>
+  <inkml:trace contextRef="#ctx0" brushRef="#br0" timeOffset="46930">25310 8117 25528,'-15'-36'-9553,"3"-4"6430,3 15 2767,7 0 0,-7 18 0,9 2 0</inkml:trace>
+  <inkml:trace contextRef="#ctx0" brushRef="#br0" timeOffset="47204">26147 8014 26068,'-20'-19'-6016,"3"10"5350,-5 21 3307,-3 29-2700,22 12-538,-2-18 0,-2-1-64,-2 25-79,7 5-395,-2-31 1,-1 1 114,5 13 0,0 0 129,0-12 1,0 0 473,0 20 1,0-2 0,0 1 0,0 11 0</inkml:trace>
+  <inkml:trace contextRef="#ctx0" brushRef="#br0" timeOffset="47350">25957 8572 24898,'-11'-39'-8639,"2"0"6050,9 3 1911,21-10 1069,-15 14-656,25 10 0,7 3 882,-6 1-354,4 9 0,3 2 0,8 2 0,1 1 0</inkml:trace>
+  <inkml:trace contextRef="#ctx0" brushRef="#br0" timeOffset="47618">26768 8092 26248,'0'-15'-6206,"0"1"4347,0 5 795,0 27 515,0 32 34,0 7 363,0-8 0,0 0-76,0 8-526,0-19 1,0-1 483,0 15-179,0-3-361,0-1-809,10 11 493,-8-17-514,8 15 503,-10-31 1392,0 0 1,-17-17 0,-4-3 0</inkml:trace>
+  <inkml:trace contextRef="#ctx0" brushRef="#br0" timeOffset="47736">26597 8638 23729,'-7'-35'-6543,"5"2"4749,-4-1 292,6 0 1293,0 1 10,23 1 1374,11-6-35,14 13-1332,-9 9 1,1 2 1837,16 3-1341,-5 6 0,0 1 0,8 3 0,-20 1 0,-1 0 0</inkml:trace>
+  <inkml:trace contextRef="#ctx0" brushRef="#br0" timeOffset="48122">27423 7357 23099,'41'38'-4720,"-4"-16"4143,-5 16-824,-2-18 1355,3 20-768,2-4 875,1 6 1,0 3-289,-15-16 0,1 3-405,3 9 1,3 7 0,-6-5 243,-8-7 1,-4 0-123,5 29 0,-3 1 394,-7-26 0,-4 0 52,-6 3 1,-3 5 0,1-5 177,7-4 0,-6 0-116,-23 11 1,-12 4-1,4-6 21,13-10 1,-2-1 238,-19 8 0,-10 2 1,5-7-1,14-11 0,1-2 1,-11 7-1,0 1 0</inkml:trace>
+  <inkml:trace contextRef="#ctx0" brushRef="#br0" timeOffset="48824">28515 7098 23189,'0'-10'-6295,"0"3"5246,0 2 164,0 17 247,0 12 572,0 28-148,0 0 145,0-8 0,0 2-1438,0 18 1552,0-6 0,0 2-52,1-24 1,-2 3 85,-3 13 1,-3 8-1,-1-6 93,-1-10 0,-2 0-45,1 11 1,-1 6 0,1-8 72,1-13 1,0-2 28,-1 22 1,2-1 20,6 3-187,-2-18 1,-1-2 144,5-1-355,0 4-107,0-18-219,20-11 296,0-2 172,25-10 1196,-15-2 158,4-22 593,3-5-26,-10 1-285,9-17-134,-12 11-539,-5-10-569,-4-8-1248,-10 23-280,-3-7-730,-26 22 773,-8 0 470,-12 28 1601,-1-13-561,20 28 0,4 7-370,-13 1 208,12 17 0,3 7-169,6-27 1,2 0 110,4 15 1,1 1-531,0-15 0,1 0-97,5 1 1,0 0-678,0-1 0,0 1 15,0 15 0,0 1 568,0-14 0,0 0-36,4 3 0,2 3 0,-1-4-352,-3-5 1,0-1-947,6 26 1,-1-2 1812,-7-25 0,0-3 0,0 11 1,0-1-1,0 14 0</inkml:trace>
+  <inkml:trace contextRef="#ctx0" brushRef="#br0" timeOffset="50372">2705 16121 23369,'-6'-11'-6793,"0"1"4222,5 10 5429,-2 0-1287,1 0-463,0 0-497,0 0 72,1 10-2086,1-2 2079,0 15-223,0-6-2049,0 6-1,0-4 1,0 13-1,0-8 1,0 7 1402,12-5-608,-10-8 481,10 6-270,-12-14 591,0 3 0,0-7 0,0 0 0,0 2 0,0 4 633,0 5-312,0 7 270,0 10-501,-15 8 120,12-2 0,2 2-96,-7-8 1,0 2-28,3 6 1,2 5-1,-1-3 12,-1-3 1,-1 1 4,-1 3 0,-2 4 0,1-5 73,1-5 0,0-1-7,-1 9 1,-1-1 86,-1-6 0,-1-2-110,-8 16 147,1-14 1,-2-2 378,-6-1-271,4-10 1,-2-4 751,-6-3 215,-8 0 166,12-15-82,-1-3-421,1-2-343,-8-33-1620,8 10 238,6-14 1,3-3-1635,-3-10 1061,7 1 0,2-1-1285,1-13 1435,6 22 0,2 0 174,0 4 1,1 3-787,1-13 1634,20-14 896,-16 39 211,33 1 1669,-20 17-349,16 20-1294,-7-11 320,-4 30-1689,-9-12-208,3-3-149,-10 16-45,6-23-1353,-5 14-436,-3-10 1336,1-1-664,-2-3 1858,1 1-193,-2-3 84,3 2-322,-4-7 62,2 3 180,-3-5-406,0 2 734,0-4 0,0 0 1,0-1-1</inkml:trace>
+  <inkml:trace contextRef="#ctx0" brushRef="#br0" timeOffset="51285">2482 16124 21660,'-19'13'1325,"-5"-10"-1023,21 27-3339,-6-13 2503,2 21-723,5 1 242,-9 10 743,8 8-1209,-3 8 691,5-13 1,0 1-108,0-12 1,1 2 844,0 3 1,0 4 0,0-4-428,-1-5 1,2 0 220,7 24 1,2-1 149,-8-29 1,0-2-246,6 10 0,2-3-224,4 9-101,-10-7 491,19-4-102,-10 1-345,-1-12 246,13 1 568,-15-16-37,18-4 1356,-14-6 302,5-1-106,5-17 650,-5-13-659,14-28-23,-13 3-1251,-5 12 1,-1 0 335,1-11-896,-6 8 1,-2 0-334,-2-3-777,-1-12-590,-4 18 599,0 14 236,0 1 319,0 37 161,-13 5 1333,10 26-786,-4-8 1,1 1 142,6 27-173,0-2 1,0 1-30,0-21 0,0 0 45,0 13 0,0-1 45,0-14 0,0-2-45,0-1 0,0 1-681,0-2 1,0 0 424,0 31-87,0-4 343,18-1-200,-16-21 1,1-1 80,14 17-134,-9-12 0,-3-3 4,-2 2 8,17 7-1095,-18-21 214,10-4-777,-11-2 1821,9-5 0,-5-2 0,4-3 0</inkml:trace>
+  <inkml:trace contextRef="#ctx0" brushRef="#br0" timeOffset="52952">5838 12723 23279,'0'17'-6385,"0"1"4256,24-10 2995,15-1 142,13-7 114,8-17 285,-13 13-708,2-29-398,-16 22 0,-1 2 1847,13-11-908,-12-2 0,-3 1-301,-10 7-171,9-29-1118,-27 24-1223,5-3 612,-34 9-414,-7 7 536,-30 1 183,12 5 393,3 24 614,16-18 434,3 42 83,5-27 238,10 25-1155,-3-10-341,16 4-1683,-7 18-308,28-11 1988,-2-9 0,5 0 0,29 4 0,-19-16 0,0 1 0</inkml:trace>
+  <inkml:trace contextRef="#ctx0" brushRef="#br0" timeOffset="53388">7287 11796 25078,'-19'-61'-7705,"15"6"5908,-34 5 734,17 21 421,-12 6 1197,6 49 1008,14 5-1358,4 0 0,2 4-1411,5 32 1557,-4-7 1,-1 4-207,6-14 1,1 3-65,-1 8 1,-2 6 0,2-6 78,1-5 1,0-1-294,-1 3 0,0 5 0,3-7-759,7-10 0,0-2 662,-8 6 0,-2 4 1,5-7-243,11-14 1,0-2 340,-13 17 1,-1-5-42,11-19-441,-12-3 585,0-35 7,0-13 139,0-33 5,0 6 48,-2 11 0,4 2 304,15-10 116,-13-13 109,13 27 141,1 7 219,-14 9-573,27 10 1683,-16 5 154,13 24-1767,-5 16-1104,-8-2 1,-1 3 112,-5-4 1,0 3-1162,6 15 1,0-1-1239,5 12 1736,-7-21 1,2-2-3422,10 13 3883,4-6 0,4-5 0,3-3 0</inkml:trace>
+  <inkml:trace contextRef="#ctx0" brushRef="#br0" timeOffset="53666">8020 12630 24089,'0'-17'-6566,"-22"6"6412,16 0-2439,-34 10 4353,25 13-369,-5 16-821,10 24-1085,10-5-441,14-7 1,5-2 478,8 3 50,12-7 1,5-6 1422,10-11-1223,-2-6 0,0-2-118,11-8 548,-22-5 1,0-2 1284,10 2 569,-5-35 382,-7 17-1574,-20-7 0,-3-3-370,1-12-841,-17 6 1,-4-2-1384,0-8-37,-29 7 0,-7 3-1190,3-5 2712,-4 16 0,-3 3 0,-11-2 0,0 4 0</inkml:trace>
+  <inkml:trace contextRef="#ctx0" brushRef="#br0" timeOffset="54600">10925 11553 24269,'-23'-25'-6208,"-28"3"6088,20 3 281,-12 8 1,-5 4 161,15 1 1,-2 2 141,-26 8 0,-2 2-113,24-6 1,1 5 79,-4 13 1,-2 8 0,4-2-128,5-8 0,3 4 116,-1 22 0,0 11 1,7-4-305,9-11 1,5 2-316,5 11 0,5 6 0,5-5-543,8-11 0,6-2-412,9 13 0,5-1 198,-2-16 0,2-2-181,3-1 1,2 0 190,2-1 0,1-2 443,1-1 0,1-1 332,-1-2 1,1-1 215,-4-1 1,2-1 500,9 3 1,-1 0 126,-15-8 0,-1 0 15,9 4 0,-4-2-137,-13-2-423,-3 0-171,-41-12 1632,-3-2-464,-25-3-685,-3 0-298,-11 0-1078,11-7 1,-1-4 986,11 0 1,1-1 0,-14-5-1,1-2 1,17 2 0,0-1 0</inkml:trace>
+  <inkml:trace contextRef="#ctx0" brushRef="#br0" timeOffset="54856">10722 11158 25708,'0'-7'-5756,"0"2"3807,0 26 885,-14-1 1132,12 15 1,0 4 58,-13-10 0,-2 1-101,8 11 0,4 7 0,-3-3-10,-8 2 0,0 3-396,3 8 0,1 7 0,2-5 545,0-2 0,2-1-248,2 7 1,1 5 0,0-6-401,3-6 1,0-2-163,1-9 0,0 2 1,3-1 537,8 17 1,1-4-1,-8-15 1,0 0-1,8 11 1,-1-1-1</inkml:trace>
+  <inkml:trace contextRef="#ctx0" brushRef="#br0" timeOffset="55572">11853 11999 24808,'0'-32'-5845,"0"2"3626,-23 6 1245,17 3-605,-35 6 2665,37 2-2202,-47 7 2272,29 18-868,-11 3 0,0 3 1693,1 25-1337,6-4 1,3 3 403,2 15-517,10-18 1,3 1-778,2 1 1,6-2 881,20 22-1841,-6-16 0,5-2-1721,26 2 1967,3-13 1,2-5 393,6-8 582,-2-5 0,-1-9 838,-6-27 62,-12 7 0,-3-3 1239,1-28-1184,-11 11 0,-3-1 1001,-3-12-940,-3-16-750,-10 19-742,-3 1-579,0 3-1028,0-7 91,0 16 637,-15-5-255,11 24 380,-11 22 2898,15 19-1902,0 14-256,9-8 1,1 1-777,-6 15 26,15-6 0,-1 0-571,-14 8 1391,12-19 1,2 0-886,-6 5 670,13-4 1,-6-6-1,1-3 1</inkml:trace>
+  <inkml:trace contextRef="#ctx0" brushRef="#br0" timeOffset="55868">12462 12169 24089,'1'-33'-5581,"0"4"3489,0 6 1479,-1 1-32,0 29 155,15 27-539,-11 8 825,2-2 0,2-2-1812,6 2 1352,-10 14 693,10-11-326,-4-13 728,-7 3-406,12-18 671,-10-21 746,5-19-237,-3-14-725,1 2 1,0-1-296,3-16-296,1 3 0,1-1 246,4-13-346,-5 22 1,-1 1-363,6-13-1598,1 5 2193,0 5 1,3 8 0,1 3 0</inkml:trace>
+  <inkml:trace contextRef="#ctx0" brushRef="#br0" timeOffset="56201">13197 11923 26068,'-19'10'2177,"4"-2"-1250,15 36-4918,0-8 1650,0 5 780,0 3 447,0 2 696,0-5 0,0 0-1179,0 9 608,-1-7 0,2-2-1144,10-11 2285,-9 6-202,9-23-202,-11-27 72,0-18-450,0-3 0,0-3-449,0-26-104,0 13 0,0 0-103,0-15 1466,-2 21 1,4 2 0,13-18 0,5 1 0</inkml:trace>
+  <inkml:trace contextRef="#ctx0" brushRef="#br0" timeOffset="56658">14845 11218 25348,'-33'-31'-5776,"6"2"3500,-32 5 2789,13 2-429,-5 4 177,13 10 1,0 2 367,-21-2-327,12 5 0,1 1-468,-2 2 1745,-10 21 684,29-16-1056,7 35-1033,11-12-476,5 9-570,6 3-530,22 6-710,12-7 1271,2 4 0,4 1-260,-13-21 0,1 2 75,11 23 0,-5 1-292,-13-1 617,-3-7 1,-3 0-198,-12 8 897,-6-10 0,-1 1 789,0 7-469,-18-17 1,-7 1 393,4 1 0,-3-2 130,-6-6 0,-3-1-87,1 4 1,-2 2-1,2-3 456,2-2 0,0-2 133,-22 16 0,2-2-438,25-16 0,3-1-37,-7 5 0,3 0 260,1 4-973,14-1-928,7-1-586,8 7-859,33-7 608,-5-6 1,3-1 592,6-7 0,5-3 65,-1 1 0,5 1 0,-3-3 891,1-1 0,0-1 0,15 1 0,0-1 0,-16-3 1,-1 0-1</inkml:trace>
+  <inkml:trace contextRef="#ctx0" brushRef="#br0" timeOffset="57104">16310 11987 24988,'-35'-32'-5582,"-15"-12"3781,11 14 1145,-10-8 367,15 20 432,2 2 30,-12 5 426,13 6-928,-14 2 1749,25 20-1,0 5-190,15 11-1347,2 2-284,23-5-697,-15 2-350,40 3 586,-9 13-805,11-11 895,-15-9 1,-1 0-437,3 3 1161,7 4 312,-20-16 217,-10-2-444,2-4-247,-11-3 138,4-2-515,-24-1 2883,-15 1-480,-12-3-1098,6 0 0,-2-1 563,-16 0-647,18-2 1,0 0 48,-16-1 154,5-1 26,4 0-1178,-2-19 1,25 14-1,-1-14 1</inkml:trace>
+  <inkml:trace contextRef="#ctx0" brushRef="#br0" timeOffset="57334">16197 11539 25078,'6'-19'-2571,"-5"8"838,5 2 2544,-6 28-2253,-18 12 1943,14 15-1169,-14 8 512,1-3-405,15-8 0,0 2 451,-12-10 1,0 3 98,11 28 0,3 0-643,-6-25 0,1-2 495,4 14 1,2-1-726,-1-17 0,0-3-203,0 33-615,16-5-375,-12-5 188,12-6 1652,1-4 0,-12-8 0,12-3 1</inkml:trace>
+  <inkml:trace contextRef="#ctx0" brushRef="#br0" timeOffset="57556">16773 12081 25978,'0'-11'-5936,"0"3"3807,0 23 1155,0 9-24,0 15-147,0 0-239,0-7 77,14 1 737,-10 12 0,20-13 0,-11 9 0</inkml:trace>
+  <inkml:trace contextRef="#ctx0" brushRef="#br0" timeOffset="57716">16962 11600 25078,'0'-28'-9174,"0"3"6146,-9 9 2544,7 5 0,-7 6 0,9 3 0</inkml:trace>
+  <inkml:trace contextRef="#ctx0" brushRef="#br0" timeOffset="58240">17333 11119 24179,'0'-11'-6296,"0"3"4078,20 4 5155,10 2-1534,11 19-1724,19 4 213,-21 12-222,-4-11 0,0-1-743,6 11 1244,-13-12 1,0 2-22,-1 3 0,-2 1-2119,11 13 1141,-9-3 1,-3 1-259,-2 6 282,-9-4 0,-3 0-57,-3 7 525,-3-6 0,-2-1-103,-2 9 230,0 12 178,0 2 235,0-14-28,0-6 1,0-1 503,0 11-259,0 14-92,0-20-325,0 1 86,0-1-90,0-2 0,15 0-658,-11-2 565,24 13-464,-8-14 299,-2-11 0,1-2-35,13 1 1528,6 8-1149,-19-23 241,3 0 899,-13-10-138,-4-18 155,-26 10 431,16-28-2062,-29 19 1,-6 1 459,4-20-1289,-17 10 0,-5 3 1332,25 8 0,0 0 0,-11-3 1,-1 2-1,-17-5 0</inkml:trace>
+  <inkml:trace contextRef="#ctx0" brushRef="#br0" timeOffset="58551">18945 11940 27867,'0'-9'-7105,"0"1"4526,0 1-1003,16 2 5172,7 3-2090,-3 15 248,13-10 0,-29 30 0,10-9 1</inkml:trace>
+  <inkml:trace contextRef="#ctx0" brushRef="#br0" timeOffset="58750">19172 12593 24539,'0'13'-5486,"0"0"3627,-14 2 3764,10-4-2051,-10 8 749,14-8-1536,0 5 324,-10-3 361,7 1 591,-22 3 1400,10 3-2635,-17 1 1096,1 4-3015,-24 11 3224,7-8 1,15-9 0,-1-2-1,-17 7 1</inkml:trace>
+  <inkml:trace contextRef="#ctx0" brushRef="#br0" timeOffset="64168">26133 3238 23999,'0'-21'-5216,"0"2"3177,0 3 1065,-14 1 545,10 1-603,-24 1 1595,24 2-1405,-25 3 290,15 2 1327,-16 3 730,5 2-5,-4 1 21,-2 21 913,-1-16-1293,-1 41 635,1-22-898,4 24-718,4-8-231,5 21-765,10-15 50,21-9 0,8-2-1594,14 1 1696,16-10 0,6-6 624,-20-11 0,0-3-163,15 1 1,0-1 530,-14-6 1,-3 0-59,2 1 1,-2-2 852,27-21 57,-26 10 1,-2-4 1502,10-25-2111,-17 15 0,-4-1-644,-8-7-2333,-3-18-163,-11 23-605,0-5 2641,0 16 0,-16 9 0,-3 3 0</inkml:trace>
+  <inkml:trace contextRef="#ctx0" brushRef="#br0" timeOffset="64401">27412 3297 24179,'-46'-20'-3153,"21"3"1117,-8 8 1598,55 3 1232,3 6-1338,29 15 493,7-11 1,-8 23 0,4-13 0</inkml:trace>
+  <inkml:trace contextRef="#ctx0" brushRef="#br0" timeOffset="64651">27675 3108 23459,'-24'-20'-5429,"9"2"3307,-3 4 3378,15 0-2550,12 8 3326,21 14-1400,9-5 229,7 26-2063,-11-14 1791,0 16-108,-1-2-545,-7 3 217,-2 24-2721,-13-10 1745,-4-3 1,-6 1-1312,-25 12 425,-1 3 0,-5 1 1776,4-29 0,-1-2 1,-8 17-1,3-1 1,-4-3-1</inkml:trace>
+  <inkml:trace contextRef="#ctx0" brushRef="#br0" timeOffset="64968">28453 3628 23549,'11'-22'-1185,"11"-17"873,0 4 698,2-2 1,0-1-71,11-15-238,-12 17 1,1-3 131,0-4 0,-2 0-261,-5 10 0,-2-1 13,10-24 0,-3-1 163,-11 25 0,-2 0-121,4-20 0,-2 0-705,-4 0 203,-3 15 0,-2 3-495,-2 5-130,0 1 282,0 21-50,-17 41 902,13-1-673,-5 16 0,1 4 203,7-15 0,2 0-152,-1 15 1,0 3-894,0 8 0,0-1 739,0-13 1,0-1 764,0 15 0,0-2 0,0-19 0,0-3 0,0 1 0,0-1 0</inkml:trace>
+  <inkml:trace contextRef="#ctx0" brushRef="#br0" timeOffset="65120">28625 3818 25978,'-7'-31'-7929,"21"5"8997,-9 2-1582,47 6 3003,-21 2-2583,11 5 0,4 2-506,16-5 667,-7 7 1,2 2 0,-22 3 0,-1 0 0,11 2 0,1 0 0</inkml:trace>
+  <inkml:trace contextRef="#ctx0" brushRef="#br0" timeOffset="67538">15773 13517 23999,'-33'-3'-719,"-3"22"2281,19-1-1848,-4 10 1,1 2-492,5 12 340,-6-1 0,1 1 106,8 13 120,5-8 1,1 0-975,6 6 382,29-5 0,9-3-1317,1-4 1893,-2-20 1,8 0-1,-5-5 226,20-1 342,-10-8 1,-2-3 204,3-2 65,-14-8 1,-4-5 1479,-5-17-132,-3-10-966,-20-26-1615,-26 20-957,1 4 1,-5 0 176,-1 16 1,-5 3 1296,-21-15 0,-1 4 0,18 17 0,-1 1 1,-12-2-1,0-1 0</inkml:trace>
+  <inkml:trace contextRef="#ctx0" brushRef="#br0" timeOffset="68051">18503 14254 25348,'24'-5'2247,"1"-3"-1405,18 3-1073,14-5-68,-13 4-647,17-1-432,-26 5 1,-1 1 1311,16 0 1,13 1 0,-25 0 0</inkml:trace>
+  <inkml:trace contextRef="#ctx0" brushRef="#br0" timeOffset="68201">18428 14628 23909,'-18'5'2873,"32"-1"-4883,4-3 1617,34-20 1328,0 15-1409,-21-13 0,3 0-285,5 15 1,1 0 791,6-14 0,1-2 0,3 11 0,2 0 0,2-9 0,0 0 0</inkml:trace>
+  <inkml:trace contextRef="#ctx0" brushRef="#br0" timeOffset="68486">20012 13595 23729,'-5'-10'-6481,"4"-3"5220,18 5 5701,19-7-1811,11 8-2071,-8 1 1,-1 2 190,12 0-523,-9 1 1,0 3-237,4 16 606,-8 3 0,-3 7-640,-11 21-2354,-3 2 1,-9 2 569,-19-18 0,-7 1 1718,1 7 0,-2 4 0,-3-3 1,-9-1-1,-4 0 0,-6 13 1,0 0-1</inkml:trace>
+  <inkml:trace contextRef="#ctx0" brushRef="#br0" timeOffset="68635">20032 14655 26338,'20'0'-5488,"-3"0"5488,-2 0 0,-2 0 0,3 0 0</inkml:trace>
+  <inkml:trace contextRef="#ctx0" brushRef="#br0" timeOffset="70219">15565 16082 21840,'-5'0'538,"-1"0"-358,3-9-4035,-1 7 3473,1-8-1540,-2 10 3162,0 0-243,1-5-2666,0 3 1293,0-3-1148,1 5 4441,-2 0-1105,2 0 1160,-2-3-3845,4 1-1376,-1-2 1704,2 0-405,0 0 1327,0-3-2064,0-1 91,0-12 0,0 1 963,17-28 1950,0 14-556,0-10 1,1-1 23,16-4-331,-24 9 1,-1 1 28,19-1 809,-25 0-1154,16-10 595,-12 14-1173,5-11 131,-5 27 212,-4 0-591,-2 30 164,-1 17-768,0 33 1155,0 2-815,0 0 1,0 2 119,0-28 1,0 1-125,1 9 0,0 5 0,-3-6 30,-4-10 1,-1-3 899,6 11 1,-1-1 0,-10 14 0,12-2-1</inkml:trace>
+  <inkml:trace contextRef="#ctx0" brushRef="#br0" timeOffset="70358">15382 16490 24089,'-17'0'360,"6"0"-90,5-14-4857,28-4 5823,3-1-774,12-3 0,5 1 453,20 4-1753,-20 2 1,4-4-1,-2 3 900,1 4 1,0 2 0,17-4 0,0 2 0,-16 4 0,-1 0 0</inkml:trace>
+  <inkml:trace contextRef="#ctx0" brushRef="#br0" timeOffset="70734">18145 16243 24539,'-11'0'2428,"1"0"-2428,32 0-90,10 0-405,2 0 1,3 0-765,22 0-46,-14 0 1,-1 0-225,10 0 1449,-19-2 0,0 4 1,8 17-1,0 5 0</inkml:trace>
+  <inkml:trace contextRef="#ctx0" brushRef="#br0" timeOffset="70868">18432 16523 23909,'-20'4'1961,"34"-16"-3799,30-6 1442,-13 9 0,3-2 504,0-7 0,1 0 0,29 2 0,-31-1 0,-1 0 0</inkml:trace>
+  <inkml:trace contextRef="#ctx0" brushRef="#br0" timeOffset="71118">19510 15819 25258,'-23'-14'-3157,"4"0"1801,7 2 503,9-1-298,9-6 1582,-1 6 418,27 0 1,7 3 597,-4-2-1248,4 5 1,3 2 443,-6 2 1,-1 1 737,18 1-731,-10 7 0,-3 5 705,0 18-1862,-15-1 0,-4 4-2251,-8 23 70,-24 2 1,-9 2 1186,5-26 1,-2-1 1433,-17 21 0,-3-1 0,10-23 0,-1-2 0,-1 0 0,0 1 1</inkml:trace>
+  <inkml:trace contextRef="#ctx0" brushRef="#br0" timeOffset="71252">19583 16579 25168,'29'5'-843,"12"1"566,-21-3 21,13 1-1629,-8-2 1910,2 0 1,-10 0 0,5-1 0</inkml:trace>
+  <inkml:trace contextRef="#ctx0" brushRef="#br0" timeOffset="71888">21580 14398 25258,'8'-27'-2902,"-1"4"2074,-7 8-376,5 7 2212,1 4 1270,8 4-1201,5 24-2091,24 20 184,-22-15 1,1 4 568,7 2 1,3 3-1,-2-1-52,2 5 0,1 2 201,-5-5 0,3 5 1,0 1-1,-3-3-570,-4-2 1,-2-3 0,1 2-393,7 12 1,2 4-1,-1 0-327,-2 2 1,-1 1-1,-1-3 670,-6-11 1,-1-1 0,1 1-87,4 11 1,2 2 0,-3-4 742,-1 1 0,-2-4 1,-1-3-1,-1 0 1,-1-3-1,0 0 1</inkml:trace>
+  <inkml:trace contextRef="#ctx0" brushRef="#br0" timeOffset="72116">22627 14440 28586,'7'-35'-2419,"0"0"0,5-24 685,-12 17 410,-15 10-560,-5 36 3954,-16 10-1313,14 9 1,0 6-459,-4 2 0,-1 2-461,-7 7 0,-3 3 485,9-10 1,-1 1 0,-1 2 1,-3 3 1,-1 2 0,-3 3-91,5-5 0,-4 4 0,-1 2 0,0-1 0,2-1 111,-1 0 1,2-1-1,-1 0 1,-3 5-907,-1 1 1,-3 5-1,-2 2 1,0 0-1,1-2 1,5-4-211,-1-1 0,4-3 0,0 0 0,-1 1 761,1 0 0,-3 3 0,1 0 1,1-1-1,3-4 0,-5 10 1,2-4-1,2-1 0,1 1 1,0-1-1,0 0 0</inkml:trace>
+</inkml:ink>
+</file>
+
+<file path=ppt/ink/ink14.xml><?xml version="1.0" encoding="utf-8"?>
+<inkml:ink xmlns:inkml="http://www.w3.org/2003/InkML">
+  <inkml:definitions>
+    <inkml:context xml:id="ctx0">
+      <inkml:inkSource xml:id="inkSrc0">
+        <inkml:traceFormat>
+          <inkml:channel name="X" type="integer" min="-2.14748E9" max="2.14748E9" units="cm"/>
+          <inkml:channel name="Y" type="integer" min="-2.14748E9" max="2.14748E9" units="cm"/>
+          <inkml:channel name="F" type="integer" max="32767" units="dev"/>
+        </inkml:traceFormat>
+        <inkml:channelProperties>
+          <inkml:channelProperty channel="X" name="resolution" value="1000" units="1/cm"/>
+          <inkml:channelProperty channel="Y" name="resolution" value="1000" units="1/cm"/>
+          <inkml:channelProperty channel="F" name="resolution" value="0" units="1/dev"/>
+        </inkml:channelProperties>
+      </inkml:inkSource>
+      <inkml:timestamp xml:id="ts0" timeString="2021-07-19T06:44:48.529"/>
+    </inkml:context>
+    <inkml:brush xml:id="br0">
+      <inkml:brushProperty name="width" value="0.12095" units="cm"/>
+      <inkml:brushProperty name="height" value="0.12095" units="cm"/>
+    </inkml:brush>
+    <inkml:brush xml:id="br1">
+      <inkml:brushProperty name="width" value="0.09071" units="cm"/>
+      <inkml:brushProperty name="height" value="0.09071" units="cm"/>
+    </inkml:brush>
+  </inkml:definitions>
+  <inkml:trace contextRef="#ctx0" brushRef="#br0">1848 3213 24179,'-19'-19'-3858,"-7"-5"2350,23-14 130,-7-2 10,10 1 1146,21-7 1232,-15-10-733,24 9 0,5-2-627,-21 11 1,-1-2 666,13-6 1,5-5 0,-2 4 77,-6 4 1,-1 0-17,2-5 0,2-4 0,-2 4 306,-4 4 1,-1 2-419,0-3 1,2-2 0,-4 3-345,-5 7 0,-1 2 53,4-9 1,-3 2-490,-6-4-254,1 8 95,-6 9-191,2 6 245,-20 28 1990,12 7-1238,-14 19 1,0 6 107,13 23-259,-12-17 0,-2 5 179,8 10 1,2 2-192,-1-14 1,0 3 193,2 3 1,-1 6 0,4-5-260,4-5 1,1-3-907,-3 14 1,0 0 343,3-3 0,2-4-234,7-12 1,1 0-220,-9 25 1,4-2 110,13-28 0,2-1-527,-9 20 0,-2-1 57,15 2 1366,-15-20 1,-4-1-1,-4 5 1,0-2 0</inkml:trace>
+  <inkml:trace contextRef="#ctx0" brushRef="#br0" timeOffset="137">1808 3381 22380,'-17'-17'-5994,"1"4"4532,9-16-806,1 6 892,26-20 2291,-14 7-443,31 1 1,9 0 553,1-12-1261,5 16 0,3 0 826,-15 8 0,0 0-326,3 0 1,0 0 0,4 0 0,0 0-1,0 0 1,1 0 0</inkml:trace>
+  <inkml:trace contextRef="#ctx0" brushRef="#br0" timeOffset="452">3125 2302 22470,'-31'-10'-1908,"-20"2"1943,31 2-585,-23 4 920,10 0-63,2 2-38,-13 17 698,13-13-637,7 19 0,3 5-45,5-5-454,-7 30-46,21-16-1076,-5 4 186,7 0-451,28 14-1166,10-15 1847,-1-11 1,3-3 526,-9-12 0,1-3 533,22 2 0,-1-3 411,0-4 126,-7-9 1,-4-7 1009,-11-18-93,-5-25-162,-18 4-1436,-5 11 0,-6 0-789,-26-8-796,22-16 637,-22 41 0,-3 3-139,6-17-1243,-27 4 418,0 1 660,15 12 1421,-7 2 1,18 13-1,1 3 1</inkml:trace>
+  <inkml:trace contextRef="#ctx0" brushRef="#br0" timeOffset="800">3423 2239 23549,'2'-10'-4526,"-2"-4"2159,23 32 1684,0-1 290,2 19-621,10-2 670,-15 11-662,2-8-70,-8-3 0,-2 0 147,-4 6 556,4 24-197,-6-30 182,-6 9 729,0-25-244,-31-3 2766,23-35-3037,-39-18 1081,30-13-980,7 9 1,1-1-69,-4-15 168,12 20 1,2-1 24,-1-15-52,0 4-2378,18 6 2235,11-6-333,12 19 1181,6 0 1,-6 22-1,1 5 1</inkml:trace>
+  <inkml:trace contextRef="#ctx0" brushRef="#br0" timeOffset="1274">4140 2657 22380,'51'0'450,"-4"0"-360,7-15 952,-2 11-712,-25-12 0,3-5 43,28-3 1,2-1-144,-23 3 1,1-3-97,7 0 0,3-2 0,-6 2 676,12-11-694,-17 6 1,-5-1-35,-5-3-578,-14-1 0,-3 0-1153,-5 1-231,-30-18-894,18 31 145,-48 3 1467,16 4 262,-14 7 747,1 2 439,17 5 876,2 20 558,6 10 485,2 12-631,13 4-2043,1 11-108,33-10-457,-7-4 1,3-1 113,4-16 0,4 0-1139,13 17 1,0-1 1816,-11-17 1,0-3 0,11 7-1,1-1 1,-10-11 0,-1 1 0</inkml:trace>
+  <inkml:trace contextRef="#ctx0" brushRef="#br0" timeOffset="1670">5467 2359 23459,'-23'-26'-6342,"-12"2"5640,32 6-1413,-45-2 2839,26 12-128,-27 17 996,22 19-794,11 10-1451,5 24 853,11-18-515,0 17 724,22 2-1799,9-18 769,-3-10 0,4-2-1371,19-3 1522,-17-13 0,1-3 522,6-4 796,23-25 1178,-30 11-166,5-42 233,-17 2-919,-11-12-853,-5 15 1,-2 0-468,-4-6-171,-8 9 0,-1 1-1297,5 1-630,-12-7-422,0 24 1266,13 5-80,-23 8 2257,24 23-688,-8 13 7,16 10 0,6 4-177,10 18-317,-13-20 0,4-1-547,27 9-160,-22-4 1177,9-15 1,3-1-1,8 10 1,-11-15 0,0 0-1</inkml:trace>
+  <inkml:trace contextRef="#ctx0" brushRef="#br0" timeOffset="1900">6202 2418 23279,'-51'-39'-4497,"19"14"2582,-7-5 1222,15 22 1518,-18 1-6,9 29 468,16 8-1115,6 12-1393,11 20 974,27-23-137,-10-5 0,3-1-623,34 4 352,-27-16 0,1-3-63,7-5 0,1-5-499,19 1 950,-7-3 0,-1-6 950,8-27-295,-20 18 0,-2-3 0,11-37 0,-3 11 0</inkml:trace>
+  <inkml:trace contextRef="#ctx0" brushRef="#br0" timeOffset="2283">6695 1832 23099,'-13'-32'-2561,"0"1"0,-7 2 0,3-1 471,13-20 1565,-26 7 1,26 10 208,-23 7 710,24 8-468,-18 9-601,19 20 1540,-7 25 149,9 9-947,0 15 210,17-7-352,-7-9 1,0 2-215,0-12 1,1 2 183,6 25 0,0-1-611,-4-25 0,1-1 210,6 22 0,3-3-90,-6-22 1,-1-3 302,0 10 1,-3-3-409,2 9 687,2-4-290,-6-7 437,2 1-260,-5-15 147,0-2-44,-5-32 926,-2-16-18,1-13-561,0 9 0,1 0 516,2-12-464,1 9 1,1 1 896,2-1 57,11-6 164,-7 23-721,5 11 1194,-3 2 68,1 8-586,2 25-1902,14 9 68,-7 14-124,-3-11 1,1-1-734,4 14-830,-5-5 1,1 2-2094,6 9 3639,-11-19 0,0-1 0,9 11 0,1-2 0</inkml:trace>
+  <inkml:trace contextRef="#ctx0" brushRef="#br0" timeOffset="2517">8377 1240 23459,'-36'-12'-2678,"1"2"2105,3 4 20,-8 3 533,11 2-1289,4 24 1137,15 2 1,10 2-1,0-8 1</inkml:trace>
+  <inkml:trace contextRef="#ctx0" brushRef="#br0" timeOffset="3517">8543 1171 21840,'-20'-12'-3074,"-12"1"2660,28 1-3118,-26-1 4371,18 2-1226,-14 1 863,6 3-22,0 3-438,-1 1 1278,1 1-248,-13 36 1143,7-5-2052,1 16 1,1 6 114,9-17 0,0 1-345,-1 11 1,-2 6 0,3-3-196,1 0 0,2 1 6,-1 7 0,1 7 0,1-7-341,4-3 0,2-3 189,0-7 1,0 1-1,4 0-136,8-2 0,4-1 0,1-3-211,1 9 0,6-1-277,12 5 0,9 2 0,0-6-165,4-3 1,4-4 1215,-4-4 1,5-1 0,0-3 0,-7-10 0,0-3 0,0 0 0,3-1 0,0 1-1,-1 0 1</inkml:trace>
+  <inkml:trace contextRef="#ctx0" brushRef="#br0" timeOffset="4354">9957 1786 22560,'4'-40'-4004,"-1"-18"2187,1 14 1170,-4-13 218,0 20 140,-24-9-708,18 15 704,-22 9 1,-3 5-725,10 2 1095,-30 2 953,7 11 316,9 25 638,-19 12-29,27 14-463,2 6-214,18-9-1544,7 1-139,20 1-446,1-13 0,5-2 92,1-8 0,5-1 236,3 3 0,5 1 0,-2-4-149,0-2 1,1-2 546,3 1 0,4 1 1,-5-2 83,-5-4 1,-1-1 307,15 9 0,-2-2 641,-6-1 289,0 5-562,-30-11-1197,-7-3-630,-23 2 2281,-18-7-456,2-2 1,-2-1-170,2-2 0,0 0 15,-4 0 0,1-1-518,-18 0-119,2-1 790,0 0-381,19-7 1,0-4 0,-15-17 0,19 5-1,0-1 1</inkml:trace>
+  <inkml:trace contextRef="#ctx0" brushRef="#br0" timeOffset="4586">9780 1038 22470,'13'-10'2414,"-10"18"-8358,9 16 3229,-12 13 2332,0-2 0,0 2-187,0 19 411,0 0 0,0 3 6,0-21 1,0 1-350,0 7 0,0 4 0,0-4-374,0-4 1,0 1 1075,0 5 0,0 4 1,0-5 57,0-4 1,0-2-244,-1 12 0,2 3-486,10-4 1,1-1-486,-10-12 1,1 1 866,9 3 1,4 2-1,-1-4 1,-1-3-1,2-2 1,9 11-1,1-1 1</inkml:trace>
+  <inkml:trace contextRef="#ctx0" brushRef="#br0" timeOffset="5052">11063 1927 22920,'0'-17'-5756,"-20"-4"3721,-3 4 1881,-2-2-54,-23 5 1093,29 5-610,-31 2 544,19 6-987,-6 1 1855,-14 22 570,11 8-1539,12-2 1,3 3 321,1 18-1143,5 2 301,14-1-1249,32-16-566,15 16-165,16-29 1136,-10-9 1,0-4 322,16-3 443,-18-10 1,6-4 0,-6 1 308,-10 7 1,-1-3 93,6-13 0,3-7 0,-7 4 1457,4-5-1018,-15-10 1,-5-4 181,-8-1-1168,-7 6 0,-2 1-738,-4-5-676,-20-7-1097,0 11-265,-5 14 1145,-6-2 328,27 35 1057,-22-11 1378,24 59-1265,-8-31 279,9 2 0,2 4 99,-1 29-1599,21-14 1188,-9-9 1,1 0 0,13 4 0,-6 13-1</inkml:trace>
+  <inkml:trace contextRef="#ctx0" brushRef="#br0" timeOffset="5367">11552 1877 22380,'-22'12'2935,"5"9"-4073,38 13-3014,-16 4 1895,32-7 1396,-19 18-777,1-11 1093,1 0 1,-3-1-1684,-12-3 920,25 20 191,-25-37 1109,5 0-158,-6-34 435,-1-27 507,-3-9-956,0 8 0,0-1-88,0-10-431,8 8 1,2-1 326,-5-9 585,11 22 1,-1 2 0,-12-9 0,10 3 0</inkml:trace>
+  <inkml:trace contextRef="#ctx0" brushRef="#br0" timeOffset="5700">12062 1942 23819,'-19'-12'-4353,"4"25"6153,15-1-4355,0 22 1076,0 6 494,17-9-349,-13 5 661,23-1-1013,-15 14 882,1-13-483,12 20 1173,-21-34-241,20 5 282,-19-22 594,9-23 1057,-6 12-1123,0-25 1,-1-8 427,3 4-814,1-28 0,0-5-81,-5 35 0,-1 0-584,7-31 1,0 2-139,-1 8 884,6-9 0,-1 30 0,2 5 0</inkml:trace>
+  <inkml:trace contextRef="#ctx0" brushRef="#br0" timeOffset="8667">14140 1837 22560,'9'-19'-2239,"-3"-1"561,-3 1 142,-3-1 198,0 1 446,0 2 255,-26 3 776,19 4-2055,-48 3 2502,29 5 330,-26 1 273,5 1-232,13 10 0,0 4 1254,-19 17-1226,13-4 1,2 4 233,5 15 410,1 12-1827,24-24-784,8 8-501,46-7-42,-11-11 804,17-9 1,4-3 357,-23-7 0,1-2 268,28 0 1,1-1 249,-27-1 1,0-2 207,7-9 1,5-5 0,-6 3 1350,17 3-505,-13-24 1,-5-3 173,-14 18-189,-5-39-1618,-16 31-490,-4-7-531,-2 12-733,-21 3 350,16 3-1253,-31 3 2346,18 7-33,-11 0 1258,12 21 624,-7-12 726,21 33-1582,-9-19 744,12 35-431,0-17-3766,0 28 920,20-24 1843,-14 9 1,34-16 0,-15-2 0</inkml:trace>
+  <inkml:trace contextRef="#ctx0" brushRef="#br0" timeOffset="9016">15202 1812 22740,'-23'-20'-4960,"-15"2"4575,33 2-2304,-35 2 3557,20-1-1236,-3 7 894,-5-2-130,17 8-748,-3 16 1727,6 8-1396,26 25-103,-13-6-631,12-9 0,4 0 101,12 8 133,0 0 1,4-1-378,12-1 475,-14-5 0,-6-1-865,-13-9 1090,10 7 886,-23-19-477,5 1-208,-8-8 126,-57-1 1566,27-3-1043,-17 0 1,-2 0 497,7 0-1478,7-5 1,1-2-93,-3 5 744,-5-10 1,19 0-1,4-3 1</inkml:trace>
+  <inkml:trace contextRef="#ctx0" brushRef="#br0" timeOffset="10316">18160 1282 23189,'0'-35'-6025,"-17"0"2237,13 2 2615,-35 1 1345,20 4-764,-23 4 1213,3 5-7,-4 7-1132,-5 6 1885,-5 4 727,-1 2-248,-4 19 122,1-1 553,6 19-1250,5-3-159,11 4-633,9 3-757,14 4-690,5 3-356,7 1-885,35 0-364,-6-1 1639,2-24 1,3-1 198,-6-1 0,-1 1 156,3-2 0,0 0 209,1-1 1,-1 0 400,0-2 1,0 0 254,24 13 362,-7-4 205,-9-4-110,-10 0-859,-13-8-9,-7 3-991,-28-11 2873,-18 5-123,-10-7-487,-13 2-709,10-4-199,-1-1 123,-1-2 15,3 0 0,3 0 0,2 0 0</inkml:trace>
+  <inkml:trace contextRef="#ctx0" brushRef="#br0" timeOffset="10574">17713 775 22020,'13'-10'1425,"-6"3"-1346,5 4 1428,-7 2-1227,8 1-154,-4 20-2611,1-15 1912,0 41-1317,6 1-498,-4 15 1456,-2-10 1,0 0-310,-3-16 1,-2-1 183,2 15 0,0-1 132,-2-11 1,-1-1 1146,0 1 1,0 0-735,0 1 0,0 1 605,0-1 1,0 0 176,-1-1 1,1 0-174,0 0 1,0 0-24,2 14 0,-1 0-36,0-13 0,0 0-1532,4 23 1,1-1 1461,-4-27 0,1-1 0,2 8 0,1-1 0,4 12 1</inkml:trace>
+  <inkml:trace contextRef="#ctx0" brushRef="#br0" timeOffset="10850">18903 1331 24629,'5'-13'-3430,"-2"2"1976,-2 6 276,-1-1 52,0 30 225,-17-6 2115,12 26-1675,-12-8-281,-1 8 785,13 5-310,-30 5 1047,23 1-265,-14 2 230,10-4-2310,8-16 0,1-1 409,-6 17 1004,6 11 1,3-27 0,4-3 0</inkml:trace>
+  <inkml:trace contextRef="#ctx0" brushRef="#br0" timeOffset="11384">18827 1136 22650,'-6'-6'-5990,"0"2"4984,3-1-881,-3 3 3099,4 0-1407,-3 21 198,4 1-336,0 43-1217,1-15 1601,0 2 0,0 2-255,-1-18 1,1 1 450,-1 27 1,-1 1-660,0-25 0,1-2 385,-2 12 1,0 0-187,1-2 0,-1-2 212,-1 22 41,1-13 0,0-1 77,0 2-343,1-12 0,0-1-914,2 0-144,0 7 1259,0-24 0,0-5 0,0-3 0</inkml:trace>
+  <inkml:trace contextRef="#ctx0" brushRef="#br0" timeOffset="11717">19293 1548 22560,'0'-9'-6296,"-19"1"6267,14 1-2092,-40-1 3275,28 5-446,-22-1 122,3 4-178,7 15-109,-20 4 1788,23 0-1143,-5 17 414,16-18-1466,4 19-648,4 18-661,4-20 280,13-1 0,7-2-1744,24-3 858,-1-6 1,4-2 1630,-8-9 1,0-2 0,5 4-1,-1-1 1,21 2 0</inkml:trace>
+  <inkml:trace contextRef="#ctx0" brushRef="#br0" timeOffset="12072">19735 1973 22200,'5'0'540,"10"0"-450,23 0-180,2-13 1064,-7 10-788,0-10 495,0-2-237,-3 12-213,-4-23-268,-2 24 267,-8-22-645,1 4-415,-10-6-96,-1-14-894,-6 17-260,0-10 254,-15 6-288,11 7-99,-31-2 1505,30 14-1039,-29 2 2512,21 29 26,-4 9 191,7 13-574,10 19 55,0-24-714,6-5 1,6-1-1484,15 2 1131,-2-8 0,3-3 441,18-1 0,4 2 0,-12-13 0</inkml:trace>
+  <inkml:trace contextRef="#ctx0" brushRef="#br0" timeOffset="12500">20415 1794 22920,'0'-17'-6476,"0"3"4348,17 39 451,3 0 906,1 26-473,16-19 1379,-19-10-341,18-11-313,2 10 1311,-11-10 260,8 3 171,-9-6 89,-7-8 1532,4-17-1038,-12 13 694,-4-30-2524,-4 10 96,-3-8-764,0-1-225,0 6-326,-16 6-523,2 4-80,-5 43 780,8 1 1357,11 33-363,0-21 1,0 1 71,0 27-40,4-17 1,3 8 0,0-6-123,2-9 0,0-1 113,-3 3 1,1 3 0,1-6-207,6-7 1,-1-2-580,-5 11 1,-1 0-189,9 17 754,-5-24 0,0-2 253,-3 11-310,3-19-1253,-5 0-1048,-27-35 2738,-7-15 0,1-16 0,5-6 0</inkml:trace>
+  <inkml:trace contextRef="#ctx0" brushRef="#br0" timeOffset="12783">21538 1786 22290,'45'0'90,"17"0"-90,-18 0-828,-3-1 0,0 2 702,8 12 0,14-10 0,-24 10 0</inkml:trace>
+  <inkml:trace contextRef="#ctx0" brushRef="#br0" timeOffset="12934">21735 2042 21840,'46'0'0,"-8"0"-719,5 0 719,-6 0 0,1 0 0,2 0 0</inkml:trace>
+  <inkml:trace contextRef="#ctx0" brushRef="#br0" timeOffset="13216">21960 1411 23999,'47'37'-4252,"-21"-5"1346,20 1 2519,-27-4-856,21 4 1157,-3 20-727,-13-7 443,-5-5 1,-3 1-1943,-5 10 1945,-4-6 0,-2-1 396,-5 10-2089,-8 2 1,-5 1 2254,-16 2 1,16-14-1,-1 0 1,-9 1 0</inkml:trace>
+  <inkml:trace contextRef="#ctx0" brushRef="#br0" timeOffset="13917">23058 1240 23999,'-10'-37'-7519,"7"3"5788,-13 6 234,15 6 1190,-9 5 57,9 7 170,-3 20 861,4 21-2287,0 12 1834,10-4 0,1 2-601,-6 15 232,14-5 1,0 0-424,-15 10 511,11-23 0,-2-1-577,-10 10-147,19-4 140,-19-4 903,20 5-214,-11-13 100,11 5 234,-9-20 220,-2-2-50,-7-10-197,-2-2-7044,0-2 7018,-17 0 1,11 0 0,-12 0 0</inkml:trace>
+  <inkml:trace contextRef="#ctx0" brushRef="#br0" timeOffset="14449">23712 923 23099,'-23'-33'-7571,"5"2"4715,-21 3 3125,-11-6-130,10 11 116,-18-2 39,24 19 0,-1 4 791,-20-2-1011,8 16 0,0 1 2384,-6-7-1076,14 27 0,4 6-325,3-7-753,13 26 1,6 6-513,4-2-238,13 1 1,10-1-590,3-31 1,4-1 74,14 20 0,5-1-107,-7-22 1,1 0 62,15 14 0,-1-1 367,-21-19 0,0-1 540,18 13 1,-3-2 331,-14-5-106,16 10 656,-42-26-796,-34 1 2172,2-6-1363,-4-1 0,-3-1 708,-19 1-58,-9 0-810,32-2 1,-3-1-821,-15 0 1,-1 0 323,14-1 1,0 0 249,-12 0 1,1 0 0,-11 0 0,0 0 0</inkml:trace>
+  <inkml:trace contextRef="#ctx0" brushRef="#br0" timeOffset="14752">23117 625 23549,'0'-15'-5486,"0"1"3358,0 3 1153,0 2 247,0 3 752,0 2-328,0 22-14,0 2-436,0 13 1,0 5 753,0 20-10,6 5 1,4 4-137,-3-21 1,1 1-48,1 17 1,1 1 53,2-16 1,-2-1 69,-9 0 0,0 0-89,9 1 1,0-1 41,-8-1 1,-1 0-35,8 0 1,-1-1 141,-6-2 0,-1 2-657,8 14 0,0 0 68,-6-15 0,0 1 614,2 1 1,2 4 0,-1-6 0,-1-5 0,-1-2 0,2 11 0,0-1 0</inkml:trace>
+  <inkml:trace contextRef="#ctx0" brushRef="#br0" timeOffset="15323">24452 1295 24089,'0'-8'-6386,"-15"3"7007,11 21-1447,-11 17 938,15 11-1041,0 7 381,17-9-272,-13 1 0,14-14 0,0 0 799,-13 13-537,17-12 0,2-2 395,-7-1-952,31 1 1708,-22-20 377,18-3 1159,-17-26 250,7 16-1253,-17-25 1,-4-6 14,9 4-1512,-6-15 1,-2-2 101,-1-5-1358,-5 7 0,-2 1 1427,-3-6 0,2-10 0,-2 25 0</inkml:trace>
+  <inkml:trace contextRef="#ctx0" brushRef="#br0" timeOffset="15734">25252 1477 23639,'-41'-39'-5666,"-4"1"4077,6 20 1779,-4 4 368,15 4-374,-3 7 592,5-7-744,-1 10 58,-4 21 1698,11 8-745,0 28-1097,14-12-651,3 14-131,25-27-987,24 15 1071,2-23 378,-10-13 1,-1-3-350,0 0 790,10-8 754,-20-16 960,-2 12 134,-5-31-602,-4 31 949,-2-38-1966,-7 25-345,2-30-820,-8 22-626,5-7-141,-6 37-286,0 17 902,0 17-724,7-2 1,1 1-82,-4 12 448,12-4 0,4 0-224,9 6 1003,-10-19 1,2-2 546,22 6 1,-8-5 0,1-4 0</inkml:trace>
+  <inkml:trace contextRef="#ctx0" brushRef="#br0" timeOffset="16368">25767 1959 22920,'10'-20'-2201,"1"3"1989,1-21-675,4 6 798,-1-6-189,2-3 328,3-7 35,-4 9 1,2-3-457,-5 9 1,1-2 279,2-6 0,2-6 0,-2 4-146,-1 1 1,-2-3 200,1-1 0,1-9 0,-1 0 0,-1 6-130,0-6 1,-1 0 164,-2 4 1,1-5-1,0 0 1,-3 8-163,-2 1 0,-2 3-76,2-12 0,-2 3-449,-3-5-189,0 11 331,-1 13 6,0 8 70,-16 14 432,13 27 256,-31 10 1482,30 27-1699,-27 0 1016,27 10-871,-8-27 1,-2 2 61,12 20 0,1 3-191,-5-15 1,0 2-76,4 4 0,3 3 1,0-4-190,-2-7 0,2 0-459,4 1 0,4 3 1,-3-5 567,-4-6 0,2-3-813,15 8 0,4 0-277,7 18 178,11-20 673,-15-14 1,-1-3 129,4-6 639,5-1 663,-12-14 569,-4-1 646,9-38-529,-13 16-661,-3-11 1,-4-2-296,-4 4-912,-2-19-392,-1 26-316,0-5-502,0 35-260,0 29 401,20 7 471,-8-4 0,4-1-487,22 5 1115,3 8-186,-10-18 296,1-6 146,1-2 227,14-6 404,-11-3 671,23-7 578,-28-3-763,14-23 1252,-24-10-1291,3-27-671,-16 9-610,-1-5-416,-6 2-301,-1 15-672,0-15 271,0 28-1142,0 20 1054,0 20 435,0 31 383,14-7-1955,4 17 757,0-24 1587,3-9 1,0-1 0,-7 0 0,23 6 0</inkml:trace>
+  <inkml:trace contextRef="#ctx0" brushRef="#br0" timeOffset="16708">27235 1591 23099,'2'-7'-3396,"2"0"3227,2 7 1263,4 0-438,3 0-218,3 0-36,4 0-168,3 0-234,1-3 1307,1 2-389,13-5-477,-11 2-191,7-3 259,-6-7-22,-12 1-365,6-18-496,-15 8-1023,-2-23 245,-3 16 183,-18 0 1,-1 0-1419,9 0-160,-39-13 513,44 31-122,-25 2 1815,24 25 269,-10 17 721,14 9-369,-2 8 1,4 1 113,14 6-715,-5 1 1,2-1-1011,21-5 175,-8-12 0,2-2 1006,10 0 1,-10-15-1,0-1 1,17 2-1</inkml:trace>
+  <inkml:trace contextRef="#ctx0" brushRef="#br0" timeOffset="17038">28137 305 23009,'41'0'1440,"-7"18"-3606,5-13 1974,-15 19 0,0 3-1597,15-2 1525,-6 14 1,-1 4-339,-13-15 0,-2 1 158,7 12 0,-3 3-678,-2 13 1,-3 1 67,-4-10 1,-1 2 730,-2 8 0,0 7 1,-3-5-204,-1-4 1,-2 1 549,0 7 0,0 5 1,-5-6-23,-7-8 1,-4 0 182,3 3 0,-1 6 1,-5-8-205,-8-6 1,-4-3-25,9-7 0,-1 1 0,-2-1 251,-5-3 1,-2-1 0,0-2 0,-6 6 0,0-1-1,3-6 1,0 0 0,0 0 0</inkml:trace>
+  <inkml:trace contextRef="#ctx0" brushRef="#br0" timeOffset="19202">29467 418 23009,'0'-6'-6115,"0"0"4166,0 20 885,18 9 256,-13 13 89,13 6-278,-18-2 925,0 8-1435,0 5 1417,0 6 180,0 4-180,0 1 252,0 2 180,0 0 334,0-1-766,-20-3 412,11-23 0,-1 1 179,-14 15-64,1-13 1,1-2 646,4-1-254,-28 8 770,21-22-265,-2-4 572,3-5-647,0-3-209,1-3 396,2-4-355,-5-3-131,9-3-803,-5-15-1240,14 12 509,1-28-1666,27 27 2149,-15 6-1539,15 18 268,-11 23 0,-4 8-565,10 13 1265,-9-19 0,0 7 0,-1-5 319,1-7 0,-2 0 23,-2 6 0,-3 4 1,0-3-15,2-3 0,-2 0-1185,-9 14 1,-2 1 1491,11-14 0,-3-2 1,-17 2-1,-3 1 1,10 1-1,0 0 1</inkml:trace>
+  <inkml:trace contextRef="#ctx0" brushRef="#br0" timeOffset="20650">2640 14806 22200,'0'-35'-5486,"16"0"6100,-12 3-1309,13 1 1672,-4 1-320,-10 1-799,11 3 844,-3 1-1228,-8 3 1132,8 1-482,-5 4 541,-5 2-1418,5 3 796,-6 3-360,0 1-517,0 20 34,0 20 553,0 15-178,-7 3 1,0 4 245,5-14 1,0 2 132,-2 11 0,-2 6 1,2-4-345,4 0 0,0-1 387,0-6 0,0 3 1,0-3 57,-1 3 1,2-2-194,8 0 1,-1 0-9,-7-3 0,3 0-49,12-4 0,1 0-208,-15-2 1,0-1 83,15-4 0,2 0-263,-7 8 1,1-1-88,20 13 400,-11-17 0,-1-4 162,2-7 107,8-3 709,-14-18 685,0-5 551,-2-16 372,-1 12 283,-3-38-1574,-3 16-646,-4-10 0,-3-4-276,2-14-275,-14 4 1,-1-1-1449,6-9 627,-15 21 0,-4 0-931,-6-18-596,3 18 2302,-3 18 0,2 4 482,7 6 667,-9 30 0,-2 12 854,-1 15-1463,17-5 0,-2 13 0,0 2 0,3-6 249,-5 11 1,1 3-400,6-16 1,-2 9-1,0 2 1,0-1-1,2-7-78,0 2 1,2-6-1,-2 6-551,0-2 1,-1 7-1,0 1 1,-1-1 0,2-6-210,-3 8 0,0-4 0,0 2 543,0-1 1,-1 3 0,-1 0 0,1-4-1,-1 1 1,1-4 0,-1 1 0,-1 1-1,0 1 1,0-1 0</inkml:trace>
+  <inkml:trace contextRef="#ctx0" brushRef="#br0" timeOffset="22972">6298 7023 23819,'-26'10'3040,"2"-7"-3445,1 8 1034,5-2-414,3-7-198,4 14-721,6-9 605,1 7-695,4-2-1149,0 2 129,0 1-325,29 1 905,-6 1-338,31-2 1597,-8-1-353,8-4 1127,8-4 585,3-3-626,-15-1 1,0-4 140,-13-5 1,0-3-190,21 2 1,-2-2 979,0-10-1096,-19 7 0,-4 0 804,-7-4-764,-2 0-89,-19-10-1803,-4 11-275,-17-11-920,-7 7 495,-19 4 585,-1 10 489,0 2 434,19 26 71,-4 6 1515,26 14-2272,-9 19 1069,36-21-1844,-2 14-931,25-18 2644,-3-3 0,5-7 0,4-3 0</inkml:trace>
+  <inkml:trace contextRef="#ctx0" brushRef="#br0" timeOffset="23383">7523 6093 24449,'-30'-43'-7349,"1"5"5010,-6 7 2033,19 15-53,-16 4 1236,24 42-863,1 13 0,1 7-109,3-5 1,1 3-423,0 10 0,2 7 1,2-5 572,6-7 1,1-1-72,-3 7 0,0 4 0,0-5-221,4-7 0,1-1 109,-2 1 1,1 5-1,-1-6-529,-1-8 0,-1-2 333,1 10 0,1-1 10,3-8 1,-2-4-178,-2 13 488,0-15 1,-1-4-229,0-8-297,-2 1 469,-4-42 351,2 0 210,0-25 48,4-19 113,0 9-349,0 5 0,2-1 488,2-9-319,-1 16 0,2 3 394,-1 3-300,6 1-61,-6 25 1008,1 6 509,1 4-711,9 22-1606,-4 13-879,-1-1 1,0 3-90,-5-5 0,-1-1 999,4 5 0,1-1 1,9 16-1,0 1 1</inkml:trace>
+  <inkml:trace contextRef="#ctx0" brushRef="#br0" timeOffset="24922">5757 7403 21750,'20'-3'1629,"-1"1"-866,1-5 341,-5 1-170,11-9-806,-9 4-194,13-16-268,-11 9 283,18-28-466,-18 20-120,9-26-545,-19 25-487,-1-20 74,-7 19-138,-1-19 90,-19 21-77,15-8-57,-31 8 988,13 8-41,-17-3 827,7 15 925,-6 0 193,17 6 571,-5 19 386,11-14 400,2 40-2264,3-21-102,6 11 1,2 3-527,-2 14-233,13-4 0,0 2-1127,-4 11 348,19-21 0,5-2-1833,4 13 3002,1-27 1,3-2 0,-4-1 0,1-1 0,3 0 0,0-1 0</inkml:trace>
+  <inkml:trace contextRef="#ctx0" brushRef="#br0" timeOffset="25484">6800 6960 22650,'-11'-16'-6411,"-5"-3"4848,1 5 1230,-15-3 714,11 10 395,-11 0-62,9 6 200,-3 1-824,-1 17 2170,-11 11-303,7 12-1368,8-7 1,0 2 46,0 14-755,10-4 1,2 1-599,3 8-70,12-19 1,8 0-220,8-3 0,6-4 4,2-5 1,4-3-207,7 1 0,5 0 0,-1-3 284,2-4 0,2-3 966,-5-1 0,3 0 0,-1-3 1,7-3-1,-1-2 0,2 0 0,0 0 1</inkml:trace>
+  <inkml:trace contextRef="#ctx0" brushRef="#br0" timeOffset="26150">8237 6943 24089,'0'-18'-4947,"-19"1"3524,15 2-883,-29-1 3052,29 3-1910,-23 2 1856,24 2-1695,-21 4 599,14 2 1495,-10 22 400,6 12-47,5 11-1616,6-9 1,1 2 779,2 10-1437,24 15 894,-3-31 0,4-4-551,3-5 1,5-3 247,21 8 0,2-3-60,-18-14 1,2-2 470,6-1 0,5 0 0,-4-2 420,-3-1 0,-1-4 281,11-9 0,-1-1 1157,11 6-653,-35-17 0,-2-3-39,17 3-881,-23-9 0,-4-4-502,2-9-415,-8 3 1,-8-1-1349,-31-9-258,8 9 1,-4 1 694,-4 17 1,-4 3-377,-1-5 1,0 2 1558,-22-3 1,-1 10-1,-2 3 1</inkml:trace>
+  <inkml:trace contextRef="#ctx0" brushRef="#br0" timeOffset="27383">10760 5767 24179,'0'-18'-5216,"0"0"3357,0 3 1154,0 0 247,0 4 32,0 0 122,-16 3 872,13 3-2541,-13 1 3054,-3 2 197,3 0 171,-19 2 58,13 18-1133,-2 4-344,16 10-1478,-1-1 1560,9-6 0,0 0 1,0 1-1</inkml:trace>
+  <inkml:trace contextRef="#ctx0" brushRef="#br0" timeOffset="27535">11090 5672 23459,'-53'-19'-2769,"-5"7"2560,11 7 515,0 27 1282,12-1-828,2 24-889,11-9 1,3 1 0,8-5-1,2 1 1,-1 14 0,-1 0 0</inkml:trace>
+  <inkml:trace contextRef="#ctx0" brushRef="#br0" timeOffset="28250">12475 5962 22560,'0'-30'-6026,"-20"2"3201,15 3 1168,-34 3 2210,7-5-744,-7 12 844,-6-3-162,14 15-725,-2 0 1684,0 3 408,-1 17 690,2-13-1279,4 36-214,2 1-800,12 13-571,16-9 1,5 1-1345,14 15 572,0-18 1,3-1 105,-1-10 1,1-1-157,4 0 0,1 0 223,2 1 0,1-1 375,1-1 0,1 0 84,0-2 0,0 0 510,-2-1 0,0-1 220,8 7 1,-1-1 204,-12-9 1,-1 0-31,9 8 0,-6-2-173,-8 0-530,-3-1-235,-18-13 369,-27-6 2101,-16-2-427,-15-5-1377,12 0 1,1-4 353,-14-20-432,8 10 0,1-3 0,20-5 0,3-2 1,-10 2-1,0-1 0</inkml:trace>
+  <inkml:trace contextRef="#ctx0" brushRef="#br0" timeOffset="28502">12187 5667 21570,'17'-4'3163,"8"1"-2876,-13 3-142,5 18-2294,4 10 128,-9 11 1034,-2-6 0,-1 1-413,2 16 837,-7-8 1,1 9 0,-2-5-558,0-5 0,0 1 483,0 14 1,0 8 0,-1-7-214,1-11 1,-1 0 821,0 4 0,1 5 0,1-5 25,0-4 0,0-2-18,1 13 1,0-2-387,1-18 1,0-2-219,1-1 0,-1-1-1139,9 29 1627,1-8 0,4-4 0,2-6 0</inkml:trace>
+  <inkml:trace contextRef="#ctx0" brushRef="#br0" timeOffset="28767">13297 6054 24808,'0'-14'-6115,"0"3"4076,0 27 975,0 16 425,0 17 214,0 9 337,-6-18 1,0 1 113,4-8 0,1 1-799,-5 27 0,0 0 922,2-24 0,1-1-197,2 25 0,0-1-730,-7 5-219,6-14 1,4-3-269,16 2 1087,-13 7 0,29-27 0,-12-4 0</inkml:trace>
+  <inkml:trace contextRef="#ctx0" brushRef="#br0" timeOffset="28966">13643 6296 23459,'-22'-18'-4993,"-16"6"5485,12 5-313,-10 6 958,-6 40-461,18-13-707,5 14 0,4 4-487,2 7 14,3-16 0,2 1 671,7 16-1230,-5 1-520,6-4-846,26-1-687,-20-5 627,46-3 2391,-30-6 1,25-5 0,-10-3 0</inkml:trace>
+  <inkml:trace contextRef="#ctx0" brushRef="#br0" timeOffset="29150">13892 6631 23009,'0'8'-6295,"0"3"4166,23 10 1047,12 12 224,12-12 602,-9-6 1,0 0 98,12 4 328,-14-14 0,1-2 1,15-3-1,2 0 0</inkml:trace>
+  <inkml:trace contextRef="#ctx0" brushRef="#br0" timeOffset="29571">14548 6563 22920,'-16'-17'-6132,"-1"8"5752,-3 16 3341,7 14-2936,30 18-2417,-13-7 1144,32-2 801,-4-4-805,10-14 2261,4 10-870,-11-20-635,-1 6 718,1-8 2575,8 0-403,-12-17-251,2 13-289,-13-31-1539,-6 31 1897,-1-38-2568,-3 10 165,-4-12-947,-1-6-277,-5 24-726,0-3 302,0 16 835,-13 6-526,10 23 1428,-11 22 168,14 12-206,0-4 1,0 1-131,0 18 247,10-20 0,3 3-243,-4 1 0,2-2 8,1-10 0,2 0-432,8 23 0,-2-1-353,-5 6 410,7-16 1,0-1 113,-3 0 165,-7-15 0,-1-1-217,-3-5 425,-1 2 140,-7-16 68,-18-6 2263,-16-2-1116,-11-4-569,-13-1 45,7-17-375,-4 13 1,27-13-1,-1-3 1,-30-5-1</inkml:trace>
+  <inkml:trace contextRef="#ctx0" brushRef="#br0" timeOffset="30674">16977 6398 23999,'-21'-24'-5781,"-3"-5"3767,12 10 758,-2-1 742,12 12-459,21 24 1506,5 29-706,-1-21 0,0 1-831,-10 9 0,0 0 426,22 14 453,-31 5 337,10 1-369,-14 3 744,0 0-838,-23-1 745,4-15 1,-3-1-167,-2-9 1,-4-1-954,-13 18 0,0-1 918,17-20 0,0-3 1,-7 6-1,0-2 0,-6 6 1</inkml:trace>
+  <inkml:trace contextRef="#ctx0" brushRef="#br0" timeOffset="31120">18495 5772 24359,'-38'-44'-6770,"17"14"3928,-26-15 2121,28 25 208,-36-1 1319,28 14 159,-14 4-4,23 21-975,0 14 1066,14 10-576,22 9-887,-2-16 1,4-1 225,1-6 1,2 1-307,15 21 1,0 2-181,-14-22 0,0 0-117,8 8 0,1 1-62,-5-4 1,-1-2-266,11 14 883,-16-11 0,-1-2 558,2-2-118,-11 12-538,-2-24-92,-10 3 642,-23-8 1781,17-4-949,-46 1 606,6 0 34,-13-3-1366,14-5 1,2-1-1,-8-1 1,18-2 0,-1 0-1</inkml:trace>
+  <inkml:trace contextRef="#ctx0" brushRef="#br0" timeOffset="31400">18337 5369 23459,'0'-4'-4406,"0"22"2367,0 11 1155,0 13 335,18 6-837,-13-5 979,13 7-288,-3 5-1413,-11 7 1943,8-29 1,2 2-74,-5 20 0,-3 3 159,1-12 0,0 1-35,3 7 0,1 6 0,-2-5 309,-4-2 1,-1 0-212,4 5 1,2 5 0,-1-5-293,-5-4 0,0-2 69,0-8 1,-1 1 0,0 0-983,-2 19 0,0-4 1285,0-14 0,0-1 1,-1 12-1,0-1 1,1-20-1,0 0 0</inkml:trace>
+  <inkml:trace contextRef="#ctx0" brushRef="#br0" timeOffset="32005">19460 5777 23909,'-7'-9'-7082,"2"4"5270,-1 2 2699,4 21-1478,-1 16 151,23 11-604,-14 12 848,35-7-655,-26-10 0,-1 0 724,5-9 0,1 0 236,8 18 0,-2 0-1103,8 3 1097,-4-15 0,1-3-127,3-4 911,12 1-343,-17-23 1010,2-5 348,-3-3 119,12-38-64,-13 11-1705,-4-15 1,-4-4-775,2-7 563,-6-8 0,-1-1 1,-3-1-1,-5 14 1,1 0-1</inkml:trace>
+  <inkml:trace contextRef="#ctx0" brushRef="#br0" timeOffset="32416">20647 6101 23999,'-19'-24'-6379,"15"-15"3924,-36 34 4426,35-32-3308,-41 32 2596,24-25-2188,-40 27 1952,22-7-1118,7 16 0,0 4 2551,-4-6-1215,10 24 1,3 7-1407,0-3 772,12 3 0,4 3-1583,2 9 1432,6-1-1967,0-2 15,25 9-1347,13-17 1877,-3-11 0,2-5 296,25-6 841,-19-6 1,-2-3 753,7-5 333,11-22 1136,-27 16-465,-3-42-280,-7 28 227,1-41-1176,-12 23-905,1-26-668,-11 30-871,1-13-377,-2 25-78,0 28 530,0 8-973,0 30 782,0-6 54,0 6 348,23 5 1341,-17 2 0,15-25 1,3-1-1,4 23 0</inkml:trace>
+  <inkml:trace contextRef="#ctx0" brushRef="#br0" timeOffset="33067">21305 6647 23549,'6'-20'-3514,"3"15"6231,0-36-4656,4 22 2038,1-23-771,5 3 417,2-5 94,5-6-128,-5 10 1,-1-2 446,-4 10 1,1-2-786,10-26 1,0 0 829,-11 23 0,0 0-375,-1-4 0,0-4 1,-1 3 184,-2 4 1,-2 0-110,2-10 0,-3-3 16,-4 0 0,-2 3-184,0 11 0,-2 1-113,-8-24 0,-2 1-579,5-2 218,-13 13 1,-4 3-487,3 11 98,-20-3 698,23 52 1776,-10 31-515,12 12-556,1-3 0,1 3 91,4-18 0,1 2-164,2 17 0,2 9 1,0-6 81,1-10 1,2 0-317,5 11 1,3 7-1,3-9-431,3-16 1,5-2-520,1 1 0,4 4 0,0-6 134,4-7 0,2-3 364,12 15 0,1-5 135,11-7 511,-19-17 0,1-4 682,28-7 694,-18-4-236,-13-20 0,-2-4 1446,-4-4-1430,-10-11 0,-3-3-191,-5-2-864,-6 5 1,-1 0-662,-2-3-463,-1-8-604,0 17-463,-18 15 412,14-4-108,-14 36 2413,18 5-1161,17 17-376,-13 4 426,32-9 428,-32 0-281,39-4 105,-23-3 237,34-5-882,-22-2 1246,22-11 1401,-27-2-664,7-7 218,-15-22 118,-5 16 326,-3-40-1108,-2 9-1149,-5-11 241,-1-17-1085,-3 27 2,0-5-520,0 19 435,0 7-1165,0 29 1674,0 2-505,0 30-819,0 16 988,20-10 955,-19-15 1,3-1-1,40 13 1,-13 0-1</inkml:trace>
+  <inkml:trace contextRef="#ctx0" brushRef="#br0" timeOffset="33400">22952 6419 23909,'0'-25'-6386,"0"3"4258,0-2 1244,0 0 245,0-11 213,0 8 32,16-18 856,-12 20-1660,30-16 2464,-8 18 470,10-8-34,0 13 520,-11-2-346,-1 2 81,5-11-990,-9 5 527,7-21-1531,-19 16-904,0-37-431,-26 35-1231,14-19 645,-34 32 946,33 5-1234,-38 6 2195,16 3 423,-13 25 1237,0 13-1100,26 11 0,6 5-57,-3-15 0,4 1-656,12 28 1,4-1-1747,-4-1 897,29-8 1,5-2-1446,-5 2 2317,6-19 1,3-4 0,11 5 0,-24-19 0,-1-1 0</inkml:trace>
+  <inkml:trace contextRef="#ctx0" brushRef="#br0" timeOffset="33772">23868 4910 22200,'0'-3'-5846,"14"0"9032,2 2-2116,1 20-3116,6-14 2265,-20 37-1586,16-20 398,-17 41-691,6-19 1554,-7-6 0,-2 0-1815,1 6 993,0-10 1,0-2 685,0 1-1593,0 4 1514,0-17-147,-13-11 2215,2-19-1548,-4-17-963,7-24 743,8 8 0,0-3 1,0 12-1</inkml:trace>
+  <inkml:trace contextRef="#ctx0" brushRef="#br0" timeOffset="33873">24143 4910 21121,'22'17'-4943,"6"14"2311,-9 10 1209,-6-5 1,-1 1 1228,-2 15 0,-4-16 0,-2 0 0,-1 18 1</inkml:trace>
+  <inkml:trace contextRef="#ctx0" brushRef="#br0" timeOffset="34364">25198 5632 26428,'-17'-14'-3685,"3"1"1494,3 3 1030,9 0-562,-9 3 1809,11 0-749,0 4 589,0 0 1,0 2-1,0 0 1</inkml:trace>
+  <inkml:trace contextRef="#ctx0" brushRef="#br0" timeOffset="34600">25380 6297 23369,'0'21'-5306,"0"1"3537,0 0 1335,0 11 65,0-6 123,21 10-324,-3 3-127,6-10-901,1 19 1129,-22-21 277,8 16-294,-11-18 486,-19 7 717,-29 6 615,-11-9-1700,19-13 0,-6 2 1,2-2 652,-3-2 1,0-1 0,2-2 0,-2 0 0,2-1 0,-7-1 0,1 0 0</inkml:trace>
+  <inkml:trace contextRef="#ctx0" brushRef="#br0" timeOffset="36284">9468 10187 23549,'17'-6'3324,"6"3"-3242,-12 18-4398,5-11 3977,-1 30-2296,-3-19 1339,2 17-131,-1-4-893,1 2-541,-1 5 389,1 5 2080,-2 6-2412,-1 4 2051,-4-10 0,-2 1-147,1 25 1021,-2-22 0,-1-1 1,-3 18-1,0-1 1</inkml:trace>
+  <inkml:trace contextRef="#ctx0" brushRef="#br0" timeOffset="36704">10013 10073 23999,'5'-33'-5071,"-1"-1"3380,-2 11 1456,-1 4-224,-1 29-172,0 23 180,0 11 343,-1-1 0,2 2-822,8-13 0,1 1 642,-9 29 1,2 1 14,14-23 0,-1-1 27,-13 13 1,-2 0-31,12-14 0,-1-3 132,-10 1 0,-1-1-418,9-1 1,1 2-835,-4 11 1,-1 0 978,0-12 0,1 0 404,4 18 0,-2-1 0,-7 1 0,8 11 0</inkml:trace>
+  <inkml:trace contextRef="#ctx0" brushRef="#br0" timeOffset="37032">9538 10677 23189,'-37'-20'-3645,"-1"2"2509,7 4 749,3 3 424,2 3 322,10 4-209,4 23 3,9 1-1091,20 43-191,-13-15 562,14-13 1,0 1-602,-14 22 537,17-28 1,2-1-360,-1 31 455,7-20 0,4 0 66,-12-10 0,1 0 529,14 17 0,3-2 621,8 2-186,-7-12 1,1-4 499,11-5-273,-20-11 1,3-5 15,3-12 1,0-7 1823,22-11-1287,-5-10 0,-1-6-249,-21 9 1,-1-4-526,5-7 1,3-6 0,-5 2-92,-5 0 0,-1-2-829,2-8 0,2-5 0,-5 4-207,-4 2 0,-3 1-99,-4 6 0,0-2 0,-1 3 518,-1-2 0,-2 1 1,-1 3-1,-1 0 1,0 1-1,0 0 1</inkml:trace>
+  <inkml:trace contextRef="#ctx0" brushRef="#br0" timeOffset="38646">12133 12189 20941,'0'-12'-2337,"0"1"1,0 3-1</inkml:trace>
+  <inkml:trace contextRef="#ctx0" brushRef="#br0" timeOffset="39017">12203 12109 23819,'0'-9'-6206,"0"4"3988,0 1 1154,0 24 425,-14 6 1527,10 15-1175,-11 1-975,0 12-714,11-11 2030,-10 13 1,14-21-1,0-3 1</inkml:trace>
+  <inkml:trace contextRef="#ctx0" brushRef="#br0" timeOffset="39167">12418 12196 23369,'0'-21'-6295,"0"2"4166,0 5 1065,-16 6 1563,-4 28 1007,-12 21-1889,13 16-304,13-23 1,1 2 406,-3 24 0,6 5 0,-2-31 1,0-1-1</inkml:trace>
+  <inkml:trace contextRef="#ctx0" brushRef="#br0" timeOffset="39617">12957 12544 23549,'-15'13'163,"3"10"-1948,12 14-890,0 3 1016,15-4-373,-11 2 1070,10 1-120,0 3-1149,-10-2 445,10 1 194,-5 8 1335,-7-14 223,7 10 618,-9-26-396,0-2 517,4-35 388,6-29-511,2-6-59,1 8 1,1 2 515,4-4-604,-5 16 1,2 1 1023,16-16-107,-7 17 254,17-1-238,-20 22 576,16 3-480,-18 29-2303,15 7 223,-16 16-1020,6 0-111,-9-7-205,-2 2-746,0 1-2121,7 20 1372,-1-16 1700,6 11 1656,-2-25 0,3-6 0,4-4 0</inkml:trace>
+  <inkml:trace contextRef="#ctx0" brushRef="#br0" timeOffset="40003">13992 12833 24449,'2'-30'-4919,"-1"1"3441,-1-5 267,-21 12 528,0-6 3,-5 19 1328,-6 2 162,10 5-924,1 22 1597,-11 8 191,17 9-856,-8 19-59,10-21 39,7 26-1529,6-27-533,21 8-790,-16-18-49,34-3 1040,-35-5-296,34-4 1555,-14-6 392,16-3 672,-10-24 702,0-10 97,-20-10-1078,10-2-493,-15 10 627,6-1-1196,-5 2-581,-3-4-596,0 12-493,0-3 566,-2 19 957,10 23-948,-2 12-710,14 27-322,-8-12-775,13 16 1312,-11-25 189,5 8-164,-8-17 1527,0-3 1,0-5-1,0-2 1</inkml:trace>
+  <inkml:trace contextRef="#ctx0" brushRef="#br0" timeOffset="40385">14332 12846 23459,'1'-31'-5244,"2"3"3659,0 5 819,-1 5 700,-1 2-434,-1 26 34,0 29 117,17 4-624,-15-3 0,1-1 620,28 5-135,-28 12 293,11-20-742,-3-4 179,-8-3 569,15 0-101,-16-10 444,9-2-375,-7-12 436,3-3 866,1-21 248,2 15 1539,0-40-2138,6 20 725,0-25-543,5 5-243,-5 12 0,-1-2 156,10-17-769,-4 11 1,-1 1 320,2-1-1315,4-4 1684,-13 24-749,-2 9 1004,-3 6 47,2 5-227,-3 0-122,8 20-1900,-7 9-223,9 27-360,-8-7-115,3 1-814,-3-12-463,-1-1 360,2-4-366,7 10 2025,-2-14 1292,13 8 0,-10-25 0,5-2 0</inkml:trace>
+  <inkml:trace contextRef="#ctx0" brushRef="#br0" timeOffset="40733">15053 12889 23549,'6'-15'-3004,"1"-4"1597,-2 17 3891,3-4-1669,3 20-2933,13 3 1419,0 1 22,11 11-592,-5-25 1872,5 27-566,2-23 1,3-3-877,13 12 522,-1-10 1,0-4 2000,-1-3-1124,-12 1 1,-1-2 782,3-20 591,4 16-1451,-22-35 2,-7 23-436,-3-19-481,-8-7-718,-1 10 169,-25-24-1396,16 26 66,-35-16 320,11 26 1413,4-1-711,-20 14 1981,22 5 449,-15 25 580,12 12 326,13 16-1318,8 4-792,11-7 1,7 1-836,1-18 0,3 1-220,2 9 0,3 4 0,2-7 962,6-8 1,2-4 0,5 10 0,1-2 0,-8-13 0,1 1 0</inkml:trace>
+  <inkml:trace contextRef="#ctx0" brushRef="#br0" timeOffset="41105">16647 12938 24808,'50'-20'3830,"-1"3"-2672,0 7-1269,-10 5-82,12 4-105,-6 20-978,-12 9 310,-14 3 1,-4 3-1198,-3 26 525,-5-8 1,-8 2 160,-12-18 0,-6 3 1362,0 15 1,-2 8 0,-3-6 0,-8-10-1,-2-1 1,7 3 0,0-1 0,0 1-1</inkml:trace>
+  <inkml:trace contextRef="#ctx0" brushRef="#br0" timeOffset="43749">22815 11143 23549,'11'-3'2762,"3"0"-2459,0 21-4398,7-14 3820,-8 45-2190,5-28 1543,-7 11 1,-2 2-369,1 2-1318,-1 16-1120,-2-3 970,-5-14 1665,1 15 776,-3-30 0,0-1 0,0-15 0</inkml:trace>
+  <inkml:trace contextRef="#ctx0" brushRef="#br0" timeOffset="43871">22957 11414 22740,'18'-37'-1417,"-13"0"-999,30 2 3732,-31 2-2100,28 5 2000,-28 5-1824,25 11 2078,-14-1-1395,10 29-490,-2 18-513,-8 17-1482,-8 0 1,-3 3 2366,-2-15 1,0 1 0,-1 17-1,-1 1 1,0-14 0,0 1 0</inkml:trace>
+  <inkml:trace contextRef="#ctx0" brushRef="#br1" timeOffset="56873">18435 12598 8702,'0'-17'1349,"0"1"-1259,0 2 90,-19 0 90,14 2-90,-48 0-90,35 6-90,-41 1 0,30 26 0,-9-16 0,19 22 0,2 5 0,-7-8 90,8 11 0,4 2-90,3 1-90,2 25 90,32-29 0,12 18-90,14-28 90,4 3 0,11-18 0,-16-4 0,-8-2 0,-1-6-90,3-19 135,-11 10 0,-3-4-45,-1-23 90,4-13 0,-24 21 90,-1-12 179,-8 4 1,0 10-270,-19-10-90,14 23 0,-27-2 90,28 29-180,-9 9-270,13 14-1349,18 18 630,-14-16-961,31 13 780,-20-13 1260,16-1 0,-3-1 0,1 0 0</inkml:trace>
+  <inkml:trace contextRef="#ctx0" brushRef="#br1" timeOffset="57300">19538 12604 8882,'4'-35'1619,"-1"2"-1169,-3 4-360,0 5 180,0 2-181,-23 5 1,17 3 0,-34 3-90,15 5 0,-22 3 90,8 21-90,-11 9 0,22 10 0,6-10 0,2 1 0,0 7 0,10 2 0,2 1 0,2-2-90,24 28 90,6-39-90,24 8 90,-8-21-505,0 1 594,-11-11-339,-1-1 160,-1-1 180,6-21-90,-9 16 0,8-35 90,-18 15 540,1-18-630,-9 10-90,-3 0 90,-2 17 90,-1 21-270,0 15-270,18 15-179,-13 5 762,29-7-2562,-5 19 1170,10-12 1013,-16-15 1,1 0 0,17 8 0,3-3 0</inkml:trace>
+  <inkml:trace contextRef="#ctx0" brushRef="#br1" timeOffset="57684">20798 12498 8432,'-27'-27'1259,"-18"4"-809,25 7-270,-19 5 0,6 6-90,-1 3-90,0 2 90,3 17 0,2 5 0,-5 2-2216,7 12 0,3 2 2126,9 1 0,6 15 796,4-17-796,5-1 0,19-2 0,-14-4 0,37-1-90,-36-6 90,24-9 0,5-4 0,-10 4 0,11-7 0,2-3 0,-3-1 0,7-19 0,-18 12 0,-3-30 90,-5 30 360,-2-50 90,-4 34-271,-3-37-269,-3 34 90,-3-6-809,-1 39 2730,0 10-4979,18 37 2968,3-6 0,2 5 0,-7-13 0</inkml:trace>
+  <inkml:trace contextRef="#ctx0" brushRef="#br1" timeOffset="58733">10413 14579 8612,'0'-8'900,"-14"1"-631,10 2 361,-11 2-540,15 22-90,0 9 0,0 16 0,21 5-263,-16-2 308,13-8 0,2 3-495,-7-9 1,0 2-241,2 5 1,2 4-1,0-4-335,5-1 1,-2-1 394,2 11 1,-1-1 629,-5-15 0,-1-2 0,15 27 0,0-4 0</inkml:trace>
+  <inkml:trace contextRef="#ctx0" brushRef="#br1" timeOffset="59000">10970 14638 8702,'-18'-24'540,"-10"4"-270,11 3 269,-1 8-539,-2 2 0,17 30 0,-5 12 180,8 15-1921,0-10 0,0 0 1741,0 17 0,7-4 0,2 3-686,-1-21 1,1-1 685,0 11 0,1 1-1071,3 1 0,-1-1 711,-4-12 1,-1 1-900,0 21 1,1 0 1258,9 5 0,-16-24 0,-1-1 0,5 11 0</inkml:trace>
+  <inkml:trace contextRef="#ctx0" brushRef="#br1" timeOffset="59305">10150 15122 7982,'-24'-17'0,"4"5"270,4 3 90,7 5 0,3 19 0,3 19-360,3 11-503,23 14 683,-17-7-45,22-10 0,4 1-45,-20-10 0,1 0 120,10 5 0,7 2 0,-2-4-120,-3-4 0,1-1 59,6 1 1,4 3 0,-1-5-1270,0-5 1,0-3 1164,12 7 0,5-4-45,5-7 0,0-5-224,-13-4 1,3-2 193,3 0 0,6-1 0,-5-5-15,-5-10 0,-2-4-105,5 2 0,4-2 1,-7-4-121,-5-7 0,-2-7-225,-5-1 0,5-5 1,-2-2-1,-6 3 90,3-8 1,-5-3 223,-4 1 0,1-7 0,-1-1 0,-6 5 0,-2-6 0,-4 2 0,-4 4 0,1 1 0,0-1 0</inkml:trace>
+  <inkml:trace contextRef="#ctx0" brushRef="#br1" timeOffset="60285">13257 16114 9691,'-27'-24'1080,"6"1"-900,-25 4-180,13 3 0,-2 4 0,3 5 0,1 4 90,2 3-90,0 21 0,4-2 90,2 23 0,1 18-180,11-9-373,3-5 1,6 0 462,23 9 0,-5-11 0,4-2 0,27 1-90,-20-16 0,2-2 0,5-7 0,2-4-180,20 1 135,-7-5 0,0-4 45,9-6 45,-12-6 1,-1-5 44,2-19 44,-8-4 1,-5-5-45,-6-16 45,-9 10 0,-4 0 45,-9 1 180,-5 9 0,-1 1-360,0-2 355,-19-11-86,15 29-89,-15 18-180,19 26 90,0 11 0,0 11-1108,0-7 208,14 4-179,-10-1-91,28 2-449,-17-4 1619,19-1 0,-5-4 0,3-3 0</inkml:trace>
+  <inkml:trace contextRef="#ctx0" brushRef="#br1" timeOffset="60983">14380 16229 8972,'-31'-10'719,"-17"4"-359,15 2 0,-11 4-360,2 0 90,15 24 90,-6 2-180,7 25 0,5-15 90,11-1-90,10-13-90,25 6 90,-19-9 0,26-4 0,4-5-90,-9-2 90,35-1 0,-28-7 0,-2 0 0,-3-16 90,-3 12-180,-5-31 180,0 31-90,-4-48 180,-6 30 539,0-41-449,-11 32-270,3-7 0,-3 16-90,0 5 180,0 3-90,-16 8 0,12 26 90,-12 1-90,14 11 0,4 3 0,-2 12-721,0-13 1,0 1 720,0 17 0,17 3-28,-12-1 28,3-16 0,2 0 0,2 17-45,-11-9 1,0-2-136,11 3-135,-19-11 0,-3-2-45,6-1-90,-33 3-269,8-18 179,-11-9 0,-10-20 451,21 6-46,10-25 0,4-6 135,3 2 0,3-15 0,9-3-90,24-5 135,4 0 0,5 2-234,-5 27 0,4 3 219,3-4 0,3-2 0,-2 6-30,22-5 0,-7 12 0,2 2-124,8 1 124,-22 7 0,0 1 0,13 0-776,-3 0 776,-4 0-448,13-3 808,-20 0 360,19-10-450,-34 5 271,4-6-91,-15 4 1038,-6 1-1038,-1-2 0,-4-6-270,-1 7 633,-18-7-813,14 14 810,-14 1-900,2 6 260,12 17-170,-13 14 0,17 9-1349,0 27 270,17-21-495,0-6 0,5 0 1267,25 4 1,-17-16-1,1-2 1,19 6-1</inkml:trace>
+  <inkml:trace contextRef="#ctx0" brushRef="#br1" timeOffset="61533">12312 15197 8072,'-11'-6'540,"-1"2"-450,6 2 0,0 18-90,4 11 90,0 26-180,1-5 180,1 5-90,0 5-720,0-15-449,-2-8 0,4-1 1169,18 1 0,-15 8 0,15-19 0</inkml:trace>
+  <inkml:trace contextRef="#ctx0" brushRef="#br1" timeOffset="61683">12553 15299 7623,'-18'49'90,"-10"-7"-90,25 10-2391,-9-5 1402,4 4 989,6 4 0,-5 2 0,7 0 0</inkml:trace>
+  <inkml:trace contextRef="#ctx0" brushRef="#br1" timeOffset="62273">16105 15873 10231,'21'23'990,"-16"12"-900,34-11-90,-34 8 0,25 3 0,-27-6 0,9 0-90,-3 6-90,-7 18-990,7-8-732,-9 14 282,0-16 1620,0-2 0,-18 0 0,-4-2 0</inkml:trace>
+  <inkml:trace contextRef="#ctx0" brushRef="#br1" timeOffset="62702">17098 15512 9602,'8'-17'359,"4"0"91,22-2-360,-4 6 90,34 0-180,-23 8 90,23 22 0,-30-13-135,-13 25 0,-4 5 135,-5-2-135,-15 26 0,-5 4-135,2 0-1366,-11-23 1,-8 3 0,4-4 1185,-3 14 90,-7-12 1,0-2 1143,13-3-874,0 5-90,18-21 793,0-4-703,25-4 0,13 2 90,13-4 0,-15-2 0,0 0 90,7 2 629,20 6-359,-43-5-270,13 4-90,-31-6 2149,8 2-2149,-10 0-90,-40 8-90,10-2 45,-15-1 0,-4-1-405,-9 5-1799,-4-2 1,1-1 1987,6 0 0,13-6 1,3-2-1,13-4 1</inkml:trace>
+  <inkml:trace contextRef="#ctx0" brushRef="#br1" timeOffset="63017">18145 15717 10231,'0'-10'1619,"0"3"-1259,-22 3-180,1 46-90,-21-16-803,31 6 1,3 1 712,-19 5 0,24 2 446,-8 2-446,30 13 0,-14-16 0,30-8 0,7-4-318,-2-2 318,17-9 0,5-4 45,-28-8 0,0-1-90,25 2 0,0-6-319,-24-11 1,-1 0 318,8 11 0,0-4 45,-8-26 0,-3-3 0,8 6 0,-16-12 0,-5-5 845,-7-5-935,-22 7 0,-8 0-359,-9-12-1,0 22 0,-6 1-1034,-3 3 0,-1 4-299,9 8 0,-2 1 1783,-10-5 0,0 5 0,-15 4 0,1 4 0</inkml:trace>
+  <inkml:trace contextRef="#ctx0" brushRef="#br1" timeOffset="63334">19287 14939 10501,'0'-5'270,"0"20"-270,18 11 0,-13 11-90,13 3 0,-5-7-360,-10 2-1619,10 14 990,-13-12 1079,0 18 0,0-28 0,0 5 0</inkml:trace>
+  <inkml:trace contextRef="#ctx0" brushRef="#br1" timeOffset="63471">19583 15062 9512,'26'-10'629,"-1"1"-629,-4 9 0,-2 0 90,-4 18-90,-3 1 0,-5 21-270,-3 2-1169,-4 9 1439,-11-7 0,0 3 0,8-10 0,1 1 0,-9 14 0,0-1 0</inkml:trace>
+  <inkml:trace contextRef="#ctx0" brushRef="#br1" timeOffset="63669">19915 16175 11760,'3'10'-1140,"-1"-1"1,0-9 0</inkml:trace>
+  <inkml:trace contextRef="#ctx0" brushRef="#br0" timeOffset="78783">23977 8460 23369,'-18'43'-1080,"4"-2"172,2 17-205,1 2 830,0-24 1,-1 2 167,2 5 1,0 2-1,-2 5 1,-1 2 38,0 7 0,-1 3-249,4-17 0,-1 0 0,0 3 243,0 3 0,-1 2 1,0 1 9,-1 4 1,0 2 0,0 0 136,0 3 0,-1 2 1,0 0-71,3-13 0,-1 1 0,0 0 0,1 0-24,-1 2 0,0 1 1,0 0-1,0 0 46,-1 2 0,0-2 0,0 3 0,0 4-23,0-6 0,0 4 0,0 3 1,-1 0-1,1-1 0,1-4 16,-1 0 1,1-3 0,1 0-1,-1 0 1,0 4-18,-1 1 0,0 4 0,0 2 0,0-1 1,0-2-1,1-3-3,1-5 1,0-2 0,1-2 0,0 0 0,1 0-6,-1 2 1,1-1 0,-1 1 0,1-1 0,0 0 16,-2 11 1,-1-1 0,1 2 0,0 3-23,1-8 0,1 4 0,-1 2 0,1 0 0,-1-1 0,1-4-26,1-3 0,0-3 0,0-1 0,0 2 0,-1 4 41,1-4 0,-1 3 0,0 4 0,0 1 0,-1 0 0,1-1 0,1-4 0,0-4-20,-1 5 0,2-5 0,-1-2 0,0 0 0,0 4 10,-1 0 1,0 3 0,-1 1 0,1-1-1,-1-1 1,1-3-1,-2 10 0,1-3 0,0-2 0,-1 0 42,0-1 1,-1 1-1,1-1 1,-1 0-39,-1 1 1,1 0 0,-1 0 0,1 0 42,-1-3 1,0 1 0,-1-1-1,1 0 11,-1-1 0,1 0 0,-1-1 1,0 1 8,0-3 0,0 0 0,0 0 0,-1 3 0,-1 0 0,-1 4 0,-1 0 1,0-1-1,1-3-4,1-3 1,0-3 0,-1 0 0,0 4-655,-3 6 1,-2 5 0,0 1 0,0-3 0,3-7-196,0-3 0,2-6 1,-1 1 836,-3 10 1,-1 1 0,3-7-1,3-10 1,2-4 0,1-4-1,0 0 1</inkml:trace>
+  <inkml:trace contextRef="#ctx0" brushRef="#br0" timeOffset="79433">25048 9469 22110,'0'-31'-6296,"0"-22"4258,22 9 2394,-11 2 1,1-2-367,14-12 195,-7 5 1,-2 0-113,-6 18 1,0 2-4,0-10 1,1-1-518,3 2 0,-3 1 1409,-9-17-837,2 14 0,0 1-599,-5 4-130,0-8-80,-19 54 2290,14 3-1425,-33 36 75,25-9 0,2 4-293,0-7 0,-1 2 223,-4 9 0,-2 5 1,5-2-321,10-1 0,-1 1 92,-7-6 0,-4 2 0,4-2-46,9 5 0,1-2-1267,-7 2 1,0 0 709,7 0 1,0 1 518,-5-1 0,0-1 1,4 0-1,0 0 0,-3-2 1,0 1-1</inkml:trace>
+  <inkml:trace contextRef="#ctx0" brushRef="#br0" timeOffset="79883">24745 10104 21840,'0'-39'-6385,"0"-5"4166,27-1 2703,-9 7 1,4 0-13,5 9 1,4 0-165,-2-4 1,2-4-1,0 3 43,0 4 0,2 0-201,5-3 0,4-2 0,-3 4-188,-1 3 0,0 1 522,4-1 0,4-3 0,-4 4 504,-4 4 0,0 1-465,9-7 0,1 0-146,-5 2 1,-3 1 44,-11 6 0,0 0-49,12-14 1,-3 0-321,-4-4 49,-14 7 1,-4-1-995,-6-3-263,-3-8-347,-7 19-487,0 2-39,-22 5 564,0 2 197,-23 7 1374,24 19 1048,-18-7 191,25 40-972,-16-18 1202,18 27-1150,-6-6 70,15 2-681,-7 3-719,10-2-255,6-16 1,6-1-1235,26 17 2024,-4-14 1,3-3-233,-3-15 0,2-3 831,15 4 0,1-4 77,11-5 256,-22-5 1,0-5 209,-5-10 1,-3-4 1698,15-6-1142,-16-9 1,-4-5 136,-6-9-1331,-11 2 0,-3-2-682,-5-11-59,-15 7 1,-3 1-1675,8-7 713,-16 20 0,-4 0-2685,-1-17 3717,0 16 1,-10-3-1,20 19 1</inkml:trace>
+  <inkml:trace contextRef="#ctx0" brushRef="#br0" timeOffset="80202">26443 8847 22110,'0'9'-5936,"0"13"3808,0 20 1153,0 7 247,15-7-586,-11 1 1120,3-10 0,1 0-463,5 16-1373,-10 13 2105,21-10-177,-21-16 1129,12 11-1647,-8-29 611,4 0-212,-2-14 1547,4-36-127,-2 6-315,5-33-297,-5 22 1,-1 1-76,8-25-654,-3 7 1,0-1 340,-6 23 1,1 0 46,8-17 1,1 2 0,5 0 0,10-8 0</inkml:trace>
+  <inkml:trace contextRef="#ctx0" brushRef="#br0" timeOffset="80716">27098 8976 21390,'31'14'-2882,"18"-10"3822,-29 10-2595,24-2 1991,-9-9 349,3 9-547,19-12 358,-13 0-406,-7 0 0,0 0 855,3 0-802,21-18 1711,-33-1-1020,4-3-455,-19-7-633,-6 10-654,-3-12-456,-28 13 122,-9-2 149,-14 18 677,13-4 1,1 4-63,-9 17 834,-16-12 529,21 31 144,5-16 837,4 17-920,7 10-606,10-10-2228,4 29-611,28-27 1915,-16 11 1,50-19 0,-12-1 0</inkml:trace>
+  <inkml:trace contextRef="#ctx0" brushRef="#br0" timeOffset="81099">28083 8941 22650,'-27'-16'-4001,"-12"3"3968,14 6 95,-11 4 730,1 3 112,9 18-45,-12 12-384,12 10-732,9-9 0,1 0 706,5 9-744,7-4 1,1 0-629,3 4-503,28 12-588,-21-20 981,22-17 0,4-2 113,-6 11 658,12-13 1,4-5 488,8 4 228,-6-5 0,1-5 1016,3-18-379,-11 4 1,-3-3 1596,-2-23-1029,5-6-1255,-23-7-535,-6 10-326,-7 8 0,-1 0-880,-1-4-279,-20-14-1388,14 29 492,-27 4 1699,30 38-195,-10 16 832,20-2 1,3 2-872,-5 20-188,20-17 0,4-2 53,-2 4 1383,2-13 0,2-3 0,12 3 0,1-2 1</inkml:trace>
+  <inkml:trace contextRef="#ctx0" brushRef="#br0" timeOffset="81299">28942 8968 22470,'-17'-32'-8123,"-1"-4"5213,-2 12 2985,-10 1 415,15 39 1352,-4 0-237,8 26-1660,11-6-1541,0 5 2233,0 3-161,0 19-360,24-16-1546,-2-5 1,4-3-1406,24-7 2663,-19-11 0,0-3 0,6-12 0,2-6 1</inkml:trace>
+  <inkml:trace contextRef="#ctx0" brushRef="#br0" timeOffset="81671">29357 8533 22560,'0'-59'-5576,"0"3"4951,1 20 1,-2 2 751,-12-2-1436,10 17 1097,-10 61 1019,13 20-790,-1-22 0,2 1-913,6-4 1,0 0 824,-5 2 1,0 2-4,5 0 0,0 2 78,-6 18 1,-2 0 336,1-16 1,0 1-234,2 1 1,2 3-1,-2-5-426,-1-7 0,0-1 231,9 17 1,1-2-216,-3-3 320,10 6-431,-8-32-67,0-6-110,3-9 1131,11-4 831,1-33-461,1 9 1,1-3-4,-8-6 0,0-4-188,16-17 1,2 0 187,-15 17 1,-1-1-42,8-12 1,-1 1-103,-11 15 0,-1 1-223,15-23-816,-5 6-389,1 4 368,-8 20 568,-3 4-128,-11 47-2087,-2 18-556,-3 18 1107,-11-28 1,-3 2 1354,0 9 0,-3 0 1,-5-9-1,-2 1 0,3 13 1,-1 0-1</inkml:trace>
+  <inkml:trace contextRef="#ctx0" brushRef="#br0" timeOffset="82484">24715 11125 22650,'-33'0'90,"-21"0"179,10 0-38,3 10 0,0 1 411,-7-6-209,9 25 0,2 4-712,0-5 116,13 13 1,6 3-770,5 3 154,20-6 1,8 0-2307,15 5 1625,-1-17 0,4-4 1281,-3-10 1,0-2 0,4-3 0,1-2 0,3-1 0,0 0 0</inkml:trace>
+  <inkml:trace contextRef="#ctx0" brushRef="#br0" timeOffset="82784">25342 11301 22380,'0'-16'-6296,"-29"6"6837,5-4-1117,-26 12 1851,14-5-918,-3 7 353,2 0-178,-2 17 151,4-13 1144,-9 44-1347,16-27-37,8 10 1,5 3-1127,5 2 116,1 13-676,9-13-354,0-2-682,26 1 246,8 4 515,15-11 1155,-15-11 1,1-3 366,8-5 452,3-12 1,1-3 1058,-1 1-389,-6-20 0,-4-6 479,-8 3-892,-12-11 0,-4-5-128,-4-4-825,-5 6 1,-1 0-540,-2-6-1122,-22 4 1,-3 1 1501,13 3 1,-20 11 0,-4 4 0,9 3 0</inkml:trace>
+  <inkml:trace contextRef="#ctx0" brushRef="#br0" timeOffset="83000">25652 10598 22830,'-44'0'0,"10"23"890,-1-17-654,16 26 0,1 5-2706,-11-5 2280,10 4 1,3 2-1,-4 15 1,4 1-1</inkml:trace>
+  <inkml:trace contextRef="#ctx0" brushRef="#br0" timeOffset="83466">26782 11287 23099,'-31'-25'-5251,"-27"3"5278,28 6-503,-34 6 1248,11 4-420,13 2 0,0 5 351,-20 18-167,12-5 0,4 3 195,-2 27-60,19-20 0,5 1-34,6 16-496,8 4-1060,8 0 120,11-14 1,5 0-1419,7 15 1061,11-14 0,6-3-883,12-4 1682,-2-12 1,1-4 172,11-5 674,-21-12 0,0-6 490,-4-4 0,-4-3 102,-7-3 1,-2-5-165,11-15 1,-3-2-261,-16 15 0,-3-1-551,3-28 1,-4-1-296,-7 23 0,-2 0-340,-1-13 1,0-1-56,-1 15 0,-2 2-484,-8-2 1,0 1 385,7 2 0,-1-2 201,-12-8 1,-2 0-1253,-2-18 1142,11 21 1,-2 3-276,-18 6 899,25 2-206,-9 40 2144,12 6-1675,0 24 135,20 4-459,-9-3 0,0 3-404,1-9 1,1 3-727,-2 9 1,0 6-1,0-5 139,1 0 1,-2-1 978,0 18 0,2-1 0,5-17 0,1-3 0,-7 2 0,0 0 0</inkml:trace>
+  <inkml:trace contextRef="#ctx0" brushRef="#br0" timeOffset="84833">26783 10612 23459,'0'-8'-5126,"0"1"3447,-7 4 2050,5 28-974,-5-1 707,7 30-771,0-4 324,0 8-1253,0 8 1596,0-30 0,0 1 0,0 1 0,0 1-374,1 2 1,-2 0 428,-9 0 0,0 2-229,8 20 0,-1 0 350,-14-15 1,-1 2-1054,11 2 0,4 5 0,-1-5 325,-4-6 0,-2-1 636,-2 11 1,1-2 0,2 11 0,-11-7 0</inkml:trace>
+  <inkml:trace contextRef="#ctx0" brushRef="#br0" timeOffset="84998">26172 11343 22470,'-1'-43'-6375,"0"3"4206,28 4 3635,0 5-415,29 3 741,0 3-1089,-24 13 0,2 0-220,3 1 0,0 1-236,4 0 1,1 1 599,0 0 1,1 1-305,3 0 1,0 0-459,0 1 1,0 0 0,2 0 0,0 0 0,0 0 0,0 1 0</inkml:trace>
+  <inkml:trace contextRef="#ctx0" brushRef="#br0" timeOffset="85583">27520 10592 22380,'-38'-19'-3437,"-1"2"2527,-11 3 1519,15 8 132,-14 1-313,28 34-211,-5-3 180,17 30-1705,-4-5 1139,11 9 1,2 4-204,-3-23 0,0 3 72,1 10 0,1 8 0,4-8-437,7-10 1,0-3 247,-9 4 0,-1 4 0,4-5-413,12-5 1,2 1 290,-11 11 0,-3 6 0,2-7 206,11 14 25,-4-11 1,-3-5-89,-8-27 81,13-7 756,-10-7-899,7-23 1985,-3-20-688,2-12-288,0-14 444,1 6-197,4-3-319,-5 14 0,2 1-281,-3 11 1,0 1 364,8-17 0,0 3-1021,1 3 897,14-2 499,-15 33 760,4 6 267,4 39-2598,-6-7 279,-1 12 1,1 3-736,6 11 574,-1-5 0,1 0-665,7 9 529,7-5 0,1-3-1234,4-5 1070,1-11 0,2-7 1718,-4-13-57,-9-6 1,0-6 1415,0-21 461,12-16-470,-28-11-1150,-2-10-786,-14 24 1,-3 0-463,0-21-158,-11 9 0,-5 1-1566,-15-5 922,15 20 0,-2 2-1271,-33-5 926,32 8 401,-10 6 1107,-4 9 858,13 5 272,-11 37 919,15-7-1575,9 12 1,7 4-263,17 10-1527,-4-4 0,3 0 383,3-18 1,1-1 670,4 9 0,1-2 1,15 9-1,4-3 1</inkml:trace>
+  <inkml:trace contextRef="#ctx0" brushRef="#br0" timeOffset="85801">27953 10725 22560,'-25'-18'-4857,"4"2"3041,8-1-181,7 6 366,32-1 4302,7 8-1656,32 2-987,-17 16-191,13 4 0,-29-1 0,8-3 0</inkml:trace>
+  <inkml:trace contextRef="#ctx0" brushRef="#br0" timeOffset="85985">28565 10507 21750,'25'-7'2478,"-1"1"-1957,-3 6-1181,-2 21-2309,2 12 461,-8 14 1623,-6-10 1,-2 2-210,-1 17 894,-2-3 1,-3 2-1,-6-20 1,-3-1-1,-1 14 1,1-1 0</inkml:trace>
+  <inkml:trace contextRef="#ctx0" brushRef="#br0" timeOffset="86333">29495 10997 22830,'-28'-25'-5845,"6"2"3535,-37 2 2978,25 8-338,-10 3 274,28 27 112,2 16-790,34 11-1080,-6-8 1,2 0 456,26 14 598,-12-7 1,1 1-941,7 7 542,-14-20 1,-2 0 70,7 19-915,-2-18 519,-14 8 887,0-26 490,-41-3 2027,5-8-1790,-21-1 0,-4-4-141,-7-11-1132,3 6 1,1-1 818,2-9 0,-2-9 0,22 8 0</inkml:trace>
+  <inkml:trace contextRef="#ctx0" brushRef="#br0" timeOffset="87371">30078 11221 22920,'-46'0'89,"6"0"-89,-4 0 0,8 0 90,2 14 888,2-11-883,4 30-437,1-6 282,14 10-873,2 1-18,11-9-736,18-3-199,-13 0-701,41-3 1391,-1 1 426,10-12 595,-14-3 0,-1-3 790,6-5-16,-7-9 1,-1-1 1450,3 4-789,-16-16 0,-2-4 737,6 1-1129,-5-25-605,0 8-423,-12 6 1,0-1-529,5-23 41,-7 5 0,-2-2-295,-4 21 1,-1-1-114,0-27 0,0-1 530,-2 26 0,-1 0 188,1-10 0,-1-6 1,0 7-96,1 12 1,-2 1-100,-7-24 1,-1 7-218,5 21 3,-13 23 1559,17 45-848,0 16 46,0-17 0,0 0-120,0 27 96,0-29 1,0 0 149,0 0 0,0 2 29,0 15 1,0 1-29,0-14 1,0 0-530,-2 26 0,4-2 303,5-28 0,0-1-20,-6 10 0,2-2-26,21 7-378,-22-5 322,19-8-169,-4 0-348,6-16 429,11-3 770,-11-14 828,17-25 892,-15-13-491,6-11-1169,-16 10 0,-2 1 596,7-8-450,-6 6 1,-1 0-228,-1 1-566,2-14-751,-10 35-661,2-1 1011,-3 16 1079,1 17-1847,7 15-42,-3 10 740,2-5 0,1 0-491,3 14 508,-3-17 1,1 0-772,4 13 132,4-2-1046,1-4 1522,15 6 662,-8-17-208,27 1 1025,-23-22 560,24-19 1258,-24 7-1205,-8-23 0,-1-6 629,0 3-1079,-10-3 1,-2-4-291,-2 2 0,-2 2 214,4-20-643,-4 10 0,-2 0-1077,2-2-680,-1-18-194,-3 36 932,0 0-63,-2 19 830,1 4 587,0 3 679,3 16-2101,-2 15 369,8 25-58,-4-1 315,0-16 1,0-1-302,2 10-224,2 11-467,3-8-957,-5-18 2289,9 12-715,-10-29 186,10 0 775,-7-13 1097,19-46 120,-13 16-889,2-14 0,0-2 646,1-3-653,-6 14 0,0 1 987,5-12-317,-1 4-257,5-6-861,-8 17 7,9-2 235,-16 21 441,10 19-1116,-12 17-948,5 8-220,-4 8 222,-1-6-91,-2 1 118,-1 2-330,-3 0-54,1-2 906,-1 12 1058,0-16-926,0 15-188,0-27-959,18 1 1898,6-16 1,-1-4 0,-3-3 0</inkml:trace>
+  <inkml:trace contextRef="#ctx0" brushRef="#br0" timeOffset="87783">32213 11196 23459,'1'19'-5325,"-20"-16"8290,14 45-4711,-30 8 2046,31-1-681,-3-10 1,0-1-102,7-4-258,0 11-767,16-11 974,-12-13-1536,29 6 1911,-12-23-182,20-1 1301,-8-24 972,0 11-111,-3-54-871,-8 28-121,-7-3 1,-2-3 241,3-12-570,-1-4-515,-4-2-86,-5 17 0,-1-1-1603,2-17 938,-4 15 1,0 2-45,-1 3 137,-1-5 111,-1 50-77,0 1 523,-7 19 0,-1 7 265,4 15-156,-8-15 1,-1 3 112,11 7 0,1 1-160,-4-12 1,0 2 64,4 25 0,2-1-41,-1-26 1,0-1 72,0 10 0,0-1-363,0 11-190,0-3 153,0-5 24,0 12 111,0-17-1067,-20 8-21,15-20-798,-32-4 2552,33-1 1,-39-5 0,10-1-1</inkml:trace>
+  <inkml:trace contextRef="#ctx0" brushRef="#br0" timeOffset="87940">30993 12456 26967,'-17'2'1120,"2"0"-826,2-2-1345,4 0-586,3 0 1019,-1-14 1,2 10 0,-3-10 0</inkml:trace>
+  <inkml:trace contextRef="#ctx0" brushRef="#br0" timeOffset="88484">23437 13668 22650,'34'-34'102,"-2"1"-234,22-4 974,-15 9-735,-6 4 0,0 1 141,1-2-12,5-4-506,-12 12 289,-11 7 36,7 3 655,-13 5-804,8 18-1536,-9-12 540,10 28-1206,-12-28 458,7 25 1276,-8-26 1,0 9 0,-1-12 0</inkml:trace>
+  <inkml:trace contextRef="#ctx0" brushRef="#br0" timeOffset="89066">24042 13366 23099,'-19'-15'-5133,"4"2"3108,1-4 500,-7 6 1767,-9 1 375,-4 7 277,3 2 45,-5 17-622,6-2 1,0 3 1473,-18 24-1027,8-6 0,1 2 91,16-13 1,3 3-482,-12 28 1,5 1-564,7 1-109,5-5 0,9-3-916,27-9-1524,15 14 318,11-30 1981,-9-11 1,0-4 6,12-2 741,4-21 1,1-7 1197,0-4-858,-4-15 0,-4-6-31,-26 20 0,-3-2 135,12-29 1,-3-3-200,-13 20 0,-1-1-624,-1-8 0,1-5 0,-2 3-299,-3 2 1,-1-1 252,-2 2 1,0-7-1,-1-1 1,0 8-704,-1-5 1,-1 1 414,-1-7 1,1-6 0,-1 10-285,-1 20 1,0 3 140,0-13 0,0 5-222,0 7 447,0 3 44,-13 23 733,9 27-153,-9 26 183,6 16-429,5-2 0,2 4-16,-4-19 1,0 2 16,2 18 1,0 2-85,1-15 0,1-2 55,-3 2 0,1-1-286,2 1 0,0-1 43,0-2-1,0 1-91,-1-2 1,2-1-398,7-4 0,1 2-740,-7 9 0,0 0 652,5-16 1,2-2 704,-1 8 0,-1-3 0,-3 2 0,10-4 0</inkml:trace>
+  <inkml:trace contextRef="#ctx0" brushRef="#br0" timeOffset="89233">23732 13155 22740,'-13'-53'-7800,"5"3"5590,5 11 1357,22 6 1848,10 16 0,5 4 1491,27-2-1995,1 5 0,2 6-837,-26 13 1,0 2 259,13-10 0,0 3 0,-12 17 1,-2 3-1,2-8 0,-1 0 1</inkml:trace>
+  <inkml:trace contextRef="#ctx0" brushRef="#br0" timeOffset="89450">25092 13171 23099,'-23'-27'-6207,"18"3"3533,-35-1 3653,35 6-2123,-32 1 1891,33 3-1802,-33 5 1842,17 3-1231,-15 20 2756,17 18-841,-1 12-1070,18 12-445,-5-3-1975,6 4 1292,0 6 368,22 0 0,-17 0 1,18 0-1</inkml:trace>
+  <inkml:trace contextRef="#ctx0" brushRef="#br0" timeOffset="89607">24423 14247 23909,'-11'5'2700,"3"-1"-3883,22-2-1774,19-14 2997,11 8 1,11-10 0,-12 14 0</inkml:trace>
+  <inkml:trace contextRef="#ctx0" brushRef="#br0" timeOffset="89921">25567 13060 24179,'8'-4'2849,"1"1"-1778,1 3-1557,10 43-3401,-3-12 2576,-4 3 0,0 4 351,3 3 1,0 0 231,-3-10 0,0 2-347,9 25 1,2 0-255,-10-25 0,1-1 101,11 18 1,2-1-649,7 1 2315,3-13 0,1-4 433,3-8-204,-3-8 1,-1-7 1189,-2-25 998,19-21-126,-25-11-2432,-9 3 1,-1-3-388,-9 14 1,-2 0-284,2-14 1,0-2 371,-4-2 1,-1 2 0,-1 10 0,-1 1 0,0-11 0,1 0 0</inkml:trace>
+  <inkml:trace contextRef="#ctx0" brushRef="#br0" timeOffset="90466">26968 13260 23999,'-19'-29'-7528,"-1"-5"4783,-3 17 2765,-13 1 838,31 7-2143,-35 7 2776,13 13 404,1 16-1932,4 8 1472,22 9-1341,9-7 1,4-1-1146,20 14 409,-12-11 1,2-2 892,24 4-1597,-14-3-961,11 9 1190,-24-14 705,20 11 761,-28-25-101,5 0 100,-9-12 264,-34-4 965,-9-1-2062,1-8 0,-2-1 77,-20 3 803,-5-9 0,21 2 1,1-2-1</inkml:trace>
+  <inkml:trace contextRef="#ctx0" brushRef="#br0" timeOffset="91150">28270 13194 25348,'0'-16'-6295,"0"4"4256,0 3 1155,0 5 335,16 23 46,7 33-536,16 0 758,-20-4 1,-2 0-1972,4 4 1951,-8 2 0,-5 1-10,-5-4 242,1-12 1,0-2-137,-4-10 331,0-5 627,0-4-666,-15-9 2197,11-23-2629,-26 9 1466,26-42-1596,-12 24-22,16-26 317,0 5 90,0-4 181,8 9 1,1 0-1646,-4-21 1985,11 11 1,5 1-871,9-2 1474,1 13 1,4 4 1015,14 11-873,-13 19 1,-2 6 286,1 22-1462,-8 10 1,-1 6-827,1 18 325,-7-2 1,-3 2-165,-9-23 1,-2 1-87,3 23 1,-1-1-1121,-5 2 727,-1-25 1,0-1-146,-2 10 1365,0-19 221,0-27 148,0-52-126,0-8-137,9 7 0,5 0 229,-2 22 0,3 0 25,10-21 1,3 1 161,-8 21 0,0 2-71,0-8 1,-1 3 540,7-3 153,-1 9 187,1 14 544,9 6-403,-8 30-2249,11 20-363,-16 12 168,-10-21 0,-1 0-640,4 21-853,-2 1-277,-1 2-937,-1-2-203,3-3 3563,1-3 1,5-6 0,1-1 0</inkml:trace>
+  <inkml:trace contextRef="#ctx0" brushRef="#br0" timeOffset="91483">30033 13441 23909,'0'-18'-6206,"-23"2"5333,-11 9 2064,-14 2-214,15 16 1,2 3 578,-8 5-1152,8 18 0,3 5-440,-2 3-261,15 0 0,4 1 761,1-2-638,22-10 0,3-1-1623,-9 0 750,24-10 1,5-4-561,-11-5 452,32-2 1171,-10-12 668,-11-19 927,15-13 399,-26-12-1234,-9 9 1,-3-2 194,-4-11-1136,-4 14 0,-1 0-185,-3-14-816,-18 0-1212,14 3-72,-31-8 157,16 19 904,-2-2-418,-9 25 193,26 23 554,-12 21 1104,16 10 0,0 10 1,0-12-1</inkml:trace>
+  <inkml:trace contextRef="#ctx0" brushRef="#br0" timeOffset="91683">30410 13527 24629,'3'-20'-4645,"0"9"3769,-2-6-274,1 11 1272,-1-4-729,1 6 809,1 23-1054,0-15-1193,2 38 477,0-22-1942,5 42 3392,-3-21 0,4 15 0,-4-17 0</inkml:trace>
+  <inkml:trace contextRef="#ctx0" brushRef="#br0" timeOffset="91867">30692 12776 24179,'0'-19'-6476,"0"4"4067,2 6-74,1 5 2155,-1 22 0,-1-13 0,-1 13 0</inkml:trace>
+  <inkml:trace contextRef="#ctx0" brushRef="#br0" timeOffset="92101">29637 14427 25348,'-2'6'-522,"20"-3"1,-15-18-1,16-7 1</inkml:trace>
+  <inkml:trace contextRef="#ctx0" brushRef="#br0" timeOffset="93050">23170 16216 22830,'21'-26'-1088,"-16"-24"-2234,46 24 5712,-26-30-2554,2 30 1,2 1 327,-6-3 1,-2-1-175,4-2 0,0 0 84,0-2 1,-1-2-214,10-18 0,-2-3 44,-8 14 0,-1-3 578,-1-4 0,1-5 0,-3 4-925,-3 4 0,-3 1 271,3-12 1,-2-2-369,-5 9 0,-3 4-458,0-20 405,-4 23 0,0 4 25,-3 8-366,-22 26 1582,3 31 0,-1 12-483,-2-7 1,0 4-59,1 10 0,-1 6 0,3-4 86,3-5 1,2 0-124,1 6 1,1 5-1,2-4 16,-1-5 1,2-1 36,4 13 1,1-2-534,0-17 0,0-3-1374,4 0 1,0 0-732,0 29 2147,28-7 1,-20-5 0,20-5 0</inkml:trace>
+  <inkml:trace contextRef="#ctx0" brushRef="#br0" timeOffset="93350">24087 15835 24179,'-23'-14'-3877,"-16"5"5150,13-1-1074,-16 9 694,4-4-618,17 21 537,8 7-1030,13 10-1378,0 0 1081,0-6-647,23 1 150,13 12-564,13-11 1201,-10-8 0,-1-4-585,12-4 1021,-6-4 1,0-3 1256,4-5 246,12 2-159,-28-22 768,-6 15-109,-8-36-2016,-8 7-230,-5-11-826,-15 12 1,-2 0-1622,7-8 643,-24 7 1,-5 2-455,7-1 2125,-8 8 1,-3 3-1,3 3 1,-7-3 0</inkml:trace>
+  <inkml:trace contextRef="#ctx0" brushRef="#br0" timeOffset="93917">24723 15832 24539,'-20'-19'-5367,"14"-6"1882,-34 22 5597,24-7-2524,-6 25 2079,11 9-1695,11 10-834,0 4-735,0-7 1342,16 0-349,11 7-1599,-6-12 1842,18-8 1,1-4-706,-11-3 1206,8-5 0,0-3 1277,-6-3 269,-2-18 278,-4 14 529,-5-35-1235,-3 21 768,-2-34-2064,-9 19-66,0-26-1027,-6 28-555,0-14-278,-17 24-67,12 1 631,-13 29 2056,18 16-1191,0 28 148,0-4 79,16-6 0,4-1-293,1 0 438,10-6 0,2-3 222,-2-9 671,24 2-2211,-24-18 2671,8-3 161,-14-5 484,-6-15 649,10-21-759,-15-2-281,3-25-862,-14 28-1205,-3-17-477,0 25-251,0-1-1685,0 14-15,0 51 2622,15-7 0,-11 31 0,12-23 0</inkml:trace>
+  <inkml:trace contextRef="#ctx0" brushRef="#br0" timeOffset="94121">25325 15020 25348,'-9'-35'-8420,"1"6"5861,4 7 1446,3 8 434,-4 5-1132,5 26 1680,22 21 1,-17 16 0,17 9-1</inkml:trace>
+  <inkml:trace contextRef="#ctx0" brushRef="#br0" timeOffset="94321">24562 16366 26248,'-11'2'1759,"2"0"-1975,3-2 1,28 0-1,7 0 1</inkml:trace>
+  <inkml:trace contextRef="#ctx0" brushRef="#br0" timeOffset="94751">26702 15680 26967,'2'-10'-4209,"1"1"3376,0 4 757,2 2 1976,5 2-888,1 1-620,13 18-1311,-6 7-921,16 25 1037,-12-8-421,7 3 20,-10-12-1402,0-2 446,-2-1 234,5 4 1355,-5-12 653,5 3 140,-10-19 940,8-1 316,-6-25 237,24-29-107,-16-2-1269,-2 4 0,0 0 168,-4-9-1372,-3 8 0,-1 0-371,-1-7 1195,-2 12 1,0 3 0,1 1 0,2-5 0</inkml:trace>
+  <inkml:trace contextRef="#ctx0" brushRef="#br0" timeOffset="95650">28202 15854 23909,'-22'-23'-6084,"-7"2"5011,15-15-1565,-9 16 2307,5-11-517,10 22 2223,3 2-1828,23 5 871,1 0 1499,3-19-568,25-12 1351,-28-14-2220,4 21 1,0 0 1551,2-22-1018,-1-6 185,-3-7-1673,-6 12 0,-2-2-109,-4 11 1,-1-2 282,0-4 1,1-4 0,-2 3-438,-3 5 1,-1 1 441,2-12 0,-1 1-974,-3-10 357,1 8 172,-2 10 33,0 10 240,0 10 201,-17 8 197,-8 36 753,5 5 1,0 5-287,2 5 0,2 3-20,-1 12 1,2 0-139,3-6 0,2 1-17,-1 3 1,1 2-28,0 0 0,0 3-110,4-5 1,1 3 0,1-2-132,-1 6 0,2 0-646,0 2 1,1 4 0,1-6 13,0-10 1,2-2-289,6 24 0,5-4-655,11-2-22,7-15 0,3-4 569,12-11 965,-8-10 1,0-5 734,2-12 757,24-20 752,-29 12-697,-10-20 0,-1-4 799,-1 7 415,-1-29-1298,-13 21-771,-4-2-810,-3 2-611,-1-8-1166,-21 11-337,1-8 612,-23 23 1315,7 1 691,2 32 1135,15 10-479,7 13-623,12 21-581,0-24-143,7-7 0,5-1-128,19 1-370,-4-9 1,3-3-76,20-7 449,-16-4 1,0-2 526,5-9 1043,8 4 449,-16-29 465,-8 5 443,-2-23-1412,-10 6-378,1-2-503,-10-6-248,1 10 1,0 0-952,-3-18 400,-10 9 0,0 2-1728,6 0 479,-30-12 758,31 32 297,-11 25 2232,14 22-1900,0 16-822,7-9 0,3-2-862,14 11 2302,-1 13 1,20-20 0,-14-2 0</inkml:trace>
+  <inkml:trace contextRef="#ctx0" brushRef="#br0" timeOffset="96099">29462 15708 25258,'0'-14'-5666,"-16"6"5686,12 23-537,-11 3 1577,15 40-2188,0-15 770,0-2 0,0 1-336,0 13-123,7 3 0,1 0 451,-4-1-112,4-6 1,0-2-335,-8-11-384,8 12 881,-6-30-66,6 0-524,-8-39 313,-15-29 7,11-8 183,-3 7 1,0-1 328,7-14 118,0 21 0,0-2 93,-2 9 0,4 2 163,11-3 1,1 1 273,-12-1 0,3 0-174,28-14 1,4 2 376,-23 14 0,0 0-102,23-16 1,3 5 995,-1 6-78,7-1 189,-15 30 196,-4 5-384,-2 4-618,-3 18-1734,-1-12 1026,-4 34-2323,-3-2-277,-6 9 436,-4 21-798,-4-28-1035,-23 22 1588,0-31 2471,-5 6 0,-10-18 0,12-2 0</inkml:trace>
+  <inkml:trace contextRef="#ctx0" brushRef="#br0" timeOffset="96349">29175 14899 23459,'-24'0'-90,"2"0"90,4 17 83,4-13 824,7 34-2670,3-18 500,3 20-841,22 13-1286,-15-12 3026,17-13 0,3-2 0,-4 10 0,25-2 0</inkml:trace>
+  <inkml:trace contextRef="#ctx0" brushRef="#br0" timeOffset="96550">28608 16551 26248,'-4'17'-9155,"1"-2"8925,26-8 0,-16-3 1,17-4-1</inkml:trace>
+  <inkml:trace contextRef="#ctx0" brushRef="#br0" timeOffset="96717">30733 15901 26697,'18'-6'-862,"-2"0"0,-8-1 0,-3-2 1</inkml:trace>
+</inkml:ink>
+</file>
+
+<file path=ppt/ink/ink15.xml><?xml version="1.0" encoding="utf-8"?>
+<inkml:ink xmlns:inkml="http://www.w3.org/2003/InkML">
+  <inkml:definitions>
+    <inkml:context xml:id="ctx0">
+      <inkml:inkSource xml:id="inkSrc0">
+        <inkml:traceFormat>
+          <inkml:channel name="X" type="integer" min="-2.14748E9" max="2.14748E9" units="cm"/>
+          <inkml:channel name="Y" type="integer" min="-2.14748E9" max="2.14748E9" units="cm"/>
+          <inkml:channel name="F" type="integer" max="32767" units="dev"/>
+        </inkml:traceFormat>
+        <inkml:channelProperties>
+          <inkml:channelProperty channel="X" name="resolution" value="1000" units="1/cm"/>
+          <inkml:channelProperty channel="Y" name="resolution" value="1000" units="1/cm"/>
+          <inkml:channelProperty channel="F" name="resolution" value="0" units="1/dev"/>
+        </inkml:channelProperties>
+      </inkml:inkSource>
+      <inkml:timestamp xml:id="ts0" timeString="2021-07-19T06:47:22.279"/>
+    </inkml:context>
+    <inkml:brush xml:id="br0">
+      <inkml:brushProperty name="width" value="0.12095" units="cm"/>
+      <inkml:brushProperty name="height" value="0.12095" units="cm"/>
+    </inkml:brush>
+  </inkml:definitions>
+  <inkml:trace contextRef="#ctx0" brushRef="#br0">1430 1966 21480,'0'-4'-6205,"0"-1"4166,0 1 1335,0-5 245,0 4 303,-14-6 343,10 7-464,-10-2-264,14 4 901,0-1-90,0 0 180,0-1-360,0 1 269,0-2-620,0 3 620,-6 0-255,22 1 1662,9 0-1471,41 1 312,-2 0-397,-10-1 0,0 2 0,-16 3 0,-2 2 0,15 0 1,0 0-1</inkml:trace>
+  <inkml:trace contextRef="#ctx0" brushRef="#br0" timeOffset="415">3138 1842 23549,'0'-22'-5486,"0"1"4347,-23-7-57,-8 8 1473,1 6 1,-2 2 367,-19 3 204,-4 1-127,-3 7-743,14 22 1114,10-8 0,2 3 1176,-1 24-839,5 0-928,15-7-555,12 0-1304,-4 3-810,33 0-688,-3 1-710,29-2 1918,-16-12 1,2-1 1583,-7-6 1,1-2-1,13 5 1,1-3 0,-12-8-1,0 1 1</inkml:trace>
+  <inkml:trace contextRef="#ctx0" brushRef="#br0" timeOffset="687">3642 1910 23639,'0'-26'-5666,"-26"2"3889,-4-1 1295,-2 9 756,-31 2 696,40 10-278,-9 13 0,-2 3 773,8-7-1384,4 29 0,4 5 921,7-12-799,11 13 0,4 2-680,1-8 29,24-7 1,6-2-263,-5 1 267,15-11 0,3-3-602,0-3 539,17-4 1128,-11-5 741,-18-19 893,11-9 280,-32-10-2307,-1-20-464,-14 21-2153,-16-25-445,-13 29 49,7-6 2525,-29 13 0,24 14 0,-25 0 0</inkml:trace>
+  <inkml:trace contextRef="#ctx0" brushRef="#br0" timeOffset="1250">4165 1800 23189,'-16'-8'-3389,"12"17"2666,-13 12 1173,17 20-2146,0-5 686,21 16-587,4-20 1370,0-5 1,2-2-1139,13-1 1336,-10-8 1,0-2-97,7 0-279,24-6 1764,-26-3-45,16-23 1674,-26-9-1418,4-10-305,-12-18-1250,-5 21 68,-2-25-648,-7 29-683,-2-12-32,-1 26-889,0 25 696,22 16 571,-11 9 1,2 3 400,11-12 0,3-2 125,-8 8 0,0-1-276,23-1 847,-7-1-42,0-5 194,2-3 317,0-6 664,13-6 388,-17-4-255,15-4 468,-30-21-913,3 16 788,-16-36-1911,-2 24-203,-2-20-406,-1-1-598,0 9-34,-17-5-810,12 10 391,-23 14 507,25 17 1772,-8 17-34,32 11-2382,-2 12 378,6-16 1523,7 16 0,-6-20 0,18 4 0</inkml:trace>
+  <inkml:trace contextRef="#ctx0" brushRef="#br0" timeOffset="1465">5407 1973 22470,'-14'-20'-6925,"10"21"11006,-10 13-3426,32 5-2610,-14 19 318,28-10 930,-15 10-660,0-2-818,9-12 2334,-23-3-2987,21-2 73,-11-4 2966,8-7 1,-3-3 0,-3-5 0</inkml:trace>
+  <inkml:trace contextRef="#ctx0" brushRef="#br0" timeOffset="1850">5748 1596 23099,'1'-34'-5449,"0"4"3375,-1 8 1032,0 1 1262,0 10-493,0 43 130,0 30 66,0-25 1,0 1-767,0 13 0,0-3 879,0 2-87,7-10 0,0 1-394,-3 3 291,22 12-454,-23-22 426,10-2-638,-5-3 381,-6 4 318,11-9-1686,-12 3 1632,3-16-837,-4 0 1440,-19-10 1523,-9 1 507,3-20-1464,-27 14 554,12-46-993,-13 28-63,19-7 1,3-4 413,-1 0-776,8 6 0,4-1-2128,6-1-320,0-9 1158,42 8 1297,0 9 879,13 3 1,6 4-496,-14 6 0,1 2-652,8 1 0,5-1 0,-3 2 369,-1 1 1,-2 2-1,16 0 1,-1 0-1,-18 1 1,1 0-1</inkml:trace>
+  <inkml:trace contextRef="#ctx0" brushRef="#br0" timeOffset="2321">7325 1129 23279,'0'-26'-5756,"0"-7"3628,0 10 974,-21-9 101,-1 21 1568,-26-1 422,12 41-331,2 10 1,2 7-883,14-7 1,2 5 569,-4 6 1,-1 7 0,5-6-5,8-6 0,2-1-206,-1 6 1,0 4-1,7-5-9,13-4 0,5-1-650,-4 3 0,2 4 0,3-5-712,12-5 0,4-2-62,3 12 0,0-1 50,-8-18 0,1-1 1229,1-1 1,1-1 0,0-2 0,0-1 0,-1-1 0,1-1 0</inkml:trace>
+  <inkml:trace contextRef="#ctx0" brushRef="#br0" timeOffset="2633">8167 1168 22020,'0'-36'-5576,"0"1"3807,23 4 3654,0 3-509,25 2-45,4 14 0,2 3-828,-19 1 0,1 4-368,11 9 0,6 6 1,-7 1-432,-11 1 0,-3 5 394,1 9 0,1 6 0,-5-1-72,-6 0 1,-3 2-697,-3 6 0,-1 5 0,-4-2-247,-3-2 1,-6 3 414,-9 1 1,-6 7-1,-2 1 1,0-6-734,-3 7 1,-4 1 385,-5-4 0,-5 7 1,-2-1-1,2-6 875,5-12 0,1-4 1,-2 1-1,-8 11 1,-2 3-1,1-3 1,-5 4-1,-1 0 1</inkml:trace>
+  <inkml:trace contextRef="#ctx0" brushRef="#br0" timeOffset="3403">1223 3781 24359,'20'-7'2578,"-16"1"-4156,33 1 1737,-19 2-595,20 3 337,0-2 1,1 4-1,14 13 1,-10-6-1,1 0 1</inkml:trace>
+  <inkml:trace contextRef="#ctx0" brushRef="#br0" timeOffset="5672">2855 3838 22920,'-26'-23'-5252,"20"1"1515,-46 1 4656,28 4-1203,-24 1 964,8 6-49,-22 4 28,15 4-671,-14 17 1925,22-11 338,3 33-1526,-6 10 448,22 0-1295,5-9 1,8-1-519,26-1-1090,13 17-104,8-26 1094,-7-9 0,0-3-289,8-4 608,15-1 430,-2-10 835,-14 0 361,18-18 1514,-30-8-657,2-9-1206,-18-14-1124,-5 18-290,-3-9-518,-4 13-431,0 1-269,-17-5-1007,12 11 744,-26-1 1216,28 38 738,-11 9 622,31 18-1438,5 18-474,0-21 140,4-5 1,-1 1 1297,-4 4 1,5-13 0,1-2-1,5 9 1</inkml:trace>
+  <inkml:trace contextRef="#ctx0" brushRef="#br0" timeOffset="5986">3293 3863 21930,'0'-13'-6565,"-15"6"6452,11 19-98,-12 14 782,16 11-1541,17 6-603,-13-7 886,12 3-1613,2 0 1655,-14 1-382,27 15 38,-17-14-587,11 19 1404,-13-32 764,3 8-1072,-13-25 937,4-25 949,-6-19-1192,0-17-100,-7 11 0,0-1 173,4-13-42,-4 16 1,1 0-100,6-16 194,0 1-722,0 2 366,17-14 0,5 21 0,17-10 0</inkml:trace>
+  <inkml:trace contextRef="#ctx0" brushRef="#br0" timeOffset="6383">3948 3767 22200,'-15'-8'-3889,"-8"6"4758,20 9-1751,-7 17 402,10 10-888,0 5 391,14-6-405,-10 1-424,11 18 592,-2-14-785,-9 22 1236,17-29 134,-19 5 1507,6-15-1305,-8-7 1076,0-24-350,0-13 247,-14-16-652,11 0-50,-11-12-79,14 9 153,7 4 0,4 1 1000,15-8-547,-3-14-67,26 21 923,-26 1-198,26 2-513,-12 5 0,3 4 1,0 2-1</inkml:trace>
+  <inkml:trace contextRef="#ctx0" brushRef="#br0" timeOffset="7251">4822 3953 22470,'-19'-38'-7988,"15"4"6105,-39 9 2704,25 1-1245,-35-8 810,22 9-285,-2 7 0,-1 2 452,0 5-1005,-28 0 2267,37 32 262,-9 6-966,21 15-325,2 13-843,10-21-297,19 11-1229,-13-15 243,38-2 416,-22-3 164,8-10 0,4-3-130,7 5 1035,-3-8 0,1-2 643,4-3 465,14-3 958,-22-3-330,-6-23-530,-1 17 465,-9-38-1823,-1 25 536,-8-20-1215,-2-5-361,-5 10-304,-1-17-307,-1 25-93,0-3-266,-16 16 1542,12 24-259,-11 9 1588,15 14-1140,19 16-665,4-18 663,0 10 44,5-22 0,1-1 91,-4 8-163,11-7 1,3-4 114,1-3-42,-5-6 0,-1-3 1479,7-4 1085,6-16 265,-8-10-540,-16-8-979,4-18-276,-19 20-855,-3-22-851,-5 28-591,0-6-1,-15 14-836,11 28 1124,7 4-368,1 29 456,33-10 812,-11 4-161,18-10 1022,-7-9 239,-4 0 63,-4-17-128,-8 5 765,4-6 326,-11-18-676,-3 14 1671,-2-32-2143,-3 10-605,-2-9-310,-1-10-1210,-3 21 479,0-9-609,0 47 304,0-4-1039,0 37 1850,0 16-84,0-10 504,0-3 1,0 1-69,0 11 79,6 1 1,1 1-165,-3 0 174,3-8 1,-1-3-190,-6-8-940,0 10 180,-16-30 859,12-3 632,-27-15 1,28-5 0,-11-2-1</inkml:trace>
+  <inkml:trace contextRef="#ctx0" brushRef="#br0" timeOffset="7402">6180 4081 22380,'60'0'0,"1"0"0,1 17-295,-15-15 0,1 0-2,-12 6 1,2 1 281,28-2 0,1-2 1,-26-4-1,-1 1 0,13 4 1,1 0-1</inkml:trace>
+  <inkml:trace contextRef="#ctx0" brushRef="#br0" timeOffset="8100">7762 3598 23369,'-5'-1'-1352,"0"0"1291,1 19-1817,-1-14 2581,-4 62-1736,3-32 624,1 4 0,0 3-344,0 12-563,0 5 245,2-1 427,1-17 1,1 1 223,1 21-352,0-13 1,0-1 495,0 5 130,0-14 0,0-1-76,0 0 122,0 3-178,0-22 285,0-6-57,0-6 36,-17-21 259,-5-16-496,0-13-403,-13-11 124,25 14 0,3-2 301,-4 8 1,1-3 96,4-7 1,2-6-1,1 4 40,1 1 0,4 0 180,6-5 0,3-4 0,-3 4-104,-6 6 0,3 3 376,17-1 0,8-2 0,-4 6 1371,4-18-746,22 23 0,3 6 1675,-12 10-1610,-2 26 0,-3 8-99,-11 9-1220,-10 10 0,-2 5-635,2 4-609,-9 15 76,-1-19-325,-7-1-441,0-4 407,-23 8 1754,18-13-1039,-34 8 1593,34-22 1,-12-3-1,17-11 1</inkml:trace>
+  <inkml:trace contextRef="#ctx0" brushRef="#br0" timeOffset="8466">8453 3596 22740,'5'21'-7342,"-1"19"5498,1-10 568,-1 13 773,2 8 243,-1-20-25,9 14-138,-1-21-1678,18 8 2532,-8-17 140,37 0 900,-24-11-486,0-13 0,1-2 1423,0 6-1177,-7-23 1,-1-4 796,2 6-1068,-7-10 1,-4-3 159,-2-2-494,0-12-1113,-12 9-955,-4 16-687,-1-3 230,-1 19 395,0 55 87,0 16 572,7-20 0,3 1-831,4 5 1,4-6-475,24-4 2203,-16-13 1,0-3 0,19 1 0,4-4 0</inkml:trace>
+  <inkml:trace contextRef="#ctx0" brushRef="#br0" timeOffset="8721">9725 3556 23189,'-21'-26'-6990,"15"2"3844,-37 7 4141,38 3-2910,-53 7 3415,38 2-725,-13 12 0,2 9 824,13 14-2188,-7 32 1477,25-12-718,9-15 1,0-1-1527,-5 8 1384,15-9 0,4-2-1503,9 4 783,-7-6 1,3-2-1241,14-4 1368,-17 9-2086,-36-26 4054,-20-20-1134,-14 9 1,2-36 0,10 13 0</inkml:trace>
+  <inkml:trace contextRef="#ctx0" brushRef="#br0" timeOffset="9102">9988 2810 22560,'19'-3'2020,"-2"1"-872,2 22-4393,-5-1 1544,10 41-491,-9-15 1530,1 15 1,-1 3 194,-6-28 0,-1 2-229,1 10 1,2 5 0,-2-5-406,-2-11 1,-1 0-85,7 23 0,-1 0 1031,-5-26 1,-1-1 24,6 20 0,0-2 329,-2 3-65,-1-9 1,-1-2-146,-1-6 160,3 15-363,-8-39-194,5-2 458,-4-7 809,4-18 496,3 11 1333,2-33-1617,6 16-325,-3-8 1,2-2 623,11-9-559,-1 8 1,1 1 1161,8-1-1376,-7 11 1,2 4 553,5 5-1159,25 3 1297,-25 24-1640,11-11 726,-16 34-1770,-1-19-736,-1 23 1645,12 7 1,-11-9 0,9 13 0</inkml:trace>
+  <inkml:trace contextRef="#ctx0" brushRef="#br0" timeOffset="9232">11605 3905 24449,'2'-14'-2689,"-1"6"0,-1 2 1</inkml:trace>
+  <inkml:trace contextRef="#ctx0" brushRef="#br0" timeOffset="10183">1133 5938 22020,'50'0'90,"-6"0"-249,-10 5 0,1 0-344,12-3 504,17 15-441,-17-15 461,1 11-1109,1-8 998,2 7 1,3-2 0,0 1 0</inkml:trace>
+  <inkml:trace contextRef="#ctx0" brushRef="#br0" timeOffset="10583">2960 5910 23279,'-19'-5'-1658,"15"-3"-3251,-43 6 6537,24-3-1280,-12 4 0,-4 2 636,-10 14-486,3-5 0,-1 0 261,-6 8-389,11 7 0,2 0 511,1-8 1963,0 29-2904,27-15-603,6-5-589,30 9-1019,-17-16 1386,27-8 1,6-5-79,-6 1 777,22-15 1,5-3-100,-7 6 684,-4-23 0,-4-3 881,-10 6-618,-11-8 1,-5-4 873,-6 2-628,2-19-1525,-15 28-939,3-4-328,-4 16-218,0 4 205,0 23 223,0 10 416,0 14-808,0 5 50,14-8 1866,-10 4 0,31 0 1,-10 1-1</inkml:trace>
+  <inkml:trace contextRef="#ctx0" brushRef="#br0" timeOffset="10885">3422 5809 23189,'0'11'-6295,"0"12"4346,0 11 885,0 6 425,0-3 214,20 25-584,-1-12 632,1-6 1,-1-1-1972,0 7 2211,0-7 0,-3-1 30,-11-6 277,22 12-752,-23-39-10,3-21 2171,-4-23-712,-3-14-1391,0-7 0,0-3 430,-1 24 0,2-1 214,4-9 1,2-7 0,-2 7-1,-3 10 1,0 2 0,7-10-1,-1-1 1</inkml:trace>
+  <inkml:trace contextRef="#ctx0" brushRef="#br0" timeOffset="11234">4008 5744 22830,'0'9'-6386,"0"1"4347,0 1 975,0 2 426,0 6 212,0 2 122,0 6 76,0 2-1369,0 3 1687,12 1-754,-9 17 548,19-13-301,-19 22 691,7-31 121,-2 11-799,-5-24 138,5-1-168,-8-29 1098,0-14-638,0-32 211,0 4-695,20 3 1,2-2 1442,-12-3-1030,27 4 0,2 3 362,-19 9 0,4 18 0,1 2 0,3-3 0</inkml:trace>
+  <inkml:trace contextRef="#ctx0" brushRef="#br0" timeOffset="12134">4880 5875 23459,'-19'-20'-5312,"15"-13"2383,-36 29 4866,21-28-3759,-20 27 3076,-7-22-1307,12 24 903,-25-7-1199,30 10 1970,-8 17 890,19-13-1874,8 35 390,4-20-1812,6 36 229,0-19-290,9-4 1,5-1-1209,21 4 1333,-3-9 0,4-2-1088,23-2 668,2-2 1378,-1-14 575,-16-6 131,-11-12 1,-1 0 1633,1 6-1281,-10-24 0,-4-4-419,0 9 52,-2-32-1265,-9 12-395,-6 15-553,0-13-502,-2 22-545,0 26 365,0 29 935,0 11 279,10-10 0,1-2-418,-6 3 697,20-8 0,4-1 490,-6-1-8,10-9 0,2-3 673,4 0 29,10-6 585,-1-2 225,-14-26 1165,16-6 24,-27-13-1774,1 1-143,-12 6-990,-5-1-245,-2-1-572,-2 0-218,-3 1-618,0 3-252,0-8 1020,-14 12-556,10-6 746,-11 20 609,15 2 180,-10 8 1186,7 18-805,-7 2 758,10 18-1036,16-17 418,-1 30-778,4-30 163,3 15-159,-19-16-994,14-17 2445,-15 20-2182,4 5 658,-6 9 377,0 11 728,0-5-805,8-5 1,2 2-56,7 23 43,1-10 0,0 2-1920,-2 8 1840,-1-22 1,-1-1-49,-3 12-161,6-5-256,1-3 235,-6 6 526,1-16-199,-1 12 336,-11-24 297,2 7-25,-22-15 1987,15 3-1202,-33-9 1317,32 1-1046,-37-3-16,9-1 217,-12-1-2086,-13-2 692,24-16 0,-7 12 1,14-11-1</inkml:trace>
+  <inkml:trace contextRef="#ctx0" brushRef="#br0" timeOffset="12901">5222 5695 21930,'-7'27'-3985,"3"-4"2239,0 3 675,4-2 101,0 2 242,0 20-62,21-8 664,-8-3 0,3 0 0,26 8 0,-22-14 0,1 0 0</inkml:trace>
+  <inkml:trace contextRef="#ctx0" brushRef="#br0" timeOffset="13182">6405 6101 23369,'36'-7'1489,"1"1"-1093,18-1-384,-9 4-1012,-2 1 0,2 1 946,11 1 0,-18 0 1,-1 0-1,14 0 0</inkml:trace>
+  <inkml:trace contextRef="#ctx0" brushRef="#br0" timeOffset="13949">7990 5588 23369,'5'-3'936,"1"0"586,-2 2-1509,2 16-4195,2 14 1643,0 9 969,6 11 907,-7-14 0,0 1-1305,6 25 897,-4-5 1,0 1-227,-3-20 0,-1 0 201,4 25 0,-1 0 1323,-4-24 0,0-1-39,2 23 1,-1-1 118,-1 5-170,-2-25 1,-1-1 891,-1 18-201,0-19-440,0 6 153,0-28-27,-19-2 1525,2-10-36,-22-21-1152,11 13 375,-1-38-1513,-2 1-42,6-14-72,7 8 0,1-3 62,8 17 0,1-1-783,-2-14 0,2-1 125,5 12 0,0 1 531,2-2 1,0 1-136,1 0 1,-1 0 676,0 2 1,2 1 215,10 2 0,1 0 994,-7-24-673,15 25 1,5 2 1034,3-9-334,22-2 605,-10 30 259,-5 3-188,-8 31-2027,-4 9-914,-8 15-319,-2 1-928,-12 9 115,3-12-224,-4 0 1,0 1 1878,0 1 1,0-13-1,0 0 1,0-1 0</inkml:trace>
+  <inkml:trace contextRef="#ctx0" brushRef="#br0" timeOffset="14253">9008 5802 24269,'0'-12'-6476,"-26"2"6641,-6 5 868,-16 3-157,3 2-68,-6 21 417,14 2-440,-9 2-213,17 24 495,14-32-511,3 37-1354,12-29-607,20 16-751,11-20 376,12 4 251,3-14 693,-9-2 984,-1-5-166,-2-2 1202,-4-2 232,-1-17 1187,-6-7-1567,1-11-518,-14-18-1284,0 17 54,-10-13-1944,-16 2-253,12 13 2361,-30-13 1,29 26 0,-13-2 0</inkml:trace>
+  <inkml:trace contextRef="#ctx0" brushRef="#br0" timeOffset="14716">9412 5918 21480,'0'9'-6025,"0"2"4346,0 29 615,0-9 879,0 4 1,0 2-242,0 7 161,8-4 1,1 0-383,-4 9-369,11-8 0,0 0 288,-13 5 581,22 11-538,-13-9 191,1-16 394,3 12 227,-10-25-29,4 2-268,-5-33 1591,-22-32-1994,-2-8 560,8 13 0,-1 0-148,-3 8 0,2 0 197,10-2 1,2-4 167,-12-21 1,0-2-32,11 13 0,1-1 74,-5-17 1,1 1-691,4 17 0,2 2 809,-1 0 0,0 1-72,-1 2 0,2 0 198,10-10 0,5 2 88,-1 14 1,4 2 145,11-12 0,4 5 1086,15 8-723,-17 16 1,-2 4 1282,4 6-312,8 22-1014,-10 15-1182,-9 11-442,-9-8 0,-2 0-1075,-2 12 816,-6-5 0,-1 0-1370,-3 9-210,-21 1 1,-5 0 2255,1 1 0,-7-11 0,-2-2 0,0 3 0</inkml:trace>
+  <inkml:trace contextRef="#ctx0" brushRef="#br0" timeOffset="14865">10728 6009 23459,'9'0'-300,"-4"0"0,-2 0 1</inkml:trace>
+  <inkml:trace contextRef="#ctx0" brushRef="#br0" timeOffset="15420">1555 8355 24539,'-28'-12'-2012,"1"1"1040,3 2 556,5-1-168,-2 0 465,11 4-455,23 0 1206,24 20-2399,19 5 1238,-24-11 1,2 2 538,12 13 1,1-1 0,-7-12 0,1-1 0,14 12 0,0 1 0</inkml:trace>
+  <inkml:trace contextRef="#ctx0" brushRef="#br0" timeOffset="15816">3152 8378 24269,'-26'-16'-3696,"19"1"-916,-46 1 5797,13-1-796,-16 7 440,-1-1-241,13 7 62,0 2-740,0 0 1261,-11 19 1758,18 1-1926,-8 23-286,28-13-949,4 3-342,11-9-755,2-1-268,21-1 57,7 2-631,-1-8 677,34-1 1044,-38-11 704,41-4 702,-34-23 677,3 18 300,-8-53-1085,-14 37-386,-1-11 0,-1-1-246,-6 3-1228,3-22 76,-4 30-468,-2 19-505,0 28-203,19 18 451,-7-12 0,0 1-983,12 8 1606,-2-12 1,-2 0 968,-2 7 0,22-3 1,-9-4-1</inkml:trace>
+  <inkml:trace contextRef="#ctx0" brushRef="#br0" timeOffset="16115">3587 8145 23279,'-20'-8'-3201,"5"21"4593,15 12-4020,0 14 997,0 4 454,0-7 491,18 3-496,-13 0-647,30 15 601,-31-15-592,22 20 1454,-23-31 819,16 2 641,-17-14-1352,11-9 1410,-12-17-917,3-18-427,-4-32-505,0 4 164,0-11-503,0 28 0,0 0 1170,0-24 0,7 23 1,3 0-1,13-16 0</inkml:trace>
+  <inkml:trace contextRef="#ctx0" brushRef="#br0" timeOffset="16403">4080 8124 21750,'0'9'-6115,"0"0"3986,0 3 1155,0 2 335,0 14 213,0-4 122,0 24 76,0-17-1278,0 24 1416,0-23 180,0 9-90,13-5-606,-9-10 803,17 8-43,-19-19-153,12 0-7,-8-26 869,4 10 885,-2-40-2534,4-6 1073,-1-13-170,1 11 1,0-1 0,4-14 0,-5 21 0,0 0 0</inkml:trace>
+  <inkml:trace contextRef="#ctx0" brushRef="#br0" timeOffset="16853">4920 8222 23909,'0'-35'-6026,"-23"15"4373,17-9-485,-37 17 3267,14-5-981,-32 9 691,18 26 920,-9 9-1234,39 11 134,-9 17-200,21-18 18,-6 8-1334,24-14-421,-13-3-605,37-2-620,-5 0 544,11-13 2033,-13-4 1,-1-1 256,7-7 1115,25-15 309,-32 9 634,5-35-404,-20 23-628,-4-18-689,-7 5-746,1-11-543,-8 10-958,3-13-511,-3 22 199,0-1 471,0 35-266,0 11 946,0 16 190,19 17-965,-15-21 759,36 11 184,-22-17-176,21-3 830,-9-5-150,4-9 356,1 1 1,1-11-1,1 4 1</inkml:trace>
+  <inkml:trace contextRef="#ctx0" brushRef="#br0" timeOffset="17248">5548 8282 22740,'0'-23'-6026,"0"2"3807,0 0 1155,-16 10 1291,12 20 346,-12 14 235,31 20-2084,-11-8-626,29-2 1965,-4-1-107,9-18 950,4 15-908,3-20 245,-10 3-416,17-7 2238,-25-5-163,6-15 875,-21-6-1149,0-19-1802,-10 8 199,-1-2-1230,-1 4 83,-16 14-205,12-11-546,-11 19 475,15 15 353,0 24 493,0 16 494,0 15-43,8-19 1,1 0-85,-7-9 1,1 2-21,12 26 0,2 0 78,-7-26 0,-1-1-437,-1 12 0,3-3 125,17 13-46,-25-6 359,21-4-262,-15 7 336,3-20-253,-5 13 556,-7-29-2903,-46 4 3130,19-16 1,-7-2 0,-1-2 0,-5-2 0</inkml:trace>
+  <inkml:trace contextRef="#ctx0" brushRef="#br0" timeOffset="17949">7098 8529 23549,'-2'-6'-9008,"1"-4"7035,17 3 5451,42-10-2727,-3 9-589,-12 2 1,2 1 0,19 3 0,-31 1 0,1 1 0</inkml:trace>
+  <inkml:trace contextRef="#ctx0" brushRef="#br0" timeOffset="18438">8337 8157 22560,'-18'-21'-6466,"3"2"3850,0 3 1951,3 4 36,-1 1 726,5 6 111,0 1 155,6 25-1859,1 9 1681,1 13 131,17 1-1122,-13 9 787,34-13-407,-33 11 26,33-22-26,-34-5 159,30-6 787,-13-4-50,9-7 1461,4-3-515,-15-25 88,10-9 189,-15-13-1463,-5 11 1,0 0 810,-1-11-1120,-2-14 68,-5 4-1154,-1 16-273,0-13 111,0 30-78,0 24 805,0 25-187,8 2 0,3 2-943,16 26 457,-3-17 1,4-3 1238,15 10 0,-19-19 1,-1-1-1,12 7 1</inkml:trace>
+  <inkml:trace contextRef="#ctx0" brushRef="#br0" timeOffset="18799">9122 8071 22470,'-19'-21'-6776,"15"2"3488,-15 4 3090,6 7 610,9 23-251,-9 21 200,13 11-673,9-6 0,3 0-1838,6 14 1846,1-7 1,0 0 59,-3 6-199,-3-21 1,-1 0-733,-1 15 282,3-17-401,1 5 716,-8-25 884,5-2 654,-3-9 1263,-2-24-974,3-11-6,-1-14-857,0 12 1,0 0 785,3-11-582,0 6 0,-1 0 271,1-2-663,1 9 0,-1 2-972,0 11 1237,12-5 382,-11 27 351,4 23-1873,-3-3-100,1 22-1675,12 13 2227,-5-9 0,-6-16 0,0 0 0,9 13 1</inkml:trace>
+  <inkml:trace contextRef="#ctx0" brushRef="#br0" timeOffset="19103">10168 7922 22740,'-24'-24'-6073,"5"5"3763,-20 7 3188,0 6 205,10 4-199,-8 27 254,15-4-602,4 24-1402,8-6 1282,-1 23-89,10-10-869,10-8 1,2 0-1315,-5 9 838,16-10 0,5-2-1219,7 4 425,-3 10 701,20-15 1323,-31-12-511,14 5 550,-17-20 512,-10-1-664,-34-9 1302,-6-2-232,-18-21-897,19 10 1,0 0 0,-8-14 0,-13 10-1</inkml:trace>
+  <inkml:trace contextRef="#ctx0" brushRef="#br0" timeOffset="19683">10367 7536 22110,'3'19'-6409,"0"12"4357,13 15 77,-12 7 1560,11-16 1,1 0-516,-12 24 843,8-5 0,3 1-88,-6-22 1,-1-1-859,3 10 0,1 0 910,4-1 1,-1-3-328,3 18 460,-2-13 1,0-2-295,2 0 291,-3-9 0,2-2-282,-2-8 326,7 7-21,-11-25 926,1-3 898,-1-1 56,4-2 389,3-24-371,9-4 123,-5-14-743,17-8 229,-20 21-893,7 2-197,-15 3-878,0 21 1044,-3-11-774,0 14 252,0 0 546,4 16-2048,-1 12-470,7 23-365,-3-4 886,4 0-1562,7-2 1461,-4-13-504,22 10 467,-15-28 2351,25 4 920,-21-17 430,9 3-220,-6-26 813,-11-7-922,7-25-372,-18 11-363,-1-13-1218,-9 28-742,-2-8-499,-2 15-74,0 34-867,0 40 46,0 1 1348,-1-14 1,2-3-718,13-2-684,-10-2 2039,22-4 1,-23-5-1,10-4 1</inkml:trace>
+  <inkml:trace contextRef="#ctx0" brushRef="#br0" timeOffset="19850">11278 7828 22740,'-8'-35'-8225,"-5"5"3050,12 8 5640,13 33 1,-8-13 0,14 24-1</inkml:trace>
+  <inkml:trace contextRef="#ctx0" brushRef="#br0" timeOffset="20183">11848 8631 24718,'8'-20'-2369,"-1"15"4718,4-50-4154,-1 29 1108,3-32 50,1-4 14,-4 11 363,-3 5 0,-2-1-918,1-11 1025,-4 7 0,0 0-1634,-2-8 1611,0 20 1,0 2-493,0-8 141,-17 6-682,12 7 693,-13 4-60,8 15 220,7 31 497,-7 7 687,10 32-815,0-6-3,0 8 630,0 7-606,7-31 0,0 1-189,-6-1 1,2 1-620,10 14 1,1 1 18,-12-15 1,-1 1-639,11 21 0,-1 0 393,-8 4 540,6-23 1,-1-2 412,-5 10 1,5-6-1,-8-2 1</inkml:trace>
+  <inkml:trace contextRef="#ctx0" brushRef="#br0" timeOffset="20315">11827 8896 23909,'-20'-17'-5080,"-6"12"6026,24-24-3309,-9 8 320,11-5 1338,23-4 1445,-1 6-1564,24-2 1,6 0 899,-21 8 1,0 0 0,22-10 0,1 0-1,-22 13 1,1-1 0</inkml:trace>
+  <inkml:trace contextRef="#ctx0" brushRef="#br0" timeOffset="20566">12875 7349 23729,'-42'-13'-1834,"1"3"1694,0 7 797,3 2-49,0 18 837,4 3-1109,12 8 1,2 6-614,-8 18-97,12 3 0,4 4 53,5-19 1,5 2-116,6 7 1,4 6 0,-2-4-342,-5 0 0,4-2 135,9-5 1,6 2 0,-2-3-889,-4 5 0,1-3 234,12 1 0,3-2 164,-5 0 0,0-2 16,1-2 0,1-1 236,1-3 1,1-1 141,1-2 0,1-2 812,1-3 1,1-2 0,1-2-1,1-2 1,1-2 0,0 0-1</inkml:trace>
+  <inkml:trace contextRef="#ctx0" brushRef="#br0" timeOffset="20833">13847 7414 23279,'45'0'630,"-2"20"-2746,-11-16 1478,-10 22 1,0 4-1508,9-3 1455,-9 14 1,-4 6-927,-4 12 1128,-7-18 0,-3 4-1276,-15 13 1,-5 0 406,4-10 1,-2 0 1371,-3-4 0,-2 2 0,-2-2 0,-6 8 0,-2-2 0,-2 2 0,-1 0 0</inkml:trace>
+  <inkml:trace contextRef="#ctx0" brushRef="#br0" timeOffset="21870">11052 5014 22650,'-20'-28'-7002,"0"2"4871,0 5 1384,-2 4 840,2 4 277,-3 5 618,1 3-94,-3 5-894,0 27 1925,-3-2-118,-1 30-855,-1-2-615,10-7 0,0 3-226,6-9 1,1 2-244,2 5 1,0 6 0,3-5-312,1-3 0,4 1-576,10 13 1,6 9 0,2-9-516,-1-12 1,4-2 1300,10 10 1,6 5 0,0-10 0,-2-15 0,1-5 0,11 11 0,0-1 0</inkml:trace>
+  <inkml:trace contextRef="#ctx0" brushRef="#br0" timeOffset="22083">11620 5305 22560,'0'-41'-5936,"0"5"3987,0 8 975,0 6 605,21 12 2870,11 3-954,11 32-1697,5-1-510,-21 12 1,-3 4 464,-6-12 0,0 1-55,10 26 1,-3 4-86,-16-22 1,-1 0 103,6 14 1,-3-1-934,-10-14 0,-1-1-449,3 1 0,0 0 586,-1-1 1,-4-1 1052,-9 1 0,-2 0 0,10-2 0,0 1 1,-9-1-1,-1 0 0</inkml:trace>
+  <inkml:trace contextRef="#ctx0" brushRef="#br0" timeOffset="22585">11557 2471 21750,'-48'0'360,"0"20"1482,-1 3-1720,13 12 0,0 7-472,9-12 1,0 3 92,-2 10 0,-2 6 1,4-2-94,4-1 0,3 1 97,-1 7 1,1 5 0,3-4-290,5-5 1,4-2-71,-5 13 0,8 0-585,17-5 1,6-4-123,-5-13 1,4-1 1162,11 0 0,6 1 0,0-6 0,0-6 0,3-3 0,14 5 0,-1 1 0</inkml:trace>
+  <inkml:trace contextRef="#ctx0" brushRef="#br0" timeOffset="22816">12215 2879 22470,'0'-10'-5037,"0"22"3089,0 17 974,21 13-503,-16 8 933,28-10 141,-30-7 0,-3 2 371,13 20-863,-12-17 0,-2 1 945,1 18 40,0 6-377,-11-32 1,-6 3-464,-8 17 0,-5 1 948,-5-11 0,-3 0 0,8-6 0,-1 3 0,1-3 0,-9 4 1,0-1-1</inkml:trace>
+  <inkml:trace contextRef="#ctx0" brushRef="#br0" timeOffset="23988">1633 10649 23549,'-4'0'1619,"-1"-8"-4682,2 6 1472,1-11-218,18 11 3469,12-3-224,12 5-1136,-6 0 1,1 0-1291,16 0-1106,-2 7 1,3 1 2316,-18-7 1,1 2 0,14 10 0,0 3 0,-10-8 0,-1 0 0</inkml:trace>
+  <inkml:trace contextRef="#ctx0" brushRef="#br0" timeOffset="25900">3533 10396 23279,'0'-23'-6385,"-18"1"3946,13 3 875,-37 1 2451,21 3-869,-22 4 821,7 4-138,-4 5-823,-3 2 1718,-3 22 706,-1-2 476,1 20-1916,2-5 513,5 2-872,6 3-415,8 0-388,8 0-598,9-3-895,5 11-273,23-16-61,12 10 172,11-24 1256,5-4 291,5-9 850,-14-5 456,20-22 1004,-26-2-222,-9-14-81,-10 6-459,-9 6-1475,-4-9-624,4 10-177,-5-5-550,0 11-519,0 30 372,0 25 332,0 12-2,8-8 1,5-1 1355,13 4 0,-8-15 1,3 0-1,15 8 0</inkml:trace>
+  <inkml:trace contextRef="#ctx0" brushRef="#br0" timeOffset="26200">3883 10381 22290,'0'43'-6206,"0"17"4168,0-17 1063,0 16 427,0-14 212,0 1 32,0-1 76,0 14-1099,0-18 2677,0 16-541,0-32 1,0 1-720,0-32-90,0-30-90,0-6-104,-1-1 0,2-2-293,13-10-458,-13 4 0,2 0 618,12 20 1,0 1 16,-13-9 1,0 1 547,33-11 1,-18 8 0,18 1-1</inkml:trace>
+  <inkml:trace contextRef="#ctx0" brushRef="#br0" timeOffset="26538">4502 10512 22650,'-46'-33'-4362,"10"14"3333,13-6-769,-1 22 2848,14-18-2746,-6 42 2440,9-11-116,7 31-2224,19-4 709,-14 2 19,14 6 220,-1 0-1434,-13 0 2442,23-2-1828,-26 12 94,19-16 1481,-18 15 944,7-30-1215,-10 1 754,0-40 138,0-12-622,-13-20-731,12 13 0,-1-1 0,-10-14 796,17-4 0,7-1 1,15 0-1,-4 13 1,0-1-1</inkml:trace>
+  <inkml:trace contextRef="#ctx0" brushRef="#br0" timeOffset="26981">5113 10557 23009,'-52'-19'-1971,"9"15"2307,6-15-1645,8 4 454,-10 11 1246,12-12-889,-22 34 1753,28-13-833,-7 50-340,22-30-634,3 10 1,2 2-85,1 1 20,0 11-787,25-18 563,-19-3-1956,41-4 1440,-16 2 582,12-14 1442,13 1 445,-24-13 483,9 0 0,-16-22 209,-4 17 783,-2-42-2517,-6 27 837,-2-24-1392,-5 11-121,-2-15-846,-2 13-112,-2-8-170,0 19-344,0 5 1344,-14 5-282,10 28 925,-10 28 349,33 5-601,-9-8 1,1-1-508,11 2 117,9-3 0,0-1 108,-7-3 188,12-9 0,3-6 721,-5-9 1,10-4 0,-13-5-1</inkml:trace>
+  <inkml:trace contextRef="#ctx0" brushRef="#br0" timeOffset="27390">5595 10610 21930,'0'7'-6385,"0"8"4256,0 26 1065,0-7 425,0 2 214,19-13-155,5 0 510,12 3-1126,-1-14 2109,7 8-190,-12-18 862,22 4 48,-26-24 572,6 14 89,-15-32-1409,-5 19 586,0-28-1690,-6 15 224,-1-9-1242,-5 5-306,0 9-392,0-2 163,-15 18 1488,11 17-80,-12 44 422,16-2-197,0 4 0,0 1 9,0-21 1,0 1 174,0 27 0,0 1-45,0-24 0,0 1 7,0 3 1,-1 5 0,2-4-383,6-4 0,0 0-161,-5 11 1,0 1 205,5-4 1,0-3 282,-6-11 1,-2 0 279,1 15 0,0-2-143,0-2 0,0 10-112,-24-36 1901,17-4-959,-44-11 257,28-4-606,-28 0-434,19-8 0,-1-4 0,-21-17 0,17 4 0,1 0 0</inkml:trace>
+  <inkml:trace contextRef="#ctx0" brushRef="#br0" timeOffset="29782">6915 10690 22920,'-6'-5'-3740,"0"1"2782,0-1 123,1 1 762,1-2-754,-1 1 572,3 0-436,0 0-1351,1 1 1487,1-2 235,0-2 178,25-1 2142,-19-1-630,47-1 692,-25-1 734,28 0-164,-5 1-3736,2 5 1,3 2 1383,-20 1 1,0 1 0,22-1 0,-2 2 0,5 1-1</inkml:trace>
+  <inkml:trace contextRef="#ctx0" brushRef="#br0" timeOffset="30282">8808 10452 23729,'-26'-24'-5684,"3"-1"3494,-27 5 2841,7 1-248,-3 10 1,-3 1 385,-11-1-492,0 2 0,2 7 390,9 19-406,12-8 1,4 3 1897,7 22-881,2-1-993,43 9-1960,4-9 958,11-4 1,6 0-233,16 3 439,0-5 0,1-2-243,-21-13 0,-1-1 139,21 7 1,-2-2 843,0-1-126,7 2 1639,-35-12-794,-11 0-445,-38-5 676,-23-15-1557,-18 10-649,18-14 0,1 1-549,-11 12 1521,20-12 0,2-1 0,-5 2 1,4-13-1</inkml:trace>
+  <inkml:trace contextRef="#ctx0" brushRef="#br0" timeOffset="30870">9307 9633 22830,'1'-5'-3638,"-1"23"923,-16 35 2644,12 4-175,-4-17 0,0 1 20,7 4 1,2 0-67,-1-10 0,0 2 86,0 27 1,0 1-541,-1-27 1,2-1 426,8 25 1,1-2 74,-5 6-243,11-26 0,0-1-379,-12 8 526,23-5 36,-23-6 202,24 2-69,-12-16 120,14 4 528,-6-21 1045,0 0 383,-5-20-74,3 12 418,2-35-881,2 18 655,0-23-773,1 7-259,9-17-936,-10 15-114,9-17-618,-19 30-202,-1 4 1199,-7 9-963,-4 11 1833,1-5-1072,1 27-1737,-2-16 480,6 50-298,-3-30 656,-1 8 0,0 2-781,3 3-35,3 7-1104,3-8 626,-4-13 1970,11 3 99,-7-19 867,12-3 901,-11-5 81,6-22 230,-1-7-354,-6-12-305,7-14 153,-14 22-822,3-18-1053,-9 27-589,0-7-556,-2 42-69,0 22 222,0 11-21,16 13-951,-12-22 239,11 0-375,-1-1 2225,-10-3 1,23-2 0,-12-3 0</inkml:trace>
+  <inkml:trace contextRef="#ctx0" brushRef="#br0" timeOffset="31051">9998 10059 23099,'-19'-41'-8852,"9"13"5035,-7-2 3545,15 45 1,14 13-1,11 30 1</inkml:trace>
+  <inkml:trace contextRef="#ctx0" brushRef="#br0" timeOffset="31518">10388 10768 23189,'25'-42'-1718,"-19"7"-453,36-1 3792,-37 5-2859,28-16 2241,-19 8-1060,-4 5 1,-2-1-158,3-7-642,-11-13 4,0 4 610,0 14-1554,0-13 1425,0 27-831,-14 2 284,10 38 853,-10 3 888,14 26-823,0-12 0,0 1 0,0 26 0,0-16 0,0 6 0,0-4 0,0-7 0,0-2 0,0 24 0,0-2 127,0-1-1263,16-2-1421,-12-3 1600,13-4-380,-17-3 707,0 9 360,0-18-90,-20 9 1049,15-28 8,-31-4 2217,12-11-507,-7-4-13,-12-24-1536,16-7-910,12 1 0,0-2-513,-5-17-116,14 14 0,2 0-144,-4-6-1836,26-14 1380,16 8 451,12 12 1094,-3 9 1,2 1-1,17 1 1,-19 9-1,1 0 1</inkml:trace>
+  <inkml:trace contextRef="#ctx0" brushRef="#br0" timeOffset="31783">11332 9811 22110,'-30'16'1977,"4"-12"-1757,7 40-2357,3-18 1507,-2 28-552,5-4 236,2 2 538,6-9 0,2 1-321,1-11 0,0 1-265,-1 24 1,4 0-69,9-24 1,2 0 252,1 21 1,4-2-335,3-23 0,3-2 291,-1 9 0,1-3 737,13 6 0,3-6 0,1-4 0</inkml:trace>
+  <inkml:trace contextRef="#ctx0" brushRef="#br0" timeOffset="32466">10780 9873 22560,'-12'-2'-1039,"2"1"1038,5 0 294,1 1 144,1 16-1634,-3 10 304,2 10 456,-1 7 1,-2 1-788,0 9 716,1 2 0,1 1-736,2 1 608,2-9 0,1-1-943,0 7 1182,0-20 0,0-1-770,0 10 204,0-5-219,16-3 969,-12-6 0,12-4 0,-16-3 0</inkml:trace>
+  <inkml:trace contextRef="#ctx0" brushRef="#br0" timeOffset="32616">10577 10437 22380,'-24'-22'-5869,"6"1"3521,10 2-215,4-1 1593,4 2 815,19 0 1730,-15 0-2108,50 1-56,-20 1 913,0 8 0,2 1 0,28-7 0,-31 7 0,1 1 1</inkml:trace>
+  <inkml:trace contextRef="#ctx0" brushRef="#br0" timeOffset="33003">11987 9921 23459,'15'-8'2484,"-11"1"-4257,26 3 2424,-7 2-130,9 2-355,16 19-976,-18 9 87,-6 0 0,-2 3-1048,0 23 404,-9-22 0,-3 0-392,-2 21-386,-4 6 268,-4 3 1191,-11-28 0,-4 0 583,5 2 0,-4-1-17,-10 2 1,-5 0 295,3-1 1,-2 3 0,0-2 0,-7 6 0,-1 0 0,3-5 0,0 0 0,0 0 0</inkml:trace>
+  <inkml:trace contextRef="#ctx0" brushRef="#br0" timeOffset="33733">1430 13131 22920,'-10'-1'192,"2"-2"-1470,8 0-1329,25-4 4499,10 2-1475,-1 0 1,3-1 308,24 0-1254,-16 2 1,0 1-867,13 0 1452,-20 3 1,0 0 0,17 0-1,-1 0 1</inkml:trace>
+  <inkml:trace contextRef="#ctx0" brushRef="#br0" timeOffset="34552">3217 12741 23729,'-17'-23'-7202,"-9"-5"5396,4 10 1371,-24-2 1104,19 14 229,-22 21 912,25-10-553,-11 51-1651,18-33 1794,2 32-866,11-22-579,4 0-677,0-1-608,27 7-1153,10-13 1652,-3-8 0,2-2 348,22-6 420,-19-4 0,-1-1 909,5-5 442,9-15 854,-23 11-297,-4-30-307,-7 17-298,-2-31-1439,-9 17-372,-3-24-367,-4 24-658,0-15-636,0 25 296,-15-1 530,11 12-970,-12 21 3632,16 10-1687,18 13-265,-13 4 380,28-5-151,-29 3-822,31 2 1319,-8 13 0,11-14 0,-1 7 0</inkml:trace>
+  <inkml:trace contextRef="#ctx0" brushRef="#br0" timeOffset="34849">3800 12630 22200,'0'43'-6296,"19"-8"2950,-14 3 2114,14-8 271,-3 5-18,-3 15 331,5-12 219,1 20-1320,-12-28 1818,3 3 914,1-16-1210,-10-6 297,4-23 1442,-5-15-1536,0-30 101,0 2-105,0-5-591,0 23 1,0 1 735,0-20 0,0 19 0,0 1 1,0-13-1</inkml:trace>
+  <inkml:trace contextRef="#ctx0" brushRef="#br0" timeOffset="35233">4480 12616 21390,'0'42'-6385,"0"-7"4256,0 8 1065,15-7-724,-11 3 1309,10 1-445,-1 1 333,-10 11-1123,19-13 1604,-19 17 655,12-29 39,-14 4 55,4-19-1192,-5-22 1155,0-19 79,0-13-712,0 6 0,0 0 230,0-14-292,8 14 1,0 1 511,-4-15-720,13 1 850,0 1-361,-13 3 0,28 2 1,-14 2-1</inkml:trace>
+  <inkml:trace contextRef="#ctx0" brushRef="#br0" timeOffset="35668">5083 12668 23279,'-20'-21'-6509,"15"-7"3459,-27 25 4943,19-9-2681,-1 32 1624,3 7-788,11 12-642,0-1-1002,0-7 1582,0 13 352,19-10-2426,3 18 965,1-26-417,15 6 772,-12-21 1573,10-2 119,-2-9 583,-11 0 89,-2-16 684,4-8 62,-7 3-1698,-8-11 0,-1-2-292,-2 11-584,-3-35-723,-4 35-732,0 5 91,0 0-190,-14 10 784,11 21 570,-11 12 972,14 12-1114,0-3 425,18-7-157,-13 0-659,33 10 503,-9-11 483,25 5 0,-6-12 0,1-1 1</inkml:trace>
+  <inkml:trace contextRef="#ctx0" brushRef="#br0" timeOffset="36115">5760 12692 22470,'0'-17'-6566,"-19"1"4954,15 22 3071,-15 7 220,19 26-2998,0 2 378,0-9 234,17-10-1051,-12 0 1469,24-12 1035,-15 11-2282,10-9 591,-10-23 2807,-5-4-829,-9-22-1033,0 8 252,0 6 127,0 25-1318,0 18 1238,0 18-1002,18 7-1802,-14-1 1798,12-8 1,2 3 358,-7-9 0,-1 3 51,8 26 1,1 0-43,-4-23 0,0 1 177,-1 10 1,-1 8 0,-1-7-65,-3-11 1,-2 0 114,7 28 0,-3-3 672,-5-15-53,-2 14 41,-3-36-15,-1 1-845,-22-20 906,-19-15-275,-6 5 1,-7-31 0,18 10 0</inkml:trace>
+  <inkml:trace contextRef="#ctx0" brushRef="#br0" timeOffset="36399">7045 12889 22650,'51'0'-990,"-1"0"-89,-6-3 1112,4 2 1,7-2-1,2 3 1</inkml:trace>
+  <inkml:trace contextRef="#ctx0" brushRef="#br0" timeOffset="36949">8530 12316 23459,'0'42'-6205,"0"-6"4076,0 6 1065,0-8 425,18 5-528,-14-1 720,26 17-262,-27-16-1034,9 23 1552,-12-33 1271,0 11-451,0-23-89,0-3-6,0-29-306,0-10-614,0-15-996,0-18 673,0 16 824,8 4 1,4-1 0,11-9 0,-2 17 0,0 0 0</inkml:trace>
+  <inkml:trace contextRef="#ctx0" brushRef="#br0" timeOffset="37282">9002 12721 23909,'38'-15'2787,"-5"12"-3055,4-31-341,-5 29 671,4-35-618,0 23 1063,0-18-724,8 0 369,-15 9-731,6-15 333,-23 20-483,-2-4-498,-8 12-71,-2 4-840,-20 4 1834,-4 2 81,-19 24 693,19 6-463,3 7 0,5 4-302,11 12 110,-4-7 0,1-2-15,8 2-1009,22-6 1,6-2-1521,6 5 2554,4-15 1,4-2 0,10 5 0,3-1 0</inkml:trace>
+  <inkml:trace contextRef="#ctx0" brushRef="#br0" timeOffset="37616">9950 12368 22740,'-7'16'-2387,"20"8"-1966,-8 13 2651,28 1 937,-17 12-477,1-11 786,-4-6 0,0 1-281,3 4-1437,0 9 900,14-11 1942,-20-11-212,17 5-424,-17-19 519,2-2 527,-5-8 764,0-1 422,8-23-904,-5 17-69,7-42-2456,3 7 1342,-5-13 0,8-8 0,-8 16 0</inkml:trace>
+  <inkml:trace contextRef="#ctx0" brushRef="#br0" timeOffset="38070">10557 12765 22560,'0'6'-5666,"0"0"3807,0-4 795,23-14 3782,5 9-1295,14-29-373,-4 28-284,-10-27-916,8 11 2223,-11-9-684,11-11 52,-21 13-2568,3-23 1,-14 19-433,-1-12-32,-3 13 235,0 0-536,0 1 683,-17-7-912,12 11 719,-13-8 316,6 21 985,9 24 446,-18 22 738,19 14-1000,-6 7 295,8-10 212,0 3-354,-2-14 1,4 0 158,21 15-717,-11-10 1,0-2-876,16 2-139,14 8 1394,-10-14-327,12-10 825,12 1 112,-26-15 520,8-5 354,-15-4 53,-4 0-646,-1-16-576,4-6 1,-8 1-1,3 4 1</inkml:trace>
+  <inkml:trace contextRef="#ctx0" brushRef="#br0" timeOffset="38449">11230 12527 23729,'0'33'-6296,"18"-13"4099,-14 13 635,27-15 1937,-13 34-1755,0-18 938,-3-3 0,0-1-205,3 3-1382,13 21 1670,-8-29 644,-5 4 452,-4-13-1329,-5-7 1373,2-2 212,-5-6 864,2-22-521,-1-8-571,4-31-461,-2 8 365,5-6-958,-5 25 1,0 1 79,7-19-410,-1 8 0,1 0-887,5-5 1568,8-11 0,-8 26 0,0 4 0</inkml:trace>
+  <inkml:trace contextRef="#ctx0" brushRef="#br0" timeOffset="39066">12313 12355 23279,'-24'-15'-4248,"-15"0"3801,13-8-1414,-25 4 2052,17 12 403,-7 20 920,31 14-1745,1 8 0,5 2-1168,29 15 775,-12-8 0,1-2-895,17 2 1321,-10-17 1,0 0-843,2 21-749,3-15-132,4 13 1064,-28-28-285,10 3 1114,-31-15 2089,-4-31-2036,-16 18 1247,18-39-1287,5 24-88,16-7 447,0 2-28,0 11 178,0 2-2643,39 1 4384,-13 4-1798,12 5 1,3 2 1772,3-1-1011,-2 2 0,1 2 653,9-1-919,-16 0 1,0 0 752,14 0-90,2 0-1932,1 0 307,-17 0 0,1 0 30,18 0 259,-13-8 1,-2 0 318,2 4-38,11-29-244,-33 9-445,-3-9-515,-13-10-882,-4 17-84,-28-14-489,-8 21 1545,2 6 0,-1 2-294,-19 3 690,15 13 0,2 6 1077,0 20-27,-5 14 444,31 4-844,30 13-962,-14-13-344,19-16 1,4-1-1134,3 14 640,0-24 0,3-1 22,-4 0 1,-1-1 1149,3 0 0,1-2 1,2 0-1,0-2 0,0 1 1,1-1-1</inkml:trace>
+  <inkml:trace contextRef="#ctx0" brushRef="#br0" timeOffset="39499">14293 11831 24718,'-35'-30'-5609,"1"4"4162,5 5 792,-1 10 1054,2 5 274,-11 28 835,9 3-1241,6 12 0,3 6-600,8-12 0,2 2 515,-2 13 1,2 2-124,6-10 1,2-1-234,1 2 0,0 1-358,0-1 0,4 0-762,13 0 0,3-1-652,-6-1 1,3-1 421,14-1 1,3-2 1411,-7-2 0,1-1 0,1-2 0,2-1 0,0-3 0,1 1 0</inkml:trace>
+  <inkml:trace contextRef="#ctx0" brushRef="#br0" timeOffset="39720">14978 12014 23819,'11'-3'2638,"1"0"-1766,17 28-4114,-3-6 2335,-2 12 0,0 3-1074,6 10 1173,-9 0 1,-4 3-749,-3 13 671,-16-16 1,-4 7 0,-3-5-661,-1-7 1,-5-1 1459,-10 13 0,-6 5 0,0-7 1,-2-8-1,-2-3 0,2-3 1,0 0-1,0-1 0</inkml:trace>
+  <inkml:trace contextRef="#ctx0" brushRef="#br0" timeOffset="42916">992 15334 25888,'54'-13'2098,"-7"10"-2341,-1-10 741,14 13-1940,-13 0-1018,18 0 2406,-19 0 0,0 0 0,-1 0 0</inkml:trace>
+  <inkml:trace contextRef="#ctx0" brushRef="#br0" timeOffset="44534">3058 14825 24179,'-21'-35'-7648,"-16"2"6647,32 3-648,-41 6 2263,26 3-999,-23 5 990,10 6 174,-1 5-1076,-4 5 2200,-1 0-391,-18 18 917,15 10-1815,9-4 0,4 4 1023,3 20-1625,11-16 0,4 1-311,6 7-438,16-8 0,3 0-1497,-7 1 1355,34-6 0,8-4-575,-17-7 1045,18-4 0,1-4 108,-10-8 893,22-18 988,-32-7 409,6-25 127,-25 9-1390,1 0-492,-12-2-1156,2 14-79,-3-16-775,0 26-383,0-2 524,-14 15 1155,10 22 335,-10 16 275,14 13-240,8-9 1,3 1-1280,8 13-6,-1-4 0,3 1-354,7 7 1646,-12-19 0,-1-1 1,9 7-1,1-2 1</inkml:trace>
+  <inkml:trace contextRef="#ctx0" brushRef="#br0" timeOffset="44832">3360 14884 22920,'0'-35'-6386,"0"3"4168,-16 8 412,13 4 801,-13 6 1042,16 33-146,0 39-130,18 5-414,-12-19 1,-1 7 0,2-7 442,4-9 1,0-2-60,2 20 0,-3-1 259,-7-2 294,6-6-632,0 7 640,-7-18 25,11 5-579,-12-26 533,3-17 1374,-4-40-1265,0-3-542,-8-1 0,0-2-451,4-12-260,-4 6 0,1-1 886,6 22 0,2 1 1,-1-9-1,0 0 1,0-15-1</inkml:trace>
+  <inkml:trace contextRef="#ctx0" brushRef="#br0" timeOffset="45188">3787 14762 23549,'-28'-16'-4379,"5"3"3155,12 37 1031,4-5-90,24 24-1907,-12-6 1559,9-4 1,3 1-355,3 19-113,-11-15 1,1-2 109,21 14-122,-28 0 239,22-5-368,-22-4 1924,16-5-448,-17-7 1454,9 2-1728,-9-15 617,2 1-673,-4-32 51,-16-15 16,13-34-409,-24 5-226,24 11 0,3 0 62,-11-15-267,8 9 0,6 0 969,16-5 1,-17 21-1,1 3 1,16-9 0</inkml:trace>
+  <inkml:trace contextRef="#ctx0" brushRef="#br0" timeOffset="45633">4540 14881 23639,'-25'-18'-4076,"-20"14"5276,39-27-4336,-40 28 4289,28-22-2806,-17 21 2389,9-9-853,-5 4-495,9 6 1614,-11 9-389,18-3 1866,-4 53-3216,14-26 1195,1 34-1671,4-19 355,0-1-487,27 1-1457,4 13-83,16-17 1484,-17-13 0,0-4 760,10-3 933,-4-11 1,0-4 833,6-2 207,12-20 470,-22 12 745,-1-37-592,-7 19-990,-10-9 0,-3-3-363,3-10-475,-8 5 1,-1-1-1043,-2-3-401,-3-21-915,-17 35-89,12 0 756,-13 17 802,6 7 855,10 20-202,-10 15 707,12 11-707,19 7-727,5 11 148,12-13 30,-11-7 1,0-2-1023,8 3 1568,14 5 1,-12-23 0,1-5 0</inkml:trace>
+  <inkml:trace contextRef="#ctx0" brushRef="#br0" timeOffset="46048">5162 14906 22200,'-23'-17'-5252,"-8"8"5535,27 15-511,9 14-2586,20 18 1181,25-2 1447,-8-13 310,4 2-1107,-12-23 2139,-1 7-877,13-9 670,-13 0 1887,18-33-303,-31 25-1723,-7-24 1,-4-4-706,-5 16 172,-4-39-1830,0 33 217,-21-12-753,16 19-43,-28 4 902,31 30 323,-22 6 2097,21 25-1257,-3-10 1,0 2 359,6 27-282,-1 0 0,2 2 148,7-24 1,1-1 58,-8 17 0,2-2-761,13-16 1,-1-3 146,-13 0 0,-1 0-614,11-1 0,0-1 705,-9-2 1,-3-1-31,11 29-35,-2-6 415,-7 7 165,7-21-254,-9 11 288,-19-33-1283,-4 0 1623,-24-16 1,10-2 0,-2-2 0</inkml:trace>
+  <inkml:trace contextRef="#ctx0" brushRef="#br0" timeOffset="46236">6230 15180 21750,'11'0'0,"-3"0"0,8 0-180,1 0 101,26 7 0,-6-5 0,18 5 0</inkml:trace>
+  <inkml:trace contextRef="#ctx0" brushRef="#br0" timeOffset="46749">8015 14718 22560,'-51'-8'-1032,"2"3"1077,13 3 1,-1 1 348,-16 1-105,11 9 0,1 5 769,-1 16-1002,14-4 1,4 4-377,3 16-435,4 16-6,13-25-401,28 23-1215,-18-29 228,42 4 353,-12-19 720,11-8 1106,18-21 1007,-29 9-175,-7-25 0,-1-5 267,1 3-106,-11-3 1,-4-2 99,4-10-788,-7-2-631,-1 0-112,-7 12 0,-1 0-1381,1-18 1069,-1 8 0,-4 1-507,-18-8 634,19 10 0,-2 2-238,-31-4-96,31-7 325,-21 17 184,22 15 180,-8 29 1795,10 11-1472,0 32 66,9-14 1,1 1-472,-5 28 309,4-21 1,1 3-139,-2 5 1,-2-1 230,-5-13 0,1 2-516,5 2 1,3 4 0,-1-5-1072,-3-5 0,1-2 260,7 21 1,1-3 1124,6 1 0,1 6 0,-6-27 1</inkml:trace>
+  <inkml:trace contextRef="#ctx0" brushRef="#br0" timeOffset="47066">8185 15030 22740,'2'-15'-5121,"2"-5"3658,11 16 4465,0-7-2014,10 6-58,16-2-303,-6 3-456,0 0 1,1 0 58,11-1 517,-7 0 1,1-1 710,6-2-1655,13-3 249,-26 1 140,-4 1 56,-7-5-39,-9-8-926,-7 0-279,-23-18-1314,11 14 387,-38-19 74,10 20 24,-13-7-127,4 16 908,13 4 638,14 4 528,-13 4 2037,18 3-452,-7 20-263,10 10-1346,29 29-1236,-16-7 241,15-24 1,4 0-490,-5 4 0,1-1 1286,3-7 0,2-1 1,4 7-1,-2-1 0,14 9 1</inkml:trace>
+  <inkml:trace contextRef="#ctx0" brushRef="#br0" timeOffset="48052">8483 14674 22920,'0'-5'-5217,"0"1"3179,0 23 884,16 6-58,-12 15 645,11-1-547,6-6 704,-16 1-1389,29 1 1740,-30 0-397,24-2-536,-24-2 93,24-3-169,-16-3 1248,12-4 1,-8-6-1,0-3 1</inkml:trace>
+  <inkml:trace contextRef="#ctx0" brushRef="#br0" timeOffset="48300">8678 14270 22560,'-18'10'2678,"-5"-7"-2798,21 16-3323,-6-11 2950,8 18 1,0-7-1,0 8 1</inkml:trace>
+  <inkml:trace contextRef="#ctx0" brushRef="#br0" timeOffset="49004">9067 15059 23189,'15'-20'908,"5"-34"-2505,0 28 1899,4-14 0,-2-3-514,-6-5 56,3 3 0,1-1 135,0-10-91,-15 19 1,0 0-384,4-2 0,-2 2-126,-5-20 537,1 12 0,0 1-839,-3-2-103,0-19 330,0 38-199,0-1 366,-15 19 705,11 22-9,-11 3 1160,15 24-1390,0-6 1,0 2 152,0 27-189,7 2 1,1 3-30,-6-23 0,0 0-220,4 16 1,3 1-282,-1-17 0,-2-1-9,-4 1 1,0 0-504,11-1 0,0 1 9,-6 16 0,-1-1 658,0-16 1,1 0-79,-1 22 0,-2-2 247,-4 1 247,0-28 1,0-1 172,0 0 61,0-7 151,-25-9 2152,-6-7 309,-14-7-70,-15-24-1145,22 12-965,5-24 1,1-6-311,-3 6-132,13-3 0,3-5-416,7 3 1,3 1-2001,-2-21 1009,16 5 1,7 1-166,15-10 1173,13 9 0,8 3 247,-15 19 1,6 2 221,4 3 0,9-3 0,1 2 1,-5 3-1,8-1 0,-1 3 1,6-1-1,0 1 0,-1-1 0</inkml:trace>
+  <inkml:trace contextRef="#ctx0" brushRef="#br0" timeOffset="49683">10117 14730 23009,'19'-30'-551,"-14"0"-1727,28-6 3454,-29-3-2504,25-3 2225,-25-2-1074,9 11 1,2 0 282,-1-18-618,-7 18 0,1 0 185,8-30 505,-15 19-1670,4-17 1389,-5 34-1007,0-1 679,-14 42 1139,10 3-782,-10 29 94,8-9 0,1 2-176,4-7 1,-1 3 150,-3 30 0,-1 2-26,6-25 1,0 2-33,0 4 1,0 5 0,0-5-163,0-3 0,0-2-811,0 12 1,0 2 201,0-4 1,0-3 370,0-13 1,0 1 62,0 19 1,0-3-97,0-1 316,-9-17 1,0-4 571,4-6-140,-33-1 1604,5-18 119,-10-4-989,10-13 1,0-1 251,-8 6-479,4-19 0,1-4-368,-3 8-495,13-3 0,1-2-92,-2-2-1680,5 1-229,8 0 205,7 3 339,4 1 388,3 2 767,53-9 1437,-14 8-846,20 2 1,6 3 98,-26 5 1,0 2 0,16-5-1,1 1 1,-14 4 0,0-1-1</inkml:trace>
+  <inkml:trace contextRef="#ctx0" brushRef="#br0" timeOffset="49950">11015 13829 24359,'-18'-17'-5758,"-8"5"5595,15 5-283,-13 23 2440,7 3-1404,-3 23-775,2 1 20,-1 8-752,-3 9 1262,6-9 0,1 1-456,2-10 1,0 1 171,-2 14 0,2-1-813,5-15 0,2-1 229,1 0 0,1-1 111,2 0 0,0-1 32,0 0 1,3-1-448,8-1 1,0 0-172,-9-3 0,5 1-896,31 9 1,8-1 1854,-23-12 1,1-2 0,26 8 0,4-4-1,-19-13 1,1 0 0</inkml:trace>
+  <inkml:trace contextRef="#ctx0" brushRef="#br0" timeOffset="50716">12372 13761 24449,'14'-32'-2414,"19"-5"3219,-4 17 583,22 1 93,-7 16-1633,-4 19 1,1 6-334,-9-8 0,1 4 133,4 12 1,2 8 0,-4-1-464,-3 0 1,-4 1 298,10 14 1,-5 5-203,-15-15 0,-4 2 1,-2-1-427,1 7 1,-5 3-200,-5 6 0,-4 7 0,-3-6 91,-6-3 0,-5-1 735,0-6 0,-4 2 0,-1-3 608,-9 8 0,-3-3 0,7-16 0,-1-1 0,-1 1 0,-2 1 0,1-1 0,-1 1 1</inkml:trace>
+  <inkml:trace contextRef="#ctx0" brushRef="#br0" timeOffset="53865">1013 17068 23999,'-16'-12'-4149,"0"1"2872,3 2 916,3 0-225,3 2 32,4-1-822,2 4 411,1-2-631,18 2 3264,-13-1-609,35-2 427,-20 3-998,24-2-1092,-4 3 1194,9 1 1,4 1-1,4 1 1</inkml:trace>
+  <inkml:trace contextRef="#ctx0" brushRef="#br0" timeOffset="56117">3275 17023 24539,'0'-30'-6386,"-14"13"3105,10-1-1307,14 16 5003,29-5 1,16 22 0,7 4 0</inkml:trace>
+  <inkml:trace contextRef="#ctx0" brushRef="#br0" timeOffset="56251">4888 17122 21750,'20'3'-1078,"2"-1"534,-7-1 534,4 0 1,-2 1 0,0 1-1</inkml:trace>
+  <inkml:trace contextRef="#ctx0" brushRef="#br0" timeOffset="56399">6120 17286 22560,'14'10'-5043,"-3"-1"3142,-1-1-217,-1-1 2275,3-3 0,4 0 0,4-1 0</inkml:trace>
+  <inkml:trace contextRef="#ctx0" brushRef="#br0" timeOffset="56554">7832 17163 24629,'22'0'0,"-4"12"-2984,-4-9 1921,-4 9-3021,0-12 4299,0 0 0,5 0 0,1 0 1</inkml:trace>
 </inkml:ink>
 </file>
 
@@ -5726,10 +6525,505 @@
           <a:chExt cx="0" cy="0"/>
         </a:xfrm>
       </p:grpSpPr>
+      <mc:AlternateContent xmlns:mc="http://schemas.openxmlformats.org/markup-compatibility/2006">
+        <mc:Choice xmlns:p14="http://schemas.microsoft.com/office/powerpoint/2010/main" Requires="p14">
+          <p:contentPart p14:bwMode="auto" r:id="rId2">
+            <p14:nvContentPartPr>
+              <p14:cNvPr id="3" name="Ink 2">
+                <a:extLst>
+                  <a:ext uri="{FF2B5EF4-FFF2-40B4-BE49-F238E27FC236}">
+                    <a16:creationId xmlns:a16="http://schemas.microsoft.com/office/drawing/2014/main" id="{33B63026-61B8-E94C-A512-3104A21A1449}"/>
+                  </a:ext>
+                </a:extLst>
+              </p14:cNvPr>
+              <p14:cNvContentPartPr/>
+              <p14:nvPr/>
+            </p14:nvContentPartPr>
+            <p14:xfrm>
+              <a:off x="6480" y="144000"/>
+              <a:ext cx="12158280" cy="6525360"/>
+            </p14:xfrm>
+          </p:contentPart>
+        </mc:Choice>
+        <mc:Fallback>
+          <p:pic>
+            <p:nvPicPr>
+              <p:cNvPr id="3" name="Ink 2">
+                <a:extLst>
+                  <a:ext uri="{FF2B5EF4-FFF2-40B4-BE49-F238E27FC236}">
+                    <a16:creationId xmlns:a16="http://schemas.microsoft.com/office/drawing/2014/main" id="{33B63026-61B8-E94C-A512-3104A21A1449}"/>
+                  </a:ext>
+                </a:extLst>
+              </p:cNvPr>
+              <p:cNvPicPr/>
+              <p:nvPr/>
+            </p:nvPicPr>
+            <p:blipFill>
+              <a:blip r:embed="rId3"/>
+              <a:stretch>
+                <a:fillRect/>
+              </a:stretch>
+            </p:blipFill>
+            <p:spPr>
+              <a:xfrm>
+                <a:off x="-15120" y="122400"/>
+                <a:ext cx="12201480" cy="6568560"/>
+              </a:xfrm>
+              <a:prstGeom prst="rect">
+                <a:avLst/>
+              </a:prstGeom>
+            </p:spPr>
+          </p:pic>
+        </mc:Fallback>
+      </mc:AlternateContent>
     </p:spTree>
     <p:extLst>
       <p:ext uri="{BB962C8B-B14F-4D97-AF65-F5344CB8AC3E}">
         <p14:creationId xmlns:p14="http://schemas.microsoft.com/office/powerpoint/2010/main" val="1109105299"/>
+      </p:ext>
+    </p:extLst>
+  </p:cSld>
+  <p:clrMapOvr>
+    <a:masterClrMapping/>
+  </p:clrMapOvr>
+</p:sld>
+</file>
+
+<file path=ppt/slides/slide12.xml><?xml version="1.0" encoding="utf-8"?>
+<p:sld xmlns:a="http://schemas.openxmlformats.org/drawingml/2006/main" xmlns:r="http://schemas.openxmlformats.org/officeDocument/2006/relationships" xmlns:p="http://schemas.openxmlformats.org/presentationml/2006/main">
+  <p:cSld>
+    <p:spTree>
+      <p:nvGrpSpPr>
+        <p:cNvPr id="1" name=""/>
+        <p:cNvGrpSpPr/>
+        <p:nvPr/>
+      </p:nvGrpSpPr>
+      <p:grpSpPr>
+        <a:xfrm>
+          <a:off x="0" y="0"/>
+          <a:ext cx="0" cy="0"/>
+          <a:chOff x="0" y="0"/>
+          <a:chExt cx="0" cy="0"/>
+        </a:xfrm>
+      </p:grpSpPr>
+      <mc:AlternateContent xmlns:mc="http://schemas.openxmlformats.org/markup-compatibility/2006">
+        <mc:Choice xmlns:p14="http://schemas.microsoft.com/office/powerpoint/2010/main" Requires="p14">
+          <p:contentPart p14:bwMode="auto" r:id="rId2">
+            <p14:nvContentPartPr>
+              <p14:cNvPr id="2" name="Ink 1">
+                <a:extLst>
+                  <a:ext uri="{FF2B5EF4-FFF2-40B4-BE49-F238E27FC236}">
+                    <a16:creationId xmlns:a16="http://schemas.microsoft.com/office/drawing/2014/main" id="{96FC5F55-209B-0A46-AB53-D9D2C10A4DB1}"/>
+                  </a:ext>
+                </a:extLst>
+              </p14:cNvPr>
+              <p14:cNvContentPartPr/>
+              <p14:nvPr/>
+            </p14:nvContentPartPr>
+            <p14:xfrm>
+              <a:off x="622800" y="153000"/>
+              <a:ext cx="8696880" cy="5629320"/>
+            </p14:xfrm>
+          </p:contentPart>
+        </mc:Choice>
+        <mc:Fallback>
+          <p:pic>
+            <p:nvPicPr>
+              <p:cNvPr id="2" name="Ink 1">
+                <a:extLst>
+                  <a:ext uri="{FF2B5EF4-FFF2-40B4-BE49-F238E27FC236}">
+                    <a16:creationId xmlns:a16="http://schemas.microsoft.com/office/drawing/2014/main" id="{96FC5F55-209B-0A46-AB53-D9D2C10A4DB1}"/>
+                  </a:ext>
+                </a:extLst>
+              </p:cNvPr>
+              <p:cNvPicPr/>
+              <p:nvPr/>
+            </p:nvPicPr>
+            <p:blipFill>
+              <a:blip r:embed="rId3"/>
+              <a:stretch>
+                <a:fillRect/>
+              </a:stretch>
+            </p:blipFill>
+            <p:spPr>
+              <a:xfrm>
+                <a:off x="601200" y="131400"/>
+                <a:ext cx="8740080" cy="5672520"/>
+              </a:xfrm>
+              <a:prstGeom prst="rect">
+                <a:avLst/>
+              </a:prstGeom>
+            </p:spPr>
+          </p:pic>
+        </mc:Fallback>
+      </mc:AlternateContent>
+    </p:spTree>
+    <p:extLst>
+      <p:ext uri="{BB962C8B-B14F-4D97-AF65-F5344CB8AC3E}">
+        <p14:creationId xmlns:p14="http://schemas.microsoft.com/office/powerpoint/2010/main" val="1853150798"/>
+      </p:ext>
+    </p:extLst>
+  </p:cSld>
+  <p:clrMapOvr>
+    <a:masterClrMapping/>
+  </p:clrMapOvr>
+</p:sld>
+</file>
+
+<file path=ppt/slides/slide13.xml><?xml version="1.0" encoding="utf-8"?>
+<p:sld xmlns:a="http://schemas.openxmlformats.org/drawingml/2006/main" xmlns:r="http://schemas.openxmlformats.org/officeDocument/2006/relationships" xmlns:p="http://schemas.openxmlformats.org/presentationml/2006/main">
+  <p:cSld>
+    <p:spTree>
+      <p:nvGrpSpPr>
+        <p:cNvPr id="1" name=""/>
+        <p:cNvGrpSpPr/>
+        <p:nvPr/>
+      </p:nvGrpSpPr>
+      <p:grpSpPr>
+        <a:xfrm>
+          <a:off x="0" y="0"/>
+          <a:ext cx="0" cy="0"/>
+          <a:chOff x="0" y="0"/>
+          <a:chExt cx="0" cy="0"/>
+        </a:xfrm>
+      </p:grpSpPr>
+      <mc:AlternateContent xmlns:mc="http://schemas.openxmlformats.org/markup-compatibility/2006">
+        <mc:Choice xmlns:p14="http://schemas.microsoft.com/office/powerpoint/2010/main" Requires="p14">
+          <p:contentPart p14:bwMode="auto" r:id="rId2">
+            <p14:nvContentPartPr>
+              <p14:cNvPr id="2" name="Ink 1">
+                <a:extLst>
+                  <a:ext uri="{FF2B5EF4-FFF2-40B4-BE49-F238E27FC236}">
+                    <a16:creationId xmlns:a16="http://schemas.microsoft.com/office/drawing/2014/main" id="{56C9C579-3C7F-5445-B625-3EE916BECCEB}"/>
+                  </a:ext>
+                </a:extLst>
+              </p14:cNvPr>
+              <p14:cNvContentPartPr/>
+              <p14:nvPr/>
+            </p14:nvContentPartPr>
+            <p14:xfrm>
+              <a:off x="491400" y="182160"/>
+              <a:ext cx="10000080" cy="6327360"/>
+            </p14:xfrm>
+          </p:contentPart>
+        </mc:Choice>
+        <mc:Fallback>
+          <p:pic>
+            <p:nvPicPr>
+              <p:cNvPr id="2" name="Ink 1">
+                <a:extLst>
+                  <a:ext uri="{FF2B5EF4-FFF2-40B4-BE49-F238E27FC236}">
+                    <a16:creationId xmlns:a16="http://schemas.microsoft.com/office/drawing/2014/main" id="{56C9C579-3C7F-5445-B625-3EE916BECCEB}"/>
+                  </a:ext>
+                </a:extLst>
+              </p:cNvPr>
+              <p:cNvPicPr/>
+              <p:nvPr/>
+            </p:nvPicPr>
+            <p:blipFill>
+              <a:blip r:embed="rId3"/>
+              <a:stretch>
+                <a:fillRect/>
+              </a:stretch>
+            </p:blipFill>
+            <p:spPr>
+              <a:xfrm>
+                <a:off x="469800" y="160560"/>
+                <a:ext cx="10043280" cy="6370560"/>
+              </a:xfrm>
+              <a:prstGeom prst="rect">
+                <a:avLst/>
+              </a:prstGeom>
+            </p:spPr>
+          </p:pic>
+        </mc:Fallback>
+      </mc:AlternateContent>
+    </p:spTree>
+    <p:extLst>
+      <p:ext uri="{BB962C8B-B14F-4D97-AF65-F5344CB8AC3E}">
+        <p14:creationId xmlns:p14="http://schemas.microsoft.com/office/powerpoint/2010/main" val="468176238"/>
+      </p:ext>
+    </p:extLst>
+  </p:cSld>
+  <p:clrMapOvr>
+    <a:masterClrMapping/>
+  </p:clrMapOvr>
+</p:sld>
+</file>
+
+<file path=ppt/slides/slide14.xml><?xml version="1.0" encoding="utf-8"?>
+<p:sld xmlns:a="http://schemas.openxmlformats.org/drawingml/2006/main" xmlns:r="http://schemas.openxmlformats.org/officeDocument/2006/relationships" xmlns:p="http://schemas.openxmlformats.org/presentationml/2006/main">
+  <p:cSld>
+    <p:spTree>
+      <p:nvGrpSpPr>
+        <p:cNvPr id="1" name=""/>
+        <p:cNvGrpSpPr/>
+        <p:nvPr/>
+      </p:nvGrpSpPr>
+      <p:grpSpPr>
+        <a:xfrm>
+          <a:off x="0" y="0"/>
+          <a:ext cx="0" cy="0"/>
+          <a:chOff x="0" y="0"/>
+          <a:chExt cx="0" cy="0"/>
+        </a:xfrm>
+      </p:grpSpPr>
+      <mc:AlternateContent xmlns:mc="http://schemas.openxmlformats.org/markup-compatibility/2006">
+        <mc:Choice xmlns:p14="http://schemas.microsoft.com/office/powerpoint/2010/main" Requires="p14">
+          <p:contentPart p14:bwMode="auto" r:id="rId2">
+            <p14:nvContentPartPr>
+              <p14:cNvPr id="2" name="Ink 1">
+                <a:extLst>
+                  <a:ext uri="{FF2B5EF4-FFF2-40B4-BE49-F238E27FC236}">
+                    <a16:creationId xmlns:a16="http://schemas.microsoft.com/office/drawing/2014/main" id="{95F019F9-F800-B940-907E-C97703C91657}"/>
+                  </a:ext>
+                </a:extLst>
+              </p14:cNvPr>
+              <p14:cNvContentPartPr/>
+              <p14:nvPr/>
+            </p14:nvContentPartPr>
+            <p14:xfrm>
+              <a:off x="634320" y="109800"/>
+              <a:ext cx="11054160" cy="6105960"/>
+            </p14:xfrm>
+          </p:contentPart>
+        </mc:Choice>
+        <mc:Fallback>
+          <p:pic>
+            <p:nvPicPr>
+              <p:cNvPr id="2" name="Ink 1">
+                <a:extLst>
+                  <a:ext uri="{FF2B5EF4-FFF2-40B4-BE49-F238E27FC236}">
+                    <a16:creationId xmlns:a16="http://schemas.microsoft.com/office/drawing/2014/main" id="{95F019F9-F800-B940-907E-C97703C91657}"/>
+                  </a:ext>
+                </a:extLst>
+              </p:cNvPr>
+              <p:cNvPicPr/>
+              <p:nvPr/>
+            </p:nvPicPr>
+            <p:blipFill>
+              <a:blip r:embed="rId3"/>
+              <a:stretch>
+                <a:fillRect/>
+              </a:stretch>
+            </p:blipFill>
+            <p:spPr>
+              <a:xfrm>
+                <a:off x="612720" y="88200"/>
+                <a:ext cx="11097360" cy="6149160"/>
+              </a:xfrm>
+              <a:prstGeom prst="rect">
+                <a:avLst/>
+              </a:prstGeom>
+            </p:spPr>
+          </p:pic>
+        </mc:Fallback>
+      </mc:AlternateContent>
+    </p:spTree>
+    <p:extLst>
+      <p:ext uri="{BB962C8B-B14F-4D97-AF65-F5344CB8AC3E}">
+        <p14:creationId xmlns:p14="http://schemas.microsoft.com/office/powerpoint/2010/main" val="3989244613"/>
+      </p:ext>
+    </p:extLst>
+  </p:cSld>
+  <p:clrMapOvr>
+    <a:masterClrMapping/>
+  </p:clrMapOvr>
+</p:sld>
+</file>
+
+<file path=ppt/slides/slide15.xml><?xml version="1.0" encoding="utf-8"?>
+<p:sld xmlns:a="http://schemas.openxmlformats.org/drawingml/2006/main" xmlns:r="http://schemas.openxmlformats.org/officeDocument/2006/relationships" xmlns:p="http://schemas.openxmlformats.org/presentationml/2006/main">
+  <p:cSld>
+    <p:spTree>
+      <p:nvGrpSpPr>
+        <p:cNvPr id="1" name=""/>
+        <p:cNvGrpSpPr/>
+        <p:nvPr/>
+      </p:nvGrpSpPr>
+      <p:grpSpPr>
+        <a:xfrm>
+          <a:off x="0" y="0"/>
+          <a:ext cx="0" cy="0"/>
+          <a:chOff x="0" y="0"/>
+          <a:chExt cx="0" cy="0"/>
+        </a:xfrm>
+      </p:grpSpPr>
+      <mc:AlternateContent xmlns:mc="http://schemas.openxmlformats.org/markup-compatibility/2006">
+        <mc:Choice xmlns:p14="http://schemas.microsoft.com/office/powerpoint/2010/main" Requires="p14">
+          <p:contentPart p14:bwMode="auto" r:id="rId2">
+            <p14:nvContentPartPr>
+              <p14:cNvPr id="2" name="Ink 1">
+                <a:extLst>
+                  <a:ext uri="{FF2B5EF4-FFF2-40B4-BE49-F238E27FC236}">
+                    <a16:creationId xmlns:a16="http://schemas.microsoft.com/office/drawing/2014/main" id="{0231B2F4-C8D7-664D-AB07-A1D0D6CE24BA}"/>
+                  </a:ext>
+                </a:extLst>
+              </p14:cNvPr>
+              <p14:cNvContentPartPr/>
+              <p14:nvPr/>
+            </p14:nvContentPartPr>
+            <p14:xfrm>
+              <a:off x="340920" y="352440"/>
+              <a:ext cx="5126400" cy="5887080"/>
+            </p14:xfrm>
+          </p:contentPart>
+        </mc:Choice>
+        <mc:Fallback>
+          <p:pic>
+            <p:nvPicPr>
+              <p:cNvPr id="2" name="Ink 1">
+                <a:extLst>
+                  <a:ext uri="{FF2B5EF4-FFF2-40B4-BE49-F238E27FC236}">
+                    <a16:creationId xmlns:a16="http://schemas.microsoft.com/office/drawing/2014/main" id="{0231B2F4-C8D7-664D-AB07-A1D0D6CE24BA}"/>
+                  </a:ext>
+                </a:extLst>
+              </p:cNvPr>
+              <p:cNvPicPr/>
+              <p:nvPr/>
+            </p:nvPicPr>
+            <p:blipFill>
+              <a:blip r:embed="rId3"/>
+              <a:stretch>
+                <a:fillRect/>
+              </a:stretch>
+            </p:blipFill>
+            <p:spPr>
+              <a:xfrm>
+                <a:off x="319320" y="330840"/>
+                <a:ext cx="5169600" cy="5930280"/>
+              </a:xfrm>
+              <a:prstGeom prst="rect">
+                <a:avLst/>
+              </a:prstGeom>
+            </p:spPr>
+          </p:pic>
+        </mc:Fallback>
+      </mc:AlternateContent>
+    </p:spTree>
+    <p:extLst>
+      <p:ext uri="{BB962C8B-B14F-4D97-AF65-F5344CB8AC3E}">
+        <p14:creationId xmlns:p14="http://schemas.microsoft.com/office/powerpoint/2010/main" val="2436823155"/>
+      </p:ext>
+    </p:extLst>
+  </p:cSld>
+  <p:clrMapOvr>
+    <a:masterClrMapping/>
+  </p:clrMapOvr>
+</p:sld>
+</file>
+
+<file path=ppt/slides/slide16.xml><?xml version="1.0" encoding="utf-8"?>
+<p:sld xmlns:a="http://schemas.openxmlformats.org/drawingml/2006/main" xmlns:r="http://schemas.openxmlformats.org/officeDocument/2006/relationships" xmlns:p="http://schemas.openxmlformats.org/presentationml/2006/main">
+  <p:cSld>
+    <p:spTree>
+      <p:nvGrpSpPr>
+        <p:cNvPr id="1" name=""/>
+        <p:cNvGrpSpPr/>
+        <p:nvPr/>
+      </p:nvGrpSpPr>
+      <p:grpSpPr>
+        <a:xfrm>
+          <a:off x="0" y="0"/>
+          <a:ext cx="0" cy="0"/>
+          <a:chOff x="0" y="0"/>
+          <a:chExt cx="0" cy="0"/>
+        </a:xfrm>
+      </p:grpSpPr>
+    </p:spTree>
+    <p:extLst>
+      <p:ext uri="{BB962C8B-B14F-4D97-AF65-F5344CB8AC3E}">
+        <p14:creationId xmlns:p14="http://schemas.microsoft.com/office/powerpoint/2010/main" val="357699455"/>
+      </p:ext>
+    </p:extLst>
+  </p:cSld>
+  <p:clrMapOvr>
+    <a:masterClrMapping/>
+  </p:clrMapOvr>
+</p:sld>
+</file>
+
+<file path=ppt/slides/slide17.xml><?xml version="1.0" encoding="utf-8"?>
+<p:sld xmlns:a="http://schemas.openxmlformats.org/drawingml/2006/main" xmlns:r="http://schemas.openxmlformats.org/officeDocument/2006/relationships" xmlns:p="http://schemas.openxmlformats.org/presentationml/2006/main">
+  <p:cSld>
+    <p:spTree>
+      <p:nvGrpSpPr>
+        <p:cNvPr id="1" name=""/>
+        <p:cNvGrpSpPr/>
+        <p:nvPr/>
+      </p:nvGrpSpPr>
+      <p:grpSpPr>
+        <a:xfrm>
+          <a:off x="0" y="0"/>
+          <a:ext cx="0" cy="0"/>
+          <a:chOff x="0" y="0"/>
+          <a:chExt cx="0" cy="0"/>
+        </a:xfrm>
+      </p:grpSpPr>
+    </p:spTree>
+    <p:extLst>
+      <p:ext uri="{BB962C8B-B14F-4D97-AF65-F5344CB8AC3E}">
+        <p14:creationId xmlns:p14="http://schemas.microsoft.com/office/powerpoint/2010/main" val="2517113515"/>
+      </p:ext>
+    </p:extLst>
+  </p:cSld>
+  <p:clrMapOvr>
+    <a:masterClrMapping/>
+  </p:clrMapOvr>
+</p:sld>
+</file>
+
+<file path=ppt/slides/slide18.xml><?xml version="1.0" encoding="utf-8"?>
+<p:sld xmlns:a="http://schemas.openxmlformats.org/drawingml/2006/main" xmlns:r="http://schemas.openxmlformats.org/officeDocument/2006/relationships" xmlns:p="http://schemas.openxmlformats.org/presentationml/2006/main">
+  <p:cSld>
+    <p:spTree>
+      <p:nvGrpSpPr>
+        <p:cNvPr id="1" name=""/>
+        <p:cNvGrpSpPr/>
+        <p:nvPr/>
+      </p:nvGrpSpPr>
+      <p:grpSpPr>
+        <a:xfrm>
+          <a:off x="0" y="0"/>
+          <a:ext cx="0" cy="0"/>
+          <a:chOff x="0" y="0"/>
+          <a:chExt cx="0" cy="0"/>
+        </a:xfrm>
+      </p:grpSpPr>
+    </p:spTree>
+    <p:extLst>
+      <p:ext uri="{BB962C8B-B14F-4D97-AF65-F5344CB8AC3E}">
+        <p14:creationId xmlns:p14="http://schemas.microsoft.com/office/powerpoint/2010/main" val="3038203632"/>
+      </p:ext>
+    </p:extLst>
+  </p:cSld>
+  <p:clrMapOvr>
+    <a:masterClrMapping/>
+  </p:clrMapOvr>
+</p:sld>
+</file>
+
+<file path=ppt/slides/slide19.xml><?xml version="1.0" encoding="utf-8"?>
+<p:sld xmlns:a="http://schemas.openxmlformats.org/drawingml/2006/main" xmlns:r="http://schemas.openxmlformats.org/officeDocument/2006/relationships" xmlns:p="http://schemas.openxmlformats.org/presentationml/2006/main">
+  <p:cSld>
+    <p:spTree>
+      <p:nvGrpSpPr>
+        <p:cNvPr id="1" name=""/>
+        <p:cNvGrpSpPr/>
+        <p:nvPr/>
+      </p:nvGrpSpPr>
+      <p:grpSpPr>
+        <a:xfrm>
+          <a:off x="0" y="0"/>
+          <a:ext cx="0" cy="0"/>
+          <a:chOff x="0" y="0"/>
+          <a:chExt cx="0" cy="0"/>
+        </a:xfrm>
+      </p:grpSpPr>
+    </p:spTree>
+    <p:extLst>
+      <p:ext uri="{BB962C8B-B14F-4D97-AF65-F5344CB8AC3E}">
+        <p14:creationId xmlns:p14="http://schemas.microsoft.com/office/powerpoint/2010/main" val="3212091594"/>
       </p:ext>
     </p:extLst>
   </p:cSld>

</xml_diff>